<commit_message>
Status Report, Tela de Projetos
</commit_message>
<xml_diff>
--- a/Documentos/Status Report/StatusReport.pptx
+++ b/Documentos/Status Report/StatusReport.pptx
@@ -7,10 +7,10 @@
     <p:sldMasterId id="2147483665" r:id="rId6"/>
   </p:sldMasterIdLst>
   <p:notesMasterIdLst>
-    <p:notesMasterId r:id="rId14"/>
+    <p:notesMasterId r:id="rId15"/>
   </p:notesMasterIdLst>
   <p:handoutMasterIdLst>
-    <p:handoutMasterId r:id="rId15"/>
+    <p:handoutMasterId r:id="rId16"/>
   </p:handoutMasterIdLst>
   <p:sldIdLst>
     <p:sldId id="472" r:id="rId7"/>
@@ -20,6 +20,7 @@
     <p:sldId id="473" r:id="rId11"/>
     <p:sldId id="471" r:id="rId12"/>
     <p:sldId id="477" r:id="rId13"/>
+    <p:sldId id="478" r:id="rId14"/>
   </p:sldIdLst>
   <p:sldSz cx="13442950" cy="7561263"/>
   <p:notesSz cx="7104063" cy="10234613"/>
@@ -133,6 +134,7 @@
             <p14:sldId id="473"/>
             <p14:sldId id="471"/>
             <p14:sldId id="477"/>
+            <p14:sldId id="478"/>
           </p14:sldIdLst>
         </p14:section>
       </p14:sectionLst>
@@ -246,7 +248,7 @@
             <a:fld id="{C3CD65D1-5C11-455D-9F9A-0E035F00A0DA}" type="datetimeFigureOut">
               <a:rPr lang="pt-BR" smtClean="0"/>
               <a:pPr/>
-              <a:t>22/09/2021</a:t>
+              <a:t>29/09/2021</a:t>
             </a:fld>
             <a:endParaRPr lang="pt-BR"/>
           </a:p>
@@ -414,7 +416,7 @@
             <a:fld id="{A05DA3EF-18EA-43DE-B1BB-402A3C558822}" type="datetimeFigureOut">
               <a:rPr lang="pt-BR" smtClean="0"/>
               <a:pPr/>
-              <a:t>22/09/2021</a:t>
+              <a:t>29/09/2021</a:t>
             </a:fld>
             <a:endParaRPr lang="pt-BR"/>
           </a:p>
@@ -1229,6 +1231,99 @@
     <p:extLst>
       <p:ext uri="{BB962C8B-B14F-4D97-AF65-F5344CB8AC3E}">
         <p14:creationId xmlns:p14="http://schemas.microsoft.com/office/powerpoint/2010/main" val="4180573926"/>
+      </p:ext>
+    </p:extLst>
+  </p:cSld>
+  <p:clrMapOvr>
+    <a:masterClrMapping/>
+  </p:clrMapOvr>
+</p:notes>
+</file>
+
+<file path=ppt/notesSlides/notesSlide7.xml><?xml version="1.0" encoding="utf-8"?>
+<p:notes xmlns:a="http://schemas.openxmlformats.org/drawingml/2006/main" xmlns:r="http://schemas.openxmlformats.org/officeDocument/2006/relationships" xmlns:p="http://schemas.openxmlformats.org/presentationml/2006/main">
+  <p:cSld>
+    <p:spTree>
+      <p:nvGrpSpPr>
+        <p:cNvPr id="1" name=""/>
+        <p:cNvGrpSpPr/>
+        <p:nvPr/>
+      </p:nvGrpSpPr>
+      <p:grpSpPr>
+        <a:xfrm>
+          <a:off x="0" y="0"/>
+          <a:ext cx="0" cy="0"/>
+          <a:chOff x="0" y="0"/>
+          <a:chExt cx="0" cy="0"/>
+        </a:xfrm>
+      </p:grpSpPr>
+      <p:sp>
+        <p:nvSpPr>
+          <p:cNvPr id="2" name="Slide Image Placeholder 1"/>
+          <p:cNvSpPr>
+            <a:spLocks noGrp="1" noRot="1" noChangeAspect="1"/>
+          </p:cNvSpPr>
+          <p:nvPr>
+            <p:ph type="sldImg"/>
+          </p:nvPr>
+        </p:nvSpPr>
+        <p:spPr/>
+      </p:sp>
+      <p:sp>
+        <p:nvSpPr>
+          <p:cNvPr id="3" name="Notes Placeholder 2"/>
+          <p:cNvSpPr>
+            <a:spLocks noGrp="1"/>
+          </p:cNvSpPr>
+          <p:nvPr>
+            <p:ph type="body" idx="1"/>
+          </p:nvPr>
+        </p:nvSpPr>
+        <p:spPr/>
+        <p:txBody>
+          <a:bodyPr/>
+          <a:lstStyle/>
+          <a:p>
+            <a:endParaRPr lang="en-US"/>
+          </a:p>
+        </p:txBody>
+      </p:sp>
+      <p:sp>
+        <p:nvSpPr>
+          <p:cNvPr id="4" name="Slide Number Placeholder 3"/>
+          <p:cNvSpPr>
+            <a:spLocks noGrp="1"/>
+          </p:cNvSpPr>
+          <p:nvPr>
+            <p:ph type="sldNum" sz="quarter" idx="10"/>
+          </p:nvPr>
+        </p:nvSpPr>
+        <p:spPr/>
+        <p:txBody>
+          <a:bodyPr/>
+          <a:lstStyle/>
+          <a:p>
+            <a:fld id="{B39AF3DB-B6A1-2444-9DD8-53D016F8E638}" type="slidenum">
+              <a:rPr lang="pt-BR" smtClean="0">
+                <a:solidFill>
+                  <a:prstClr val="black"/>
+                </a:solidFill>
+              </a:rPr>
+              <a:pPr/>
+              <a:t>8</a:t>
+            </a:fld>
+            <a:endParaRPr lang="pt-BR">
+              <a:solidFill>
+                <a:prstClr val="black"/>
+              </a:solidFill>
+            </a:endParaRPr>
+          </a:p>
+        </p:txBody>
+      </p:sp>
+    </p:spTree>
+    <p:extLst>
+      <p:ext uri="{BB962C8B-B14F-4D97-AF65-F5344CB8AC3E}">
+        <p14:creationId xmlns:p14="http://schemas.microsoft.com/office/powerpoint/2010/main" val="3999837420"/>
       </p:ext>
     </p:extLst>
   </p:cSld>
@@ -31933,6 +32028,1991 @@
     <p:extLst>
       <p:ext uri="{BB962C8B-B14F-4D97-AF65-F5344CB8AC3E}">
         <p14:creationId xmlns:p14="http://schemas.microsoft.com/office/powerpoint/2010/main" val="3623469582"/>
+      </p:ext>
+    </p:extLst>
+  </p:cSld>
+  <p:clrMapOvr>
+    <a:masterClrMapping/>
+  </p:clrMapOvr>
+</p:sld>
+</file>
+
+<file path=ppt/slides/slide8.xml><?xml version="1.0" encoding="utf-8"?>
+<p:sld xmlns:a="http://schemas.openxmlformats.org/drawingml/2006/main" xmlns:r="http://schemas.openxmlformats.org/officeDocument/2006/relationships" xmlns:p="http://schemas.openxmlformats.org/presentationml/2006/main">
+  <p:cSld>
+    <p:spTree>
+      <p:nvGrpSpPr>
+        <p:cNvPr id="1" name=""/>
+        <p:cNvGrpSpPr/>
+        <p:nvPr/>
+      </p:nvGrpSpPr>
+      <p:grpSpPr>
+        <a:xfrm>
+          <a:off x="0" y="0"/>
+          <a:ext cx="0" cy="0"/>
+          <a:chOff x="0" y="0"/>
+          <a:chExt cx="0" cy="0"/>
+        </a:xfrm>
+      </p:grpSpPr>
+      <p:sp>
+        <p:nvSpPr>
+          <p:cNvPr id="43" name="Rectangle 42"/>
+          <p:cNvSpPr/>
+          <p:nvPr/>
+        </p:nvSpPr>
+        <p:spPr>
+          <a:xfrm>
+            <a:off x="6804884" y="1106495"/>
+            <a:ext cx="6204408" cy="2962168"/>
+          </a:xfrm>
+          <a:prstGeom prst="rect">
+            <a:avLst/>
+          </a:prstGeom>
+          <a:noFill/>
+          <a:ln w="12700">
+            <a:solidFill>
+              <a:schemeClr val="bg1">
+                <a:lumMod val="50000"/>
+              </a:schemeClr>
+            </a:solidFill>
+          </a:ln>
+        </p:spPr>
+        <p:style>
+          <a:lnRef idx="2">
+            <a:schemeClr val="accent4"/>
+          </a:lnRef>
+          <a:fillRef idx="1">
+            <a:schemeClr val="lt1"/>
+          </a:fillRef>
+          <a:effectRef idx="0">
+            <a:schemeClr val="accent4"/>
+          </a:effectRef>
+          <a:fontRef idx="minor">
+            <a:schemeClr val="dk1"/>
+          </a:fontRef>
+        </p:style>
+        <p:txBody>
+          <a:bodyPr tIns="105844" rtlCol="0" anchor="t"/>
+          <a:lstStyle/>
+          <a:p>
+            <a:pPr defTabSz="672130">
+              <a:spcAft>
+                <a:spcPts val="882"/>
+              </a:spcAft>
+            </a:pPr>
+            <a:endParaRPr lang="pt-BR" sz="1470" dirty="0">
+              <a:solidFill>
+                <a:schemeClr val="tx1"/>
+              </a:solidFill>
+              <a:latin typeface="Exo 2 Medium" panose="00000600000000000000" pitchFamily="50" charset="0"/>
+              <a:cs typeface="Simplon BP Regular"/>
+            </a:endParaRPr>
+          </a:p>
+        </p:txBody>
+      </p:sp>
+      <p:sp>
+        <p:nvSpPr>
+          <p:cNvPr id="3" name="Title 2"/>
+          <p:cNvSpPr>
+            <a:spLocks noGrp="1"/>
+          </p:cNvSpPr>
+          <p:nvPr>
+            <p:ph type="title"/>
+          </p:nvPr>
+        </p:nvSpPr>
+        <p:spPr>
+          <a:xfrm>
+            <a:off x="469692" y="185232"/>
+            <a:ext cx="12098020" cy="800352"/>
+          </a:xfrm>
+        </p:spPr>
+        <p:txBody>
+          <a:bodyPr vert="horz" wrap="square" lIns="105844" tIns="0" rIns="105844" bIns="0" numCol="1" anchor="t" anchorCtr="0" compatLnSpc="1">
+            <a:prstTxWarp prst="textNoShape">
+              <a:avLst/>
+            </a:prstTxWarp>
+            <a:noAutofit/>
+          </a:bodyPr>
+          <a:lstStyle/>
+          <a:p>
+            <a:pPr algn="l">
+              <a:spcAft>
+                <a:spcPts val="882"/>
+              </a:spcAft>
+            </a:pPr>
+            <a:r>
+              <a:rPr lang="en-US" sz="2646" dirty="0">
+                <a:solidFill>
+                  <a:srgbClr val="08276B"/>
+                </a:solidFill>
+                <a:latin typeface="Exo 2 Medium" panose="00000600000000000000" pitchFamily="50" charset="0"/>
+                <a:cs typeface="Simplon Oi Headline"/>
+              </a:rPr>
+              <a:t>SEMANA 7 – 28/09/2021</a:t>
+            </a:r>
+          </a:p>
+        </p:txBody>
+      </p:sp>
+      <p:sp>
+        <p:nvSpPr>
+          <p:cNvPr id="78" name="TextBox 118"/>
+          <p:cNvSpPr txBox="1"/>
+          <p:nvPr/>
+        </p:nvSpPr>
+        <p:spPr>
+          <a:xfrm>
+            <a:off x="11822773" y="576471"/>
+            <a:ext cx="899678" cy="179824"/>
+          </a:xfrm>
+          <a:prstGeom prst="rect">
+            <a:avLst/>
+          </a:prstGeom>
+          <a:noFill/>
+          <a:ln w="12700">
+            <a:noFill/>
+          </a:ln>
+        </p:spPr>
+        <p:style>
+          <a:lnRef idx="2">
+            <a:schemeClr val="accent4"/>
+          </a:lnRef>
+          <a:fillRef idx="1">
+            <a:schemeClr val="lt1"/>
+          </a:fillRef>
+          <a:effectRef idx="0">
+            <a:schemeClr val="accent4"/>
+          </a:effectRef>
+          <a:fontRef idx="minor">
+            <a:schemeClr val="dk1"/>
+          </a:fontRef>
+        </p:style>
+        <p:txBody>
+          <a:bodyPr wrap="none" lIns="52922" tIns="52922" rIns="52922" bIns="0" rtlCol="0" anchor="b"/>
+          <a:lstStyle>
+            <a:defPPr>
+              <a:defRPr lang="en-US"/>
+            </a:defPPr>
+            <a:lvl1pPr algn="ctr">
+              <a:defRPr sz="1000" b="1">
+                <a:latin typeface="Simplon BP Regular"/>
+                <a:cs typeface="Simplon BP Regular"/>
+              </a:defRPr>
+            </a:lvl1pPr>
+            <a:lvl2pPr>
+              <a:defRPr>
+                <a:solidFill>
+                  <a:schemeClr val="dk1"/>
+                </a:solidFill>
+              </a:defRPr>
+            </a:lvl2pPr>
+            <a:lvl3pPr>
+              <a:defRPr>
+                <a:solidFill>
+                  <a:schemeClr val="dk1"/>
+                </a:solidFill>
+              </a:defRPr>
+            </a:lvl3pPr>
+            <a:lvl4pPr>
+              <a:defRPr>
+                <a:solidFill>
+                  <a:schemeClr val="dk1"/>
+                </a:solidFill>
+              </a:defRPr>
+            </a:lvl4pPr>
+            <a:lvl5pPr>
+              <a:defRPr>
+                <a:solidFill>
+                  <a:schemeClr val="dk1"/>
+                </a:solidFill>
+              </a:defRPr>
+            </a:lvl5pPr>
+            <a:lvl6pPr>
+              <a:defRPr>
+                <a:solidFill>
+                  <a:schemeClr val="dk1"/>
+                </a:solidFill>
+              </a:defRPr>
+            </a:lvl6pPr>
+            <a:lvl7pPr>
+              <a:defRPr>
+                <a:solidFill>
+                  <a:schemeClr val="dk1"/>
+                </a:solidFill>
+              </a:defRPr>
+            </a:lvl7pPr>
+            <a:lvl8pPr>
+              <a:defRPr>
+                <a:solidFill>
+                  <a:schemeClr val="dk1"/>
+                </a:solidFill>
+              </a:defRPr>
+            </a:lvl8pPr>
+            <a:lvl9pPr>
+              <a:defRPr>
+                <a:solidFill>
+                  <a:schemeClr val="dk1"/>
+                </a:solidFill>
+              </a:defRPr>
+            </a:lvl9pPr>
+          </a:lstStyle>
+          <a:p>
+            <a:pPr defTabSz="672130"/>
+            <a:r>
+              <a:rPr lang="pt-BR" sz="1176" b="0" dirty="0">
+                <a:solidFill>
+                  <a:prstClr val="black"/>
+                </a:solidFill>
+                <a:latin typeface="Exo 2 Medium" panose="00000600000000000000" pitchFamily="50" charset="0"/>
+              </a:rPr>
+              <a:t>Negócios</a:t>
+            </a:r>
+          </a:p>
+        </p:txBody>
+      </p:sp>
+      <p:sp>
+        <p:nvSpPr>
+          <p:cNvPr id="109" name="Oval 120"/>
+          <p:cNvSpPr>
+            <a:spLocks noChangeAspect="1"/>
+          </p:cNvSpPr>
+          <p:nvPr/>
+        </p:nvSpPr>
+        <p:spPr>
+          <a:xfrm>
+            <a:off x="11193898" y="324247"/>
+            <a:ext cx="211404" cy="211689"/>
+          </a:xfrm>
+          <a:prstGeom prst="ellipse">
+            <a:avLst/>
+          </a:prstGeom>
+          <a:solidFill>
+            <a:schemeClr val="bg1">
+              <a:lumMod val="65000"/>
+            </a:schemeClr>
+          </a:solidFill>
+          <a:ln w="12700">
+            <a:solidFill>
+              <a:schemeClr val="accent3"/>
+            </a:solidFill>
+          </a:ln>
+        </p:spPr>
+        <p:style>
+          <a:lnRef idx="2">
+            <a:schemeClr val="accent1">
+              <a:shade val="50000"/>
+            </a:schemeClr>
+          </a:lnRef>
+          <a:fillRef idx="1">
+            <a:schemeClr val="accent1"/>
+          </a:fillRef>
+          <a:effectRef idx="0">
+            <a:schemeClr val="accent1"/>
+          </a:effectRef>
+          <a:fontRef idx="minor">
+            <a:schemeClr val="lt1"/>
+          </a:fontRef>
+        </p:style>
+        <p:txBody>
+          <a:bodyPr wrap="none" lIns="52922" tIns="52922" rIns="52922" rtlCol="0" anchor="ctr"/>
+          <a:lstStyle/>
+          <a:p>
+            <a:pPr algn="ctr" defTabSz="672130"/>
+            <a:endParaRPr lang="en-US" sz="1176" dirty="0">
+              <a:solidFill>
+                <a:prstClr val="black"/>
+              </a:solidFill>
+              <a:latin typeface="Exo 2 Medium" panose="00000600000000000000" pitchFamily="50" charset="0"/>
+              <a:cs typeface="Simplon BP Regular"/>
+            </a:endParaRPr>
+          </a:p>
+        </p:txBody>
+      </p:sp>
+      <p:sp>
+        <p:nvSpPr>
+          <p:cNvPr id="80" name="TextBox 123"/>
+          <p:cNvSpPr txBox="1"/>
+          <p:nvPr/>
+        </p:nvSpPr>
+        <p:spPr>
+          <a:xfrm>
+            <a:off x="10852497" y="576471"/>
+            <a:ext cx="899678" cy="179824"/>
+          </a:xfrm>
+          <a:prstGeom prst="rect">
+            <a:avLst/>
+          </a:prstGeom>
+          <a:noFill/>
+          <a:ln w="12700">
+            <a:noFill/>
+          </a:ln>
+        </p:spPr>
+        <p:style>
+          <a:lnRef idx="2">
+            <a:schemeClr val="accent4"/>
+          </a:lnRef>
+          <a:fillRef idx="1">
+            <a:schemeClr val="lt1"/>
+          </a:fillRef>
+          <a:effectRef idx="0">
+            <a:schemeClr val="accent4"/>
+          </a:effectRef>
+          <a:fontRef idx="minor">
+            <a:schemeClr val="dk1"/>
+          </a:fontRef>
+        </p:style>
+        <p:txBody>
+          <a:bodyPr wrap="none" lIns="52922" tIns="52922" rIns="52922" bIns="0" rtlCol="0" anchor="b"/>
+          <a:lstStyle>
+            <a:defPPr>
+              <a:defRPr lang="en-US"/>
+            </a:defPPr>
+            <a:lvl1pPr algn="ctr">
+              <a:defRPr sz="1000" b="1">
+                <a:latin typeface="Simplon BP Regular"/>
+                <a:cs typeface="Simplon BP Regular"/>
+              </a:defRPr>
+            </a:lvl1pPr>
+            <a:lvl2pPr>
+              <a:defRPr>
+                <a:solidFill>
+                  <a:schemeClr val="dk1"/>
+                </a:solidFill>
+              </a:defRPr>
+            </a:lvl2pPr>
+            <a:lvl3pPr>
+              <a:defRPr>
+                <a:solidFill>
+                  <a:schemeClr val="dk1"/>
+                </a:solidFill>
+              </a:defRPr>
+            </a:lvl3pPr>
+            <a:lvl4pPr>
+              <a:defRPr>
+                <a:solidFill>
+                  <a:schemeClr val="dk1"/>
+                </a:solidFill>
+              </a:defRPr>
+            </a:lvl4pPr>
+            <a:lvl5pPr>
+              <a:defRPr>
+                <a:solidFill>
+                  <a:schemeClr val="dk1"/>
+                </a:solidFill>
+              </a:defRPr>
+            </a:lvl5pPr>
+            <a:lvl6pPr>
+              <a:defRPr>
+                <a:solidFill>
+                  <a:schemeClr val="dk1"/>
+                </a:solidFill>
+              </a:defRPr>
+            </a:lvl6pPr>
+            <a:lvl7pPr>
+              <a:defRPr>
+                <a:solidFill>
+                  <a:schemeClr val="dk1"/>
+                </a:solidFill>
+              </a:defRPr>
+            </a:lvl7pPr>
+            <a:lvl8pPr>
+              <a:defRPr>
+                <a:solidFill>
+                  <a:schemeClr val="dk1"/>
+                </a:solidFill>
+              </a:defRPr>
+            </a:lvl8pPr>
+            <a:lvl9pPr>
+              <a:defRPr>
+                <a:solidFill>
+                  <a:schemeClr val="dk1"/>
+                </a:solidFill>
+              </a:defRPr>
+            </a:lvl9pPr>
+          </a:lstStyle>
+          <a:p>
+            <a:pPr defTabSz="672130"/>
+            <a:r>
+              <a:rPr lang="pt-BR" sz="1176" b="0" dirty="0">
+                <a:solidFill>
+                  <a:prstClr val="black"/>
+                </a:solidFill>
+                <a:latin typeface="Exo 2 Medium" panose="00000600000000000000" pitchFamily="50" charset="0"/>
+              </a:rPr>
+              <a:t>Plataforma</a:t>
+            </a:r>
+          </a:p>
+        </p:txBody>
+      </p:sp>
+      <p:sp>
+        <p:nvSpPr>
+          <p:cNvPr id="82" name="TextBox 128"/>
+          <p:cNvSpPr txBox="1"/>
+          <p:nvPr/>
+        </p:nvSpPr>
+        <p:spPr>
+          <a:xfrm>
+            <a:off x="9854245" y="576471"/>
+            <a:ext cx="899678" cy="179824"/>
+          </a:xfrm>
+          <a:prstGeom prst="rect">
+            <a:avLst/>
+          </a:prstGeom>
+          <a:noFill/>
+          <a:ln w="12700">
+            <a:noFill/>
+          </a:ln>
+        </p:spPr>
+        <p:style>
+          <a:lnRef idx="2">
+            <a:schemeClr val="accent4"/>
+          </a:lnRef>
+          <a:fillRef idx="1">
+            <a:schemeClr val="lt1"/>
+          </a:fillRef>
+          <a:effectRef idx="0">
+            <a:schemeClr val="accent4"/>
+          </a:effectRef>
+          <a:fontRef idx="minor">
+            <a:schemeClr val="dk1"/>
+          </a:fontRef>
+        </p:style>
+        <p:txBody>
+          <a:bodyPr wrap="none" lIns="52922" tIns="52922" rIns="52922" bIns="0" rtlCol="0" anchor="b"/>
+          <a:lstStyle>
+            <a:defPPr>
+              <a:defRPr lang="en-US"/>
+            </a:defPPr>
+            <a:lvl1pPr algn="ctr">
+              <a:defRPr sz="1000" b="1">
+                <a:latin typeface="Simplon BP Regular"/>
+                <a:cs typeface="Simplon BP Regular"/>
+              </a:defRPr>
+            </a:lvl1pPr>
+            <a:lvl2pPr>
+              <a:defRPr>
+                <a:solidFill>
+                  <a:schemeClr val="dk1"/>
+                </a:solidFill>
+              </a:defRPr>
+            </a:lvl2pPr>
+            <a:lvl3pPr>
+              <a:defRPr>
+                <a:solidFill>
+                  <a:schemeClr val="dk1"/>
+                </a:solidFill>
+              </a:defRPr>
+            </a:lvl3pPr>
+            <a:lvl4pPr>
+              <a:defRPr>
+                <a:solidFill>
+                  <a:schemeClr val="dk1"/>
+                </a:solidFill>
+              </a:defRPr>
+            </a:lvl4pPr>
+            <a:lvl5pPr>
+              <a:defRPr>
+                <a:solidFill>
+                  <a:schemeClr val="dk1"/>
+                </a:solidFill>
+              </a:defRPr>
+            </a:lvl5pPr>
+            <a:lvl6pPr>
+              <a:defRPr>
+                <a:solidFill>
+                  <a:schemeClr val="dk1"/>
+                </a:solidFill>
+              </a:defRPr>
+            </a:lvl6pPr>
+            <a:lvl7pPr>
+              <a:defRPr>
+                <a:solidFill>
+                  <a:schemeClr val="dk1"/>
+                </a:solidFill>
+              </a:defRPr>
+            </a:lvl7pPr>
+            <a:lvl8pPr>
+              <a:defRPr>
+                <a:solidFill>
+                  <a:schemeClr val="dk1"/>
+                </a:solidFill>
+              </a:defRPr>
+            </a:lvl8pPr>
+            <a:lvl9pPr>
+              <a:defRPr>
+                <a:solidFill>
+                  <a:schemeClr val="dk1"/>
+                </a:solidFill>
+              </a:defRPr>
+            </a:lvl9pPr>
+          </a:lstStyle>
+          <a:p>
+            <a:pPr defTabSz="672130"/>
+            <a:r>
+              <a:rPr lang="pt-BR" sz="1176" b="0" dirty="0">
+                <a:solidFill>
+                  <a:prstClr val="black"/>
+                </a:solidFill>
+                <a:latin typeface="Exo 2 Medium" panose="00000600000000000000" pitchFamily="50" charset="0"/>
+              </a:rPr>
+              <a:t>Back</a:t>
+            </a:r>
+          </a:p>
+        </p:txBody>
+      </p:sp>
+      <p:sp>
+        <p:nvSpPr>
+          <p:cNvPr id="84" name="TextBox 133"/>
+          <p:cNvSpPr txBox="1"/>
+          <p:nvPr/>
+        </p:nvSpPr>
+        <p:spPr>
+          <a:xfrm>
+            <a:off x="8888645" y="576471"/>
+            <a:ext cx="899678" cy="179824"/>
+          </a:xfrm>
+          <a:prstGeom prst="rect">
+            <a:avLst/>
+          </a:prstGeom>
+          <a:noFill/>
+          <a:ln w="12700">
+            <a:noFill/>
+          </a:ln>
+        </p:spPr>
+        <p:style>
+          <a:lnRef idx="2">
+            <a:schemeClr val="accent4"/>
+          </a:lnRef>
+          <a:fillRef idx="1">
+            <a:schemeClr val="lt1"/>
+          </a:fillRef>
+          <a:effectRef idx="0">
+            <a:schemeClr val="accent4"/>
+          </a:effectRef>
+          <a:fontRef idx="minor">
+            <a:schemeClr val="dk1"/>
+          </a:fontRef>
+        </p:style>
+        <p:txBody>
+          <a:bodyPr wrap="none" lIns="52922" tIns="52922" rIns="52922" bIns="0" rtlCol="0" anchor="b"/>
+          <a:lstStyle>
+            <a:defPPr>
+              <a:defRPr lang="en-US"/>
+            </a:defPPr>
+            <a:lvl1pPr algn="ctr">
+              <a:defRPr sz="1000" b="1">
+                <a:latin typeface="Simplon BP Regular"/>
+                <a:cs typeface="Simplon BP Regular"/>
+              </a:defRPr>
+            </a:lvl1pPr>
+            <a:lvl2pPr>
+              <a:defRPr>
+                <a:solidFill>
+                  <a:schemeClr val="dk1"/>
+                </a:solidFill>
+              </a:defRPr>
+            </a:lvl2pPr>
+            <a:lvl3pPr>
+              <a:defRPr>
+                <a:solidFill>
+                  <a:schemeClr val="dk1"/>
+                </a:solidFill>
+              </a:defRPr>
+            </a:lvl3pPr>
+            <a:lvl4pPr>
+              <a:defRPr>
+                <a:solidFill>
+                  <a:schemeClr val="dk1"/>
+                </a:solidFill>
+              </a:defRPr>
+            </a:lvl4pPr>
+            <a:lvl5pPr>
+              <a:defRPr>
+                <a:solidFill>
+                  <a:schemeClr val="dk1"/>
+                </a:solidFill>
+              </a:defRPr>
+            </a:lvl5pPr>
+            <a:lvl6pPr>
+              <a:defRPr>
+                <a:solidFill>
+                  <a:schemeClr val="dk1"/>
+                </a:solidFill>
+              </a:defRPr>
+            </a:lvl6pPr>
+            <a:lvl7pPr>
+              <a:defRPr>
+                <a:solidFill>
+                  <a:schemeClr val="dk1"/>
+                </a:solidFill>
+              </a:defRPr>
+            </a:lvl7pPr>
+            <a:lvl8pPr>
+              <a:defRPr>
+                <a:solidFill>
+                  <a:schemeClr val="dk1"/>
+                </a:solidFill>
+              </a:defRPr>
+            </a:lvl8pPr>
+            <a:lvl9pPr>
+              <a:defRPr>
+                <a:solidFill>
+                  <a:schemeClr val="dk1"/>
+                </a:solidFill>
+              </a:defRPr>
+            </a:lvl9pPr>
+          </a:lstStyle>
+          <a:p>
+            <a:pPr defTabSz="672130"/>
+            <a:r>
+              <a:rPr lang="pt-BR" sz="1176" b="0" dirty="0">
+                <a:solidFill>
+                  <a:prstClr val="black"/>
+                </a:solidFill>
+                <a:latin typeface="Exo 2 Medium" panose="00000600000000000000" pitchFamily="50" charset="0"/>
+              </a:rPr>
+              <a:t>Front</a:t>
+            </a:r>
+          </a:p>
+        </p:txBody>
+      </p:sp>
+      <p:sp>
+        <p:nvSpPr>
+          <p:cNvPr id="88" name="Oval 134"/>
+          <p:cNvSpPr>
+            <a:spLocks noChangeAspect="1"/>
+          </p:cNvSpPr>
+          <p:nvPr/>
+        </p:nvSpPr>
+        <p:spPr>
+          <a:xfrm>
+            <a:off x="8443555" y="297930"/>
+            <a:ext cx="211404" cy="211689"/>
+          </a:xfrm>
+          <a:prstGeom prst="ellipse">
+            <a:avLst/>
+          </a:prstGeom>
+          <a:solidFill>
+            <a:srgbClr val="1BCF13"/>
+          </a:solidFill>
+          <a:ln w="12700">
+            <a:solidFill>
+              <a:schemeClr val="accent3"/>
+            </a:solidFill>
+          </a:ln>
+        </p:spPr>
+        <p:style>
+          <a:lnRef idx="2">
+            <a:schemeClr val="accent1">
+              <a:shade val="50000"/>
+            </a:schemeClr>
+          </a:lnRef>
+          <a:fillRef idx="1">
+            <a:schemeClr val="accent1"/>
+          </a:fillRef>
+          <a:effectRef idx="0">
+            <a:schemeClr val="accent1"/>
+          </a:effectRef>
+          <a:fontRef idx="minor">
+            <a:schemeClr val="lt1"/>
+          </a:fontRef>
+        </p:style>
+        <p:txBody>
+          <a:bodyPr wrap="none" lIns="52922" tIns="52922" rIns="52922" rtlCol="0" anchor="ctr"/>
+          <a:lstStyle/>
+          <a:p>
+            <a:pPr algn="ctr" defTabSz="672130"/>
+            <a:endParaRPr lang="en-US" sz="1176" dirty="0">
+              <a:solidFill>
+                <a:srgbClr val="FFC000"/>
+              </a:solidFill>
+              <a:latin typeface="Exo 2 Medium" panose="00000600000000000000" pitchFamily="50" charset="0"/>
+              <a:cs typeface="Simplon BP Regular"/>
+            </a:endParaRPr>
+          </a:p>
+        </p:txBody>
+      </p:sp>
+      <p:sp>
+        <p:nvSpPr>
+          <p:cNvPr id="86" name="TextBox 138"/>
+          <p:cNvSpPr txBox="1"/>
+          <p:nvPr/>
+        </p:nvSpPr>
+        <p:spPr>
+          <a:xfrm>
+            <a:off x="8126053" y="576471"/>
+            <a:ext cx="899678" cy="179824"/>
+          </a:xfrm>
+          <a:prstGeom prst="rect">
+            <a:avLst/>
+          </a:prstGeom>
+          <a:noFill/>
+          <a:ln w="12700">
+            <a:noFill/>
+          </a:ln>
+        </p:spPr>
+        <p:style>
+          <a:lnRef idx="2">
+            <a:schemeClr val="accent4"/>
+          </a:lnRef>
+          <a:fillRef idx="1">
+            <a:schemeClr val="lt1"/>
+          </a:fillRef>
+          <a:effectRef idx="0">
+            <a:schemeClr val="accent4"/>
+          </a:effectRef>
+          <a:fontRef idx="minor">
+            <a:schemeClr val="dk1"/>
+          </a:fontRef>
+        </p:style>
+        <p:txBody>
+          <a:bodyPr wrap="none" lIns="52922" tIns="52922" rIns="52922" bIns="0" rtlCol="0" anchor="b"/>
+          <a:lstStyle>
+            <a:defPPr>
+              <a:defRPr lang="en-US"/>
+            </a:defPPr>
+            <a:lvl1pPr algn="ctr">
+              <a:defRPr sz="1000" b="1">
+                <a:latin typeface="Simplon BP Regular"/>
+                <a:cs typeface="Simplon BP Regular"/>
+              </a:defRPr>
+            </a:lvl1pPr>
+            <a:lvl2pPr>
+              <a:defRPr>
+                <a:solidFill>
+                  <a:schemeClr val="dk1"/>
+                </a:solidFill>
+              </a:defRPr>
+            </a:lvl2pPr>
+            <a:lvl3pPr>
+              <a:defRPr>
+                <a:solidFill>
+                  <a:schemeClr val="dk1"/>
+                </a:solidFill>
+              </a:defRPr>
+            </a:lvl3pPr>
+            <a:lvl4pPr>
+              <a:defRPr>
+                <a:solidFill>
+                  <a:schemeClr val="dk1"/>
+                </a:solidFill>
+              </a:defRPr>
+            </a:lvl4pPr>
+            <a:lvl5pPr>
+              <a:defRPr>
+                <a:solidFill>
+                  <a:schemeClr val="dk1"/>
+                </a:solidFill>
+              </a:defRPr>
+            </a:lvl5pPr>
+            <a:lvl6pPr>
+              <a:defRPr>
+                <a:solidFill>
+                  <a:schemeClr val="dk1"/>
+                </a:solidFill>
+              </a:defRPr>
+            </a:lvl6pPr>
+            <a:lvl7pPr>
+              <a:defRPr>
+                <a:solidFill>
+                  <a:schemeClr val="dk1"/>
+                </a:solidFill>
+              </a:defRPr>
+            </a:lvl7pPr>
+            <a:lvl8pPr>
+              <a:defRPr>
+                <a:solidFill>
+                  <a:schemeClr val="dk1"/>
+                </a:solidFill>
+              </a:defRPr>
+            </a:lvl8pPr>
+            <a:lvl9pPr>
+              <a:defRPr>
+                <a:solidFill>
+                  <a:schemeClr val="dk1"/>
+                </a:solidFill>
+              </a:defRPr>
+            </a:lvl9pPr>
+          </a:lstStyle>
+          <a:p>
+            <a:pPr defTabSz="672130"/>
+            <a:r>
+              <a:rPr lang="en-US" sz="1176" b="0" dirty="0" err="1">
+                <a:solidFill>
+                  <a:prstClr val="black"/>
+                </a:solidFill>
+                <a:latin typeface="Exo 2 Medium" panose="00000600000000000000" pitchFamily="50" charset="0"/>
+              </a:rPr>
+              <a:t>Equipe</a:t>
+            </a:r>
+            <a:endParaRPr lang="en-US" sz="1176" b="0" dirty="0">
+              <a:solidFill>
+                <a:prstClr val="black"/>
+              </a:solidFill>
+              <a:latin typeface="Exo 2 Medium" panose="00000600000000000000" pitchFamily="50" charset="0"/>
+            </a:endParaRPr>
+          </a:p>
+        </p:txBody>
+      </p:sp>
+      <p:sp>
+        <p:nvSpPr>
+          <p:cNvPr id="64" name="Retângulo 63"/>
+          <p:cNvSpPr/>
+          <p:nvPr/>
+        </p:nvSpPr>
+        <p:spPr>
+          <a:xfrm>
+            <a:off x="512766" y="868345"/>
+            <a:ext cx="6186608" cy="238150"/>
+          </a:xfrm>
+          <a:prstGeom prst="rect">
+            <a:avLst/>
+          </a:prstGeom>
+          <a:solidFill>
+            <a:srgbClr val="08276B"/>
+          </a:solidFill>
+        </p:spPr>
+        <p:txBody>
+          <a:bodyPr vert="horz" lIns="134422" tIns="67211" rIns="134422" bIns="67211" rtlCol="0" anchor="ctr"/>
+          <a:lstStyle/>
+          <a:p>
+            <a:pPr defTabSz="672130"/>
+            <a:r>
+              <a:rPr lang="en-US" sz="1544" dirty="0">
+                <a:solidFill>
+                  <a:schemeClr val="bg1"/>
+                </a:solidFill>
+                <a:latin typeface="Exo 2 Medium" panose="00000600000000000000" pitchFamily="50" charset="0"/>
+                <a:ea typeface="Simplon Oi Headline" charset="0"/>
+                <a:cs typeface="Simplon Oi Headline" charset="0"/>
+              </a:rPr>
+              <a:t>Progressos c/ responsáveis </a:t>
+            </a:r>
+          </a:p>
+        </p:txBody>
+      </p:sp>
+      <p:sp>
+        <p:nvSpPr>
+          <p:cNvPr id="65" name="Retângulo 64"/>
+          <p:cNvSpPr/>
+          <p:nvPr/>
+        </p:nvSpPr>
+        <p:spPr>
+          <a:xfrm>
+            <a:off x="6814576" y="868345"/>
+            <a:ext cx="6194715" cy="238150"/>
+          </a:xfrm>
+          <a:prstGeom prst="rect">
+            <a:avLst/>
+          </a:prstGeom>
+          <a:solidFill>
+            <a:srgbClr val="08276B"/>
+          </a:solidFill>
+        </p:spPr>
+        <p:txBody>
+          <a:bodyPr vert="horz" lIns="134422" tIns="67211" rIns="134422" bIns="67211" rtlCol="0" anchor="ctr"/>
+          <a:lstStyle/>
+          <a:p>
+            <a:pPr defTabSz="672130"/>
+            <a:r>
+              <a:rPr lang="pt-BR" sz="1544" dirty="0">
+                <a:solidFill>
+                  <a:schemeClr val="bg1"/>
+                </a:solidFill>
+                <a:latin typeface="Exo 2 Medium" panose="00000600000000000000" pitchFamily="50" charset="0"/>
+                <a:ea typeface="Simplon Oi Headline" charset="0"/>
+                <a:cs typeface="Simplon Oi Headline" charset="0"/>
+              </a:rPr>
+              <a:t>Pontos atenção/ Principais Riscos</a:t>
+            </a:r>
+          </a:p>
+        </p:txBody>
+      </p:sp>
+      <p:sp>
+        <p:nvSpPr>
+          <p:cNvPr id="66" name="Retângulo 65"/>
+          <p:cNvSpPr/>
+          <p:nvPr/>
+        </p:nvSpPr>
+        <p:spPr>
+          <a:xfrm>
+            <a:off x="508267" y="4152347"/>
+            <a:ext cx="12505521" cy="238150"/>
+          </a:xfrm>
+          <a:prstGeom prst="rect">
+            <a:avLst/>
+          </a:prstGeom>
+          <a:solidFill>
+            <a:srgbClr val="08276B"/>
+          </a:solidFill>
+        </p:spPr>
+        <p:txBody>
+          <a:bodyPr vert="horz" lIns="134422" tIns="67211" rIns="134422" bIns="67211" rtlCol="0" anchor="ctr"/>
+          <a:lstStyle/>
+          <a:p>
+            <a:pPr defTabSz="672130"/>
+            <a:r>
+              <a:rPr lang="pt-BR" sz="1544" dirty="0">
+                <a:solidFill>
+                  <a:schemeClr val="bg1"/>
+                </a:solidFill>
+                <a:latin typeface="Exo 2 Medium" panose="00000600000000000000" pitchFamily="50" charset="0"/>
+                <a:ea typeface="Simplon Oi Headline" charset="0"/>
+                <a:cs typeface="Simplon Oi Headline" charset="0"/>
+              </a:rPr>
+              <a:t>Próximos Passos c/ responsáveis </a:t>
+            </a:r>
+          </a:p>
+        </p:txBody>
+      </p:sp>
+      <p:sp>
+        <p:nvSpPr>
+          <p:cNvPr id="63" name="Rectangle 37"/>
+          <p:cNvSpPr/>
+          <p:nvPr/>
+        </p:nvSpPr>
+        <p:spPr>
+          <a:xfrm>
+            <a:off x="496766" y="1106495"/>
+            <a:ext cx="6186608" cy="2962168"/>
+          </a:xfrm>
+          <a:prstGeom prst="rect">
+            <a:avLst/>
+          </a:prstGeom>
+          <a:noFill/>
+          <a:ln w="12700">
+            <a:solidFill>
+              <a:schemeClr val="bg1">
+                <a:lumMod val="50000"/>
+              </a:schemeClr>
+            </a:solidFill>
+          </a:ln>
+        </p:spPr>
+        <p:style>
+          <a:lnRef idx="2">
+            <a:schemeClr val="accent4"/>
+          </a:lnRef>
+          <a:fillRef idx="1">
+            <a:schemeClr val="lt1"/>
+          </a:fillRef>
+          <a:effectRef idx="0">
+            <a:schemeClr val="accent4"/>
+          </a:effectRef>
+          <a:fontRef idx="minor">
+            <a:schemeClr val="dk1"/>
+          </a:fontRef>
+        </p:style>
+        <p:txBody>
+          <a:bodyPr tIns="105844" rtlCol="0" anchor="t"/>
+          <a:lstStyle/>
+          <a:p>
+            <a:pPr marL="0" lvl="1" fontAlgn="base">
+              <a:spcBef>
+                <a:spcPct val="0"/>
+              </a:spcBef>
+              <a:defRPr/>
+            </a:pPr>
+            <a:r>
+              <a:rPr lang="pt-BR" sz="1323" b="1" dirty="0">
+                <a:solidFill>
+                  <a:schemeClr val="tx1"/>
+                </a:solidFill>
+                <a:latin typeface="Exo 2 Medium" panose="00000600000000000000" pitchFamily="50" charset="0"/>
+                <a:cs typeface="Simplon BP Regular"/>
+              </a:rPr>
+              <a:t>Criação de tela.</a:t>
+            </a:r>
+          </a:p>
+          <a:p>
+            <a:pPr marL="285750" lvl="1" indent="-285750" fontAlgn="base">
+              <a:spcBef>
+                <a:spcPct val="0"/>
+              </a:spcBef>
+              <a:buFont typeface="Wingdings" panose="05000000000000000000" pitchFamily="2" charset="2"/>
+              <a:buChar char="§"/>
+              <a:defRPr/>
+            </a:pPr>
+            <a:r>
+              <a:rPr lang="pt-BR" sz="1323" dirty="0">
+                <a:solidFill>
+                  <a:schemeClr val="tx1"/>
+                </a:solidFill>
+                <a:latin typeface="Exo 2 Medium" panose="00000600000000000000" pitchFamily="50" charset="0"/>
+                <a:cs typeface="Simplon BP Regular"/>
+              </a:rPr>
+              <a:t>Codificação da tela de projetos #João Oliveira</a:t>
+            </a:r>
+          </a:p>
+          <a:p>
+            <a:pPr marL="0" lvl="1" fontAlgn="base">
+              <a:spcBef>
+                <a:spcPct val="0"/>
+              </a:spcBef>
+              <a:defRPr/>
+            </a:pPr>
+            <a:r>
+              <a:rPr lang="pt-BR" sz="1323" b="1" dirty="0">
+                <a:solidFill>
+                  <a:schemeClr val="tx1"/>
+                </a:solidFill>
+                <a:latin typeface="Exo 2 Medium" panose="00000600000000000000" pitchFamily="50" charset="0"/>
+                <a:cs typeface="Simplon BP Regular"/>
+              </a:rPr>
+              <a:t>Criação de tela.</a:t>
+            </a:r>
+          </a:p>
+          <a:p>
+            <a:pPr marL="285750" lvl="1" indent="-285750" fontAlgn="base">
+              <a:spcBef>
+                <a:spcPct val="0"/>
+              </a:spcBef>
+              <a:buFont typeface="Wingdings" panose="05000000000000000000" pitchFamily="2" charset="2"/>
+              <a:buChar char="§"/>
+              <a:defRPr/>
+            </a:pPr>
+            <a:r>
+              <a:rPr lang="pt-BR" sz="1323" dirty="0">
+                <a:solidFill>
+                  <a:schemeClr val="tx1"/>
+                </a:solidFill>
+                <a:latin typeface="Exo 2 Medium" panose="00000600000000000000" pitchFamily="50" charset="0"/>
+                <a:cs typeface="Simplon BP Regular"/>
+              </a:rPr>
+              <a:t>Codificação da tela Home #Lucas Félix</a:t>
+            </a:r>
+            <a:endParaRPr lang="pt-BR" sz="1323" b="1" dirty="0">
+              <a:solidFill>
+                <a:schemeClr val="tx1"/>
+              </a:solidFill>
+              <a:latin typeface="Exo 2 Medium" panose="00000600000000000000" pitchFamily="50" charset="0"/>
+              <a:cs typeface="Simplon BP Regular"/>
+            </a:endParaRPr>
+          </a:p>
+          <a:p>
+            <a:pPr marL="0" lvl="1" fontAlgn="base">
+              <a:spcBef>
+                <a:spcPct val="0"/>
+              </a:spcBef>
+              <a:defRPr/>
+            </a:pPr>
+            <a:r>
+              <a:rPr lang="pt-BR" sz="1323" b="1" dirty="0">
+                <a:solidFill>
+                  <a:schemeClr val="tx1"/>
+                </a:solidFill>
+                <a:latin typeface="Exo 2 Medium" panose="00000600000000000000" pitchFamily="50" charset="0"/>
+                <a:cs typeface="Simplon BP Regular"/>
+              </a:rPr>
+              <a:t>Criação de tela.</a:t>
+            </a:r>
+          </a:p>
+          <a:p>
+            <a:pPr marL="285750" lvl="1" indent="-285750" fontAlgn="base">
+              <a:spcBef>
+                <a:spcPct val="0"/>
+              </a:spcBef>
+              <a:buFont typeface="Wingdings" panose="05000000000000000000" pitchFamily="2" charset="2"/>
+              <a:buChar char="§"/>
+              <a:defRPr/>
+            </a:pPr>
+            <a:r>
+              <a:rPr lang="pt-BR" sz="1323" dirty="0">
+                <a:solidFill>
+                  <a:schemeClr val="tx1"/>
+                </a:solidFill>
+                <a:latin typeface="Exo 2 Medium" panose="00000600000000000000" pitchFamily="50" charset="0"/>
+                <a:cs typeface="Simplon BP Regular"/>
+              </a:rPr>
+              <a:t>Codificação da tela Dashboard #Vinicius Novais</a:t>
+            </a:r>
+          </a:p>
+          <a:p>
+            <a:pPr marL="0" lvl="1" fontAlgn="base">
+              <a:spcBef>
+                <a:spcPct val="0"/>
+              </a:spcBef>
+              <a:defRPr/>
+            </a:pPr>
+            <a:r>
+              <a:rPr lang="pt-BR" sz="1323" b="1" dirty="0">
+                <a:solidFill>
+                  <a:schemeClr val="tx1"/>
+                </a:solidFill>
+                <a:latin typeface="Exo 2 Medium" panose="00000600000000000000" pitchFamily="50" charset="0"/>
+                <a:cs typeface="Simplon BP Regular"/>
+              </a:rPr>
+              <a:t>Criação e edição de tela.</a:t>
+            </a:r>
+          </a:p>
+          <a:p>
+            <a:pPr marL="285750" lvl="1" indent="-285750" fontAlgn="base">
+              <a:spcBef>
+                <a:spcPct val="0"/>
+              </a:spcBef>
+              <a:buFont typeface="Wingdings" panose="05000000000000000000" pitchFamily="2" charset="2"/>
+              <a:buChar char="§"/>
+              <a:defRPr/>
+            </a:pPr>
+            <a:r>
+              <a:rPr lang="pt-BR" sz="1323" dirty="0">
+                <a:solidFill>
+                  <a:schemeClr val="tx1"/>
+                </a:solidFill>
+                <a:latin typeface="Exo 2 Medium" panose="00000600000000000000" pitchFamily="50" charset="0"/>
+                <a:cs typeface="Simplon BP Regular"/>
+              </a:rPr>
+              <a:t>Codificação da tela de Uploads e ajustes Login e Cadastro #Caio </a:t>
+            </a:r>
+            <a:r>
+              <a:rPr lang="pt-BR" sz="1323" dirty="0" err="1">
+                <a:solidFill>
+                  <a:schemeClr val="tx1"/>
+                </a:solidFill>
+                <a:latin typeface="Exo 2 Medium" panose="00000600000000000000" pitchFamily="50" charset="0"/>
+                <a:cs typeface="Simplon BP Regular"/>
+              </a:rPr>
+              <a:t>Elcio</a:t>
+            </a:r>
+            <a:endParaRPr lang="pt-BR" sz="1323" dirty="0">
+              <a:solidFill>
+                <a:schemeClr val="tx1"/>
+              </a:solidFill>
+              <a:latin typeface="Exo 2 Medium" panose="00000600000000000000" pitchFamily="50" charset="0"/>
+              <a:cs typeface="Simplon BP Regular"/>
+            </a:endParaRPr>
+          </a:p>
+          <a:p>
+            <a:pPr marL="0" lvl="1" fontAlgn="base">
+              <a:spcBef>
+                <a:spcPct val="0"/>
+              </a:spcBef>
+              <a:defRPr/>
+            </a:pPr>
+            <a:r>
+              <a:rPr lang="pt-BR" sz="1323" b="1" dirty="0">
+                <a:solidFill>
+                  <a:schemeClr val="tx1"/>
+                </a:solidFill>
+                <a:latin typeface="Exo 2 Medium" panose="00000600000000000000" pitchFamily="50" charset="0"/>
+                <a:cs typeface="Simplon BP Regular"/>
+              </a:rPr>
+              <a:t>Criação de tela.</a:t>
+            </a:r>
+          </a:p>
+          <a:p>
+            <a:pPr marL="285750" lvl="1" indent="-285750" fontAlgn="base">
+              <a:spcBef>
+                <a:spcPct val="0"/>
+              </a:spcBef>
+              <a:buFont typeface="Wingdings" panose="05000000000000000000" pitchFamily="2" charset="2"/>
+              <a:buChar char="§"/>
+              <a:defRPr/>
+            </a:pPr>
+            <a:r>
+              <a:rPr lang="pt-BR" sz="1323" dirty="0">
+                <a:solidFill>
+                  <a:schemeClr val="tx1"/>
+                </a:solidFill>
+                <a:latin typeface="Exo 2 Medium" panose="00000600000000000000" pitchFamily="50" charset="0"/>
+                <a:cs typeface="Simplon BP Regular"/>
+              </a:rPr>
+              <a:t>Codificação da tela de projetos #João Oliveira</a:t>
+            </a:r>
+          </a:p>
+          <a:p>
+            <a:pPr marL="0" lvl="1" fontAlgn="base">
+              <a:spcBef>
+                <a:spcPct val="0"/>
+              </a:spcBef>
+              <a:defRPr/>
+            </a:pPr>
+            <a:r>
+              <a:rPr lang="pt-BR" sz="1323" b="1" dirty="0">
+                <a:solidFill>
+                  <a:schemeClr val="tx1"/>
+                </a:solidFill>
+                <a:latin typeface="Exo 2 Medium" panose="00000600000000000000" pitchFamily="50" charset="0"/>
+                <a:cs typeface="Simplon BP Regular"/>
+              </a:rPr>
+              <a:t>Criação do CRUD no </a:t>
+            </a:r>
+            <a:r>
+              <a:rPr lang="pt-BR" sz="1323" b="1" dirty="0" err="1">
+                <a:solidFill>
+                  <a:schemeClr val="tx1"/>
+                </a:solidFill>
+                <a:latin typeface="Exo 2 Medium" panose="00000600000000000000" pitchFamily="50" charset="0"/>
+                <a:cs typeface="Simplon BP Regular"/>
+              </a:rPr>
+              <a:t>Postman</a:t>
+            </a:r>
+            <a:r>
+              <a:rPr lang="pt-BR" sz="1323" b="1" dirty="0">
+                <a:solidFill>
+                  <a:schemeClr val="tx1"/>
+                </a:solidFill>
+                <a:latin typeface="Exo 2 Medium" panose="00000600000000000000" pitchFamily="50" charset="0"/>
+                <a:cs typeface="Simplon BP Regular"/>
+              </a:rPr>
+              <a:t>.</a:t>
+            </a:r>
+          </a:p>
+          <a:p>
+            <a:pPr marL="285750" lvl="1" indent="-285750" fontAlgn="base">
+              <a:spcBef>
+                <a:spcPct val="0"/>
+              </a:spcBef>
+              <a:buFont typeface="Wingdings" panose="05000000000000000000" pitchFamily="2" charset="2"/>
+              <a:buChar char="§"/>
+              <a:defRPr/>
+            </a:pPr>
+            <a:r>
+              <a:rPr lang="pt-BR" sz="1323" dirty="0" err="1">
+                <a:solidFill>
+                  <a:schemeClr val="tx1"/>
+                </a:solidFill>
+                <a:latin typeface="Exo 2 Medium" panose="00000600000000000000" pitchFamily="50" charset="0"/>
+                <a:cs typeface="Simplon BP Regular"/>
+              </a:rPr>
+              <a:t>Crud</a:t>
+            </a:r>
+            <a:r>
+              <a:rPr lang="pt-BR" sz="1323" dirty="0">
+                <a:solidFill>
+                  <a:schemeClr val="tx1"/>
+                </a:solidFill>
+                <a:latin typeface="Exo 2 Medium" panose="00000600000000000000" pitchFamily="50" charset="0"/>
+                <a:cs typeface="Simplon BP Regular"/>
+              </a:rPr>
+              <a:t> completo no </a:t>
+            </a:r>
+            <a:r>
+              <a:rPr lang="pt-BR" sz="1323" dirty="0" err="1">
+                <a:solidFill>
+                  <a:schemeClr val="tx1"/>
+                </a:solidFill>
+                <a:latin typeface="Exo 2 Medium" panose="00000600000000000000" pitchFamily="50" charset="0"/>
+                <a:cs typeface="Simplon BP Regular"/>
+              </a:rPr>
+              <a:t>Postman</a:t>
+            </a:r>
+            <a:r>
+              <a:rPr lang="pt-BR" sz="1323" dirty="0">
+                <a:solidFill>
+                  <a:schemeClr val="tx1"/>
+                </a:solidFill>
+                <a:latin typeface="Exo 2 Medium" panose="00000600000000000000" pitchFamily="50" charset="0"/>
+                <a:cs typeface="Simplon BP Regular"/>
+              </a:rPr>
+              <a:t> #Luiz Gustavo</a:t>
+            </a:r>
+          </a:p>
+          <a:p>
+            <a:pPr marL="0" lvl="1" fontAlgn="base">
+              <a:spcBef>
+                <a:spcPct val="0"/>
+              </a:spcBef>
+              <a:defRPr/>
+            </a:pPr>
+            <a:endParaRPr lang="pt-BR" sz="1323" b="1" dirty="0">
+              <a:solidFill>
+                <a:schemeClr val="tx1"/>
+              </a:solidFill>
+              <a:latin typeface="Exo 2 Medium" panose="00000600000000000000" pitchFamily="50" charset="0"/>
+              <a:cs typeface="Simplon BP Regular"/>
+            </a:endParaRPr>
+          </a:p>
+          <a:p>
+            <a:pPr fontAlgn="base">
+              <a:spcBef>
+                <a:spcPct val="0"/>
+              </a:spcBef>
+              <a:defRPr/>
+            </a:pPr>
+            <a:endParaRPr lang="pt-BR" sz="1323" b="1" dirty="0">
+              <a:solidFill>
+                <a:schemeClr val="tx1"/>
+              </a:solidFill>
+              <a:latin typeface="Exo 2 Medium" panose="00000600000000000000" pitchFamily="50" charset="0"/>
+              <a:cs typeface="Simplon BP Regular"/>
+            </a:endParaRPr>
+          </a:p>
+        </p:txBody>
+      </p:sp>
+      <p:sp>
+        <p:nvSpPr>
+          <p:cNvPr id="2" name="Rectangle 43">
+            <a:extLst>
+              <a:ext uri="{FF2B5EF4-FFF2-40B4-BE49-F238E27FC236}">
+                <a16:creationId xmlns:a16="http://schemas.microsoft.com/office/drawing/2014/main" id="{B15BA19F-C787-4E6A-ADAB-C0DFF09C66A8}"/>
+              </a:ext>
+            </a:extLst>
+          </p:cNvPr>
+          <p:cNvSpPr>
+            <a:spLocks/>
+          </p:cNvSpPr>
+          <p:nvPr/>
+        </p:nvSpPr>
+        <p:spPr>
+          <a:xfrm>
+            <a:off x="512766" y="4500711"/>
+            <a:ext cx="12496525" cy="2808978"/>
+          </a:xfrm>
+          <a:prstGeom prst="rect">
+            <a:avLst/>
+          </a:prstGeom>
+          <a:noFill/>
+          <a:ln w="12700">
+            <a:solidFill>
+              <a:schemeClr val="bg1">
+                <a:lumMod val="50000"/>
+              </a:schemeClr>
+            </a:solidFill>
+          </a:ln>
+        </p:spPr>
+        <p:style>
+          <a:lnRef idx="2">
+            <a:schemeClr val="accent4"/>
+          </a:lnRef>
+          <a:fillRef idx="1">
+            <a:schemeClr val="lt1"/>
+          </a:fillRef>
+          <a:effectRef idx="0">
+            <a:schemeClr val="accent4"/>
+          </a:effectRef>
+          <a:fontRef idx="minor">
+            <a:schemeClr val="dk1"/>
+          </a:fontRef>
+        </p:style>
+        <p:txBody>
+          <a:bodyPr wrap="square" tIns="105844" numCol="3" rtlCol="0" anchor="t"/>
+          <a:lstStyle/>
+          <a:p>
+            <a:pPr marL="0" lvl="1" defTabSz="672130"/>
+            <a:r>
+              <a:rPr lang="pt-BR" sz="1323" b="1" dirty="0">
+                <a:solidFill>
+                  <a:schemeClr val="tx1"/>
+                </a:solidFill>
+                <a:latin typeface="Exo 2 Medium" panose="00000600000000000000" pitchFamily="50" charset="0"/>
+                <a:cs typeface="Simplon BP Regular"/>
+              </a:rPr>
+              <a:t>Criação do banco na </a:t>
+            </a:r>
+            <a:r>
+              <a:rPr lang="pt-BR" sz="1323" b="1" dirty="0" err="1">
+                <a:solidFill>
+                  <a:schemeClr val="tx1"/>
+                </a:solidFill>
+                <a:latin typeface="Exo 2 Medium" panose="00000600000000000000" pitchFamily="50" charset="0"/>
+                <a:cs typeface="Simplon BP Regular"/>
+              </a:rPr>
+              <a:t>azure</a:t>
+            </a:r>
+            <a:r>
+              <a:rPr lang="pt-BR" sz="1323" b="1" dirty="0">
+                <a:solidFill>
+                  <a:schemeClr val="tx1"/>
+                </a:solidFill>
+                <a:latin typeface="Exo 2 Medium" panose="00000600000000000000" pitchFamily="50" charset="0"/>
+                <a:cs typeface="Simplon BP Regular"/>
+              </a:rPr>
+              <a:t>.</a:t>
+            </a:r>
+          </a:p>
+          <a:p>
+            <a:pPr marL="285750" lvl="1" indent="-285750" defTabSz="672130">
+              <a:buFont typeface="Wingdings" panose="05000000000000000000" pitchFamily="2" charset="2"/>
+              <a:buChar char="§"/>
+            </a:pPr>
+            <a:r>
+              <a:rPr lang="pt-BR" sz="1323" dirty="0">
+                <a:solidFill>
+                  <a:schemeClr val="tx1"/>
+                </a:solidFill>
+                <a:latin typeface="Exo 2 Medium" panose="00000600000000000000" pitchFamily="50" charset="0"/>
+                <a:cs typeface="Simplon BP Regular"/>
+              </a:rPr>
+              <a:t>Criar banco conforme </a:t>
+            </a:r>
+            <a:r>
+              <a:rPr lang="pt-BR" sz="1323" dirty="0" err="1">
+                <a:solidFill>
+                  <a:schemeClr val="tx1"/>
+                </a:solidFill>
+                <a:latin typeface="Exo 2 Medium" panose="00000600000000000000" pitchFamily="50" charset="0"/>
+                <a:cs typeface="Simplon BP Regular"/>
+              </a:rPr>
+              <a:t>uml</a:t>
+            </a:r>
+            <a:r>
+              <a:rPr lang="pt-BR" sz="1323" dirty="0">
+                <a:solidFill>
+                  <a:schemeClr val="tx1"/>
+                </a:solidFill>
+                <a:latin typeface="Exo 2 Medium" panose="00000600000000000000" pitchFamily="50" charset="0"/>
+                <a:cs typeface="Simplon BP Regular"/>
+              </a:rPr>
+              <a:t> #Luiz Gustavo</a:t>
+            </a:r>
+          </a:p>
+          <a:p>
+            <a:pPr marL="285750" lvl="1" indent="-285750" defTabSz="672130">
+              <a:buFont typeface="Wingdings" panose="05000000000000000000" pitchFamily="2" charset="2"/>
+              <a:buChar char="§"/>
+            </a:pPr>
+            <a:endParaRPr lang="pt-BR" sz="1323" dirty="0">
+              <a:solidFill>
+                <a:schemeClr val="tx1"/>
+              </a:solidFill>
+              <a:latin typeface="Exo 2 Medium" panose="00000600000000000000" pitchFamily="50" charset="0"/>
+              <a:cs typeface="Simplon BP Regular"/>
+            </a:endParaRPr>
+          </a:p>
+          <a:p>
+            <a:pPr marL="0" lvl="1" defTabSz="672130"/>
+            <a:r>
+              <a:rPr lang="pt-BR" sz="1323" b="1" dirty="0">
+                <a:solidFill>
+                  <a:schemeClr val="tx1"/>
+                </a:solidFill>
+                <a:latin typeface="Exo 2 Medium" panose="00000600000000000000" pitchFamily="50" charset="0"/>
+                <a:cs typeface="Simplon BP Regular"/>
+              </a:rPr>
+              <a:t>Finalizar front.</a:t>
+            </a:r>
+          </a:p>
+          <a:p>
+            <a:pPr marL="285750" lvl="1" indent="-285750" defTabSz="672130">
+              <a:buFont typeface="Wingdings" panose="05000000000000000000" pitchFamily="2" charset="2"/>
+              <a:buChar char="§"/>
+            </a:pPr>
+            <a:r>
+              <a:rPr lang="pt-BR" sz="1323" dirty="0">
+                <a:solidFill>
+                  <a:schemeClr val="tx1"/>
+                </a:solidFill>
+                <a:latin typeface="Exo 2 Medium" panose="00000600000000000000" pitchFamily="50" charset="0"/>
+                <a:cs typeface="Simplon BP Regular"/>
+              </a:rPr>
+              <a:t>Finalizar front das telas  #Todo o grupo</a:t>
+            </a:r>
+          </a:p>
+          <a:p>
+            <a:pPr marL="0" lvl="1" algn="just"/>
+            <a:endParaRPr lang="pt-BR" sz="1323" dirty="0">
+              <a:solidFill>
+                <a:schemeClr val="tx1"/>
+              </a:solidFill>
+              <a:latin typeface="Exo 2 Medium" panose="00000600000000000000" pitchFamily="50" charset="0"/>
+              <a:cs typeface="Simplon BP Regular"/>
+            </a:endParaRPr>
+          </a:p>
+          <a:p>
+            <a:pPr marL="0" lvl="1" defTabSz="672130"/>
+            <a:r>
+              <a:rPr lang="pt-BR" sz="1323" b="1" dirty="0">
+                <a:solidFill>
+                  <a:schemeClr val="tx1"/>
+                </a:solidFill>
+                <a:latin typeface="Exo 2 Medium" panose="00000600000000000000" pitchFamily="50" charset="0"/>
+                <a:cs typeface="Simplon BP Regular"/>
+              </a:rPr>
+              <a:t>Iniciar </a:t>
+            </a:r>
+            <a:r>
+              <a:rPr lang="pt-BR" sz="1323" b="1" dirty="0" err="1">
+                <a:solidFill>
+                  <a:schemeClr val="tx1"/>
+                </a:solidFill>
+                <a:latin typeface="Exo 2 Medium" panose="00000600000000000000" pitchFamily="50" charset="0"/>
+                <a:cs typeface="Simplon BP Regular"/>
+              </a:rPr>
+              <a:t>Backend</a:t>
+            </a:r>
+            <a:r>
+              <a:rPr lang="pt-BR" sz="1323" b="1" dirty="0">
+                <a:solidFill>
+                  <a:schemeClr val="tx1"/>
+                </a:solidFill>
+                <a:latin typeface="Exo 2 Medium" panose="00000600000000000000" pitchFamily="50" charset="0"/>
+                <a:cs typeface="Simplon BP Regular"/>
+              </a:rPr>
+              <a:t> das telas.</a:t>
+            </a:r>
+          </a:p>
+          <a:p>
+            <a:pPr marL="285750" lvl="1" indent="-285750" defTabSz="672130">
+              <a:buFont typeface="Wingdings" panose="05000000000000000000" pitchFamily="2" charset="2"/>
+              <a:buChar char="§"/>
+            </a:pPr>
+            <a:r>
+              <a:rPr lang="pt-BR" sz="1323" dirty="0">
+                <a:solidFill>
+                  <a:schemeClr val="tx1"/>
+                </a:solidFill>
+                <a:latin typeface="Exo 2 Medium" panose="00000600000000000000" pitchFamily="50" charset="0"/>
+                <a:cs typeface="Simplon BP Regular"/>
+              </a:rPr>
+              <a:t>Inicio da implementação de </a:t>
+            </a:r>
+            <a:r>
+              <a:rPr lang="pt-BR" sz="1323" dirty="0" err="1">
+                <a:solidFill>
+                  <a:schemeClr val="tx1"/>
+                </a:solidFill>
+                <a:latin typeface="Exo 2 Medium" panose="00000600000000000000" pitchFamily="50" charset="0"/>
+                <a:cs typeface="Simplon BP Regular"/>
+              </a:rPr>
+              <a:t>backend</a:t>
+            </a:r>
+            <a:r>
+              <a:rPr lang="pt-BR" sz="1323" dirty="0">
+                <a:solidFill>
+                  <a:schemeClr val="tx1"/>
+                </a:solidFill>
+                <a:latin typeface="Exo 2 Medium" panose="00000600000000000000" pitchFamily="50" charset="0"/>
+                <a:cs typeface="Simplon BP Regular"/>
+              </a:rPr>
+              <a:t> no projeto #Caio </a:t>
+            </a:r>
+            <a:r>
+              <a:rPr lang="pt-BR" sz="1323" dirty="0" err="1">
+                <a:solidFill>
+                  <a:schemeClr val="tx1"/>
+                </a:solidFill>
+                <a:latin typeface="Exo 2 Medium" panose="00000600000000000000" pitchFamily="50" charset="0"/>
+                <a:cs typeface="Simplon BP Regular"/>
+              </a:rPr>
+              <a:t>Elcio</a:t>
+            </a:r>
+            <a:endParaRPr lang="pt-BR" sz="1323" dirty="0">
+              <a:solidFill>
+                <a:schemeClr val="tx1"/>
+              </a:solidFill>
+              <a:latin typeface="Exo 2 Medium" panose="00000600000000000000" pitchFamily="50" charset="0"/>
+              <a:cs typeface="Simplon BP Regular"/>
+            </a:endParaRPr>
+          </a:p>
+          <a:p>
+            <a:pPr marL="0" lvl="1" defTabSz="672130"/>
+            <a:endParaRPr lang="pt-BR" sz="1323" b="1" dirty="0">
+              <a:solidFill>
+                <a:schemeClr val="tx1"/>
+              </a:solidFill>
+              <a:latin typeface="Exo 2 Medium" panose="00000600000000000000" pitchFamily="50" charset="0"/>
+              <a:cs typeface="Simplon BP Regular"/>
+            </a:endParaRPr>
+          </a:p>
+        </p:txBody>
+      </p:sp>
+      <p:sp>
+        <p:nvSpPr>
+          <p:cNvPr id="6" name="Oval 134">
+            <a:extLst>
+              <a:ext uri="{FF2B5EF4-FFF2-40B4-BE49-F238E27FC236}">
+                <a16:creationId xmlns:a16="http://schemas.microsoft.com/office/drawing/2014/main" id="{70825C6F-9257-4CF5-8C62-1CA1EB2F8815}"/>
+              </a:ext>
+            </a:extLst>
+          </p:cNvPr>
+          <p:cNvSpPr>
+            <a:spLocks noChangeAspect="1"/>
+          </p:cNvSpPr>
+          <p:nvPr/>
+        </p:nvSpPr>
+        <p:spPr>
+          <a:xfrm>
+            <a:off x="9225955" y="297930"/>
+            <a:ext cx="211404" cy="211689"/>
+          </a:xfrm>
+          <a:prstGeom prst="ellipse">
+            <a:avLst/>
+          </a:prstGeom>
+          <a:solidFill>
+            <a:srgbClr val="1BCF13"/>
+          </a:solidFill>
+          <a:ln w="12700">
+            <a:solidFill>
+              <a:schemeClr val="accent3"/>
+            </a:solidFill>
+          </a:ln>
+        </p:spPr>
+        <p:style>
+          <a:lnRef idx="2">
+            <a:schemeClr val="accent1">
+              <a:shade val="50000"/>
+            </a:schemeClr>
+          </a:lnRef>
+          <a:fillRef idx="1">
+            <a:schemeClr val="accent1"/>
+          </a:fillRef>
+          <a:effectRef idx="0">
+            <a:schemeClr val="accent1"/>
+          </a:effectRef>
+          <a:fontRef idx="minor">
+            <a:schemeClr val="lt1"/>
+          </a:fontRef>
+        </p:style>
+        <p:txBody>
+          <a:bodyPr wrap="none" lIns="52922" tIns="52922" rIns="52922" rtlCol="0" anchor="ctr"/>
+          <a:lstStyle/>
+          <a:p>
+            <a:pPr algn="ctr" defTabSz="672130"/>
+            <a:endParaRPr lang="en-US" sz="1176" dirty="0">
+              <a:solidFill>
+                <a:srgbClr val="00B050"/>
+              </a:solidFill>
+              <a:latin typeface="Exo 2 Medium" panose="00000600000000000000" pitchFamily="50" charset="0"/>
+              <a:cs typeface="Simplon BP Regular"/>
+            </a:endParaRPr>
+          </a:p>
+        </p:txBody>
+      </p:sp>
+      <p:sp>
+        <p:nvSpPr>
+          <p:cNvPr id="44" name="Oval 120">
+            <a:extLst>
+              <a:ext uri="{FF2B5EF4-FFF2-40B4-BE49-F238E27FC236}">
+                <a16:creationId xmlns:a16="http://schemas.microsoft.com/office/drawing/2014/main" id="{2688D066-DD5D-4246-B846-8AD1218C78EC}"/>
+              </a:ext>
+            </a:extLst>
+          </p:cNvPr>
+          <p:cNvSpPr>
+            <a:spLocks noChangeAspect="1"/>
+          </p:cNvSpPr>
+          <p:nvPr/>
+        </p:nvSpPr>
+        <p:spPr>
+          <a:xfrm>
+            <a:off x="10188056" y="297930"/>
+            <a:ext cx="211404" cy="211689"/>
+          </a:xfrm>
+          <a:prstGeom prst="ellipse">
+            <a:avLst/>
+          </a:prstGeom>
+          <a:solidFill>
+            <a:schemeClr val="bg1">
+              <a:lumMod val="65000"/>
+            </a:schemeClr>
+          </a:solidFill>
+          <a:ln w="12700">
+            <a:solidFill>
+              <a:schemeClr val="accent3"/>
+            </a:solidFill>
+          </a:ln>
+        </p:spPr>
+        <p:style>
+          <a:lnRef idx="2">
+            <a:schemeClr val="accent1">
+              <a:shade val="50000"/>
+            </a:schemeClr>
+          </a:lnRef>
+          <a:fillRef idx="1">
+            <a:schemeClr val="accent1"/>
+          </a:fillRef>
+          <a:effectRef idx="0">
+            <a:schemeClr val="accent1"/>
+          </a:effectRef>
+          <a:fontRef idx="minor">
+            <a:schemeClr val="lt1"/>
+          </a:fontRef>
+        </p:style>
+        <p:txBody>
+          <a:bodyPr wrap="none" lIns="52922" tIns="52922" rIns="52922" rtlCol="0" anchor="ctr"/>
+          <a:lstStyle/>
+          <a:p>
+            <a:pPr algn="ctr" defTabSz="672130"/>
+            <a:endParaRPr lang="en-US" sz="1176" dirty="0">
+              <a:solidFill>
+                <a:prstClr val="black"/>
+              </a:solidFill>
+              <a:latin typeface="Exo 2 Medium" panose="00000600000000000000" pitchFamily="50" charset="0"/>
+              <a:cs typeface="Simplon BP Regular"/>
+            </a:endParaRPr>
+          </a:p>
+        </p:txBody>
+      </p:sp>
+      <p:sp>
+        <p:nvSpPr>
+          <p:cNvPr id="5" name="Retângulo 4">
+            <a:extLst>
+              <a:ext uri="{FF2B5EF4-FFF2-40B4-BE49-F238E27FC236}">
+                <a16:creationId xmlns:a16="http://schemas.microsoft.com/office/drawing/2014/main" id="{A1C14918-6027-46B3-96BF-C5F7FDEC3276}"/>
+              </a:ext>
+            </a:extLst>
+          </p:cNvPr>
+          <p:cNvSpPr/>
+          <p:nvPr/>
+        </p:nvSpPr>
+        <p:spPr>
+          <a:xfrm>
+            <a:off x="8017619" y="209534"/>
+            <a:ext cx="4937689" cy="618769"/>
+          </a:xfrm>
+          <a:prstGeom prst="rect">
+            <a:avLst/>
+          </a:prstGeom>
+          <a:noFill/>
+          <a:ln w="6350">
+            <a:solidFill>
+              <a:schemeClr val="bg1">
+                <a:lumMod val="75000"/>
+              </a:schemeClr>
+            </a:solidFill>
+          </a:ln>
+        </p:spPr>
+        <p:style>
+          <a:lnRef idx="2">
+            <a:schemeClr val="accent1">
+              <a:shade val="50000"/>
+            </a:schemeClr>
+          </a:lnRef>
+          <a:fillRef idx="1">
+            <a:schemeClr val="accent1"/>
+          </a:fillRef>
+          <a:effectRef idx="0">
+            <a:schemeClr val="accent1"/>
+          </a:effectRef>
+          <a:fontRef idx="minor">
+            <a:schemeClr val="lt1"/>
+          </a:fontRef>
+        </p:style>
+        <p:txBody>
+          <a:bodyPr rtlCol="0" anchor="ctr"/>
+          <a:lstStyle/>
+          <a:p>
+            <a:pPr algn="ctr"/>
+            <a:endParaRPr lang="pt-BR">
+              <a:latin typeface="Exo 2 Medium" panose="00000600000000000000" pitchFamily="50" charset="0"/>
+            </a:endParaRPr>
+          </a:p>
+        </p:txBody>
+      </p:sp>
+      <p:sp>
+        <p:nvSpPr>
+          <p:cNvPr id="8" name="TextBox 138">
+            <a:extLst>
+              <a:ext uri="{FF2B5EF4-FFF2-40B4-BE49-F238E27FC236}">
+                <a16:creationId xmlns:a16="http://schemas.microsoft.com/office/drawing/2014/main" id="{5CE7D08C-795B-4BF1-97F6-F9773F4E9F4C}"/>
+              </a:ext>
+            </a:extLst>
+          </p:cNvPr>
+          <p:cNvSpPr txBox="1"/>
+          <p:nvPr/>
+        </p:nvSpPr>
+        <p:spPr>
+          <a:xfrm>
+            <a:off x="9715810" y="51570"/>
+            <a:ext cx="1478088" cy="211688"/>
+          </a:xfrm>
+          <a:prstGeom prst="rect">
+            <a:avLst/>
+          </a:prstGeom>
+          <a:solidFill>
+            <a:schemeClr val="bg1"/>
+          </a:solidFill>
+          <a:ln w="12700">
+            <a:noFill/>
+          </a:ln>
+        </p:spPr>
+        <p:style>
+          <a:lnRef idx="2">
+            <a:schemeClr val="accent4"/>
+          </a:lnRef>
+          <a:fillRef idx="1">
+            <a:schemeClr val="lt1"/>
+          </a:fillRef>
+          <a:effectRef idx="0">
+            <a:schemeClr val="accent4"/>
+          </a:effectRef>
+          <a:fontRef idx="minor">
+            <a:schemeClr val="dk1"/>
+          </a:fontRef>
+        </p:style>
+        <p:txBody>
+          <a:bodyPr wrap="none" lIns="52922" tIns="52922" rIns="52922" bIns="0" rtlCol="0" anchor="b"/>
+          <a:lstStyle>
+            <a:defPPr>
+              <a:defRPr lang="en-US"/>
+            </a:defPPr>
+            <a:lvl1pPr algn="ctr">
+              <a:defRPr sz="1000" b="1">
+                <a:latin typeface="Simplon BP Regular"/>
+                <a:cs typeface="Simplon BP Regular"/>
+              </a:defRPr>
+            </a:lvl1pPr>
+            <a:lvl2pPr>
+              <a:defRPr>
+                <a:solidFill>
+                  <a:schemeClr val="dk1"/>
+                </a:solidFill>
+              </a:defRPr>
+            </a:lvl2pPr>
+            <a:lvl3pPr>
+              <a:defRPr>
+                <a:solidFill>
+                  <a:schemeClr val="dk1"/>
+                </a:solidFill>
+              </a:defRPr>
+            </a:lvl3pPr>
+            <a:lvl4pPr>
+              <a:defRPr>
+                <a:solidFill>
+                  <a:schemeClr val="dk1"/>
+                </a:solidFill>
+              </a:defRPr>
+            </a:lvl4pPr>
+            <a:lvl5pPr>
+              <a:defRPr>
+                <a:solidFill>
+                  <a:schemeClr val="dk1"/>
+                </a:solidFill>
+              </a:defRPr>
+            </a:lvl5pPr>
+            <a:lvl6pPr>
+              <a:defRPr>
+                <a:solidFill>
+                  <a:schemeClr val="dk1"/>
+                </a:solidFill>
+              </a:defRPr>
+            </a:lvl6pPr>
+            <a:lvl7pPr>
+              <a:defRPr>
+                <a:solidFill>
+                  <a:schemeClr val="dk1"/>
+                </a:solidFill>
+              </a:defRPr>
+            </a:lvl7pPr>
+            <a:lvl8pPr>
+              <a:defRPr>
+                <a:solidFill>
+                  <a:schemeClr val="dk1"/>
+                </a:solidFill>
+              </a:defRPr>
+            </a:lvl8pPr>
+            <a:lvl9pPr>
+              <a:defRPr>
+                <a:solidFill>
+                  <a:schemeClr val="dk1"/>
+                </a:solidFill>
+              </a:defRPr>
+            </a:lvl9pPr>
+          </a:lstStyle>
+          <a:p>
+            <a:pPr defTabSz="672130"/>
+            <a:r>
+              <a:rPr lang="en-US" sz="1176" dirty="0">
+                <a:solidFill>
+                  <a:srgbClr val="08276B"/>
+                </a:solidFill>
+                <a:latin typeface="Exo 2 Medium" panose="00000600000000000000" pitchFamily="50" charset="0"/>
+              </a:rPr>
+              <a:t>    </a:t>
+            </a:r>
+            <a:r>
+              <a:rPr lang="en-US" sz="1176" dirty="0" err="1">
+                <a:solidFill>
+                  <a:srgbClr val="08276B"/>
+                </a:solidFill>
+                <a:latin typeface="Exo 2 Medium" panose="00000600000000000000" pitchFamily="50" charset="0"/>
+              </a:rPr>
+              <a:t>Farol</a:t>
+            </a:r>
+            <a:r>
+              <a:rPr lang="en-US" sz="1176" dirty="0">
+                <a:solidFill>
+                  <a:srgbClr val="08276B"/>
+                </a:solidFill>
+                <a:latin typeface="Exo 2 Medium" panose="00000600000000000000" pitchFamily="50" charset="0"/>
+              </a:rPr>
+              <a:t> do </a:t>
+            </a:r>
+            <a:r>
+              <a:rPr lang="en-US" sz="1176" dirty="0" err="1">
+                <a:solidFill>
+                  <a:srgbClr val="08276B"/>
+                </a:solidFill>
+                <a:latin typeface="Exo 2 Medium" panose="00000600000000000000" pitchFamily="50" charset="0"/>
+              </a:rPr>
+              <a:t>Projeto</a:t>
+            </a:r>
+            <a:r>
+              <a:rPr lang="en-US" sz="1176" dirty="0">
+                <a:solidFill>
+                  <a:srgbClr val="08276B"/>
+                </a:solidFill>
+                <a:latin typeface="Exo 2 Medium" panose="00000600000000000000" pitchFamily="50" charset="0"/>
+              </a:rPr>
+              <a:t>   </a:t>
+            </a:r>
+          </a:p>
+        </p:txBody>
+      </p:sp>
+      <p:sp>
+        <p:nvSpPr>
+          <p:cNvPr id="22" name="Oval 134">
+            <a:extLst>
+              <a:ext uri="{FF2B5EF4-FFF2-40B4-BE49-F238E27FC236}">
+                <a16:creationId xmlns:a16="http://schemas.microsoft.com/office/drawing/2014/main" id="{1DAFFF76-A01F-4F25-8512-D34E6780DD5B}"/>
+              </a:ext>
+            </a:extLst>
+          </p:cNvPr>
+          <p:cNvSpPr>
+            <a:spLocks noChangeAspect="1"/>
+          </p:cNvSpPr>
+          <p:nvPr/>
+        </p:nvSpPr>
+        <p:spPr>
+          <a:xfrm>
+            <a:off x="12166910" y="328582"/>
+            <a:ext cx="211404" cy="211689"/>
+          </a:xfrm>
+          <a:prstGeom prst="ellipse">
+            <a:avLst/>
+          </a:prstGeom>
+          <a:solidFill>
+            <a:srgbClr val="1BCF13"/>
+          </a:solidFill>
+          <a:ln w="12700">
+            <a:solidFill>
+              <a:schemeClr val="accent3"/>
+            </a:solidFill>
+          </a:ln>
+        </p:spPr>
+        <p:style>
+          <a:lnRef idx="2">
+            <a:schemeClr val="accent1">
+              <a:shade val="50000"/>
+            </a:schemeClr>
+          </a:lnRef>
+          <a:fillRef idx="1">
+            <a:schemeClr val="accent1"/>
+          </a:fillRef>
+          <a:effectRef idx="0">
+            <a:schemeClr val="accent1"/>
+          </a:effectRef>
+          <a:fontRef idx="minor">
+            <a:schemeClr val="lt1"/>
+          </a:fontRef>
+        </p:style>
+        <p:txBody>
+          <a:bodyPr wrap="none" lIns="52922" tIns="52922" rIns="52922" rtlCol="0" anchor="ctr"/>
+          <a:lstStyle/>
+          <a:p>
+            <a:pPr algn="ctr" defTabSz="672130"/>
+            <a:endParaRPr lang="en-US" sz="1176" dirty="0">
+              <a:solidFill>
+                <a:srgbClr val="FFC000"/>
+              </a:solidFill>
+              <a:latin typeface="Exo 2 Medium" panose="00000600000000000000" pitchFamily="50" charset="0"/>
+              <a:cs typeface="Simplon BP Regular"/>
+            </a:endParaRPr>
+          </a:p>
+        </p:txBody>
+      </p:sp>
+    </p:spTree>
+    <p:extLst>
+      <p:ext uri="{BB962C8B-B14F-4D97-AF65-F5344CB8AC3E}">
+        <p14:creationId xmlns:p14="http://schemas.microsoft.com/office/powerpoint/2010/main" val="4097448176"/>
       </p:ext>
     </p:extLst>
   </p:cSld>
@@ -33364,6 +35444,15 @@
 </file>
 
 <file path=customXml/item2.xml><?xml version="1.0" encoding="utf-8"?>
+<?mso-contentType ?>
+<FormTemplates xmlns="http://schemas.microsoft.com/sharepoint/v3/contenttype/forms">
+  <Display>DocumentLibraryForm</Display>
+  <Edit>DocumentLibraryForm</Edit>
+  <New>DocumentLibraryForm</New>
+</FormTemplates>
+</file>
+
+<file path=customXml/item3.xml><?xml version="1.0" encoding="utf-8"?>
 <ct:contentTypeSchema xmlns:ct="http://schemas.microsoft.com/office/2006/metadata/contentType" xmlns:ma="http://schemas.microsoft.com/office/2006/metadata/properties/metaAttributes" ct:_="" ma:_="" ma:contentTypeName="Document" ma:contentTypeID="0x0101007F8ECE7139958D46ABEDA89D12B90CBF" ma:contentTypeVersion="0" ma:contentTypeDescription="Create a new document." ma:contentTypeScope="" ma:versionID="e6d660081116f63565d30cc13099d5ec">
   <xsd:schema xmlns:xsd="http://www.w3.org/2001/XMLSchema" xmlns:xs="http://www.w3.org/2001/XMLSchema" xmlns:p="http://schemas.microsoft.com/office/2006/metadata/properties" targetNamespace="http://schemas.microsoft.com/office/2006/metadata/properties" ma:root="true" ma:fieldsID="d413257cd9829394d17656a545d5fa4e">
     <xsd:element name="properties">
@@ -33477,15 +35566,6 @@
 </ct:contentTypeSchema>
 </file>
 
-<file path=customXml/item3.xml><?xml version="1.0" encoding="utf-8"?>
-<?mso-contentType ?>
-<FormTemplates xmlns="http://schemas.microsoft.com/sharepoint/v3/contenttype/forms">
-  <Display>DocumentLibraryForm</Display>
-  <Edit>DocumentLibraryForm</Edit>
-  <New>DocumentLibraryForm</New>
-</FormTemplates>
-</file>
-
 <file path=customXml/itemProps1.xml><?xml version="1.0" encoding="utf-8"?>
 <ds:datastoreItem xmlns:ds="http://schemas.openxmlformats.org/officeDocument/2006/customXml" ds:itemID="{4B31267F-D399-4A8A-87F8-B75F56828412}">
   <ds:schemaRefs>
@@ -33504,6 +35584,14 @@
 </file>
 
 <file path=customXml/itemProps2.xml><?xml version="1.0" encoding="utf-8"?>
+<ds:datastoreItem xmlns:ds="http://schemas.openxmlformats.org/officeDocument/2006/customXml" ds:itemID="{E2481852-F24E-4532-AF30-C154D705D105}">
+  <ds:schemaRefs>
+    <ds:schemaRef ds:uri="http://schemas.microsoft.com/sharepoint/v3/contenttype/forms"/>
+  </ds:schemaRefs>
+</ds:datastoreItem>
+</file>
+
+<file path=customXml/itemProps3.xml><?xml version="1.0" encoding="utf-8"?>
 <ds:datastoreItem xmlns:ds="http://schemas.openxmlformats.org/officeDocument/2006/customXml" ds:itemID="{EFDE92A4-5D2A-451A-A373-EB014CDC0D59}">
   <ds:schemaRefs>
     <ds:schemaRef ds:uri="http://schemas.microsoft.com/office/2006/metadata/contentType"/>
@@ -33517,12 +35605,4 @@
     <ds:schemaRef ds:uri="http://schemas.microsoft.com/office/infopath/2007/PartnerControls"/>
   </ds:schemaRefs>
 </ds:datastoreItem>
-</file>
-
-<file path=customXml/itemProps3.xml><?xml version="1.0" encoding="utf-8"?>
-<ds:datastoreItem xmlns:ds="http://schemas.openxmlformats.org/officeDocument/2006/customXml" ds:itemID="{E2481852-F24E-4532-AF30-C154D705D105}">
-  <ds:schemaRefs>
-    <ds:schemaRef ds:uri="http://schemas.microsoft.com/sharepoint/v3/contenttype/forms"/>
-  </ds:schemaRefs>
-</ds:datastoreItem>
 </file>
</xml_diff>

<commit_message>
Adiciona novo Status Report
</commit_message>
<xml_diff>
--- a/Documentos/Status Report/StatusReport.pptx
+++ b/Documentos/Status Report/StatusReport.pptx
@@ -7,10 +7,10 @@
     <p:sldMasterId id="2147483665" r:id="rId6"/>
   </p:sldMasterIdLst>
   <p:notesMasterIdLst>
-    <p:notesMasterId r:id="rId16"/>
+    <p:notesMasterId r:id="rId18"/>
   </p:notesMasterIdLst>
   <p:handoutMasterIdLst>
-    <p:handoutMasterId r:id="rId17"/>
+    <p:handoutMasterId r:id="rId19"/>
   </p:handoutMasterIdLst>
   <p:sldIdLst>
     <p:sldId id="472" r:id="rId7"/>
@@ -22,6 +22,8 @@
     <p:sldId id="477" r:id="rId13"/>
     <p:sldId id="478" r:id="rId14"/>
     <p:sldId id="479" r:id="rId15"/>
+    <p:sldId id="256" r:id="rId16"/>
+    <p:sldId id="480" r:id="rId17"/>
   </p:sldIdLst>
   <p:sldSz cx="13442950" cy="7561263"/>
   <p:notesSz cx="7104063" cy="10234613"/>
@@ -137,6 +139,8 @@
             <p14:sldId id="477"/>
             <p14:sldId id="478"/>
             <p14:sldId id="479"/>
+            <p14:sldId id="256"/>
+            <p14:sldId id="480"/>
           </p14:sldIdLst>
         </p14:section>
       </p14:sectionLst>
@@ -250,7 +254,7 @@
             <a:fld id="{C3CD65D1-5C11-455D-9F9A-0E035F00A0DA}" type="datetimeFigureOut">
               <a:rPr lang="pt-BR" smtClean="0"/>
               <a:pPr/>
-              <a:t>06/10/2021</a:t>
+              <a:t>03/11/2021</a:t>
             </a:fld>
             <a:endParaRPr lang="pt-BR"/>
           </a:p>
@@ -418,7 +422,7 @@
             <a:fld id="{A05DA3EF-18EA-43DE-B1BB-402A3C558822}" type="datetimeFigureOut">
               <a:rPr lang="pt-BR" smtClean="0"/>
               <a:pPr/>
-              <a:t>06/10/2021</a:t>
+              <a:t>03/11/2021</a:t>
             </a:fld>
             <a:endParaRPr lang="pt-BR"/>
           </a:p>
@@ -3508,6 +3512,1002 @@
 
 <file path=ppt/slideLayouts/slideLayout10.xml><?xml version="1.0" encoding="utf-8"?>
 <p:sldLayout xmlns:a="http://schemas.openxmlformats.org/drawingml/2006/main" xmlns:r="http://schemas.openxmlformats.org/officeDocument/2006/relationships" xmlns:p="http://schemas.openxmlformats.org/presentationml/2006/main" preserve="1">
+  <p:cSld name="Uma Parte de Conteúdo">
+    <p:spTree>
+      <p:nvGrpSpPr>
+        <p:cNvPr id="1" name=""/>
+        <p:cNvGrpSpPr/>
+        <p:nvPr/>
+      </p:nvGrpSpPr>
+      <p:grpSpPr>
+        <a:xfrm>
+          <a:off x="0" y="0"/>
+          <a:ext cx="0" cy="0"/>
+          <a:chOff x="0" y="0"/>
+          <a:chExt cx="0" cy="0"/>
+        </a:xfrm>
+      </p:grpSpPr>
+      <p:sp>
+        <p:nvSpPr>
+          <p:cNvPr id="4103" name="Freeform 7"/>
+          <p:cNvSpPr>
+            <a:spLocks/>
+          </p:cNvSpPr>
+          <p:nvPr/>
+        </p:nvSpPr>
+        <p:spPr bwMode="auto">
+          <a:xfrm>
+            <a:off x="12605478" y="6948983"/>
+            <a:ext cx="837472" cy="612280"/>
+          </a:xfrm>
+          <a:custGeom>
+            <a:avLst/>
+            <a:gdLst/>
+            <a:ahLst/>
+            <a:cxnLst>
+              <a:cxn ang="0">
+                <a:pos x="1475" y="0"/>
+              </a:cxn>
+              <a:cxn ang="0">
+                <a:pos x="742" y="258"/>
+              </a:cxn>
+              <a:cxn ang="0">
+                <a:pos x="701" y="273"/>
+              </a:cxn>
+              <a:cxn ang="0">
+                <a:pos x="660" y="290"/>
+              </a:cxn>
+              <a:cxn ang="0">
+                <a:pos x="620" y="309"/>
+              </a:cxn>
+              <a:cxn ang="0">
+                <a:pos x="582" y="329"/>
+              </a:cxn>
+              <a:cxn ang="0">
+                <a:pos x="544" y="350"/>
+              </a:cxn>
+              <a:cxn ang="0">
+                <a:pos x="508" y="373"/>
+              </a:cxn>
+              <a:cxn ang="0">
+                <a:pos x="472" y="397"/>
+              </a:cxn>
+              <a:cxn ang="0">
+                <a:pos x="437" y="422"/>
+              </a:cxn>
+              <a:cxn ang="0">
+                <a:pos x="404" y="449"/>
+              </a:cxn>
+              <a:cxn ang="0">
+                <a:pos x="371" y="477"/>
+              </a:cxn>
+              <a:cxn ang="0">
+                <a:pos x="341" y="506"/>
+              </a:cxn>
+              <a:cxn ang="0">
+                <a:pos x="311" y="536"/>
+              </a:cxn>
+              <a:cxn ang="0">
+                <a:pos x="281" y="566"/>
+              </a:cxn>
+              <a:cxn ang="0">
+                <a:pos x="254" y="599"/>
+              </a:cxn>
+              <a:cxn ang="0">
+                <a:pos x="228" y="632"/>
+              </a:cxn>
+              <a:cxn ang="0">
+                <a:pos x="203" y="666"/>
+              </a:cxn>
+              <a:cxn ang="0">
+                <a:pos x="179" y="701"/>
+              </a:cxn>
+              <a:cxn ang="0">
+                <a:pos x="158" y="738"/>
+              </a:cxn>
+              <a:cxn ang="0">
+                <a:pos x="136" y="775"/>
+              </a:cxn>
+              <a:cxn ang="0">
+                <a:pos x="117" y="813"/>
+              </a:cxn>
+              <a:cxn ang="0">
+                <a:pos x="98" y="850"/>
+              </a:cxn>
+              <a:cxn ang="0">
+                <a:pos x="82" y="890"/>
+              </a:cxn>
+              <a:cxn ang="0">
+                <a:pos x="67" y="930"/>
+              </a:cxn>
+              <a:cxn ang="0">
+                <a:pos x="53" y="970"/>
+              </a:cxn>
+              <a:cxn ang="0">
+                <a:pos x="41" y="1011"/>
+              </a:cxn>
+              <a:cxn ang="0">
+                <a:pos x="30" y="1053"/>
+              </a:cxn>
+              <a:cxn ang="0">
+                <a:pos x="21" y="1096"/>
+              </a:cxn>
+              <a:cxn ang="0">
+                <a:pos x="14" y="1138"/>
+              </a:cxn>
+              <a:cxn ang="0">
+                <a:pos x="7" y="1181"/>
+              </a:cxn>
+              <a:cxn ang="0">
+                <a:pos x="4" y="1224"/>
+              </a:cxn>
+              <a:cxn ang="0">
+                <a:pos x="1" y="1269"/>
+              </a:cxn>
+              <a:cxn ang="0">
+                <a:pos x="0" y="1313"/>
+              </a:cxn>
+              <a:cxn ang="0">
+                <a:pos x="0" y="1578"/>
+              </a:cxn>
+              <a:cxn ang="0">
+                <a:pos x="1475" y="1578"/>
+              </a:cxn>
+              <a:cxn ang="0">
+                <a:pos x="1475" y="0"/>
+              </a:cxn>
+            </a:cxnLst>
+            <a:rect l="0" t="0" r="r" b="b"/>
+            <a:pathLst>
+              <a:path w="1475" h="1578">
+                <a:moveTo>
+                  <a:pt x="1475" y="0"/>
+                </a:moveTo>
+                <a:lnTo>
+                  <a:pt x="742" y="258"/>
+                </a:lnTo>
+                <a:lnTo>
+                  <a:pt x="701" y="273"/>
+                </a:lnTo>
+                <a:lnTo>
+                  <a:pt x="660" y="290"/>
+                </a:lnTo>
+                <a:lnTo>
+                  <a:pt x="620" y="309"/>
+                </a:lnTo>
+                <a:lnTo>
+                  <a:pt x="582" y="329"/>
+                </a:lnTo>
+                <a:lnTo>
+                  <a:pt x="544" y="350"/>
+                </a:lnTo>
+                <a:lnTo>
+                  <a:pt x="508" y="373"/>
+                </a:lnTo>
+                <a:lnTo>
+                  <a:pt x="472" y="397"/>
+                </a:lnTo>
+                <a:lnTo>
+                  <a:pt x="437" y="422"/>
+                </a:lnTo>
+                <a:lnTo>
+                  <a:pt x="404" y="449"/>
+                </a:lnTo>
+                <a:lnTo>
+                  <a:pt x="371" y="477"/>
+                </a:lnTo>
+                <a:lnTo>
+                  <a:pt x="341" y="506"/>
+                </a:lnTo>
+                <a:lnTo>
+                  <a:pt x="311" y="536"/>
+                </a:lnTo>
+                <a:lnTo>
+                  <a:pt x="281" y="566"/>
+                </a:lnTo>
+                <a:lnTo>
+                  <a:pt x="254" y="599"/>
+                </a:lnTo>
+                <a:lnTo>
+                  <a:pt x="228" y="632"/>
+                </a:lnTo>
+                <a:lnTo>
+                  <a:pt x="203" y="666"/>
+                </a:lnTo>
+                <a:lnTo>
+                  <a:pt x="179" y="701"/>
+                </a:lnTo>
+                <a:lnTo>
+                  <a:pt x="158" y="738"/>
+                </a:lnTo>
+                <a:lnTo>
+                  <a:pt x="136" y="775"/>
+                </a:lnTo>
+                <a:lnTo>
+                  <a:pt x="117" y="813"/>
+                </a:lnTo>
+                <a:lnTo>
+                  <a:pt x="98" y="850"/>
+                </a:lnTo>
+                <a:lnTo>
+                  <a:pt x="82" y="890"/>
+                </a:lnTo>
+                <a:lnTo>
+                  <a:pt x="67" y="930"/>
+                </a:lnTo>
+                <a:lnTo>
+                  <a:pt x="53" y="970"/>
+                </a:lnTo>
+                <a:lnTo>
+                  <a:pt x="41" y="1011"/>
+                </a:lnTo>
+                <a:lnTo>
+                  <a:pt x="30" y="1053"/>
+                </a:lnTo>
+                <a:lnTo>
+                  <a:pt x="21" y="1096"/>
+                </a:lnTo>
+                <a:lnTo>
+                  <a:pt x="14" y="1138"/>
+                </a:lnTo>
+                <a:lnTo>
+                  <a:pt x="7" y="1181"/>
+                </a:lnTo>
+                <a:lnTo>
+                  <a:pt x="4" y="1224"/>
+                </a:lnTo>
+                <a:lnTo>
+                  <a:pt x="1" y="1269"/>
+                </a:lnTo>
+                <a:lnTo>
+                  <a:pt x="0" y="1313"/>
+                </a:lnTo>
+                <a:lnTo>
+                  <a:pt x="0" y="1578"/>
+                </a:lnTo>
+                <a:lnTo>
+                  <a:pt x="1475" y="1578"/>
+                </a:lnTo>
+                <a:lnTo>
+                  <a:pt x="1475" y="0"/>
+                </a:lnTo>
+                <a:close/>
+              </a:path>
+            </a:pathLst>
+          </a:custGeom>
+          <a:solidFill>
+            <a:srgbClr val="292C34"/>
+          </a:solidFill>
+          <a:ln w="9525">
+            <a:noFill/>
+            <a:round/>
+            <a:headEnd/>
+            <a:tailEnd/>
+          </a:ln>
+        </p:spPr>
+        <p:txBody>
+          <a:bodyPr vert="horz" wrap="square" lIns="91440" tIns="45720" rIns="91440" bIns="45720" numCol="1" anchor="t" anchorCtr="0" compatLnSpc="1">
+            <a:prstTxWarp prst="textNoShape">
+              <a:avLst/>
+            </a:prstTxWarp>
+          </a:bodyPr>
+          <a:lstStyle/>
+          <a:p>
+            <a:endParaRPr lang="pt-BR" sz="2100"/>
+          </a:p>
+        </p:txBody>
+      </p:sp>
+      <p:sp>
+        <p:nvSpPr>
+          <p:cNvPr id="18" name="Espaço Reservado para Texto 17"/>
+          <p:cNvSpPr>
+            <a:spLocks noGrp="1"/>
+          </p:cNvSpPr>
+          <p:nvPr>
+            <p:ph type="body" sz="quarter" idx="11"/>
+          </p:nvPr>
+        </p:nvSpPr>
+        <p:spPr>
+          <a:xfrm>
+            <a:off x="2828982" y="1331914"/>
+            <a:ext cx="8779933" cy="5761037"/>
+          </a:xfrm>
+          <a:prstGeom prst="rect">
+            <a:avLst/>
+          </a:prstGeom>
+        </p:spPr>
+        <p:txBody>
+          <a:bodyPr/>
+          <a:lstStyle>
+            <a:lvl1pPr>
+              <a:buClr>
+                <a:srgbClr val="32B9CD"/>
+              </a:buClr>
+              <a:defRPr>
+                <a:latin typeface="Exo 2" pitchFamily="50" charset="0"/>
+              </a:defRPr>
+            </a:lvl1pPr>
+            <a:lvl2pPr>
+              <a:buClr>
+                <a:srgbClr val="32B9CD"/>
+              </a:buClr>
+              <a:defRPr>
+                <a:latin typeface="Exo 2" pitchFamily="50" charset="0"/>
+              </a:defRPr>
+            </a:lvl2pPr>
+            <a:lvl3pPr>
+              <a:buClr>
+                <a:srgbClr val="32B9CD"/>
+              </a:buClr>
+              <a:defRPr>
+                <a:latin typeface="Exo 2" pitchFamily="50" charset="0"/>
+              </a:defRPr>
+            </a:lvl3pPr>
+            <a:lvl4pPr>
+              <a:buClr>
+                <a:srgbClr val="32B9CD"/>
+              </a:buClr>
+              <a:defRPr>
+                <a:latin typeface="Exo 2" pitchFamily="50" charset="0"/>
+              </a:defRPr>
+            </a:lvl4pPr>
+            <a:lvl5pPr>
+              <a:buClr>
+                <a:srgbClr val="32B9CD"/>
+              </a:buClr>
+              <a:defRPr>
+                <a:latin typeface="Exo 2" pitchFamily="50" charset="0"/>
+              </a:defRPr>
+            </a:lvl5pPr>
+          </a:lstStyle>
+          <a:p>
+            <a:pPr lvl="0"/>
+            <a:r>
+              <a:rPr lang="pt-BR"/>
+              <a:t>Clique para editar os estilos do texto mestre</a:t>
+            </a:r>
+          </a:p>
+          <a:p>
+            <a:pPr lvl="1"/>
+            <a:r>
+              <a:rPr lang="pt-BR"/>
+              <a:t>Segundo nível</a:t>
+            </a:r>
+          </a:p>
+          <a:p>
+            <a:pPr lvl="2"/>
+            <a:r>
+              <a:rPr lang="pt-BR"/>
+              <a:t>Terceiro nível</a:t>
+            </a:r>
+          </a:p>
+          <a:p>
+            <a:pPr lvl="3"/>
+            <a:r>
+              <a:rPr lang="pt-BR"/>
+              <a:t>Quarto nível</a:t>
+            </a:r>
+          </a:p>
+          <a:p>
+            <a:pPr lvl="4"/>
+            <a:r>
+              <a:rPr lang="pt-BR"/>
+              <a:t>Quinto nível</a:t>
+            </a:r>
+            <a:endParaRPr lang="pt-BR" dirty="0"/>
+          </a:p>
+        </p:txBody>
+      </p:sp>
+      <p:sp>
+        <p:nvSpPr>
+          <p:cNvPr id="7" name="Rectangle 4"/>
+          <p:cNvSpPr>
+            <a:spLocks noGrp="1" noChangeArrowheads="1"/>
+          </p:cNvSpPr>
+          <p:nvPr>
+            <p:ph type="sldNum" sz="quarter" idx="4"/>
+          </p:nvPr>
+        </p:nvSpPr>
+        <p:spPr bwMode="auto">
+          <a:xfrm>
+            <a:off x="12605478" y="7237015"/>
+            <a:ext cx="628646" cy="214290"/>
+          </a:xfrm>
+          <a:prstGeom prst="rect">
+            <a:avLst/>
+          </a:prstGeom>
+          <a:noFill/>
+          <a:ln w="9525">
+            <a:noFill/>
+            <a:miter lim="800000"/>
+            <a:headEnd/>
+            <a:tailEnd/>
+          </a:ln>
+          <a:effectLst/>
+        </p:spPr>
+        <p:txBody>
+          <a:bodyPr vert="horz" wrap="square" lIns="18000" tIns="10800" rIns="18000" bIns="10800" numCol="1" anchor="t" anchorCtr="0" compatLnSpc="1">
+            <a:prstTxWarp prst="textNoShape">
+              <a:avLst/>
+            </a:prstTxWarp>
+          </a:bodyPr>
+          <a:lstStyle>
+            <a:lvl1pPr algn="r">
+              <a:spcBef>
+                <a:spcPct val="0"/>
+              </a:spcBef>
+              <a:spcAft>
+                <a:spcPct val="0"/>
+              </a:spcAft>
+              <a:defRPr sz="1000" b="1">
+                <a:solidFill>
+                  <a:schemeClr val="bg1"/>
+                </a:solidFill>
+                <a:latin typeface="Exo 2" pitchFamily="50" charset="0"/>
+                <a:ea typeface="Tahoma" pitchFamily="34" charset="0"/>
+                <a:cs typeface="Tahoma" pitchFamily="34" charset="0"/>
+              </a:defRPr>
+            </a:lvl1pPr>
+          </a:lstStyle>
+          <a:p>
+            <a:pPr>
+              <a:defRPr/>
+            </a:pPr>
+            <a:fld id="{B66251D2-9488-44CD-87B4-F793A73C4A01}" type="slidenum">
+              <a:rPr lang="pt-BR" smtClean="0"/>
+              <a:pPr>
+                <a:defRPr/>
+              </a:pPr>
+              <a:t>‹nº›</a:t>
+            </a:fld>
+            <a:endParaRPr lang="pt-BR" sz="700" dirty="0"/>
+          </a:p>
+        </p:txBody>
+      </p:sp>
+      <p:sp>
+        <p:nvSpPr>
+          <p:cNvPr id="9" name="Freeform 6"/>
+          <p:cNvSpPr>
+            <a:spLocks/>
+          </p:cNvSpPr>
+          <p:nvPr/>
+        </p:nvSpPr>
+        <p:spPr bwMode="auto">
+          <a:xfrm>
+            <a:off x="1" y="1"/>
+            <a:ext cx="2401423" cy="1332359"/>
+          </a:xfrm>
+          <a:custGeom>
+            <a:avLst/>
+            <a:gdLst/>
+            <a:ahLst/>
+            <a:cxnLst>
+              <a:cxn ang="0">
+                <a:pos x="3091" y="1686"/>
+              </a:cxn>
+              <a:cxn ang="0">
+                <a:pos x="3117" y="1687"/>
+              </a:cxn>
+              <a:cxn ang="0">
+                <a:pos x="3156" y="1689"/>
+              </a:cxn>
+              <a:cxn ang="0">
+                <a:pos x="3169" y="1687"/>
+              </a:cxn>
+              <a:cxn ang="0">
+                <a:pos x="3252" y="1655"/>
+              </a:cxn>
+              <a:cxn ang="0">
+                <a:pos x="3332" y="1617"/>
+              </a:cxn>
+              <a:cxn ang="0">
+                <a:pos x="3408" y="1573"/>
+              </a:cxn>
+              <a:cxn ang="0">
+                <a:pos x="3478" y="1523"/>
+              </a:cxn>
+              <a:cxn ang="0">
+                <a:pos x="3545" y="1469"/>
+              </a:cxn>
+              <a:cxn ang="0">
+                <a:pos x="3608" y="1411"/>
+              </a:cxn>
+              <a:cxn ang="0">
+                <a:pos x="3665" y="1346"/>
+              </a:cxn>
+              <a:cxn ang="0">
+                <a:pos x="3718" y="1279"/>
+              </a:cxn>
+              <a:cxn ang="0">
+                <a:pos x="3765" y="1207"/>
+              </a:cxn>
+              <a:cxn ang="0">
+                <a:pos x="3807" y="1133"/>
+              </a:cxn>
+              <a:cxn ang="0">
+                <a:pos x="3842" y="1055"/>
+              </a:cxn>
+              <a:cxn ang="0">
+                <a:pos x="3872" y="974"/>
+              </a:cxn>
+              <a:cxn ang="0">
+                <a:pos x="3896" y="890"/>
+              </a:cxn>
+              <a:cxn ang="0">
+                <a:pos x="3913" y="805"/>
+              </a:cxn>
+              <a:cxn ang="0">
+                <a:pos x="3923" y="717"/>
+              </a:cxn>
+              <a:cxn ang="0">
+                <a:pos x="3927" y="628"/>
+              </a:cxn>
+              <a:cxn ang="0">
+                <a:pos x="3855" y="0"/>
+              </a:cxn>
+              <a:cxn ang="0">
+                <a:pos x="3088" y="0"/>
+              </a:cxn>
+              <a:cxn ang="0">
+                <a:pos x="3855" y="278"/>
+              </a:cxn>
+              <a:cxn ang="0">
+                <a:pos x="3853" y="671"/>
+              </a:cxn>
+              <a:cxn ang="0">
+                <a:pos x="3847" y="753"/>
+              </a:cxn>
+              <a:cxn ang="0">
+                <a:pos x="3834" y="834"/>
+              </a:cxn>
+              <a:cxn ang="0">
+                <a:pos x="3814" y="913"/>
+              </a:cxn>
+              <a:cxn ang="0">
+                <a:pos x="3790" y="990"/>
+              </a:cxn>
+              <a:cxn ang="0">
+                <a:pos x="3759" y="1063"/>
+              </a:cxn>
+              <a:cxn ang="0">
+                <a:pos x="3723" y="1135"/>
+              </a:cxn>
+              <a:cxn ang="0">
+                <a:pos x="3682" y="1204"/>
+              </a:cxn>
+              <a:cxn ang="0">
+                <a:pos x="3635" y="1269"/>
+              </a:cxn>
+              <a:cxn ang="0">
+                <a:pos x="3583" y="1330"/>
+              </a:cxn>
+              <a:cxn ang="0">
+                <a:pos x="3528" y="1388"/>
+              </a:cxn>
+              <a:cxn ang="0">
+                <a:pos x="3467" y="1441"/>
+              </a:cxn>
+              <a:cxn ang="0">
+                <a:pos x="3403" y="1489"/>
+              </a:cxn>
+              <a:cxn ang="0">
+                <a:pos x="3333" y="1533"/>
+              </a:cxn>
+              <a:cxn ang="0">
+                <a:pos x="3261" y="1571"/>
+              </a:cxn>
+              <a:cxn ang="0">
+                <a:pos x="3185" y="1604"/>
+              </a:cxn>
+              <a:cxn ang="0">
+                <a:pos x="3140" y="1621"/>
+              </a:cxn>
+              <a:cxn ang="0">
+                <a:pos x="3121" y="1636"/>
+              </a:cxn>
+              <a:cxn ang="0">
+                <a:pos x="3091" y="1661"/>
+              </a:cxn>
+              <a:cxn ang="0">
+                <a:pos x="0" y="2718"/>
+              </a:cxn>
+            </a:cxnLst>
+            <a:rect l="0" t="0" r="r" b="b"/>
+            <a:pathLst>
+              <a:path w="3927" h="2740">
+                <a:moveTo>
+                  <a:pt x="0" y="2740"/>
+                </a:moveTo>
+                <a:lnTo>
+                  <a:pt x="3091" y="1686"/>
+                </a:lnTo>
+                <a:lnTo>
+                  <a:pt x="3098" y="1686"/>
+                </a:lnTo>
+                <a:lnTo>
+                  <a:pt x="3117" y="1687"/>
+                </a:lnTo>
+                <a:lnTo>
+                  <a:pt x="3139" y="1689"/>
+                </a:lnTo>
+                <a:lnTo>
+                  <a:pt x="3156" y="1689"/>
+                </a:lnTo>
+                <a:lnTo>
+                  <a:pt x="3163" y="1689"/>
+                </a:lnTo>
+                <a:lnTo>
+                  <a:pt x="3169" y="1687"/>
+                </a:lnTo>
+                <a:lnTo>
+                  <a:pt x="3211" y="1672"/>
+                </a:lnTo>
+                <a:lnTo>
+                  <a:pt x="3252" y="1655"/>
+                </a:lnTo>
+                <a:lnTo>
+                  <a:pt x="3293" y="1637"/>
+                </a:lnTo>
+                <a:lnTo>
+                  <a:pt x="3332" y="1617"/>
+                </a:lnTo>
+                <a:lnTo>
+                  <a:pt x="3370" y="1595"/>
+                </a:lnTo>
+                <a:lnTo>
+                  <a:pt x="3408" y="1573"/>
+                </a:lnTo>
+                <a:lnTo>
+                  <a:pt x="3443" y="1549"/>
+                </a:lnTo>
+                <a:lnTo>
+                  <a:pt x="3478" y="1523"/>
+                </a:lnTo>
+                <a:lnTo>
+                  <a:pt x="3512" y="1497"/>
+                </a:lnTo>
+                <a:lnTo>
+                  <a:pt x="3545" y="1469"/>
+                </a:lnTo>
+                <a:lnTo>
+                  <a:pt x="3577" y="1440"/>
+                </a:lnTo>
+                <a:lnTo>
+                  <a:pt x="3608" y="1411"/>
+                </a:lnTo>
+                <a:lnTo>
+                  <a:pt x="3637" y="1379"/>
+                </a:lnTo>
+                <a:lnTo>
+                  <a:pt x="3665" y="1346"/>
+                </a:lnTo>
+                <a:lnTo>
+                  <a:pt x="3692" y="1314"/>
+                </a:lnTo>
+                <a:lnTo>
+                  <a:pt x="3718" y="1279"/>
+                </a:lnTo>
+                <a:lnTo>
+                  <a:pt x="3742" y="1244"/>
+                </a:lnTo>
+                <a:lnTo>
+                  <a:pt x="3765" y="1207"/>
+                </a:lnTo>
+                <a:lnTo>
+                  <a:pt x="3786" y="1171"/>
+                </a:lnTo>
+                <a:lnTo>
+                  <a:pt x="3807" y="1133"/>
+                </a:lnTo>
+                <a:lnTo>
+                  <a:pt x="3826" y="1094"/>
+                </a:lnTo>
+                <a:lnTo>
+                  <a:pt x="3842" y="1055"/>
+                </a:lnTo>
+                <a:lnTo>
+                  <a:pt x="3858" y="1014"/>
+                </a:lnTo>
+                <a:lnTo>
+                  <a:pt x="3872" y="974"/>
+                </a:lnTo>
+                <a:lnTo>
+                  <a:pt x="3885" y="932"/>
+                </a:lnTo>
+                <a:lnTo>
+                  <a:pt x="3896" y="890"/>
+                </a:lnTo>
+                <a:lnTo>
+                  <a:pt x="3905" y="848"/>
+                </a:lnTo>
+                <a:lnTo>
+                  <a:pt x="3913" y="805"/>
+                </a:lnTo>
+                <a:lnTo>
+                  <a:pt x="3919" y="762"/>
+                </a:lnTo>
+                <a:lnTo>
+                  <a:pt x="3923" y="717"/>
+                </a:lnTo>
+                <a:lnTo>
+                  <a:pt x="3927" y="673"/>
+                </a:lnTo>
+                <a:lnTo>
+                  <a:pt x="3927" y="628"/>
+                </a:lnTo>
+                <a:lnTo>
+                  <a:pt x="3927" y="0"/>
+                </a:lnTo>
+                <a:lnTo>
+                  <a:pt x="3855" y="0"/>
+                </a:lnTo>
+                <a:lnTo>
+                  <a:pt x="3855" y="256"/>
+                </a:lnTo>
+                <a:lnTo>
+                  <a:pt x="3088" y="0"/>
+                </a:lnTo>
+                <a:lnTo>
+                  <a:pt x="3022" y="0"/>
+                </a:lnTo>
+                <a:lnTo>
+                  <a:pt x="3855" y="278"/>
+                </a:lnTo>
+                <a:lnTo>
+                  <a:pt x="3855" y="628"/>
+                </a:lnTo>
+                <a:lnTo>
+                  <a:pt x="3853" y="671"/>
+                </a:lnTo>
+                <a:lnTo>
+                  <a:pt x="3851" y="711"/>
+                </a:lnTo>
+                <a:lnTo>
+                  <a:pt x="3847" y="753"/>
+                </a:lnTo>
+                <a:lnTo>
+                  <a:pt x="3841" y="793"/>
+                </a:lnTo>
+                <a:lnTo>
+                  <a:pt x="3834" y="834"/>
+                </a:lnTo>
+                <a:lnTo>
+                  <a:pt x="3826" y="874"/>
+                </a:lnTo>
+                <a:lnTo>
+                  <a:pt x="3814" y="913"/>
+                </a:lnTo>
+                <a:lnTo>
+                  <a:pt x="3803" y="951"/>
+                </a:lnTo>
+                <a:lnTo>
+                  <a:pt x="3790" y="990"/>
+                </a:lnTo>
+                <a:lnTo>
+                  <a:pt x="3775" y="1027"/>
+                </a:lnTo>
+                <a:lnTo>
+                  <a:pt x="3759" y="1063"/>
+                </a:lnTo>
+                <a:lnTo>
+                  <a:pt x="3742" y="1100"/>
+                </a:lnTo>
+                <a:lnTo>
+                  <a:pt x="3723" y="1135"/>
+                </a:lnTo>
+                <a:lnTo>
+                  <a:pt x="3703" y="1170"/>
+                </a:lnTo>
+                <a:lnTo>
+                  <a:pt x="3682" y="1204"/>
+                </a:lnTo>
+                <a:lnTo>
+                  <a:pt x="3659" y="1237"/>
+                </a:lnTo>
+                <a:lnTo>
+                  <a:pt x="3635" y="1269"/>
+                </a:lnTo>
+                <a:lnTo>
+                  <a:pt x="3610" y="1300"/>
+                </a:lnTo>
+                <a:lnTo>
+                  <a:pt x="3583" y="1330"/>
+                </a:lnTo>
+                <a:lnTo>
+                  <a:pt x="3555" y="1359"/>
+                </a:lnTo>
+                <a:lnTo>
+                  <a:pt x="3528" y="1388"/>
+                </a:lnTo>
+                <a:lnTo>
+                  <a:pt x="3497" y="1415"/>
+                </a:lnTo>
+                <a:lnTo>
+                  <a:pt x="3467" y="1441"/>
+                </a:lnTo>
+                <a:lnTo>
+                  <a:pt x="3435" y="1465"/>
+                </a:lnTo>
+                <a:lnTo>
+                  <a:pt x="3403" y="1489"/>
+                </a:lnTo>
+                <a:lnTo>
+                  <a:pt x="3368" y="1512"/>
+                </a:lnTo>
+                <a:lnTo>
+                  <a:pt x="3333" y="1533"/>
+                </a:lnTo>
+                <a:lnTo>
+                  <a:pt x="3298" y="1552"/>
+                </a:lnTo>
+                <a:lnTo>
+                  <a:pt x="3261" y="1571"/>
+                </a:lnTo>
+                <a:lnTo>
+                  <a:pt x="3223" y="1588"/>
+                </a:lnTo>
+                <a:lnTo>
+                  <a:pt x="3185" y="1604"/>
+                </a:lnTo>
+                <a:lnTo>
+                  <a:pt x="3145" y="1618"/>
+                </a:lnTo>
+                <a:lnTo>
+                  <a:pt x="3140" y="1621"/>
+                </a:lnTo>
+                <a:lnTo>
+                  <a:pt x="3135" y="1624"/>
+                </a:lnTo>
+                <a:lnTo>
+                  <a:pt x="3121" y="1636"/>
+                </a:lnTo>
+                <a:lnTo>
+                  <a:pt x="3104" y="1650"/>
+                </a:lnTo>
+                <a:lnTo>
+                  <a:pt x="3091" y="1661"/>
+                </a:lnTo>
+                <a:lnTo>
+                  <a:pt x="3084" y="1666"/>
+                </a:lnTo>
+                <a:lnTo>
+                  <a:pt x="0" y="2718"/>
+                </a:lnTo>
+                <a:lnTo>
+                  <a:pt x="0" y="2740"/>
+                </a:lnTo>
+                <a:close/>
+              </a:path>
+            </a:pathLst>
+          </a:custGeom>
+          <a:solidFill>
+            <a:srgbClr val="3B3D42"/>
+          </a:solidFill>
+          <a:ln w="9525">
+            <a:noFill/>
+            <a:round/>
+            <a:headEnd/>
+            <a:tailEnd/>
+          </a:ln>
+        </p:spPr>
+        <p:txBody>
+          <a:bodyPr vert="horz" wrap="square" lIns="91440" tIns="45720" rIns="91440" bIns="45720" numCol="1" anchor="t" anchorCtr="0" compatLnSpc="1">
+            <a:prstTxWarp prst="textNoShape">
+              <a:avLst/>
+            </a:prstTxWarp>
+          </a:bodyPr>
+          <a:lstStyle/>
+          <a:p>
+            <a:endParaRPr lang="pt-BR" sz="2100"/>
+          </a:p>
+        </p:txBody>
+      </p:sp>
+      <p:sp>
+        <p:nvSpPr>
+          <p:cNvPr id="10" name="Espaço Reservado para Texto 15"/>
+          <p:cNvSpPr>
+            <a:spLocks noGrp="1"/>
+          </p:cNvSpPr>
+          <p:nvPr>
+            <p:ph type="body" sz="quarter" idx="13" hasCustomPrompt="1"/>
+          </p:nvPr>
+        </p:nvSpPr>
+        <p:spPr>
+          <a:xfrm>
+            <a:off x="2829885" y="108224"/>
+            <a:ext cx="10137686" cy="765639"/>
+          </a:xfrm>
+          <a:prstGeom prst="rect">
+            <a:avLst/>
+          </a:prstGeom>
+        </p:spPr>
+        <p:txBody>
+          <a:bodyPr anchor="t"/>
+          <a:lstStyle>
+            <a:lvl1pPr>
+              <a:buNone/>
+              <a:defRPr sz="3000" b="1" baseline="0">
+                <a:solidFill>
+                  <a:srgbClr val="32B9CD"/>
+                </a:solidFill>
+                <a:latin typeface="Exo 2" pitchFamily="50" charset="0"/>
+              </a:defRPr>
+            </a:lvl1pPr>
+            <a:lvl2pPr>
+              <a:buNone/>
+              <a:defRPr sz="3000">
+                <a:latin typeface="Exo 2" pitchFamily="50" charset="0"/>
+              </a:defRPr>
+            </a:lvl2pPr>
+            <a:lvl3pPr>
+              <a:buNone/>
+              <a:defRPr sz="3000">
+                <a:latin typeface="Exo 2" pitchFamily="50" charset="0"/>
+              </a:defRPr>
+            </a:lvl3pPr>
+            <a:lvl4pPr>
+              <a:buNone/>
+              <a:defRPr sz="3000">
+                <a:latin typeface="Exo 2" pitchFamily="50" charset="0"/>
+              </a:defRPr>
+            </a:lvl4pPr>
+            <a:lvl5pPr>
+              <a:buNone/>
+              <a:defRPr sz="3000">
+                <a:latin typeface="Exo 2" pitchFamily="50" charset="0"/>
+              </a:defRPr>
+            </a:lvl5pPr>
+          </a:lstStyle>
+          <a:p>
+            <a:pPr lvl="0"/>
+            <a:r>
+              <a:rPr lang="pt-BR" dirty="0"/>
+              <a:t>Clique para editar título do slide</a:t>
+            </a:r>
+          </a:p>
+        </p:txBody>
+      </p:sp>
+      <p:pic>
+        <p:nvPicPr>
+          <p:cNvPr id="11" name="Imagem 10"/>
+          <p:cNvPicPr>
+            <a:picLocks noChangeAspect="1"/>
+          </p:cNvPicPr>
+          <p:nvPr userDrawn="1"/>
+        </p:nvPicPr>
+        <p:blipFill>
+          <a:blip r:embed="rId2" cstate="print">
+            <a:extLst>
+              <a:ext uri="{28A0092B-C50C-407E-A947-70E740481C1C}">
+                <a14:useLocalDpi xmlns:a14="http://schemas.microsoft.com/office/drawing/2010/main" val="0"/>
+              </a:ext>
+            </a:extLst>
+          </a:blip>
+          <a:stretch>
+            <a:fillRect/>
+          </a:stretch>
+        </p:blipFill>
+        <p:spPr>
+          <a:xfrm>
+            <a:off x="212219" y="166075"/>
+            <a:ext cx="1687192" cy="500104"/>
+          </a:xfrm>
+          <a:prstGeom prst="rect">
+            <a:avLst/>
+          </a:prstGeom>
+        </p:spPr>
+      </p:pic>
+    </p:spTree>
+  </p:cSld>
+  <p:clrMapOvr>
+    <a:masterClrMapping/>
+  </p:clrMapOvr>
+  <p:hf hdr="0" ftr="0" dt="0"/>
+</p:sldLayout>
+</file>
+
+<file path=ppt/slideLayouts/slideLayout11.xml><?xml version="1.0" encoding="utf-8"?>
+<p:sldLayout xmlns:a="http://schemas.openxmlformats.org/drawingml/2006/main" xmlns:r="http://schemas.openxmlformats.org/officeDocument/2006/relationships" xmlns:p="http://schemas.openxmlformats.org/presentationml/2006/main" preserve="1">
   <p:cSld name="Duas Partes de Conteúdo">
     <p:spTree>
       <p:nvGrpSpPr>
@@ -4802,7 +5802,7 @@
 </p:sldLayout>
 </file>
 
-<file path=ppt/slideLayouts/slideLayout11.xml><?xml version="1.0" encoding="utf-8"?>
+<file path=ppt/slideLayouts/slideLayout12.xml><?xml version="1.0" encoding="utf-8"?>
 <p:sldLayout xmlns:a="http://schemas.openxmlformats.org/drawingml/2006/main" xmlns:r="http://schemas.openxmlformats.org/officeDocument/2006/relationships" xmlns:p="http://schemas.openxmlformats.org/presentationml/2006/main" preserve="1">
   <p:cSld name="Encerramento 1">
     <p:spTree>
@@ -6907,7 +7907,7 @@
 </p:sldLayout>
 </file>
 
-<file path=ppt/slideLayouts/slideLayout12.xml><?xml version="1.0" encoding="utf-8"?>
+<file path=ppt/slideLayouts/slideLayout13.xml><?xml version="1.0" encoding="utf-8"?>
 <p:sldLayout xmlns:a="http://schemas.openxmlformats.org/drawingml/2006/main" xmlns:r="http://schemas.openxmlformats.org/officeDocument/2006/relationships" xmlns:p="http://schemas.openxmlformats.org/presentationml/2006/main" preserve="1" userDrawn="1">
   <p:cSld name="Encerramento 2">
     <p:spTree>
@@ -19134,8 +20134,8 @@
 </file>
 
 <file path=ppt/slideLayouts/slideLayout9.xml><?xml version="1.0" encoding="utf-8"?>
-<p:sldLayout xmlns:a="http://schemas.openxmlformats.org/drawingml/2006/main" xmlns:r="http://schemas.openxmlformats.org/officeDocument/2006/relationships" xmlns:p="http://schemas.openxmlformats.org/presentationml/2006/main" preserve="1">
-  <p:cSld name="Uma Parte de Conteúdo">
+<p:sldLayout xmlns:a="http://schemas.openxmlformats.org/drawingml/2006/main" xmlns:r="http://schemas.openxmlformats.org/officeDocument/2006/relationships" xmlns:p="http://schemas.openxmlformats.org/presentationml/2006/main" type="title">
+  <p:cSld name="Title Slide">
     <p:spTree>
       <p:nvGrpSpPr>
         <p:cNvPr id="1" name=""/>
@@ -19152,980 +20152,206 @@
       </p:grpSpPr>
       <p:sp>
         <p:nvSpPr>
-          <p:cNvPr id="4103" name="Freeform 7"/>
+          <p:cNvPr id="2" name="Title 1">
+            <a:extLst>
+              <a:ext uri="{FF2B5EF4-FFF2-40B4-BE49-F238E27FC236}">
+                <a16:creationId xmlns:a16="http://schemas.microsoft.com/office/drawing/2014/main" id="{DE74271D-A397-4CAD-9EFD-D1880BD1901C}"/>
+              </a:ext>
+            </a:extLst>
+          </p:cNvPr>
           <p:cNvSpPr>
-            <a:spLocks/>
+            <a:spLocks noGrp="1"/>
           </p:cNvSpPr>
-          <p:nvPr/>
+          <p:nvPr>
+            <p:ph type="ctrTitle"/>
+          </p:nvPr>
         </p:nvSpPr>
-        <p:spPr bwMode="auto">
+        <p:spPr>
           <a:xfrm>
-            <a:off x="12605478" y="6948983"/>
-            <a:ext cx="837472" cy="612280"/>
+            <a:off x="1680369" y="1237457"/>
+            <a:ext cx="10082213" cy="2632440"/>
           </a:xfrm>
-          <a:custGeom>
-            <a:avLst/>
-            <a:gdLst/>
-            <a:ahLst/>
-            <a:cxnLst>
-              <a:cxn ang="0">
-                <a:pos x="1475" y="0"/>
-              </a:cxn>
-              <a:cxn ang="0">
-                <a:pos x="742" y="258"/>
-              </a:cxn>
-              <a:cxn ang="0">
-                <a:pos x="701" y="273"/>
-              </a:cxn>
-              <a:cxn ang="0">
-                <a:pos x="660" y="290"/>
-              </a:cxn>
-              <a:cxn ang="0">
-                <a:pos x="620" y="309"/>
-              </a:cxn>
-              <a:cxn ang="0">
-                <a:pos x="582" y="329"/>
-              </a:cxn>
-              <a:cxn ang="0">
-                <a:pos x="544" y="350"/>
-              </a:cxn>
-              <a:cxn ang="0">
-                <a:pos x="508" y="373"/>
-              </a:cxn>
-              <a:cxn ang="0">
-                <a:pos x="472" y="397"/>
-              </a:cxn>
-              <a:cxn ang="0">
-                <a:pos x="437" y="422"/>
-              </a:cxn>
-              <a:cxn ang="0">
-                <a:pos x="404" y="449"/>
-              </a:cxn>
-              <a:cxn ang="0">
-                <a:pos x="371" y="477"/>
-              </a:cxn>
-              <a:cxn ang="0">
-                <a:pos x="341" y="506"/>
-              </a:cxn>
-              <a:cxn ang="0">
-                <a:pos x="311" y="536"/>
-              </a:cxn>
-              <a:cxn ang="0">
-                <a:pos x="281" y="566"/>
-              </a:cxn>
-              <a:cxn ang="0">
-                <a:pos x="254" y="599"/>
-              </a:cxn>
-              <a:cxn ang="0">
-                <a:pos x="228" y="632"/>
-              </a:cxn>
-              <a:cxn ang="0">
-                <a:pos x="203" y="666"/>
-              </a:cxn>
-              <a:cxn ang="0">
-                <a:pos x="179" y="701"/>
-              </a:cxn>
-              <a:cxn ang="0">
-                <a:pos x="158" y="738"/>
-              </a:cxn>
-              <a:cxn ang="0">
-                <a:pos x="136" y="775"/>
-              </a:cxn>
-              <a:cxn ang="0">
-                <a:pos x="117" y="813"/>
-              </a:cxn>
-              <a:cxn ang="0">
-                <a:pos x="98" y="850"/>
-              </a:cxn>
-              <a:cxn ang="0">
-                <a:pos x="82" y="890"/>
-              </a:cxn>
-              <a:cxn ang="0">
-                <a:pos x="67" y="930"/>
-              </a:cxn>
-              <a:cxn ang="0">
-                <a:pos x="53" y="970"/>
-              </a:cxn>
-              <a:cxn ang="0">
-                <a:pos x="41" y="1011"/>
-              </a:cxn>
-              <a:cxn ang="0">
-                <a:pos x="30" y="1053"/>
-              </a:cxn>
-              <a:cxn ang="0">
-                <a:pos x="21" y="1096"/>
-              </a:cxn>
-              <a:cxn ang="0">
-                <a:pos x="14" y="1138"/>
-              </a:cxn>
-              <a:cxn ang="0">
-                <a:pos x="7" y="1181"/>
-              </a:cxn>
-              <a:cxn ang="0">
-                <a:pos x="4" y="1224"/>
-              </a:cxn>
-              <a:cxn ang="0">
-                <a:pos x="1" y="1269"/>
-              </a:cxn>
-              <a:cxn ang="0">
-                <a:pos x="0" y="1313"/>
-              </a:cxn>
-              <a:cxn ang="0">
-                <a:pos x="0" y="1578"/>
-              </a:cxn>
-              <a:cxn ang="0">
-                <a:pos x="1475" y="1578"/>
-              </a:cxn>
-              <a:cxn ang="0">
-                <a:pos x="1475" y="0"/>
-              </a:cxn>
-            </a:cxnLst>
-            <a:rect l="0" t="0" r="r" b="b"/>
-            <a:pathLst>
-              <a:path w="1475" h="1578">
-                <a:moveTo>
-                  <a:pt x="1475" y="0"/>
-                </a:moveTo>
-                <a:lnTo>
-                  <a:pt x="742" y="258"/>
-                </a:lnTo>
-                <a:lnTo>
-                  <a:pt x="701" y="273"/>
-                </a:lnTo>
-                <a:lnTo>
-                  <a:pt x="660" y="290"/>
-                </a:lnTo>
-                <a:lnTo>
-                  <a:pt x="620" y="309"/>
-                </a:lnTo>
-                <a:lnTo>
-                  <a:pt x="582" y="329"/>
-                </a:lnTo>
-                <a:lnTo>
-                  <a:pt x="544" y="350"/>
-                </a:lnTo>
-                <a:lnTo>
-                  <a:pt x="508" y="373"/>
-                </a:lnTo>
-                <a:lnTo>
-                  <a:pt x="472" y="397"/>
-                </a:lnTo>
-                <a:lnTo>
-                  <a:pt x="437" y="422"/>
-                </a:lnTo>
-                <a:lnTo>
-                  <a:pt x="404" y="449"/>
-                </a:lnTo>
-                <a:lnTo>
-                  <a:pt x="371" y="477"/>
-                </a:lnTo>
-                <a:lnTo>
-                  <a:pt x="341" y="506"/>
-                </a:lnTo>
-                <a:lnTo>
-                  <a:pt x="311" y="536"/>
-                </a:lnTo>
-                <a:lnTo>
-                  <a:pt x="281" y="566"/>
-                </a:lnTo>
-                <a:lnTo>
-                  <a:pt x="254" y="599"/>
-                </a:lnTo>
-                <a:lnTo>
-                  <a:pt x="228" y="632"/>
-                </a:lnTo>
-                <a:lnTo>
-                  <a:pt x="203" y="666"/>
-                </a:lnTo>
-                <a:lnTo>
-                  <a:pt x="179" y="701"/>
-                </a:lnTo>
-                <a:lnTo>
-                  <a:pt x="158" y="738"/>
-                </a:lnTo>
-                <a:lnTo>
-                  <a:pt x="136" y="775"/>
-                </a:lnTo>
-                <a:lnTo>
-                  <a:pt x="117" y="813"/>
-                </a:lnTo>
-                <a:lnTo>
-                  <a:pt x="98" y="850"/>
-                </a:lnTo>
-                <a:lnTo>
-                  <a:pt x="82" y="890"/>
-                </a:lnTo>
-                <a:lnTo>
-                  <a:pt x="67" y="930"/>
-                </a:lnTo>
-                <a:lnTo>
-                  <a:pt x="53" y="970"/>
-                </a:lnTo>
-                <a:lnTo>
-                  <a:pt x="41" y="1011"/>
-                </a:lnTo>
-                <a:lnTo>
-                  <a:pt x="30" y="1053"/>
-                </a:lnTo>
-                <a:lnTo>
-                  <a:pt x="21" y="1096"/>
-                </a:lnTo>
-                <a:lnTo>
-                  <a:pt x="14" y="1138"/>
-                </a:lnTo>
-                <a:lnTo>
-                  <a:pt x="7" y="1181"/>
-                </a:lnTo>
-                <a:lnTo>
-                  <a:pt x="4" y="1224"/>
-                </a:lnTo>
-                <a:lnTo>
-                  <a:pt x="1" y="1269"/>
-                </a:lnTo>
-                <a:lnTo>
-                  <a:pt x="0" y="1313"/>
-                </a:lnTo>
-                <a:lnTo>
-                  <a:pt x="0" y="1578"/>
-                </a:lnTo>
-                <a:lnTo>
-                  <a:pt x="1475" y="1578"/>
-                </a:lnTo>
-                <a:lnTo>
-                  <a:pt x="1475" y="0"/>
-                </a:lnTo>
-                <a:close/>
-              </a:path>
-            </a:pathLst>
-          </a:custGeom>
-          <a:solidFill>
-            <a:srgbClr val="292C34"/>
-          </a:solidFill>
-          <a:ln w="9525">
-            <a:noFill/>
-            <a:round/>
-            <a:headEnd/>
-            <a:tailEnd/>
-          </a:ln>
         </p:spPr>
         <p:txBody>
-          <a:bodyPr vert="horz" wrap="square" lIns="91440" tIns="45720" rIns="91440" bIns="45720" numCol="1" anchor="t" anchorCtr="0" compatLnSpc="1">
-            <a:prstTxWarp prst="textNoShape">
-              <a:avLst/>
-            </a:prstTxWarp>
-          </a:bodyPr>
-          <a:lstStyle/>
-          <a:p>
-            <a:endParaRPr lang="pt-BR" sz="2100"/>
+          <a:bodyPr anchor="b"/>
+          <a:lstStyle>
+            <a:lvl1pPr algn="ctr">
+              <a:defRPr sz="6615"/>
+            </a:lvl1pPr>
+          </a:lstStyle>
+          <a:p>
+            <a:r>
+              <a:rPr lang="en-US"/>
+              <a:t>Click to edit Master title style</a:t>
+            </a:r>
+            <a:endParaRPr lang="pt-BR"/>
           </a:p>
         </p:txBody>
       </p:sp>
       <p:sp>
         <p:nvSpPr>
-          <p:cNvPr id="18" name="Espaço Reservado para Texto 17"/>
+          <p:cNvPr id="3" name="Subtitle 2">
+            <a:extLst>
+              <a:ext uri="{FF2B5EF4-FFF2-40B4-BE49-F238E27FC236}">
+                <a16:creationId xmlns:a16="http://schemas.microsoft.com/office/drawing/2014/main" id="{3A3FD023-ACD2-40D5-BFA9-ED8483876A5B}"/>
+              </a:ext>
+            </a:extLst>
+          </p:cNvPr>
           <p:cNvSpPr>
             <a:spLocks noGrp="1"/>
           </p:cNvSpPr>
           <p:nvPr>
-            <p:ph type="body" sz="quarter" idx="11"/>
+            <p:ph type="subTitle" idx="1"/>
           </p:nvPr>
         </p:nvSpPr>
         <p:spPr>
           <a:xfrm>
-            <a:off x="2828982" y="1331914"/>
-            <a:ext cx="8779933" cy="5761037"/>
+            <a:off x="1680369" y="3971414"/>
+            <a:ext cx="10082213" cy="1825554"/>
           </a:xfrm>
-          <a:prstGeom prst="rect">
-            <a:avLst/>
-          </a:prstGeom>
         </p:spPr>
         <p:txBody>
           <a:bodyPr/>
           <a:lstStyle>
-            <a:lvl1pPr>
-              <a:buClr>
-                <a:srgbClr val="32B9CD"/>
-              </a:buClr>
-              <a:defRPr>
-                <a:latin typeface="Exo 2" pitchFamily="50" charset="0"/>
-              </a:defRPr>
+            <a:lvl1pPr marL="0" indent="0" algn="ctr">
+              <a:buNone/>
+              <a:defRPr sz="2646"/>
             </a:lvl1pPr>
-            <a:lvl2pPr>
-              <a:buClr>
-                <a:srgbClr val="32B9CD"/>
-              </a:buClr>
-              <a:defRPr>
-                <a:latin typeface="Exo 2" pitchFamily="50" charset="0"/>
-              </a:defRPr>
+            <a:lvl2pPr marL="504063" indent="0" algn="ctr">
+              <a:buNone/>
+              <a:defRPr sz="2205"/>
             </a:lvl2pPr>
-            <a:lvl3pPr>
-              <a:buClr>
-                <a:srgbClr val="32B9CD"/>
-              </a:buClr>
-              <a:defRPr>
-                <a:latin typeface="Exo 2" pitchFamily="50" charset="0"/>
-              </a:defRPr>
+            <a:lvl3pPr marL="1008126" indent="0" algn="ctr">
+              <a:buNone/>
+              <a:defRPr sz="1985"/>
             </a:lvl3pPr>
-            <a:lvl4pPr>
-              <a:buClr>
-                <a:srgbClr val="32B9CD"/>
-              </a:buClr>
-              <a:defRPr>
-                <a:latin typeface="Exo 2" pitchFamily="50" charset="0"/>
-              </a:defRPr>
+            <a:lvl4pPr marL="1512189" indent="0" algn="ctr">
+              <a:buNone/>
+              <a:defRPr sz="1764"/>
             </a:lvl4pPr>
-            <a:lvl5pPr>
-              <a:buClr>
-                <a:srgbClr val="32B9CD"/>
-              </a:buClr>
-              <a:defRPr>
-                <a:latin typeface="Exo 2" pitchFamily="50" charset="0"/>
-              </a:defRPr>
+            <a:lvl5pPr marL="2016252" indent="0" algn="ctr">
+              <a:buNone/>
+              <a:defRPr sz="1764"/>
             </a:lvl5pPr>
+            <a:lvl6pPr marL="2520315" indent="0" algn="ctr">
+              <a:buNone/>
+              <a:defRPr sz="1764"/>
+            </a:lvl6pPr>
+            <a:lvl7pPr marL="3024378" indent="0" algn="ctr">
+              <a:buNone/>
+              <a:defRPr sz="1764"/>
+            </a:lvl7pPr>
+            <a:lvl8pPr marL="3528441" indent="0" algn="ctr">
+              <a:buNone/>
+              <a:defRPr sz="1764"/>
+            </a:lvl8pPr>
+            <a:lvl9pPr marL="4032504" indent="0" algn="ctr">
+              <a:buNone/>
+              <a:defRPr sz="1764"/>
+            </a:lvl9pPr>
           </a:lstStyle>
           <a:p>
-            <a:pPr lvl="0"/>
             <a:r>
-              <a:rPr lang="pt-BR"/>
-              <a:t>Clique para editar os estilos do texto mestre</a:t>
+              <a:rPr lang="en-US"/>
+              <a:t>Click to edit Master subtitle style</a:t>
             </a:r>
-          </a:p>
-          <a:p>
-            <a:pPr lvl="1"/>
-            <a:r>
-              <a:rPr lang="pt-BR"/>
-              <a:t>Segundo nível</a:t>
-            </a:r>
-          </a:p>
-          <a:p>
-            <a:pPr lvl="2"/>
-            <a:r>
-              <a:rPr lang="pt-BR"/>
-              <a:t>Terceiro nível</a:t>
-            </a:r>
-          </a:p>
-          <a:p>
-            <a:pPr lvl="3"/>
-            <a:r>
-              <a:rPr lang="pt-BR"/>
-              <a:t>Quarto nível</a:t>
-            </a:r>
-          </a:p>
-          <a:p>
-            <a:pPr lvl="4"/>
-            <a:r>
-              <a:rPr lang="pt-BR"/>
-              <a:t>Quinto nível</a:t>
-            </a:r>
-            <a:endParaRPr lang="pt-BR" dirty="0"/>
+            <a:endParaRPr lang="pt-BR"/>
           </a:p>
         </p:txBody>
       </p:sp>
       <p:sp>
         <p:nvSpPr>
-          <p:cNvPr id="7" name="Rectangle 4"/>
+          <p:cNvPr id="4" name="Date Placeholder 3">
+            <a:extLst>
+              <a:ext uri="{FF2B5EF4-FFF2-40B4-BE49-F238E27FC236}">
+                <a16:creationId xmlns:a16="http://schemas.microsoft.com/office/drawing/2014/main" id="{B503E4D3-5B94-46B9-83CB-D6507F3C427E}"/>
+              </a:ext>
+            </a:extLst>
+          </p:cNvPr>
           <p:cNvSpPr>
-            <a:spLocks noGrp="1" noChangeArrowheads="1"/>
+            <a:spLocks noGrp="1"/>
           </p:cNvSpPr>
           <p:nvPr>
-            <p:ph type="sldNum" sz="quarter" idx="4"/>
+            <p:ph type="dt" sz="half" idx="10"/>
           </p:nvPr>
         </p:nvSpPr>
-        <p:spPr bwMode="auto">
-          <a:xfrm>
-            <a:off x="12605478" y="7237015"/>
-            <a:ext cx="628646" cy="214290"/>
-          </a:xfrm>
-          <a:prstGeom prst="rect">
-            <a:avLst/>
-          </a:prstGeom>
-          <a:noFill/>
-          <a:ln w="9525">
-            <a:noFill/>
-            <a:miter lim="800000"/>
-            <a:headEnd/>
-            <a:tailEnd/>
-          </a:ln>
-          <a:effectLst/>
-        </p:spPr>
+        <p:spPr/>
         <p:txBody>
-          <a:bodyPr vert="horz" wrap="square" lIns="18000" tIns="10800" rIns="18000" bIns="10800" numCol="1" anchor="t" anchorCtr="0" compatLnSpc="1">
-            <a:prstTxWarp prst="textNoShape">
-              <a:avLst/>
-            </a:prstTxWarp>
-          </a:bodyPr>
-          <a:lstStyle>
-            <a:lvl1pPr algn="r">
-              <a:spcBef>
-                <a:spcPct val="0"/>
-              </a:spcBef>
-              <a:spcAft>
-                <a:spcPct val="0"/>
-              </a:spcAft>
-              <a:defRPr sz="1000" b="1">
-                <a:solidFill>
-                  <a:schemeClr val="bg1"/>
-                </a:solidFill>
-                <a:latin typeface="Exo 2" pitchFamily="50" charset="0"/>
-                <a:ea typeface="Tahoma" pitchFamily="34" charset="0"/>
-                <a:cs typeface="Tahoma" pitchFamily="34" charset="0"/>
-              </a:defRPr>
-            </a:lvl1pPr>
-          </a:lstStyle>
-          <a:p>
-            <a:pPr>
-              <a:defRPr/>
-            </a:pPr>
-            <a:fld id="{B66251D2-9488-44CD-87B4-F793A73C4A01}" type="slidenum">
+          <a:bodyPr/>
+          <a:lstStyle/>
+          <a:p>
+            <a:fld id="{B63D1FDA-9627-42C2-B20E-477EB9193F18}" type="datetimeFigureOut">
               <a:rPr lang="pt-BR" smtClean="0"/>
-              <a:pPr>
-                <a:defRPr/>
-              </a:pPr>
-              <a:t>‹nº›</a:t>
+              <a:t>03/11/2021</a:t>
             </a:fld>
-            <a:endParaRPr lang="pt-BR" sz="700" dirty="0"/>
+            <a:endParaRPr lang="pt-BR"/>
           </a:p>
         </p:txBody>
       </p:sp>
       <p:sp>
         <p:nvSpPr>
-          <p:cNvPr id="9" name="Freeform 6"/>
+          <p:cNvPr id="5" name="Footer Placeholder 4">
+            <a:extLst>
+              <a:ext uri="{FF2B5EF4-FFF2-40B4-BE49-F238E27FC236}">
+                <a16:creationId xmlns:a16="http://schemas.microsoft.com/office/drawing/2014/main" id="{58C4069A-B54E-4A9F-B711-5D72225C1427}"/>
+              </a:ext>
+            </a:extLst>
+          </p:cNvPr>
           <p:cNvSpPr>
-            <a:spLocks/>
+            <a:spLocks noGrp="1"/>
           </p:cNvSpPr>
-          <p:nvPr/>
+          <p:nvPr>
+            <p:ph type="ftr" sz="quarter" idx="11"/>
+          </p:nvPr>
         </p:nvSpPr>
-        <p:spPr bwMode="auto">
-          <a:xfrm>
-            <a:off x="1" y="1"/>
-            <a:ext cx="2401423" cy="1332359"/>
-          </a:xfrm>
-          <a:custGeom>
-            <a:avLst/>
-            <a:gdLst/>
-            <a:ahLst/>
-            <a:cxnLst>
-              <a:cxn ang="0">
-                <a:pos x="3091" y="1686"/>
-              </a:cxn>
-              <a:cxn ang="0">
-                <a:pos x="3117" y="1687"/>
-              </a:cxn>
-              <a:cxn ang="0">
-                <a:pos x="3156" y="1689"/>
-              </a:cxn>
-              <a:cxn ang="0">
-                <a:pos x="3169" y="1687"/>
-              </a:cxn>
-              <a:cxn ang="0">
-                <a:pos x="3252" y="1655"/>
-              </a:cxn>
-              <a:cxn ang="0">
-                <a:pos x="3332" y="1617"/>
-              </a:cxn>
-              <a:cxn ang="0">
-                <a:pos x="3408" y="1573"/>
-              </a:cxn>
-              <a:cxn ang="0">
-                <a:pos x="3478" y="1523"/>
-              </a:cxn>
-              <a:cxn ang="0">
-                <a:pos x="3545" y="1469"/>
-              </a:cxn>
-              <a:cxn ang="0">
-                <a:pos x="3608" y="1411"/>
-              </a:cxn>
-              <a:cxn ang="0">
-                <a:pos x="3665" y="1346"/>
-              </a:cxn>
-              <a:cxn ang="0">
-                <a:pos x="3718" y="1279"/>
-              </a:cxn>
-              <a:cxn ang="0">
-                <a:pos x="3765" y="1207"/>
-              </a:cxn>
-              <a:cxn ang="0">
-                <a:pos x="3807" y="1133"/>
-              </a:cxn>
-              <a:cxn ang="0">
-                <a:pos x="3842" y="1055"/>
-              </a:cxn>
-              <a:cxn ang="0">
-                <a:pos x="3872" y="974"/>
-              </a:cxn>
-              <a:cxn ang="0">
-                <a:pos x="3896" y="890"/>
-              </a:cxn>
-              <a:cxn ang="0">
-                <a:pos x="3913" y="805"/>
-              </a:cxn>
-              <a:cxn ang="0">
-                <a:pos x="3923" y="717"/>
-              </a:cxn>
-              <a:cxn ang="0">
-                <a:pos x="3927" y="628"/>
-              </a:cxn>
-              <a:cxn ang="0">
-                <a:pos x="3855" y="0"/>
-              </a:cxn>
-              <a:cxn ang="0">
-                <a:pos x="3088" y="0"/>
-              </a:cxn>
-              <a:cxn ang="0">
-                <a:pos x="3855" y="278"/>
-              </a:cxn>
-              <a:cxn ang="0">
-                <a:pos x="3853" y="671"/>
-              </a:cxn>
-              <a:cxn ang="0">
-                <a:pos x="3847" y="753"/>
-              </a:cxn>
-              <a:cxn ang="0">
-                <a:pos x="3834" y="834"/>
-              </a:cxn>
-              <a:cxn ang="0">
-                <a:pos x="3814" y="913"/>
-              </a:cxn>
-              <a:cxn ang="0">
-                <a:pos x="3790" y="990"/>
-              </a:cxn>
-              <a:cxn ang="0">
-                <a:pos x="3759" y="1063"/>
-              </a:cxn>
-              <a:cxn ang="0">
-                <a:pos x="3723" y="1135"/>
-              </a:cxn>
-              <a:cxn ang="0">
-                <a:pos x="3682" y="1204"/>
-              </a:cxn>
-              <a:cxn ang="0">
-                <a:pos x="3635" y="1269"/>
-              </a:cxn>
-              <a:cxn ang="0">
-                <a:pos x="3583" y="1330"/>
-              </a:cxn>
-              <a:cxn ang="0">
-                <a:pos x="3528" y="1388"/>
-              </a:cxn>
-              <a:cxn ang="0">
-                <a:pos x="3467" y="1441"/>
-              </a:cxn>
-              <a:cxn ang="0">
-                <a:pos x="3403" y="1489"/>
-              </a:cxn>
-              <a:cxn ang="0">
-                <a:pos x="3333" y="1533"/>
-              </a:cxn>
-              <a:cxn ang="0">
-                <a:pos x="3261" y="1571"/>
-              </a:cxn>
-              <a:cxn ang="0">
-                <a:pos x="3185" y="1604"/>
-              </a:cxn>
-              <a:cxn ang="0">
-                <a:pos x="3140" y="1621"/>
-              </a:cxn>
-              <a:cxn ang="0">
-                <a:pos x="3121" y="1636"/>
-              </a:cxn>
-              <a:cxn ang="0">
-                <a:pos x="3091" y="1661"/>
-              </a:cxn>
-              <a:cxn ang="0">
-                <a:pos x="0" y="2718"/>
-              </a:cxn>
-            </a:cxnLst>
-            <a:rect l="0" t="0" r="r" b="b"/>
-            <a:pathLst>
-              <a:path w="3927" h="2740">
-                <a:moveTo>
-                  <a:pt x="0" y="2740"/>
-                </a:moveTo>
-                <a:lnTo>
-                  <a:pt x="3091" y="1686"/>
-                </a:lnTo>
-                <a:lnTo>
-                  <a:pt x="3098" y="1686"/>
-                </a:lnTo>
-                <a:lnTo>
-                  <a:pt x="3117" y="1687"/>
-                </a:lnTo>
-                <a:lnTo>
-                  <a:pt x="3139" y="1689"/>
-                </a:lnTo>
-                <a:lnTo>
-                  <a:pt x="3156" y="1689"/>
-                </a:lnTo>
-                <a:lnTo>
-                  <a:pt x="3163" y="1689"/>
-                </a:lnTo>
-                <a:lnTo>
-                  <a:pt x="3169" y="1687"/>
-                </a:lnTo>
-                <a:lnTo>
-                  <a:pt x="3211" y="1672"/>
-                </a:lnTo>
-                <a:lnTo>
-                  <a:pt x="3252" y="1655"/>
-                </a:lnTo>
-                <a:lnTo>
-                  <a:pt x="3293" y="1637"/>
-                </a:lnTo>
-                <a:lnTo>
-                  <a:pt x="3332" y="1617"/>
-                </a:lnTo>
-                <a:lnTo>
-                  <a:pt x="3370" y="1595"/>
-                </a:lnTo>
-                <a:lnTo>
-                  <a:pt x="3408" y="1573"/>
-                </a:lnTo>
-                <a:lnTo>
-                  <a:pt x="3443" y="1549"/>
-                </a:lnTo>
-                <a:lnTo>
-                  <a:pt x="3478" y="1523"/>
-                </a:lnTo>
-                <a:lnTo>
-                  <a:pt x="3512" y="1497"/>
-                </a:lnTo>
-                <a:lnTo>
-                  <a:pt x="3545" y="1469"/>
-                </a:lnTo>
-                <a:lnTo>
-                  <a:pt x="3577" y="1440"/>
-                </a:lnTo>
-                <a:lnTo>
-                  <a:pt x="3608" y="1411"/>
-                </a:lnTo>
-                <a:lnTo>
-                  <a:pt x="3637" y="1379"/>
-                </a:lnTo>
-                <a:lnTo>
-                  <a:pt x="3665" y="1346"/>
-                </a:lnTo>
-                <a:lnTo>
-                  <a:pt x="3692" y="1314"/>
-                </a:lnTo>
-                <a:lnTo>
-                  <a:pt x="3718" y="1279"/>
-                </a:lnTo>
-                <a:lnTo>
-                  <a:pt x="3742" y="1244"/>
-                </a:lnTo>
-                <a:lnTo>
-                  <a:pt x="3765" y="1207"/>
-                </a:lnTo>
-                <a:lnTo>
-                  <a:pt x="3786" y="1171"/>
-                </a:lnTo>
-                <a:lnTo>
-                  <a:pt x="3807" y="1133"/>
-                </a:lnTo>
-                <a:lnTo>
-                  <a:pt x="3826" y="1094"/>
-                </a:lnTo>
-                <a:lnTo>
-                  <a:pt x="3842" y="1055"/>
-                </a:lnTo>
-                <a:lnTo>
-                  <a:pt x="3858" y="1014"/>
-                </a:lnTo>
-                <a:lnTo>
-                  <a:pt x="3872" y="974"/>
-                </a:lnTo>
-                <a:lnTo>
-                  <a:pt x="3885" y="932"/>
-                </a:lnTo>
-                <a:lnTo>
-                  <a:pt x="3896" y="890"/>
-                </a:lnTo>
-                <a:lnTo>
-                  <a:pt x="3905" y="848"/>
-                </a:lnTo>
-                <a:lnTo>
-                  <a:pt x="3913" y="805"/>
-                </a:lnTo>
-                <a:lnTo>
-                  <a:pt x="3919" y="762"/>
-                </a:lnTo>
-                <a:lnTo>
-                  <a:pt x="3923" y="717"/>
-                </a:lnTo>
-                <a:lnTo>
-                  <a:pt x="3927" y="673"/>
-                </a:lnTo>
-                <a:lnTo>
-                  <a:pt x="3927" y="628"/>
-                </a:lnTo>
-                <a:lnTo>
-                  <a:pt x="3927" y="0"/>
-                </a:lnTo>
-                <a:lnTo>
-                  <a:pt x="3855" y="0"/>
-                </a:lnTo>
-                <a:lnTo>
-                  <a:pt x="3855" y="256"/>
-                </a:lnTo>
-                <a:lnTo>
-                  <a:pt x="3088" y="0"/>
-                </a:lnTo>
-                <a:lnTo>
-                  <a:pt x="3022" y="0"/>
-                </a:lnTo>
-                <a:lnTo>
-                  <a:pt x="3855" y="278"/>
-                </a:lnTo>
-                <a:lnTo>
-                  <a:pt x="3855" y="628"/>
-                </a:lnTo>
-                <a:lnTo>
-                  <a:pt x="3853" y="671"/>
-                </a:lnTo>
-                <a:lnTo>
-                  <a:pt x="3851" y="711"/>
-                </a:lnTo>
-                <a:lnTo>
-                  <a:pt x="3847" y="753"/>
-                </a:lnTo>
-                <a:lnTo>
-                  <a:pt x="3841" y="793"/>
-                </a:lnTo>
-                <a:lnTo>
-                  <a:pt x="3834" y="834"/>
-                </a:lnTo>
-                <a:lnTo>
-                  <a:pt x="3826" y="874"/>
-                </a:lnTo>
-                <a:lnTo>
-                  <a:pt x="3814" y="913"/>
-                </a:lnTo>
-                <a:lnTo>
-                  <a:pt x="3803" y="951"/>
-                </a:lnTo>
-                <a:lnTo>
-                  <a:pt x="3790" y="990"/>
-                </a:lnTo>
-                <a:lnTo>
-                  <a:pt x="3775" y="1027"/>
-                </a:lnTo>
-                <a:lnTo>
-                  <a:pt x="3759" y="1063"/>
-                </a:lnTo>
-                <a:lnTo>
-                  <a:pt x="3742" y="1100"/>
-                </a:lnTo>
-                <a:lnTo>
-                  <a:pt x="3723" y="1135"/>
-                </a:lnTo>
-                <a:lnTo>
-                  <a:pt x="3703" y="1170"/>
-                </a:lnTo>
-                <a:lnTo>
-                  <a:pt x="3682" y="1204"/>
-                </a:lnTo>
-                <a:lnTo>
-                  <a:pt x="3659" y="1237"/>
-                </a:lnTo>
-                <a:lnTo>
-                  <a:pt x="3635" y="1269"/>
-                </a:lnTo>
-                <a:lnTo>
-                  <a:pt x="3610" y="1300"/>
-                </a:lnTo>
-                <a:lnTo>
-                  <a:pt x="3583" y="1330"/>
-                </a:lnTo>
-                <a:lnTo>
-                  <a:pt x="3555" y="1359"/>
-                </a:lnTo>
-                <a:lnTo>
-                  <a:pt x="3528" y="1388"/>
-                </a:lnTo>
-                <a:lnTo>
-                  <a:pt x="3497" y="1415"/>
-                </a:lnTo>
-                <a:lnTo>
-                  <a:pt x="3467" y="1441"/>
-                </a:lnTo>
-                <a:lnTo>
-                  <a:pt x="3435" y="1465"/>
-                </a:lnTo>
-                <a:lnTo>
-                  <a:pt x="3403" y="1489"/>
-                </a:lnTo>
-                <a:lnTo>
-                  <a:pt x="3368" y="1512"/>
-                </a:lnTo>
-                <a:lnTo>
-                  <a:pt x="3333" y="1533"/>
-                </a:lnTo>
-                <a:lnTo>
-                  <a:pt x="3298" y="1552"/>
-                </a:lnTo>
-                <a:lnTo>
-                  <a:pt x="3261" y="1571"/>
-                </a:lnTo>
-                <a:lnTo>
-                  <a:pt x="3223" y="1588"/>
-                </a:lnTo>
-                <a:lnTo>
-                  <a:pt x="3185" y="1604"/>
-                </a:lnTo>
-                <a:lnTo>
-                  <a:pt x="3145" y="1618"/>
-                </a:lnTo>
-                <a:lnTo>
-                  <a:pt x="3140" y="1621"/>
-                </a:lnTo>
-                <a:lnTo>
-                  <a:pt x="3135" y="1624"/>
-                </a:lnTo>
-                <a:lnTo>
-                  <a:pt x="3121" y="1636"/>
-                </a:lnTo>
-                <a:lnTo>
-                  <a:pt x="3104" y="1650"/>
-                </a:lnTo>
-                <a:lnTo>
-                  <a:pt x="3091" y="1661"/>
-                </a:lnTo>
-                <a:lnTo>
-                  <a:pt x="3084" y="1666"/>
-                </a:lnTo>
-                <a:lnTo>
-                  <a:pt x="0" y="2718"/>
-                </a:lnTo>
-                <a:lnTo>
-                  <a:pt x="0" y="2740"/>
-                </a:lnTo>
-                <a:close/>
-              </a:path>
-            </a:pathLst>
-          </a:custGeom>
-          <a:solidFill>
-            <a:srgbClr val="3B3D42"/>
-          </a:solidFill>
-          <a:ln w="9525">
-            <a:noFill/>
-            <a:round/>
-            <a:headEnd/>
-            <a:tailEnd/>
-          </a:ln>
-        </p:spPr>
+        <p:spPr/>
         <p:txBody>
-          <a:bodyPr vert="horz" wrap="square" lIns="91440" tIns="45720" rIns="91440" bIns="45720" numCol="1" anchor="t" anchorCtr="0" compatLnSpc="1">
-            <a:prstTxWarp prst="textNoShape">
-              <a:avLst/>
-            </a:prstTxWarp>
-          </a:bodyPr>
+          <a:bodyPr/>
           <a:lstStyle/>
           <a:p>
-            <a:endParaRPr lang="pt-BR" sz="2100"/>
+            <a:endParaRPr lang="pt-BR"/>
           </a:p>
         </p:txBody>
       </p:sp>
       <p:sp>
         <p:nvSpPr>
-          <p:cNvPr id="10" name="Espaço Reservado para Texto 15"/>
+          <p:cNvPr id="6" name="Slide Number Placeholder 5">
+            <a:extLst>
+              <a:ext uri="{FF2B5EF4-FFF2-40B4-BE49-F238E27FC236}">
+                <a16:creationId xmlns:a16="http://schemas.microsoft.com/office/drawing/2014/main" id="{8FD648FE-F3A6-4EA5-987D-ECD3CFB974A5}"/>
+              </a:ext>
+            </a:extLst>
+          </p:cNvPr>
           <p:cNvSpPr>
             <a:spLocks noGrp="1"/>
           </p:cNvSpPr>
           <p:nvPr>
-            <p:ph type="body" sz="quarter" idx="13" hasCustomPrompt="1"/>
+            <p:ph type="sldNum" sz="quarter" idx="12"/>
           </p:nvPr>
         </p:nvSpPr>
-        <p:spPr>
-          <a:xfrm>
-            <a:off x="2829885" y="108224"/>
-            <a:ext cx="10137686" cy="765639"/>
-          </a:xfrm>
-          <a:prstGeom prst="rect">
-            <a:avLst/>
-          </a:prstGeom>
-        </p:spPr>
+        <p:spPr/>
         <p:txBody>
-          <a:bodyPr anchor="t"/>
-          <a:lstStyle>
-            <a:lvl1pPr>
-              <a:buNone/>
-              <a:defRPr sz="3000" b="1" baseline="0">
-                <a:solidFill>
-                  <a:srgbClr val="32B9CD"/>
-                </a:solidFill>
-                <a:latin typeface="Exo 2" pitchFamily="50" charset="0"/>
-              </a:defRPr>
-            </a:lvl1pPr>
-            <a:lvl2pPr>
-              <a:buNone/>
-              <a:defRPr sz="3000">
-                <a:latin typeface="Exo 2" pitchFamily="50" charset="0"/>
-              </a:defRPr>
-            </a:lvl2pPr>
-            <a:lvl3pPr>
-              <a:buNone/>
-              <a:defRPr sz="3000">
-                <a:latin typeface="Exo 2" pitchFamily="50" charset="0"/>
-              </a:defRPr>
-            </a:lvl3pPr>
-            <a:lvl4pPr>
-              <a:buNone/>
-              <a:defRPr sz="3000">
-                <a:latin typeface="Exo 2" pitchFamily="50" charset="0"/>
-              </a:defRPr>
-            </a:lvl4pPr>
-            <a:lvl5pPr>
-              <a:buNone/>
-              <a:defRPr sz="3000">
-                <a:latin typeface="Exo 2" pitchFamily="50" charset="0"/>
-              </a:defRPr>
-            </a:lvl5pPr>
-          </a:lstStyle>
-          <a:p>
-            <a:pPr lvl="0"/>
-            <a:r>
-              <a:rPr lang="pt-BR" dirty="0"/>
-              <a:t>Clique para editar título do slide</a:t>
-            </a:r>
+          <a:bodyPr/>
+          <a:lstStyle/>
+          <a:p>
+            <a:fld id="{4B433E1D-DE11-47DB-9D52-4D093F496990}" type="slidenum">
+              <a:rPr lang="pt-BR" smtClean="0"/>
+              <a:t>‹nº›</a:t>
+            </a:fld>
+            <a:endParaRPr lang="pt-BR"/>
           </a:p>
         </p:txBody>
       </p:sp>
-      <p:pic>
-        <p:nvPicPr>
-          <p:cNvPr id="11" name="Imagem 10"/>
-          <p:cNvPicPr>
-            <a:picLocks noChangeAspect="1"/>
-          </p:cNvPicPr>
-          <p:nvPr userDrawn="1"/>
-        </p:nvPicPr>
-        <p:blipFill>
-          <a:blip r:embed="rId2" cstate="print">
-            <a:extLst>
-              <a:ext uri="{28A0092B-C50C-407E-A947-70E740481C1C}">
-                <a14:useLocalDpi xmlns:a14="http://schemas.microsoft.com/office/drawing/2010/main" val="0"/>
-              </a:ext>
-            </a:extLst>
-          </a:blip>
-          <a:stretch>
-            <a:fillRect/>
-          </a:stretch>
-        </p:blipFill>
-        <p:spPr>
-          <a:xfrm>
-            <a:off x="212219" y="166075"/>
-            <a:ext cx="1687192" cy="500104"/>
-          </a:xfrm>
-          <a:prstGeom prst="rect">
-            <a:avLst/>
-          </a:prstGeom>
-        </p:spPr>
-      </p:pic>
     </p:spTree>
+    <p:extLst>
+      <p:ext uri="{BB962C8B-B14F-4D97-AF65-F5344CB8AC3E}">
+        <p14:creationId xmlns:p14="http://schemas.microsoft.com/office/powerpoint/2010/main" val="87114978"/>
+      </p:ext>
+    </p:extLst>
   </p:cSld>
   <p:clrMapOvr>
     <a:masterClrMapping/>
   </p:clrMapOvr>
-  <p:hf hdr="0" ftr="0" dt="0"/>
 </p:sldLayout>
 </file>
 
@@ -20163,6 +20389,7 @@
     <p:sldLayoutId id="2147483651" r:id="rId6"/>
     <p:sldLayoutId id="2147483650" r:id="rId7"/>
     <p:sldLayoutId id="2147483667" r:id="rId8"/>
+    <p:sldLayoutId id="2147483668" r:id="rId9"/>
   </p:sldLayoutIdLst>
   <p:hf hdr="0" ftr="0" dt="0"/>
   <p:txStyles>
@@ -21117,6 +21344,2286 @@
     <p:extLst>
       <p:ext uri="{BB962C8B-B14F-4D97-AF65-F5344CB8AC3E}">
         <p14:creationId xmlns:p14="http://schemas.microsoft.com/office/powerpoint/2010/main" val="3924471410"/>
+      </p:ext>
+    </p:extLst>
+  </p:cSld>
+  <p:clrMapOvr>
+    <a:masterClrMapping/>
+  </p:clrMapOvr>
+</p:sld>
+</file>
+
+<file path=ppt/slides/slide10.xml><?xml version="1.0" encoding="utf-8"?>
+<p:sld xmlns:a="http://schemas.openxmlformats.org/drawingml/2006/main" xmlns:r="http://schemas.openxmlformats.org/officeDocument/2006/relationships" xmlns:p="http://schemas.openxmlformats.org/presentationml/2006/main">
+  <p:cSld>
+    <p:spTree>
+      <p:nvGrpSpPr>
+        <p:cNvPr id="1" name=""/>
+        <p:cNvGrpSpPr/>
+        <p:nvPr/>
+      </p:nvGrpSpPr>
+      <p:grpSpPr>
+        <a:xfrm>
+          <a:off x="0" y="0"/>
+          <a:ext cx="0" cy="0"/>
+          <a:chOff x="0" y="0"/>
+          <a:chExt cx="0" cy="0"/>
+        </a:xfrm>
+      </p:grpSpPr>
+      <p:pic>
+        <p:nvPicPr>
+          <p:cNvPr id="5" name="Picture 4">
+            <a:extLst>
+              <a:ext uri="{FF2B5EF4-FFF2-40B4-BE49-F238E27FC236}">
+                <a16:creationId xmlns:a16="http://schemas.microsoft.com/office/drawing/2014/main" id="{AA8094E3-AE4E-445E-BA66-0F3D0148C047}"/>
+              </a:ext>
+            </a:extLst>
+          </p:cNvPr>
+          <p:cNvPicPr>
+            <a:picLocks noChangeAspect="1"/>
+          </p:cNvPicPr>
+          <p:nvPr/>
+        </p:nvPicPr>
+        <p:blipFill>
+          <a:blip r:embed="rId2"/>
+          <a:stretch>
+            <a:fillRect/>
+          </a:stretch>
+        </p:blipFill>
+        <p:spPr>
+          <a:xfrm>
+            <a:off x="283547" y="207489"/>
+            <a:ext cx="12706917" cy="7146284"/>
+          </a:xfrm>
+          <a:prstGeom prst="rect">
+            <a:avLst/>
+          </a:prstGeom>
+        </p:spPr>
+      </p:pic>
+    </p:spTree>
+    <p:extLst>
+      <p:ext uri="{BB962C8B-B14F-4D97-AF65-F5344CB8AC3E}">
+        <p14:creationId xmlns:p14="http://schemas.microsoft.com/office/powerpoint/2010/main" val="2966653505"/>
+      </p:ext>
+    </p:extLst>
+  </p:cSld>
+  <p:clrMapOvr>
+    <a:masterClrMapping/>
+  </p:clrMapOvr>
+</p:sld>
+</file>
+
+<file path=ppt/slides/slide11.xml><?xml version="1.0" encoding="utf-8"?>
+<p:sld xmlns:a="http://schemas.openxmlformats.org/drawingml/2006/main" xmlns:r="http://schemas.openxmlformats.org/officeDocument/2006/relationships" xmlns:p="http://schemas.openxmlformats.org/presentationml/2006/main">
+  <p:cSld>
+    <p:spTree>
+      <p:nvGrpSpPr>
+        <p:cNvPr id="1" name=""/>
+        <p:cNvGrpSpPr/>
+        <p:nvPr/>
+      </p:nvGrpSpPr>
+      <p:grpSpPr>
+        <a:xfrm>
+          <a:off x="0" y="0"/>
+          <a:ext cx="0" cy="0"/>
+          <a:chOff x="0" y="0"/>
+          <a:chExt cx="0" cy="0"/>
+        </a:xfrm>
+      </p:grpSpPr>
+      <p:sp>
+        <p:nvSpPr>
+          <p:cNvPr id="3" name="Espaço Reservado para Número de Slide 2">
+            <a:extLst>
+              <a:ext uri="{FF2B5EF4-FFF2-40B4-BE49-F238E27FC236}">
+                <a16:creationId xmlns:a16="http://schemas.microsoft.com/office/drawing/2014/main" id="{25E66A94-914F-497A-A098-71B8A170A7DE}"/>
+              </a:ext>
+            </a:extLst>
+          </p:cNvPr>
+          <p:cNvSpPr>
+            <a:spLocks noGrp="1"/>
+          </p:cNvSpPr>
+          <p:nvPr>
+            <p:ph type="sldNum" sz="quarter" idx="4"/>
+          </p:nvPr>
+        </p:nvSpPr>
+        <p:spPr/>
+        <p:txBody>
+          <a:bodyPr/>
+          <a:lstStyle/>
+          <a:p>
+            <a:fld id="{74850952-3374-434C-8FC6-DE28F8CD25B0}" type="slidenum">
+              <a:rPr lang="pt-BR" smtClean="0">
+                <a:solidFill>
+                  <a:prstClr val="black">
+                    <a:tint val="75000"/>
+                  </a:prstClr>
+                </a:solidFill>
+              </a:rPr>
+              <a:pPr/>
+              <a:t>11</a:t>
+            </a:fld>
+            <a:endParaRPr lang="pt-BR" dirty="0">
+              <a:solidFill>
+                <a:prstClr val="black">
+                  <a:tint val="75000"/>
+                </a:prstClr>
+              </a:solidFill>
+            </a:endParaRPr>
+          </a:p>
+        </p:txBody>
+      </p:sp>
+      <p:sp>
+        <p:nvSpPr>
+          <p:cNvPr id="20" name="Rectangle 42">
+            <a:extLst>
+              <a:ext uri="{FF2B5EF4-FFF2-40B4-BE49-F238E27FC236}">
+                <a16:creationId xmlns:a16="http://schemas.microsoft.com/office/drawing/2014/main" id="{D56D5B31-1798-4A73-939D-5495975295D4}"/>
+              </a:ext>
+            </a:extLst>
+          </p:cNvPr>
+          <p:cNvSpPr/>
+          <p:nvPr/>
+        </p:nvSpPr>
+        <p:spPr>
+          <a:xfrm>
+            <a:off x="6804884" y="1106495"/>
+            <a:ext cx="6204408" cy="2962168"/>
+          </a:xfrm>
+          <a:prstGeom prst="rect">
+            <a:avLst/>
+          </a:prstGeom>
+          <a:noFill/>
+          <a:ln w="12700">
+            <a:solidFill>
+              <a:schemeClr val="bg1">
+                <a:lumMod val="50000"/>
+              </a:schemeClr>
+            </a:solidFill>
+          </a:ln>
+        </p:spPr>
+        <p:style>
+          <a:lnRef idx="2">
+            <a:schemeClr val="accent4"/>
+          </a:lnRef>
+          <a:fillRef idx="1">
+            <a:schemeClr val="lt1"/>
+          </a:fillRef>
+          <a:effectRef idx="0">
+            <a:schemeClr val="accent4"/>
+          </a:effectRef>
+          <a:fontRef idx="minor">
+            <a:schemeClr val="dk1"/>
+          </a:fontRef>
+        </p:style>
+        <p:txBody>
+          <a:bodyPr tIns="105844" rtlCol="0" anchor="t"/>
+          <a:lstStyle/>
+          <a:p>
+            <a:pPr defTabSz="672130">
+              <a:spcAft>
+                <a:spcPts val="882"/>
+              </a:spcAft>
+            </a:pPr>
+            <a:endParaRPr lang="pt-BR" sz="1470" dirty="0">
+              <a:solidFill>
+                <a:schemeClr val="tx1"/>
+              </a:solidFill>
+              <a:latin typeface="Exo 2 Medium" panose="00000600000000000000" pitchFamily="50" charset="0"/>
+              <a:cs typeface="Simplon BP Regular"/>
+            </a:endParaRPr>
+          </a:p>
+        </p:txBody>
+      </p:sp>
+      <p:sp>
+        <p:nvSpPr>
+          <p:cNvPr id="21" name="Title 2">
+            <a:extLst>
+              <a:ext uri="{FF2B5EF4-FFF2-40B4-BE49-F238E27FC236}">
+                <a16:creationId xmlns:a16="http://schemas.microsoft.com/office/drawing/2014/main" id="{C488E075-24DD-4CAC-A846-48FBDF28D797}"/>
+              </a:ext>
+            </a:extLst>
+          </p:cNvPr>
+          <p:cNvSpPr>
+            <a:spLocks noGrp="1"/>
+          </p:cNvSpPr>
+          <p:nvPr>
+            <p:ph type="title"/>
+          </p:nvPr>
+        </p:nvSpPr>
+        <p:spPr>
+          <a:xfrm>
+            <a:off x="469692" y="185232"/>
+            <a:ext cx="12098020" cy="800352"/>
+          </a:xfrm>
+        </p:spPr>
+        <p:txBody>
+          <a:bodyPr vert="horz" wrap="square" lIns="105844" tIns="0" rIns="105844" bIns="0" numCol="1" anchor="t" anchorCtr="0" compatLnSpc="1">
+            <a:prstTxWarp prst="textNoShape">
+              <a:avLst/>
+            </a:prstTxWarp>
+            <a:noAutofit/>
+          </a:bodyPr>
+          <a:lstStyle/>
+          <a:p>
+            <a:pPr algn="l">
+              <a:spcAft>
+                <a:spcPts val="882"/>
+              </a:spcAft>
+            </a:pPr>
+            <a:r>
+              <a:rPr lang="en-US" sz="2646" dirty="0">
+                <a:solidFill>
+                  <a:srgbClr val="08276B"/>
+                </a:solidFill>
+                <a:latin typeface="Exo 2 Medium" panose="00000600000000000000" pitchFamily="50" charset="0"/>
+                <a:cs typeface="Simplon Oi Headline"/>
+              </a:rPr>
+              <a:t>SEMANA 10 – 03/11/2021</a:t>
+            </a:r>
+          </a:p>
+        </p:txBody>
+      </p:sp>
+      <p:sp>
+        <p:nvSpPr>
+          <p:cNvPr id="22" name="TextBox 118">
+            <a:extLst>
+              <a:ext uri="{FF2B5EF4-FFF2-40B4-BE49-F238E27FC236}">
+                <a16:creationId xmlns:a16="http://schemas.microsoft.com/office/drawing/2014/main" id="{BD7B98C2-C566-441C-A8E5-BA505B2CA31F}"/>
+              </a:ext>
+            </a:extLst>
+          </p:cNvPr>
+          <p:cNvSpPr txBox="1"/>
+          <p:nvPr/>
+        </p:nvSpPr>
+        <p:spPr>
+          <a:xfrm>
+            <a:off x="11822773" y="576471"/>
+            <a:ext cx="899678" cy="179824"/>
+          </a:xfrm>
+          <a:prstGeom prst="rect">
+            <a:avLst/>
+          </a:prstGeom>
+          <a:noFill/>
+          <a:ln w="12700">
+            <a:noFill/>
+          </a:ln>
+        </p:spPr>
+        <p:style>
+          <a:lnRef idx="2">
+            <a:schemeClr val="accent4"/>
+          </a:lnRef>
+          <a:fillRef idx="1">
+            <a:schemeClr val="lt1"/>
+          </a:fillRef>
+          <a:effectRef idx="0">
+            <a:schemeClr val="accent4"/>
+          </a:effectRef>
+          <a:fontRef idx="minor">
+            <a:schemeClr val="dk1"/>
+          </a:fontRef>
+        </p:style>
+        <p:txBody>
+          <a:bodyPr wrap="none" lIns="52922" tIns="52922" rIns="52922" bIns="0" rtlCol="0" anchor="b"/>
+          <a:lstStyle>
+            <a:defPPr>
+              <a:defRPr lang="en-US"/>
+            </a:defPPr>
+            <a:lvl1pPr algn="ctr">
+              <a:defRPr sz="1000" b="1">
+                <a:latin typeface="Simplon BP Regular"/>
+                <a:cs typeface="Simplon BP Regular"/>
+              </a:defRPr>
+            </a:lvl1pPr>
+            <a:lvl2pPr>
+              <a:defRPr>
+                <a:solidFill>
+                  <a:schemeClr val="dk1"/>
+                </a:solidFill>
+              </a:defRPr>
+            </a:lvl2pPr>
+            <a:lvl3pPr>
+              <a:defRPr>
+                <a:solidFill>
+                  <a:schemeClr val="dk1"/>
+                </a:solidFill>
+              </a:defRPr>
+            </a:lvl3pPr>
+            <a:lvl4pPr>
+              <a:defRPr>
+                <a:solidFill>
+                  <a:schemeClr val="dk1"/>
+                </a:solidFill>
+              </a:defRPr>
+            </a:lvl4pPr>
+            <a:lvl5pPr>
+              <a:defRPr>
+                <a:solidFill>
+                  <a:schemeClr val="dk1"/>
+                </a:solidFill>
+              </a:defRPr>
+            </a:lvl5pPr>
+            <a:lvl6pPr>
+              <a:defRPr>
+                <a:solidFill>
+                  <a:schemeClr val="dk1"/>
+                </a:solidFill>
+              </a:defRPr>
+            </a:lvl6pPr>
+            <a:lvl7pPr>
+              <a:defRPr>
+                <a:solidFill>
+                  <a:schemeClr val="dk1"/>
+                </a:solidFill>
+              </a:defRPr>
+            </a:lvl7pPr>
+            <a:lvl8pPr>
+              <a:defRPr>
+                <a:solidFill>
+                  <a:schemeClr val="dk1"/>
+                </a:solidFill>
+              </a:defRPr>
+            </a:lvl8pPr>
+            <a:lvl9pPr>
+              <a:defRPr>
+                <a:solidFill>
+                  <a:schemeClr val="dk1"/>
+                </a:solidFill>
+              </a:defRPr>
+            </a:lvl9pPr>
+          </a:lstStyle>
+          <a:p>
+            <a:pPr defTabSz="672130"/>
+            <a:r>
+              <a:rPr lang="pt-BR" sz="1176" b="0" dirty="0">
+                <a:solidFill>
+                  <a:prstClr val="black"/>
+                </a:solidFill>
+                <a:latin typeface="Exo 2 Medium" panose="00000600000000000000" pitchFamily="50" charset="0"/>
+              </a:rPr>
+              <a:t>Negócios</a:t>
+            </a:r>
+          </a:p>
+        </p:txBody>
+      </p:sp>
+      <p:sp>
+        <p:nvSpPr>
+          <p:cNvPr id="23" name="Oval 120">
+            <a:extLst>
+              <a:ext uri="{FF2B5EF4-FFF2-40B4-BE49-F238E27FC236}">
+                <a16:creationId xmlns:a16="http://schemas.microsoft.com/office/drawing/2014/main" id="{D512B11E-A0D6-43B9-9FAB-A12852EB997C}"/>
+              </a:ext>
+            </a:extLst>
+          </p:cNvPr>
+          <p:cNvSpPr>
+            <a:spLocks noChangeAspect="1"/>
+          </p:cNvSpPr>
+          <p:nvPr/>
+        </p:nvSpPr>
+        <p:spPr>
+          <a:xfrm>
+            <a:off x="11193898" y="324247"/>
+            <a:ext cx="211404" cy="211689"/>
+          </a:xfrm>
+          <a:prstGeom prst="ellipse">
+            <a:avLst/>
+          </a:prstGeom>
+          <a:solidFill>
+            <a:srgbClr val="1BCF13"/>
+          </a:solidFill>
+          <a:ln w="12700">
+            <a:solidFill>
+              <a:schemeClr val="accent3"/>
+            </a:solidFill>
+          </a:ln>
+        </p:spPr>
+        <p:style>
+          <a:lnRef idx="2">
+            <a:schemeClr val="accent1">
+              <a:shade val="50000"/>
+            </a:schemeClr>
+          </a:lnRef>
+          <a:fillRef idx="1">
+            <a:schemeClr val="accent1"/>
+          </a:fillRef>
+          <a:effectRef idx="0">
+            <a:schemeClr val="accent1"/>
+          </a:effectRef>
+          <a:fontRef idx="minor">
+            <a:schemeClr val="lt1"/>
+          </a:fontRef>
+        </p:style>
+        <p:txBody>
+          <a:bodyPr wrap="none" lIns="52922" tIns="52922" rIns="52922" rtlCol="0" anchor="ctr"/>
+          <a:lstStyle/>
+          <a:p>
+            <a:pPr algn="ctr" defTabSz="672130"/>
+            <a:endParaRPr lang="en-US" sz="1176" dirty="0">
+              <a:solidFill>
+                <a:srgbClr val="1BCF13"/>
+              </a:solidFill>
+              <a:latin typeface="Exo 2 Medium" panose="00000600000000000000" pitchFamily="50" charset="0"/>
+              <a:cs typeface="Simplon BP Regular"/>
+            </a:endParaRPr>
+          </a:p>
+        </p:txBody>
+      </p:sp>
+      <p:sp>
+        <p:nvSpPr>
+          <p:cNvPr id="24" name="TextBox 123">
+            <a:extLst>
+              <a:ext uri="{FF2B5EF4-FFF2-40B4-BE49-F238E27FC236}">
+                <a16:creationId xmlns:a16="http://schemas.microsoft.com/office/drawing/2014/main" id="{DF2A6510-AF00-4432-92E4-F9CD9E5F17D8}"/>
+              </a:ext>
+            </a:extLst>
+          </p:cNvPr>
+          <p:cNvSpPr txBox="1"/>
+          <p:nvPr/>
+        </p:nvSpPr>
+        <p:spPr>
+          <a:xfrm>
+            <a:off x="10852497" y="576471"/>
+            <a:ext cx="899678" cy="179824"/>
+          </a:xfrm>
+          <a:prstGeom prst="rect">
+            <a:avLst/>
+          </a:prstGeom>
+          <a:noFill/>
+          <a:ln w="12700">
+            <a:noFill/>
+          </a:ln>
+        </p:spPr>
+        <p:style>
+          <a:lnRef idx="2">
+            <a:schemeClr val="accent4"/>
+          </a:lnRef>
+          <a:fillRef idx="1">
+            <a:schemeClr val="lt1"/>
+          </a:fillRef>
+          <a:effectRef idx="0">
+            <a:schemeClr val="accent4"/>
+          </a:effectRef>
+          <a:fontRef idx="minor">
+            <a:schemeClr val="dk1"/>
+          </a:fontRef>
+        </p:style>
+        <p:txBody>
+          <a:bodyPr wrap="none" lIns="52922" tIns="52922" rIns="52922" bIns="0" rtlCol="0" anchor="b"/>
+          <a:lstStyle>
+            <a:defPPr>
+              <a:defRPr lang="en-US"/>
+            </a:defPPr>
+            <a:lvl1pPr algn="ctr">
+              <a:defRPr sz="1000" b="1">
+                <a:latin typeface="Simplon BP Regular"/>
+                <a:cs typeface="Simplon BP Regular"/>
+              </a:defRPr>
+            </a:lvl1pPr>
+            <a:lvl2pPr>
+              <a:defRPr>
+                <a:solidFill>
+                  <a:schemeClr val="dk1"/>
+                </a:solidFill>
+              </a:defRPr>
+            </a:lvl2pPr>
+            <a:lvl3pPr>
+              <a:defRPr>
+                <a:solidFill>
+                  <a:schemeClr val="dk1"/>
+                </a:solidFill>
+              </a:defRPr>
+            </a:lvl3pPr>
+            <a:lvl4pPr>
+              <a:defRPr>
+                <a:solidFill>
+                  <a:schemeClr val="dk1"/>
+                </a:solidFill>
+              </a:defRPr>
+            </a:lvl4pPr>
+            <a:lvl5pPr>
+              <a:defRPr>
+                <a:solidFill>
+                  <a:schemeClr val="dk1"/>
+                </a:solidFill>
+              </a:defRPr>
+            </a:lvl5pPr>
+            <a:lvl6pPr>
+              <a:defRPr>
+                <a:solidFill>
+                  <a:schemeClr val="dk1"/>
+                </a:solidFill>
+              </a:defRPr>
+            </a:lvl6pPr>
+            <a:lvl7pPr>
+              <a:defRPr>
+                <a:solidFill>
+                  <a:schemeClr val="dk1"/>
+                </a:solidFill>
+              </a:defRPr>
+            </a:lvl7pPr>
+            <a:lvl8pPr>
+              <a:defRPr>
+                <a:solidFill>
+                  <a:schemeClr val="dk1"/>
+                </a:solidFill>
+              </a:defRPr>
+            </a:lvl8pPr>
+            <a:lvl9pPr>
+              <a:defRPr>
+                <a:solidFill>
+                  <a:schemeClr val="dk1"/>
+                </a:solidFill>
+              </a:defRPr>
+            </a:lvl9pPr>
+          </a:lstStyle>
+          <a:p>
+            <a:pPr defTabSz="672130"/>
+            <a:r>
+              <a:rPr lang="pt-BR" sz="1176" b="0" dirty="0">
+                <a:solidFill>
+                  <a:prstClr val="black"/>
+                </a:solidFill>
+                <a:latin typeface="Exo 2 Medium" panose="00000600000000000000" pitchFamily="50" charset="0"/>
+              </a:rPr>
+              <a:t>Plataforma</a:t>
+            </a:r>
+          </a:p>
+        </p:txBody>
+      </p:sp>
+      <p:sp>
+        <p:nvSpPr>
+          <p:cNvPr id="25" name="TextBox 128">
+            <a:extLst>
+              <a:ext uri="{FF2B5EF4-FFF2-40B4-BE49-F238E27FC236}">
+                <a16:creationId xmlns:a16="http://schemas.microsoft.com/office/drawing/2014/main" id="{983CE74D-5B8F-4DD1-8C18-E4BE116FF1DC}"/>
+              </a:ext>
+            </a:extLst>
+          </p:cNvPr>
+          <p:cNvSpPr txBox="1"/>
+          <p:nvPr/>
+        </p:nvSpPr>
+        <p:spPr>
+          <a:xfrm>
+            <a:off x="9854245" y="576471"/>
+            <a:ext cx="899678" cy="179824"/>
+          </a:xfrm>
+          <a:prstGeom prst="rect">
+            <a:avLst/>
+          </a:prstGeom>
+          <a:noFill/>
+          <a:ln w="12700">
+            <a:noFill/>
+          </a:ln>
+        </p:spPr>
+        <p:style>
+          <a:lnRef idx="2">
+            <a:schemeClr val="accent4"/>
+          </a:lnRef>
+          <a:fillRef idx="1">
+            <a:schemeClr val="lt1"/>
+          </a:fillRef>
+          <a:effectRef idx="0">
+            <a:schemeClr val="accent4"/>
+          </a:effectRef>
+          <a:fontRef idx="minor">
+            <a:schemeClr val="dk1"/>
+          </a:fontRef>
+        </p:style>
+        <p:txBody>
+          <a:bodyPr wrap="none" lIns="52922" tIns="52922" rIns="52922" bIns="0" rtlCol="0" anchor="b"/>
+          <a:lstStyle>
+            <a:defPPr>
+              <a:defRPr lang="en-US"/>
+            </a:defPPr>
+            <a:lvl1pPr algn="ctr">
+              <a:defRPr sz="1000" b="1">
+                <a:latin typeface="Simplon BP Regular"/>
+                <a:cs typeface="Simplon BP Regular"/>
+              </a:defRPr>
+            </a:lvl1pPr>
+            <a:lvl2pPr>
+              <a:defRPr>
+                <a:solidFill>
+                  <a:schemeClr val="dk1"/>
+                </a:solidFill>
+              </a:defRPr>
+            </a:lvl2pPr>
+            <a:lvl3pPr>
+              <a:defRPr>
+                <a:solidFill>
+                  <a:schemeClr val="dk1"/>
+                </a:solidFill>
+              </a:defRPr>
+            </a:lvl3pPr>
+            <a:lvl4pPr>
+              <a:defRPr>
+                <a:solidFill>
+                  <a:schemeClr val="dk1"/>
+                </a:solidFill>
+              </a:defRPr>
+            </a:lvl4pPr>
+            <a:lvl5pPr>
+              <a:defRPr>
+                <a:solidFill>
+                  <a:schemeClr val="dk1"/>
+                </a:solidFill>
+              </a:defRPr>
+            </a:lvl5pPr>
+            <a:lvl6pPr>
+              <a:defRPr>
+                <a:solidFill>
+                  <a:schemeClr val="dk1"/>
+                </a:solidFill>
+              </a:defRPr>
+            </a:lvl6pPr>
+            <a:lvl7pPr>
+              <a:defRPr>
+                <a:solidFill>
+                  <a:schemeClr val="dk1"/>
+                </a:solidFill>
+              </a:defRPr>
+            </a:lvl7pPr>
+            <a:lvl8pPr>
+              <a:defRPr>
+                <a:solidFill>
+                  <a:schemeClr val="dk1"/>
+                </a:solidFill>
+              </a:defRPr>
+            </a:lvl8pPr>
+            <a:lvl9pPr>
+              <a:defRPr>
+                <a:solidFill>
+                  <a:schemeClr val="dk1"/>
+                </a:solidFill>
+              </a:defRPr>
+            </a:lvl9pPr>
+          </a:lstStyle>
+          <a:p>
+            <a:pPr defTabSz="672130"/>
+            <a:r>
+              <a:rPr lang="pt-BR" sz="1176" b="0" dirty="0">
+                <a:solidFill>
+                  <a:prstClr val="black"/>
+                </a:solidFill>
+                <a:latin typeface="Exo 2 Medium" panose="00000600000000000000" pitchFamily="50" charset="0"/>
+              </a:rPr>
+              <a:t>Back</a:t>
+            </a:r>
+          </a:p>
+        </p:txBody>
+      </p:sp>
+      <p:sp>
+        <p:nvSpPr>
+          <p:cNvPr id="26" name="TextBox 133">
+            <a:extLst>
+              <a:ext uri="{FF2B5EF4-FFF2-40B4-BE49-F238E27FC236}">
+                <a16:creationId xmlns:a16="http://schemas.microsoft.com/office/drawing/2014/main" id="{FE1215A2-D778-4D77-9417-6C32B4E10829}"/>
+              </a:ext>
+            </a:extLst>
+          </p:cNvPr>
+          <p:cNvSpPr txBox="1"/>
+          <p:nvPr/>
+        </p:nvSpPr>
+        <p:spPr>
+          <a:xfrm>
+            <a:off x="8888645" y="576471"/>
+            <a:ext cx="899678" cy="179824"/>
+          </a:xfrm>
+          <a:prstGeom prst="rect">
+            <a:avLst/>
+          </a:prstGeom>
+          <a:noFill/>
+          <a:ln w="12700">
+            <a:noFill/>
+          </a:ln>
+        </p:spPr>
+        <p:style>
+          <a:lnRef idx="2">
+            <a:schemeClr val="accent4"/>
+          </a:lnRef>
+          <a:fillRef idx="1">
+            <a:schemeClr val="lt1"/>
+          </a:fillRef>
+          <a:effectRef idx="0">
+            <a:schemeClr val="accent4"/>
+          </a:effectRef>
+          <a:fontRef idx="minor">
+            <a:schemeClr val="dk1"/>
+          </a:fontRef>
+        </p:style>
+        <p:txBody>
+          <a:bodyPr wrap="none" lIns="52922" tIns="52922" rIns="52922" bIns="0" rtlCol="0" anchor="b"/>
+          <a:lstStyle>
+            <a:defPPr>
+              <a:defRPr lang="en-US"/>
+            </a:defPPr>
+            <a:lvl1pPr algn="ctr">
+              <a:defRPr sz="1000" b="1">
+                <a:latin typeface="Simplon BP Regular"/>
+                <a:cs typeface="Simplon BP Regular"/>
+              </a:defRPr>
+            </a:lvl1pPr>
+            <a:lvl2pPr>
+              <a:defRPr>
+                <a:solidFill>
+                  <a:schemeClr val="dk1"/>
+                </a:solidFill>
+              </a:defRPr>
+            </a:lvl2pPr>
+            <a:lvl3pPr>
+              <a:defRPr>
+                <a:solidFill>
+                  <a:schemeClr val="dk1"/>
+                </a:solidFill>
+              </a:defRPr>
+            </a:lvl3pPr>
+            <a:lvl4pPr>
+              <a:defRPr>
+                <a:solidFill>
+                  <a:schemeClr val="dk1"/>
+                </a:solidFill>
+              </a:defRPr>
+            </a:lvl4pPr>
+            <a:lvl5pPr>
+              <a:defRPr>
+                <a:solidFill>
+                  <a:schemeClr val="dk1"/>
+                </a:solidFill>
+              </a:defRPr>
+            </a:lvl5pPr>
+            <a:lvl6pPr>
+              <a:defRPr>
+                <a:solidFill>
+                  <a:schemeClr val="dk1"/>
+                </a:solidFill>
+              </a:defRPr>
+            </a:lvl6pPr>
+            <a:lvl7pPr>
+              <a:defRPr>
+                <a:solidFill>
+                  <a:schemeClr val="dk1"/>
+                </a:solidFill>
+              </a:defRPr>
+            </a:lvl7pPr>
+            <a:lvl8pPr>
+              <a:defRPr>
+                <a:solidFill>
+                  <a:schemeClr val="dk1"/>
+                </a:solidFill>
+              </a:defRPr>
+            </a:lvl8pPr>
+            <a:lvl9pPr>
+              <a:defRPr>
+                <a:solidFill>
+                  <a:schemeClr val="dk1"/>
+                </a:solidFill>
+              </a:defRPr>
+            </a:lvl9pPr>
+          </a:lstStyle>
+          <a:p>
+            <a:pPr defTabSz="672130"/>
+            <a:r>
+              <a:rPr lang="pt-BR" sz="1176" b="0" dirty="0">
+                <a:solidFill>
+                  <a:prstClr val="black"/>
+                </a:solidFill>
+                <a:latin typeface="Exo 2 Medium" panose="00000600000000000000" pitchFamily="50" charset="0"/>
+              </a:rPr>
+              <a:t>Front</a:t>
+            </a:r>
+          </a:p>
+        </p:txBody>
+      </p:sp>
+      <p:sp>
+        <p:nvSpPr>
+          <p:cNvPr id="27" name="Oval 134">
+            <a:extLst>
+              <a:ext uri="{FF2B5EF4-FFF2-40B4-BE49-F238E27FC236}">
+                <a16:creationId xmlns:a16="http://schemas.microsoft.com/office/drawing/2014/main" id="{E0659533-7794-44EF-87B8-DFFD796E8DCB}"/>
+              </a:ext>
+            </a:extLst>
+          </p:cNvPr>
+          <p:cNvSpPr>
+            <a:spLocks noChangeAspect="1"/>
+          </p:cNvSpPr>
+          <p:nvPr/>
+        </p:nvSpPr>
+        <p:spPr>
+          <a:xfrm>
+            <a:off x="8443555" y="297930"/>
+            <a:ext cx="211404" cy="211689"/>
+          </a:xfrm>
+          <a:prstGeom prst="ellipse">
+            <a:avLst/>
+          </a:prstGeom>
+          <a:solidFill>
+            <a:srgbClr val="1BCF13"/>
+          </a:solidFill>
+          <a:ln w="12700">
+            <a:solidFill>
+              <a:schemeClr val="accent3"/>
+            </a:solidFill>
+          </a:ln>
+        </p:spPr>
+        <p:style>
+          <a:lnRef idx="2">
+            <a:schemeClr val="accent1">
+              <a:shade val="50000"/>
+            </a:schemeClr>
+          </a:lnRef>
+          <a:fillRef idx="1">
+            <a:schemeClr val="accent1"/>
+          </a:fillRef>
+          <a:effectRef idx="0">
+            <a:schemeClr val="accent1"/>
+          </a:effectRef>
+          <a:fontRef idx="minor">
+            <a:schemeClr val="lt1"/>
+          </a:fontRef>
+        </p:style>
+        <p:txBody>
+          <a:bodyPr wrap="none" lIns="52922" tIns="52922" rIns="52922" rtlCol="0" anchor="ctr"/>
+          <a:lstStyle/>
+          <a:p>
+            <a:pPr algn="ctr" defTabSz="672130"/>
+            <a:endParaRPr lang="en-US" sz="1176" dirty="0">
+              <a:solidFill>
+                <a:srgbClr val="FFC000"/>
+              </a:solidFill>
+              <a:latin typeface="Exo 2 Medium" panose="00000600000000000000" pitchFamily="50" charset="0"/>
+              <a:cs typeface="Simplon BP Regular"/>
+            </a:endParaRPr>
+          </a:p>
+        </p:txBody>
+      </p:sp>
+      <p:sp>
+        <p:nvSpPr>
+          <p:cNvPr id="28" name="TextBox 138">
+            <a:extLst>
+              <a:ext uri="{FF2B5EF4-FFF2-40B4-BE49-F238E27FC236}">
+                <a16:creationId xmlns:a16="http://schemas.microsoft.com/office/drawing/2014/main" id="{CFC76C64-835E-4901-A393-78B96741EBC6}"/>
+              </a:ext>
+            </a:extLst>
+          </p:cNvPr>
+          <p:cNvSpPr txBox="1"/>
+          <p:nvPr/>
+        </p:nvSpPr>
+        <p:spPr>
+          <a:xfrm>
+            <a:off x="8126053" y="576471"/>
+            <a:ext cx="899678" cy="179824"/>
+          </a:xfrm>
+          <a:prstGeom prst="rect">
+            <a:avLst/>
+          </a:prstGeom>
+          <a:noFill/>
+          <a:ln w="12700">
+            <a:noFill/>
+          </a:ln>
+        </p:spPr>
+        <p:style>
+          <a:lnRef idx="2">
+            <a:schemeClr val="accent4"/>
+          </a:lnRef>
+          <a:fillRef idx="1">
+            <a:schemeClr val="lt1"/>
+          </a:fillRef>
+          <a:effectRef idx="0">
+            <a:schemeClr val="accent4"/>
+          </a:effectRef>
+          <a:fontRef idx="minor">
+            <a:schemeClr val="dk1"/>
+          </a:fontRef>
+        </p:style>
+        <p:txBody>
+          <a:bodyPr wrap="none" lIns="52922" tIns="52922" rIns="52922" bIns="0" rtlCol="0" anchor="b"/>
+          <a:lstStyle>
+            <a:defPPr>
+              <a:defRPr lang="en-US"/>
+            </a:defPPr>
+            <a:lvl1pPr algn="ctr">
+              <a:defRPr sz="1000" b="1">
+                <a:latin typeface="Simplon BP Regular"/>
+                <a:cs typeface="Simplon BP Regular"/>
+              </a:defRPr>
+            </a:lvl1pPr>
+            <a:lvl2pPr>
+              <a:defRPr>
+                <a:solidFill>
+                  <a:schemeClr val="dk1"/>
+                </a:solidFill>
+              </a:defRPr>
+            </a:lvl2pPr>
+            <a:lvl3pPr>
+              <a:defRPr>
+                <a:solidFill>
+                  <a:schemeClr val="dk1"/>
+                </a:solidFill>
+              </a:defRPr>
+            </a:lvl3pPr>
+            <a:lvl4pPr>
+              <a:defRPr>
+                <a:solidFill>
+                  <a:schemeClr val="dk1"/>
+                </a:solidFill>
+              </a:defRPr>
+            </a:lvl4pPr>
+            <a:lvl5pPr>
+              <a:defRPr>
+                <a:solidFill>
+                  <a:schemeClr val="dk1"/>
+                </a:solidFill>
+              </a:defRPr>
+            </a:lvl5pPr>
+            <a:lvl6pPr>
+              <a:defRPr>
+                <a:solidFill>
+                  <a:schemeClr val="dk1"/>
+                </a:solidFill>
+              </a:defRPr>
+            </a:lvl6pPr>
+            <a:lvl7pPr>
+              <a:defRPr>
+                <a:solidFill>
+                  <a:schemeClr val="dk1"/>
+                </a:solidFill>
+              </a:defRPr>
+            </a:lvl7pPr>
+            <a:lvl8pPr>
+              <a:defRPr>
+                <a:solidFill>
+                  <a:schemeClr val="dk1"/>
+                </a:solidFill>
+              </a:defRPr>
+            </a:lvl8pPr>
+            <a:lvl9pPr>
+              <a:defRPr>
+                <a:solidFill>
+                  <a:schemeClr val="dk1"/>
+                </a:solidFill>
+              </a:defRPr>
+            </a:lvl9pPr>
+          </a:lstStyle>
+          <a:p>
+            <a:pPr defTabSz="672130"/>
+            <a:r>
+              <a:rPr lang="en-US" sz="1176" b="0" dirty="0" err="1">
+                <a:solidFill>
+                  <a:prstClr val="black"/>
+                </a:solidFill>
+                <a:latin typeface="Exo 2 Medium" panose="00000600000000000000" pitchFamily="50" charset="0"/>
+              </a:rPr>
+              <a:t>Equipe</a:t>
+            </a:r>
+            <a:endParaRPr lang="en-US" sz="1176" b="0" dirty="0">
+              <a:solidFill>
+                <a:prstClr val="black"/>
+              </a:solidFill>
+              <a:latin typeface="Exo 2 Medium" panose="00000600000000000000" pitchFamily="50" charset="0"/>
+            </a:endParaRPr>
+          </a:p>
+        </p:txBody>
+      </p:sp>
+      <p:sp>
+        <p:nvSpPr>
+          <p:cNvPr id="29" name="Retângulo 28">
+            <a:extLst>
+              <a:ext uri="{FF2B5EF4-FFF2-40B4-BE49-F238E27FC236}">
+                <a16:creationId xmlns:a16="http://schemas.microsoft.com/office/drawing/2014/main" id="{1E43F633-0A68-4D0F-AC0D-375E22F80328}"/>
+              </a:ext>
+            </a:extLst>
+          </p:cNvPr>
+          <p:cNvSpPr/>
+          <p:nvPr/>
+        </p:nvSpPr>
+        <p:spPr>
+          <a:xfrm>
+            <a:off x="512766" y="868345"/>
+            <a:ext cx="6186608" cy="238150"/>
+          </a:xfrm>
+          <a:prstGeom prst="rect">
+            <a:avLst/>
+          </a:prstGeom>
+          <a:solidFill>
+            <a:srgbClr val="08276B"/>
+          </a:solidFill>
+        </p:spPr>
+        <p:txBody>
+          <a:bodyPr vert="horz" lIns="134422" tIns="67211" rIns="134422" bIns="67211" rtlCol="0" anchor="ctr"/>
+          <a:lstStyle/>
+          <a:p>
+            <a:pPr defTabSz="672130"/>
+            <a:r>
+              <a:rPr lang="en-US" sz="1544" dirty="0">
+                <a:solidFill>
+                  <a:schemeClr val="bg1"/>
+                </a:solidFill>
+                <a:latin typeface="Exo 2 Medium" panose="00000600000000000000" pitchFamily="50" charset="0"/>
+                <a:ea typeface="Simplon Oi Headline" charset="0"/>
+                <a:cs typeface="Simplon Oi Headline" charset="0"/>
+              </a:rPr>
+              <a:t>Progressos c/ responsáveis </a:t>
+            </a:r>
+          </a:p>
+        </p:txBody>
+      </p:sp>
+      <p:sp>
+        <p:nvSpPr>
+          <p:cNvPr id="30" name="Retângulo 29">
+            <a:extLst>
+              <a:ext uri="{FF2B5EF4-FFF2-40B4-BE49-F238E27FC236}">
+                <a16:creationId xmlns:a16="http://schemas.microsoft.com/office/drawing/2014/main" id="{D543C29D-67E1-4031-9D29-169B0DBC6EA2}"/>
+              </a:ext>
+            </a:extLst>
+          </p:cNvPr>
+          <p:cNvSpPr/>
+          <p:nvPr/>
+        </p:nvSpPr>
+        <p:spPr>
+          <a:xfrm>
+            <a:off x="6814576" y="868345"/>
+            <a:ext cx="6194715" cy="238150"/>
+          </a:xfrm>
+          <a:prstGeom prst="rect">
+            <a:avLst/>
+          </a:prstGeom>
+          <a:solidFill>
+            <a:srgbClr val="08276B"/>
+          </a:solidFill>
+        </p:spPr>
+        <p:txBody>
+          <a:bodyPr vert="horz" lIns="134422" tIns="67211" rIns="134422" bIns="67211" rtlCol="0" anchor="ctr"/>
+          <a:lstStyle/>
+          <a:p>
+            <a:pPr defTabSz="672130"/>
+            <a:r>
+              <a:rPr lang="pt-BR" sz="1544" dirty="0">
+                <a:solidFill>
+                  <a:schemeClr val="bg1"/>
+                </a:solidFill>
+                <a:latin typeface="Exo 2 Medium" panose="00000600000000000000" pitchFamily="50" charset="0"/>
+                <a:ea typeface="Simplon Oi Headline" charset="0"/>
+                <a:cs typeface="Simplon Oi Headline" charset="0"/>
+              </a:rPr>
+              <a:t>Pontos atenção/ Principais Riscos</a:t>
+            </a:r>
+          </a:p>
+        </p:txBody>
+      </p:sp>
+      <p:sp>
+        <p:nvSpPr>
+          <p:cNvPr id="31" name="Retângulo 30">
+            <a:extLst>
+              <a:ext uri="{FF2B5EF4-FFF2-40B4-BE49-F238E27FC236}">
+                <a16:creationId xmlns:a16="http://schemas.microsoft.com/office/drawing/2014/main" id="{DA8C0DE2-12B6-4997-B780-BE9D9F8E16D6}"/>
+              </a:ext>
+            </a:extLst>
+          </p:cNvPr>
+          <p:cNvSpPr/>
+          <p:nvPr/>
+        </p:nvSpPr>
+        <p:spPr>
+          <a:xfrm>
+            <a:off x="508267" y="4152347"/>
+            <a:ext cx="12505521" cy="238150"/>
+          </a:xfrm>
+          <a:prstGeom prst="rect">
+            <a:avLst/>
+          </a:prstGeom>
+          <a:solidFill>
+            <a:srgbClr val="08276B"/>
+          </a:solidFill>
+        </p:spPr>
+        <p:txBody>
+          <a:bodyPr vert="horz" lIns="134422" tIns="67211" rIns="134422" bIns="67211" rtlCol="0" anchor="ctr"/>
+          <a:lstStyle/>
+          <a:p>
+            <a:pPr defTabSz="672130"/>
+            <a:r>
+              <a:rPr lang="pt-BR" sz="1544" dirty="0">
+                <a:solidFill>
+                  <a:schemeClr val="bg1"/>
+                </a:solidFill>
+                <a:latin typeface="Exo 2 Medium" panose="00000600000000000000" pitchFamily="50" charset="0"/>
+                <a:ea typeface="Simplon Oi Headline" charset="0"/>
+                <a:cs typeface="Simplon Oi Headline" charset="0"/>
+              </a:rPr>
+              <a:t>Próximos Passos c/ responsáveis </a:t>
+            </a:r>
+          </a:p>
+        </p:txBody>
+      </p:sp>
+      <p:sp>
+        <p:nvSpPr>
+          <p:cNvPr id="32" name="Rectangle 37">
+            <a:extLst>
+              <a:ext uri="{FF2B5EF4-FFF2-40B4-BE49-F238E27FC236}">
+                <a16:creationId xmlns:a16="http://schemas.microsoft.com/office/drawing/2014/main" id="{224F3AF8-BD84-4D63-8F6E-083FA677F2DB}"/>
+              </a:ext>
+            </a:extLst>
+          </p:cNvPr>
+          <p:cNvSpPr/>
+          <p:nvPr/>
+        </p:nvSpPr>
+        <p:spPr>
+          <a:xfrm>
+            <a:off x="496766" y="1106495"/>
+            <a:ext cx="6186608" cy="2962168"/>
+          </a:xfrm>
+          <a:prstGeom prst="rect">
+            <a:avLst/>
+          </a:prstGeom>
+          <a:noFill/>
+          <a:ln w="12700">
+            <a:solidFill>
+              <a:schemeClr val="bg1">
+                <a:lumMod val="50000"/>
+              </a:schemeClr>
+            </a:solidFill>
+          </a:ln>
+        </p:spPr>
+        <p:style>
+          <a:lnRef idx="2">
+            <a:schemeClr val="accent4"/>
+          </a:lnRef>
+          <a:fillRef idx="1">
+            <a:schemeClr val="lt1"/>
+          </a:fillRef>
+          <a:effectRef idx="0">
+            <a:schemeClr val="accent4"/>
+          </a:effectRef>
+          <a:fontRef idx="minor">
+            <a:schemeClr val="dk1"/>
+          </a:fontRef>
+        </p:style>
+        <p:txBody>
+          <a:bodyPr tIns="105844" rtlCol="0" anchor="t"/>
+          <a:lstStyle/>
+          <a:p>
+            <a:pPr marL="0" lvl="1" fontAlgn="base">
+              <a:spcBef>
+                <a:spcPct val="0"/>
+              </a:spcBef>
+              <a:defRPr/>
+            </a:pPr>
+            <a:r>
+              <a:rPr lang="pt-BR" sz="1323" b="1" dirty="0">
+                <a:solidFill>
+                  <a:schemeClr val="tx1"/>
+                </a:solidFill>
+                <a:latin typeface="Exo 2 Medium" panose="00000600000000000000" pitchFamily="50" charset="0"/>
+                <a:cs typeface="Simplon BP Regular"/>
+              </a:rPr>
+              <a:t>Criação de Filtros e ajustes em telas</a:t>
+            </a:r>
+          </a:p>
+          <a:p>
+            <a:pPr marL="0" lvl="1" fontAlgn="base">
+              <a:spcBef>
+                <a:spcPct val="0"/>
+              </a:spcBef>
+              <a:defRPr/>
+            </a:pPr>
+            <a:r>
+              <a:rPr lang="pt-BR" sz="1323" dirty="0">
+                <a:solidFill>
+                  <a:schemeClr val="tx1"/>
+                </a:solidFill>
+                <a:latin typeface="Exo 2 Medium" panose="00000600000000000000" pitchFamily="50" charset="0"/>
+                <a:cs typeface="Simplon BP Regular"/>
+              </a:rPr>
+              <a:t>#Lucas Felix</a:t>
+            </a:r>
+          </a:p>
+          <a:p>
+            <a:pPr marL="0" lvl="1" fontAlgn="base">
+              <a:spcBef>
+                <a:spcPct val="0"/>
+              </a:spcBef>
+              <a:defRPr/>
+            </a:pPr>
+            <a:endParaRPr lang="pt-BR" sz="1323" b="1" dirty="0">
+              <a:solidFill>
+                <a:schemeClr val="tx1"/>
+              </a:solidFill>
+              <a:latin typeface="Exo 2 Medium" panose="00000600000000000000" pitchFamily="50" charset="0"/>
+              <a:cs typeface="Simplon BP Regular"/>
+            </a:endParaRPr>
+          </a:p>
+          <a:p>
+            <a:pPr marL="0" lvl="1" fontAlgn="base">
+              <a:spcBef>
+                <a:spcPct val="0"/>
+              </a:spcBef>
+              <a:defRPr/>
+            </a:pPr>
+            <a:r>
+              <a:rPr lang="pt-BR" sz="1323" b="1" dirty="0">
+                <a:solidFill>
+                  <a:schemeClr val="tx1"/>
+                </a:solidFill>
+                <a:latin typeface="Exo 2 Medium" panose="00000600000000000000" pitchFamily="50" charset="0"/>
+                <a:cs typeface="Simplon BP Regular"/>
+              </a:rPr>
+              <a:t>Atualização da </a:t>
+            </a:r>
+            <a:r>
+              <a:rPr lang="pt-BR" sz="1323" b="1" dirty="0" err="1">
+                <a:solidFill>
+                  <a:schemeClr val="tx1"/>
+                </a:solidFill>
+                <a:latin typeface="Exo 2 Medium" panose="00000600000000000000" pitchFamily="50" charset="0"/>
+                <a:cs typeface="Simplon BP Regular"/>
+              </a:rPr>
+              <a:t>timeline</a:t>
+            </a:r>
+            <a:r>
+              <a:rPr lang="pt-BR" sz="1323" dirty="0">
+                <a:solidFill>
+                  <a:schemeClr val="tx1"/>
+                </a:solidFill>
+                <a:latin typeface="Exo 2 Medium" panose="00000600000000000000" pitchFamily="50" charset="0"/>
+                <a:cs typeface="Simplon BP Regular"/>
+              </a:rPr>
+              <a:t> </a:t>
+            </a:r>
+            <a:r>
+              <a:rPr lang="pt-BR" sz="1323" b="1" dirty="0">
+                <a:solidFill>
+                  <a:schemeClr val="tx1"/>
+                </a:solidFill>
+                <a:latin typeface="Exo 2 Medium" panose="00000600000000000000" pitchFamily="50" charset="0"/>
+                <a:cs typeface="Simplon BP Regular"/>
+              </a:rPr>
+              <a:t>e inicialização da OAT</a:t>
+            </a:r>
+          </a:p>
+          <a:p>
+            <a:pPr marL="0" lvl="1" fontAlgn="base">
+              <a:spcBef>
+                <a:spcPct val="0"/>
+              </a:spcBef>
+              <a:defRPr/>
+            </a:pPr>
+            <a:r>
+              <a:rPr lang="pt-BR" sz="1323" dirty="0">
+                <a:solidFill>
+                  <a:schemeClr val="tx1"/>
+                </a:solidFill>
+                <a:latin typeface="Exo 2 Medium" panose="00000600000000000000" pitchFamily="50" charset="0"/>
+                <a:cs typeface="Simplon BP Regular"/>
+              </a:rPr>
+              <a:t>#Lucas Ferreira</a:t>
+            </a:r>
+          </a:p>
+          <a:p>
+            <a:pPr marL="0" lvl="1" fontAlgn="base">
+              <a:spcBef>
+                <a:spcPct val="0"/>
+              </a:spcBef>
+              <a:defRPr/>
+            </a:pPr>
+            <a:endParaRPr lang="pt-BR" sz="1323" b="1" dirty="0">
+              <a:solidFill>
+                <a:schemeClr val="tx1"/>
+              </a:solidFill>
+              <a:latin typeface="Exo 2 Medium" panose="00000600000000000000" pitchFamily="50" charset="0"/>
+              <a:cs typeface="Simplon BP Regular"/>
+            </a:endParaRPr>
+          </a:p>
+          <a:p>
+            <a:pPr marL="0" lvl="1" fontAlgn="base">
+              <a:spcBef>
+                <a:spcPct val="0"/>
+              </a:spcBef>
+              <a:defRPr/>
+            </a:pPr>
+            <a:r>
+              <a:rPr lang="pt-BR" sz="1323" b="1" dirty="0">
+                <a:solidFill>
+                  <a:schemeClr val="tx1"/>
+                </a:solidFill>
+                <a:latin typeface="Exo 2 Medium" panose="00000600000000000000" pitchFamily="50" charset="0"/>
+                <a:cs typeface="Simplon BP Regular"/>
+              </a:rPr>
+              <a:t>Criação do </a:t>
+            </a:r>
+            <a:r>
+              <a:rPr lang="pt-BR" sz="1323" b="1" dirty="0" err="1">
+                <a:solidFill>
+                  <a:schemeClr val="tx1"/>
+                </a:solidFill>
+                <a:latin typeface="Exo 2 Medium" panose="00000600000000000000" pitchFamily="50" charset="0"/>
+                <a:cs typeface="Simplon BP Regular"/>
+              </a:rPr>
+              <a:t>chatbot</a:t>
+            </a:r>
+            <a:endParaRPr lang="pt-BR" sz="1323" b="1" dirty="0">
+              <a:solidFill>
+                <a:schemeClr val="tx1"/>
+              </a:solidFill>
+              <a:latin typeface="Exo 2 Medium" panose="00000600000000000000" pitchFamily="50" charset="0"/>
+              <a:cs typeface="Simplon BP Regular"/>
+            </a:endParaRPr>
+          </a:p>
+          <a:p>
+            <a:pPr fontAlgn="base">
+              <a:spcBef>
+                <a:spcPct val="0"/>
+              </a:spcBef>
+              <a:defRPr/>
+            </a:pPr>
+            <a:r>
+              <a:rPr lang="pt-BR" sz="1323" dirty="0">
+                <a:solidFill>
+                  <a:schemeClr val="tx1"/>
+                </a:solidFill>
+                <a:latin typeface="Exo 2 Medium" panose="00000600000000000000" pitchFamily="50" charset="0"/>
+                <a:cs typeface="Simplon BP Regular"/>
+              </a:rPr>
+              <a:t>#João Oliveira</a:t>
+            </a:r>
+          </a:p>
+          <a:p>
+            <a:pPr fontAlgn="base">
+              <a:spcBef>
+                <a:spcPct val="0"/>
+              </a:spcBef>
+              <a:defRPr/>
+            </a:pPr>
+            <a:endParaRPr lang="pt-BR" sz="1323" dirty="0">
+              <a:solidFill>
+                <a:schemeClr val="tx1"/>
+              </a:solidFill>
+              <a:latin typeface="Exo 2 Medium" panose="00000600000000000000" pitchFamily="50" charset="0"/>
+              <a:cs typeface="Simplon BP Regular"/>
+            </a:endParaRPr>
+          </a:p>
+          <a:p>
+            <a:pPr fontAlgn="base">
+              <a:spcBef>
+                <a:spcPct val="0"/>
+              </a:spcBef>
+              <a:defRPr/>
+            </a:pPr>
+            <a:r>
+              <a:rPr lang="pt-BR" sz="1323" b="1" dirty="0">
+                <a:solidFill>
+                  <a:schemeClr val="tx1"/>
+                </a:solidFill>
+                <a:latin typeface="Exo 2 Medium" panose="00000600000000000000" pitchFamily="50" charset="0"/>
+                <a:cs typeface="Simplon BP Regular"/>
+              </a:rPr>
+              <a:t>Criação do </a:t>
+            </a:r>
+            <a:r>
+              <a:rPr lang="pt-BR" sz="1323" b="1" dirty="0" err="1">
+                <a:solidFill>
+                  <a:schemeClr val="tx1"/>
+                </a:solidFill>
+                <a:latin typeface="Exo 2 Medium" panose="00000600000000000000" pitchFamily="50" charset="0"/>
+                <a:cs typeface="Simplon BP Regular"/>
+              </a:rPr>
+              <a:t>Whitepaper</a:t>
+            </a:r>
+            <a:endParaRPr lang="pt-BR" sz="1323" b="1" dirty="0">
+              <a:solidFill>
+                <a:schemeClr val="tx1"/>
+              </a:solidFill>
+              <a:latin typeface="Exo 2 Medium" panose="00000600000000000000" pitchFamily="50" charset="0"/>
+              <a:cs typeface="Simplon BP Regular"/>
+            </a:endParaRPr>
+          </a:p>
+          <a:p>
+            <a:pPr fontAlgn="base">
+              <a:spcBef>
+                <a:spcPct val="0"/>
+              </a:spcBef>
+              <a:defRPr/>
+            </a:pPr>
+            <a:r>
+              <a:rPr lang="pt-BR" sz="1323" b="1" dirty="0">
+                <a:solidFill>
+                  <a:schemeClr val="tx1"/>
+                </a:solidFill>
+                <a:latin typeface="Exo 2 Medium" panose="00000600000000000000" pitchFamily="50" charset="0"/>
+                <a:cs typeface="Simplon BP Regular"/>
+              </a:rPr>
+              <a:t>#</a:t>
+            </a:r>
+            <a:r>
+              <a:rPr lang="pt-BR" sz="1323" dirty="0">
+                <a:solidFill>
+                  <a:schemeClr val="tx1"/>
+                </a:solidFill>
+                <a:latin typeface="Exo 2 Medium" panose="00000600000000000000" pitchFamily="50" charset="0"/>
+                <a:cs typeface="Simplon BP Regular"/>
+              </a:rPr>
+              <a:t>Vinicius Novais</a:t>
+            </a:r>
+          </a:p>
+          <a:p>
+            <a:pPr fontAlgn="base">
+              <a:spcBef>
+                <a:spcPct val="0"/>
+              </a:spcBef>
+              <a:defRPr/>
+            </a:pPr>
+            <a:endParaRPr lang="pt-BR" sz="1323" b="1" dirty="0">
+              <a:solidFill>
+                <a:schemeClr val="tx1"/>
+              </a:solidFill>
+              <a:latin typeface="Exo 2 Medium" panose="00000600000000000000" pitchFamily="50" charset="0"/>
+              <a:cs typeface="Simplon BP Regular"/>
+            </a:endParaRPr>
+          </a:p>
+          <a:p>
+            <a:pPr fontAlgn="base">
+              <a:spcBef>
+                <a:spcPct val="0"/>
+              </a:spcBef>
+              <a:defRPr/>
+            </a:pPr>
+            <a:r>
+              <a:rPr lang="pt-BR" sz="1323" b="1" dirty="0">
+                <a:solidFill>
+                  <a:schemeClr val="tx1"/>
+                </a:solidFill>
+                <a:latin typeface="Exo 2 Medium" panose="00000600000000000000" pitchFamily="50" charset="0"/>
+                <a:cs typeface="Simplon BP Regular"/>
+              </a:rPr>
+              <a:t>Atualização tela de Planos                                                      </a:t>
+            </a:r>
+            <a:r>
+              <a:rPr lang="pt-BR" sz="1323" b="1" dirty="0" err="1">
+                <a:solidFill>
+                  <a:schemeClr val="tx1"/>
+                </a:solidFill>
+                <a:latin typeface="Exo 2 Medium" panose="00000600000000000000" pitchFamily="50" charset="0"/>
+                <a:cs typeface="Simplon BP Regular"/>
+              </a:rPr>
+              <a:t>Refatoração</a:t>
+            </a:r>
+            <a:r>
+              <a:rPr lang="pt-BR" sz="1323" b="1" dirty="0">
+                <a:solidFill>
+                  <a:schemeClr val="tx1"/>
+                </a:solidFill>
+                <a:latin typeface="Exo 2 Medium" panose="00000600000000000000" pitchFamily="50" charset="0"/>
+                <a:cs typeface="Simplon BP Regular"/>
+              </a:rPr>
+              <a:t> das telas de perfis</a:t>
+            </a:r>
+          </a:p>
+          <a:p>
+            <a:pPr fontAlgn="base">
+              <a:spcBef>
+                <a:spcPct val="0"/>
+              </a:spcBef>
+              <a:defRPr/>
+            </a:pPr>
+            <a:r>
+              <a:rPr lang="pt-BR" sz="1323" b="1" dirty="0">
+                <a:solidFill>
+                  <a:schemeClr val="tx1"/>
+                </a:solidFill>
+                <a:latin typeface="Exo 2 Medium" panose="00000600000000000000" pitchFamily="50" charset="0"/>
+                <a:cs typeface="Simplon BP Regular"/>
+              </a:rPr>
+              <a:t>#Caio </a:t>
+            </a:r>
+            <a:r>
+              <a:rPr lang="pt-BR" sz="1323" b="1" dirty="0" err="1">
+                <a:solidFill>
+                  <a:schemeClr val="tx1"/>
+                </a:solidFill>
+                <a:latin typeface="Exo 2 Medium" panose="00000600000000000000" pitchFamily="50" charset="0"/>
+                <a:cs typeface="Simplon BP Regular"/>
+              </a:rPr>
+              <a:t>Elcio</a:t>
+            </a:r>
+            <a:r>
+              <a:rPr lang="pt-BR" sz="1323" b="1" dirty="0">
+                <a:solidFill>
+                  <a:schemeClr val="tx1"/>
+                </a:solidFill>
+                <a:latin typeface="Exo 2 Medium" panose="00000600000000000000" pitchFamily="50" charset="0"/>
+                <a:cs typeface="Simplon BP Regular"/>
+              </a:rPr>
+              <a:t>                                                                                   #</a:t>
+            </a:r>
+            <a:r>
+              <a:rPr lang="pt-BR" sz="1323" dirty="0">
+                <a:solidFill>
+                  <a:schemeClr val="tx1"/>
+                </a:solidFill>
+                <a:latin typeface="Exo 2 Medium" panose="00000600000000000000" pitchFamily="50" charset="0"/>
+                <a:cs typeface="Simplon BP Regular"/>
+              </a:rPr>
+              <a:t>Luiz Gustavo</a:t>
+            </a:r>
+            <a:r>
+              <a:rPr lang="pt-BR" sz="1323" b="1" dirty="0">
+                <a:solidFill>
+                  <a:schemeClr val="tx1"/>
+                </a:solidFill>
+                <a:latin typeface="Exo 2 Medium" panose="00000600000000000000" pitchFamily="50" charset="0"/>
+                <a:cs typeface="Simplon BP Regular"/>
+              </a:rPr>
+              <a:t>    </a:t>
+            </a:r>
+          </a:p>
+        </p:txBody>
+      </p:sp>
+      <p:sp>
+        <p:nvSpPr>
+          <p:cNvPr id="33" name="Rectangle 43">
+            <a:extLst>
+              <a:ext uri="{FF2B5EF4-FFF2-40B4-BE49-F238E27FC236}">
+                <a16:creationId xmlns:a16="http://schemas.microsoft.com/office/drawing/2014/main" id="{F0F9D098-FF4D-4A23-BBE2-370207E68022}"/>
+              </a:ext>
+            </a:extLst>
+          </p:cNvPr>
+          <p:cNvSpPr>
+            <a:spLocks/>
+          </p:cNvSpPr>
+          <p:nvPr/>
+        </p:nvSpPr>
+        <p:spPr>
+          <a:xfrm>
+            <a:off x="512766" y="4500711"/>
+            <a:ext cx="12496525" cy="2808978"/>
+          </a:xfrm>
+          <a:prstGeom prst="rect">
+            <a:avLst/>
+          </a:prstGeom>
+          <a:noFill/>
+          <a:ln w="12700">
+            <a:solidFill>
+              <a:schemeClr val="bg1">
+                <a:lumMod val="50000"/>
+              </a:schemeClr>
+            </a:solidFill>
+          </a:ln>
+        </p:spPr>
+        <p:style>
+          <a:lnRef idx="2">
+            <a:schemeClr val="accent4"/>
+          </a:lnRef>
+          <a:fillRef idx="1">
+            <a:schemeClr val="lt1"/>
+          </a:fillRef>
+          <a:effectRef idx="0">
+            <a:schemeClr val="accent4"/>
+          </a:effectRef>
+          <a:fontRef idx="minor">
+            <a:schemeClr val="dk1"/>
+          </a:fontRef>
+        </p:style>
+        <p:txBody>
+          <a:bodyPr wrap="square" tIns="105844" numCol="3" rtlCol="0" anchor="t"/>
+          <a:lstStyle/>
+          <a:p>
+            <a:pPr marL="0" lvl="1" defTabSz="672130"/>
+            <a:r>
+              <a:rPr lang="pt-BR" sz="1323" b="1" dirty="0">
+                <a:solidFill>
+                  <a:schemeClr val="tx1"/>
+                </a:solidFill>
+                <a:latin typeface="Exo 2 Medium" panose="00000600000000000000" pitchFamily="50" charset="0"/>
+                <a:cs typeface="Simplon BP Regular"/>
+              </a:rPr>
+              <a:t>Implementar </a:t>
+            </a:r>
+            <a:r>
+              <a:rPr lang="pt-BR" sz="1323" b="1" dirty="0" err="1">
+                <a:solidFill>
+                  <a:schemeClr val="tx1"/>
+                </a:solidFill>
+                <a:latin typeface="Exo 2 Medium" panose="00000600000000000000" pitchFamily="50" charset="0"/>
+                <a:cs typeface="Simplon BP Regular"/>
+              </a:rPr>
+              <a:t>Chatbot</a:t>
+            </a:r>
+            <a:r>
+              <a:rPr lang="pt-BR" sz="1323" b="1" dirty="0">
+                <a:solidFill>
+                  <a:schemeClr val="tx1"/>
+                </a:solidFill>
+                <a:latin typeface="Exo 2 Medium" panose="00000600000000000000" pitchFamily="50" charset="0"/>
+                <a:cs typeface="Simplon BP Regular"/>
+              </a:rPr>
+              <a:t> no site</a:t>
+            </a:r>
+          </a:p>
+          <a:p>
+            <a:pPr marL="0" lvl="1" defTabSz="672130"/>
+            <a:r>
+              <a:rPr lang="pt-BR" sz="1323" b="1" dirty="0">
+                <a:solidFill>
+                  <a:schemeClr val="tx1"/>
+                </a:solidFill>
+                <a:latin typeface="Exo 2 Medium" panose="00000600000000000000" pitchFamily="50" charset="0"/>
+                <a:cs typeface="Simplon BP Regular"/>
+              </a:rPr>
+              <a:t>#</a:t>
+            </a:r>
+            <a:r>
+              <a:rPr lang="pt-BR" sz="1323" dirty="0">
+                <a:solidFill>
+                  <a:schemeClr val="tx1"/>
+                </a:solidFill>
+                <a:latin typeface="Exo 2 Medium" panose="00000600000000000000" pitchFamily="50" charset="0"/>
+                <a:cs typeface="Simplon BP Regular"/>
+              </a:rPr>
+              <a:t>João Oliveira</a:t>
+            </a:r>
+          </a:p>
+          <a:p>
+            <a:pPr marL="0" lvl="1" defTabSz="672130"/>
+            <a:endParaRPr lang="pt-BR" sz="1323" b="1" dirty="0">
+              <a:solidFill>
+                <a:schemeClr val="tx1"/>
+              </a:solidFill>
+              <a:latin typeface="Exo 2 Medium" panose="00000600000000000000" pitchFamily="50" charset="0"/>
+              <a:cs typeface="Simplon BP Regular"/>
+            </a:endParaRPr>
+          </a:p>
+          <a:p>
+            <a:pPr marL="0" lvl="1" defTabSz="672130"/>
+            <a:r>
+              <a:rPr lang="pt-BR" sz="1323" b="1" dirty="0">
+                <a:solidFill>
+                  <a:schemeClr val="tx1"/>
+                </a:solidFill>
+                <a:latin typeface="Exo 2 Medium" panose="00000600000000000000" pitchFamily="50" charset="0"/>
+                <a:cs typeface="Simplon BP Regular"/>
+              </a:rPr>
+              <a:t>Sistema após login em </a:t>
+            </a:r>
+            <a:r>
+              <a:rPr lang="pt-BR" sz="1323" b="1" dirty="0" err="1">
+                <a:solidFill>
+                  <a:schemeClr val="tx1"/>
+                </a:solidFill>
+                <a:latin typeface="Exo 2 Medium" panose="00000600000000000000" pitchFamily="50" charset="0"/>
+                <a:cs typeface="Simplon BP Regular"/>
+              </a:rPr>
+              <a:t>react</a:t>
+            </a:r>
+            <a:endParaRPr lang="pt-BR" sz="1323" b="1" dirty="0">
+              <a:solidFill>
+                <a:schemeClr val="tx1"/>
+              </a:solidFill>
+              <a:latin typeface="Exo 2 Medium" panose="00000600000000000000" pitchFamily="50" charset="0"/>
+              <a:cs typeface="Simplon BP Regular"/>
+            </a:endParaRPr>
+          </a:p>
+          <a:p>
+            <a:pPr marL="0" lvl="1" defTabSz="672130"/>
+            <a:r>
+              <a:rPr lang="pt-BR" sz="1323" b="1" dirty="0">
+                <a:solidFill>
+                  <a:schemeClr val="tx1"/>
+                </a:solidFill>
+                <a:latin typeface="Exo 2 Medium" panose="00000600000000000000" pitchFamily="50" charset="0"/>
+                <a:cs typeface="Simplon BP Regular"/>
+              </a:rPr>
+              <a:t>#Caio </a:t>
+            </a:r>
+            <a:r>
+              <a:rPr lang="pt-BR" sz="1323" b="1" dirty="0" err="1">
+                <a:solidFill>
+                  <a:schemeClr val="tx1"/>
+                </a:solidFill>
+                <a:latin typeface="Exo 2 Medium" panose="00000600000000000000" pitchFamily="50" charset="0"/>
+                <a:cs typeface="Simplon BP Regular"/>
+              </a:rPr>
+              <a:t>Elcio</a:t>
+            </a:r>
+            <a:endParaRPr lang="pt-BR" sz="1323" b="1" dirty="0">
+              <a:solidFill>
+                <a:schemeClr val="tx1"/>
+              </a:solidFill>
+              <a:latin typeface="Exo 2 Medium" panose="00000600000000000000" pitchFamily="50" charset="0"/>
+              <a:cs typeface="Simplon BP Regular"/>
+            </a:endParaRPr>
+          </a:p>
+          <a:p>
+            <a:pPr marL="0" lvl="1" defTabSz="672130"/>
+            <a:endParaRPr lang="pt-BR" sz="1323" b="1" dirty="0">
+              <a:solidFill>
+                <a:schemeClr val="tx1"/>
+              </a:solidFill>
+              <a:latin typeface="Exo 2 Medium" panose="00000600000000000000" pitchFamily="50" charset="0"/>
+              <a:cs typeface="Simplon BP Regular"/>
+            </a:endParaRPr>
+          </a:p>
+          <a:p>
+            <a:pPr marL="0" lvl="1" defTabSz="672130"/>
+            <a:r>
+              <a:rPr lang="pt-BR" sz="1323" b="1" dirty="0">
+                <a:solidFill>
+                  <a:schemeClr val="tx1"/>
+                </a:solidFill>
+                <a:latin typeface="Exo 2 Medium" panose="00000600000000000000" pitchFamily="50" charset="0"/>
+                <a:cs typeface="Simplon BP Regular"/>
+              </a:rPr>
+              <a:t>Finalizar OAT</a:t>
+            </a:r>
+          </a:p>
+          <a:p>
+            <a:pPr marL="0" lvl="1" defTabSz="672130"/>
+            <a:r>
+              <a:rPr lang="pt-BR" sz="1323" b="1" dirty="0">
+                <a:solidFill>
+                  <a:schemeClr val="tx1"/>
+                </a:solidFill>
+                <a:latin typeface="Exo 2 Medium" panose="00000600000000000000" pitchFamily="50" charset="0"/>
+                <a:cs typeface="Simplon BP Regular"/>
+              </a:rPr>
+              <a:t>#Lucas Ferreira</a:t>
+            </a:r>
+          </a:p>
+          <a:p>
+            <a:pPr marL="0" lvl="1" defTabSz="672130"/>
+            <a:endParaRPr lang="pt-BR" sz="1323" b="1" dirty="0">
+              <a:solidFill>
+                <a:schemeClr val="tx1"/>
+              </a:solidFill>
+              <a:latin typeface="Exo 2 Medium" panose="00000600000000000000" pitchFamily="50" charset="0"/>
+              <a:cs typeface="Simplon BP Regular"/>
+            </a:endParaRPr>
+          </a:p>
+          <a:p>
+            <a:pPr marL="0" lvl="1" defTabSz="672130"/>
+            <a:endParaRPr lang="pt-BR" sz="1323" b="1" dirty="0">
+              <a:solidFill>
+                <a:schemeClr val="tx1"/>
+              </a:solidFill>
+              <a:latin typeface="Exo 2 Medium" panose="00000600000000000000" pitchFamily="50" charset="0"/>
+              <a:cs typeface="Simplon BP Regular"/>
+            </a:endParaRPr>
+          </a:p>
+          <a:p>
+            <a:pPr marL="0" lvl="1" defTabSz="672130"/>
+            <a:r>
+              <a:rPr lang="pt-BR" sz="1323" b="1" dirty="0">
+                <a:solidFill>
+                  <a:schemeClr val="tx1"/>
+                </a:solidFill>
+                <a:latin typeface="Exo 2 Medium" panose="00000600000000000000" pitchFamily="50" charset="0"/>
+                <a:cs typeface="Simplon BP Regular"/>
+              </a:rPr>
+              <a:t>Finalizar telas de perfil(</a:t>
+            </a:r>
+            <a:r>
+              <a:rPr lang="pt-BR" sz="1323" b="1" dirty="0" err="1">
+                <a:solidFill>
+                  <a:schemeClr val="tx1"/>
+                </a:solidFill>
+                <a:latin typeface="Exo 2 Medium" panose="00000600000000000000" pitchFamily="50" charset="0"/>
+                <a:cs typeface="Simplon BP Regular"/>
+              </a:rPr>
+              <a:t>Dev</a:t>
+            </a:r>
+            <a:r>
+              <a:rPr lang="pt-BR" sz="1323" b="1" dirty="0">
+                <a:solidFill>
+                  <a:schemeClr val="tx1"/>
+                </a:solidFill>
+                <a:latin typeface="Exo 2 Medium" panose="00000600000000000000" pitchFamily="50" charset="0"/>
+                <a:cs typeface="Simplon BP Regular"/>
+              </a:rPr>
+              <a:t> e Investidor)</a:t>
+            </a:r>
+          </a:p>
+          <a:p>
+            <a:pPr marL="0" lvl="1" defTabSz="672130"/>
+            <a:r>
+              <a:rPr lang="pt-BR" sz="1323" b="1" dirty="0">
+                <a:solidFill>
+                  <a:schemeClr val="tx1"/>
+                </a:solidFill>
+                <a:latin typeface="Exo 2 Medium" panose="00000600000000000000" pitchFamily="50" charset="0"/>
+                <a:cs typeface="Simplon BP Regular"/>
+              </a:rPr>
+              <a:t>#Lucas Felix</a:t>
+            </a:r>
+          </a:p>
+          <a:p>
+            <a:pPr marL="0" lvl="1" defTabSz="672130"/>
+            <a:endParaRPr lang="pt-BR" sz="1323" b="1" dirty="0">
+              <a:solidFill>
+                <a:schemeClr val="tx1"/>
+              </a:solidFill>
+              <a:latin typeface="Exo 2 Medium" panose="00000600000000000000" pitchFamily="50" charset="0"/>
+              <a:cs typeface="Simplon BP Regular"/>
+            </a:endParaRPr>
+          </a:p>
+          <a:p>
+            <a:pPr marL="0" lvl="1" defTabSz="672130"/>
+            <a:r>
+              <a:rPr lang="pt-BR" sz="1323" b="1" dirty="0">
+                <a:solidFill>
+                  <a:schemeClr val="tx1"/>
+                </a:solidFill>
+                <a:latin typeface="Exo 2 Medium" panose="00000600000000000000" pitchFamily="50" charset="0"/>
+                <a:cs typeface="Simplon BP Regular"/>
+              </a:rPr>
+              <a:t>Melhoria do CRUD e do login/</a:t>
+            </a:r>
+            <a:r>
+              <a:rPr lang="pt-BR" sz="1323" b="1" dirty="0" err="1">
+                <a:solidFill>
+                  <a:schemeClr val="tx1"/>
+                </a:solidFill>
+                <a:latin typeface="Exo 2 Medium" panose="00000600000000000000" pitchFamily="50" charset="0"/>
+                <a:cs typeface="Simplon BP Regular"/>
+              </a:rPr>
+              <a:t>logoff</a:t>
+            </a:r>
+            <a:r>
+              <a:rPr lang="pt-BR" sz="1323" b="1" dirty="0">
+                <a:solidFill>
+                  <a:schemeClr val="tx1"/>
+                </a:solidFill>
+                <a:latin typeface="Exo 2 Medium" panose="00000600000000000000" pitchFamily="50" charset="0"/>
+                <a:cs typeface="Simplon BP Regular"/>
+              </a:rPr>
+              <a:t>.</a:t>
+            </a:r>
+          </a:p>
+          <a:p>
+            <a:pPr marL="0" lvl="1" defTabSz="672130"/>
+            <a:r>
+              <a:rPr lang="pt-BR" sz="1323" b="1" dirty="0">
+                <a:solidFill>
+                  <a:schemeClr val="tx1"/>
+                </a:solidFill>
+                <a:latin typeface="Exo 2 Medium" panose="00000600000000000000" pitchFamily="50" charset="0"/>
+                <a:cs typeface="Simplon BP Regular"/>
+              </a:rPr>
+              <a:t>#Luiz Gustavo</a:t>
+            </a:r>
+          </a:p>
+          <a:p>
+            <a:pPr marL="0" lvl="1" defTabSz="672130"/>
+            <a:endParaRPr lang="pt-BR" sz="1323" b="1" dirty="0">
+              <a:solidFill>
+                <a:schemeClr val="tx1"/>
+              </a:solidFill>
+              <a:latin typeface="Exo 2 Medium" panose="00000600000000000000" pitchFamily="50" charset="0"/>
+              <a:cs typeface="Simplon BP Regular"/>
+            </a:endParaRPr>
+          </a:p>
+        </p:txBody>
+      </p:sp>
+      <p:sp>
+        <p:nvSpPr>
+          <p:cNvPr id="34" name="Oval 134">
+            <a:extLst>
+              <a:ext uri="{FF2B5EF4-FFF2-40B4-BE49-F238E27FC236}">
+                <a16:creationId xmlns:a16="http://schemas.microsoft.com/office/drawing/2014/main" id="{B57AA8A8-84FD-48DE-BA43-08D253C6F275}"/>
+              </a:ext>
+            </a:extLst>
+          </p:cNvPr>
+          <p:cNvSpPr>
+            <a:spLocks noChangeAspect="1"/>
+          </p:cNvSpPr>
+          <p:nvPr/>
+        </p:nvSpPr>
+        <p:spPr>
+          <a:xfrm>
+            <a:off x="9225955" y="297930"/>
+            <a:ext cx="211404" cy="211689"/>
+          </a:xfrm>
+          <a:prstGeom prst="ellipse">
+            <a:avLst/>
+          </a:prstGeom>
+          <a:solidFill>
+            <a:srgbClr val="1BCF13"/>
+          </a:solidFill>
+          <a:ln w="12700">
+            <a:solidFill>
+              <a:schemeClr val="accent3"/>
+            </a:solidFill>
+          </a:ln>
+        </p:spPr>
+        <p:style>
+          <a:lnRef idx="2">
+            <a:schemeClr val="accent1">
+              <a:shade val="50000"/>
+            </a:schemeClr>
+          </a:lnRef>
+          <a:fillRef idx="1">
+            <a:schemeClr val="accent1"/>
+          </a:fillRef>
+          <a:effectRef idx="0">
+            <a:schemeClr val="accent1"/>
+          </a:effectRef>
+          <a:fontRef idx="minor">
+            <a:schemeClr val="lt1"/>
+          </a:fontRef>
+        </p:style>
+        <p:txBody>
+          <a:bodyPr wrap="none" lIns="52922" tIns="52922" rIns="52922" rtlCol="0" anchor="ctr"/>
+          <a:lstStyle/>
+          <a:p>
+            <a:pPr algn="ctr" defTabSz="672130"/>
+            <a:endParaRPr lang="en-US" sz="1176" dirty="0">
+              <a:solidFill>
+                <a:srgbClr val="00B050"/>
+              </a:solidFill>
+              <a:latin typeface="Exo 2 Medium" panose="00000600000000000000" pitchFamily="50" charset="0"/>
+              <a:cs typeface="Simplon BP Regular"/>
+            </a:endParaRPr>
+          </a:p>
+        </p:txBody>
+      </p:sp>
+      <p:sp>
+        <p:nvSpPr>
+          <p:cNvPr id="35" name="Oval 120">
+            <a:extLst>
+              <a:ext uri="{FF2B5EF4-FFF2-40B4-BE49-F238E27FC236}">
+                <a16:creationId xmlns:a16="http://schemas.microsoft.com/office/drawing/2014/main" id="{DAAADCBD-ECD9-4B5D-A8E0-075FB6F9BED7}"/>
+              </a:ext>
+            </a:extLst>
+          </p:cNvPr>
+          <p:cNvSpPr>
+            <a:spLocks noChangeAspect="1"/>
+          </p:cNvSpPr>
+          <p:nvPr/>
+        </p:nvSpPr>
+        <p:spPr>
+          <a:xfrm>
+            <a:off x="10188056" y="297930"/>
+            <a:ext cx="211404" cy="211689"/>
+          </a:xfrm>
+          <a:prstGeom prst="ellipse">
+            <a:avLst/>
+          </a:prstGeom>
+          <a:solidFill>
+            <a:srgbClr val="1BCF13"/>
+          </a:solidFill>
+          <a:ln w="12700">
+            <a:solidFill>
+              <a:schemeClr val="accent3"/>
+            </a:solidFill>
+          </a:ln>
+        </p:spPr>
+        <p:style>
+          <a:lnRef idx="2">
+            <a:schemeClr val="accent1">
+              <a:shade val="50000"/>
+            </a:schemeClr>
+          </a:lnRef>
+          <a:fillRef idx="1">
+            <a:schemeClr val="accent1"/>
+          </a:fillRef>
+          <a:effectRef idx="0">
+            <a:schemeClr val="accent1"/>
+          </a:effectRef>
+          <a:fontRef idx="minor">
+            <a:schemeClr val="lt1"/>
+          </a:fontRef>
+        </p:style>
+        <p:txBody>
+          <a:bodyPr wrap="none" lIns="52922" tIns="52922" rIns="52922" rtlCol="0" anchor="ctr"/>
+          <a:lstStyle/>
+          <a:p>
+            <a:pPr algn="ctr" defTabSz="672130"/>
+            <a:endParaRPr lang="en-US" sz="1176" dirty="0">
+              <a:solidFill>
+                <a:srgbClr val="1BCF13"/>
+              </a:solidFill>
+              <a:latin typeface="Exo 2 Medium" panose="00000600000000000000" pitchFamily="50" charset="0"/>
+              <a:cs typeface="Simplon BP Regular"/>
+            </a:endParaRPr>
+          </a:p>
+        </p:txBody>
+      </p:sp>
+      <p:sp>
+        <p:nvSpPr>
+          <p:cNvPr id="36" name="Retângulo 35">
+            <a:extLst>
+              <a:ext uri="{FF2B5EF4-FFF2-40B4-BE49-F238E27FC236}">
+                <a16:creationId xmlns:a16="http://schemas.microsoft.com/office/drawing/2014/main" id="{A87B1CA7-18E0-459A-8B40-B30CC45C209A}"/>
+              </a:ext>
+            </a:extLst>
+          </p:cNvPr>
+          <p:cNvSpPr/>
+          <p:nvPr/>
+        </p:nvSpPr>
+        <p:spPr>
+          <a:xfrm>
+            <a:off x="8017619" y="209534"/>
+            <a:ext cx="4937689" cy="618769"/>
+          </a:xfrm>
+          <a:prstGeom prst="rect">
+            <a:avLst/>
+          </a:prstGeom>
+          <a:noFill/>
+          <a:ln w="6350">
+            <a:solidFill>
+              <a:schemeClr val="bg1">
+                <a:lumMod val="75000"/>
+              </a:schemeClr>
+            </a:solidFill>
+          </a:ln>
+        </p:spPr>
+        <p:style>
+          <a:lnRef idx="2">
+            <a:schemeClr val="accent1">
+              <a:shade val="50000"/>
+            </a:schemeClr>
+          </a:lnRef>
+          <a:fillRef idx="1">
+            <a:schemeClr val="accent1"/>
+          </a:fillRef>
+          <a:effectRef idx="0">
+            <a:schemeClr val="accent1"/>
+          </a:effectRef>
+          <a:fontRef idx="minor">
+            <a:schemeClr val="lt1"/>
+          </a:fontRef>
+        </p:style>
+        <p:txBody>
+          <a:bodyPr rtlCol="0" anchor="ctr"/>
+          <a:lstStyle/>
+          <a:p>
+            <a:pPr algn="ctr"/>
+            <a:endParaRPr lang="pt-BR">
+              <a:latin typeface="Exo 2 Medium" panose="00000600000000000000" pitchFamily="50" charset="0"/>
+            </a:endParaRPr>
+          </a:p>
+        </p:txBody>
+      </p:sp>
+      <p:sp>
+        <p:nvSpPr>
+          <p:cNvPr id="37" name="TextBox 138">
+            <a:extLst>
+              <a:ext uri="{FF2B5EF4-FFF2-40B4-BE49-F238E27FC236}">
+                <a16:creationId xmlns:a16="http://schemas.microsoft.com/office/drawing/2014/main" id="{41B46BEE-7CCD-459E-800A-B6E0E71F7FC7}"/>
+              </a:ext>
+            </a:extLst>
+          </p:cNvPr>
+          <p:cNvSpPr txBox="1"/>
+          <p:nvPr/>
+        </p:nvSpPr>
+        <p:spPr>
+          <a:xfrm>
+            <a:off x="9715810" y="51570"/>
+            <a:ext cx="1478088" cy="211688"/>
+          </a:xfrm>
+          <a:prstGeom prst="rect">
+            <a:avLst/>
+          </a:prstGeom>
+          <a:solidFill>
+            <a:schemeClr val="bg1"/>
+          </a:solidFill>
+          <a:ln w="12700">
+            <a:noFill/>
+          </a:ln>
+        </p:spPr>
+        <p:style>
+          <a:lnRef idx="2">
+            <a:schemeClr val="accent4"/>
+          </a:lnRef>
+          <a:fillRef idx="1">
+            <a:schemeClr val="lt1"/>
+          </a:fillRef>
+          <a:effectRef idx="0">
+            <a:schemeClr val="accent4"/>
+          </a:effectRef>
+          <a:fontRef idx="minor">
+            <a:schemeClr val="dk1"/>
+          </a:fontRef>
+        </p:style>
+        <p:txBody>
+          <a:bodyPr wrap="none" lIns="52922" tIns="52922" rIns="52922" bIns="0" rtlCol="0" anchor="b"/>
+          <a:lstStyle>
+            <a:defPPr>
+              <a:defRPr lang="en-US"/>
+            </a:defPPr>
+            <a:lvl1pPr algn="ctr">
+              <a:defRPr sz="1000" b="1">
+                <a:latin typeface="Simplon BP Regular"/>
+                <a:cs typeface="Simplon BP Regular"/>
+              </a:defRPr>
+            </a:lvl1pPr>
+            <a:lvl2pPr>
+              <a:defRPr>
+                <a:solidFill>
+                  <a:schemeClr val="dk1"/>
+                </a:solidFill>
+              </a:defRPr>
+            </a:lvl2pPr>
+            <a:lvl3pPr>
+              <a:defRPr>
+                <a:solidFill>
+                  <a:schemeClr val="dk1"/>
+                </a:solidFill>
+              </a:defRPr>
+            </a:lvl3pPr>
+            <a:lvl4pPr>
+              <a:defRPr>
+                <a:solidFill>
+                  <a:schemeClr val="dk1"/>
+                </a:solidFill>
+              </a:defRPr>
+            </a:lvl4pPr>
+            <a:lvl5pPr>
+              <a:defRPr>
+                <a:solidFill>
+                  <a:schemeClr val="dk1"/>
+                </a:solidFill>
+              </a:defRPr>
+            </a:lvl5pPr>
+            <a:lvl6pPr>
+              <a:defRPr>
+                <a:solidFill>
+                  <a:schemeClr val="dk1"/>
+                </a:solidFill>
+              </a:defRPr>
+            </a:lvl6pPr>
+            <a:lvl7pPr>
+              <a:defRPr>
+                <a:solidFill>
+                  <a:schemeClr val="dk1"/>
+                </a:solidFill>
+              </a:defRPr>
+            </a:lvl7pPr>
+            <a:lvl8pPr>
+              <a:defRPr>
+                <a:solidFill>
+                  <a:schemeClr val="dk1"/>
+                </a:solidFill>
+              </a:defRPr>
+            </a:lvl8pPr>
+            <a:lvl9pPr>
+              <a:defRPr>
+                <a:solidFill>
+                  <a:schemeClr val="dk1"/>
+                </a:solidFill>
+              </a:defRPr>
+            </a:lvl9pPr>
+          </a:lstStyle>
+          <a:p>
+            <a:pPr defTabSz="672130"/>
+            <a:r>
+              <a:rPr lang="en-US" sz="1176" dirty="0">
+                <a:solidFill>
+                  <a:srgbClr val="08276B"/>
+                </a:solidFill>
+                <a:latin typeface="Exo 2 Medium" panose="00000600000000000000" pitchFamily="50" charset="0"/>
+              </a:rPr>
+              <a:t>    </a:t>
+            </a:r>
+            <a:r>
+              <a:rPr lang="en-US" sz="1176" dirty="0" err="1">
+                <a:solidFill>
+                  <a:srgbClr val="08276B"/>
+                </a:solidFill>
+                <a:latin typeface="Exo 2 Medium" panose="00000600000000000000" pitchFamily="50" charset="0"/>
+              </a:rPr>
+              <a:t>Farol</a:t>
+            </a:r>
+            <a:r>
+              <a:rPr lang="en-US" sz="1176" dirty="0">
+                <a:solidFill>
+                  <a:srgbClr val="08276B"/>
+                </a:solidFill>
+                <a:latin typeface="Exo 2 Medium" panose="00000600000000000000" pitchFamily="50" charset="0"/>
+              </a:rPr>
+              <a:t> do </a:t>
+            </a:r>
+            <a:r>
+              <a:rPr lang="en-US" sz="1176" dirty="0" err="1">
+                <a:solidFill>
+                  <a:srgbClr val="08276B"/>
+                </a:solidFill>
+                <a:latin typeface="Exo 2 Medium" panose="00000600000000000000" pitchFamily="50" charset="0"/>
+              </a:rPr>
+              <a:t>Projeto</a:t>
+            </a:r>
+            <a:r>
+              <a:rPr lang="en-US" sz="1176" dirty="0">
+                <a:solidFill>
+                  <a:srgbClr val="08276B"/>
+                </a:solidFill>
+                <a:latin typeface="Exo 2 Medium" panose="00000600000000000000" pitchFamily="50" charset="0"/>
+              </a:rPr>
+              <a:t>   </a:t>
+            </a:r>
+          </a:p>
+        </p:txBody>
+      </p:sp>
+      <p:sp>
+        <p:nvSpPr>
+          <p:cNvPr id="38" name="Oval 134">
+            <a:extLst>
+              <a:ext uri="{FF2B5EF4-FFF2-40B4-BE49-F238E27FC236}">
+                <a16:creationId xmlns:a16="http://schemas.microsoft.com/office/drawing/2014/main" id="{AC71B70F-2DA1-4D18-9AC0-DCFDF0FE0D5C}"/>
+              </a:ext>
+            </a:extLst>
+          </p:cNvPr>
+          <p:cNvSpPr>
+            <a:spLocks noChangeAspect="1"/>
+          </p:cNvSpPr>
+          <p:nvPr/>
+        </p:nvSpPr>
+        <p:spPr>
+          <a:xfrm>
+            <a:off x="12166910" y="328582"/>
+            <a:ext cx="211404" cy="211689"/>
+          </a:xfrm>
+          <a:prstGeom prst="ellipse">
+            <a:avLst/>
+          </a:prstGeom>
+          <a:solidFill>
+            <a:srgbClr val="1BCF13"/>
+          </a:solidFill>
+          <a:ln w="12700">
+            <a:solidFill>
+              <a:schemeClr val="accent3"/>
+            </a:solidFill>
+          </a:ln>
+        </p:spPr>
+        <p:style>
+          <a:lnRef idx="2">
+            <a:schemeClr val="accent1">
+              <a:shade val="50000"/>
+            </a:schemeClr>
+          </a:lnRef>
+          <a:fillRef idx="1">
+            <a:schemeClr val="accent1"/>
+          </a:fillRef>
+          <a:effectRef idx="0">
+            <a:schemeClr val="accent1"/>
+          </a:effectRef>
+          <a:fontRef idx="minor">
+            <a:schemeClr val="lt1"/>
+          </a:fontRef>
+        </p:style>
+        <p:txBody>
+          <a:bodyPr wrap="none" lIns="52922" tIns="52922" rIns="52922" rtlCol="0" anchor="ctr"/>
+          <a:lstStyle/>
+          <a:p>
+            <a:pPr algn="ctr" defTabSz="672130"/>
+            <a:endParaRPr lang="en-US" sz="1176" dirty="0">
+              <a:solidFill>
+                <a:srgbClr val="FFC000"/>
+              </a:solidFill>
+              <a:latin typeface="Exo 2 Medium" panose="00000600000000000000" pitchFamily="50" charset="0"/>
+              <a:cs typeface="Simplon BP Regular"/>
+            </a:endParaRPr>
+          </a:p>
+        </p:txBody>
+      </p:sp>
+    </p:spTree>
+    <p:extLst>
+      <p:ext uri="{BB962C8B-B14F-4D97-AF65-F5344CB8AC3E}">
+        <p14:creationId xmlns:p14="http://schemas.microsoft.com/office/powerpoint/2010/main" val="581679171"/>
       </p:ext>
     </p:extLst>
   </p:cSld>
@@ -37455,15 +39962,6 @@
 </file>
 
 <file path=customXml/item2.xml><?xml version="1.0" encoding="utf-8"?>
-<?mso-contentType ?>
-<FormTemplates xmlns="http://schemas.microsoft.com/sharepoint/v3/contenttype/forms">
-  <Display>DocumentLibraryForm</Display>
-  <Edit>DocumentLibraryForm</Edit>
-  <New>DocumentLibraryForm</New>
-</FormTemplates>
-</file>
-
-<file path=customXml/item3.xml><?xml version="1.0" encoding="utf-8"?>
 <ct:contentTypeSchema xmlns:ct="http://schemas.microsoft.com/office/2006/metadata/contentType" xmlns:ma="http://schemas.microsoft.com/office/2006/metadata/properties/metaAttributes" ct:_="" ma:_="" ma:contentTypeName="Document" ma:contentTypeID="0x0101007F8ECE7139958D46ABEDA89D12B90CBF" ma:contentTypeVersion="0" ma:contentTypeDescription="Create a new document." ma:contentTypeScope="" ma:versionID="e6d660081116f63565d30cc13099d5ec">
   <xsd:schema xmlns:xsd="http://www.w3.org/2001/XMLSchema" xmlns:xs="http://www.w3.org/2001/XMLSchema" xmlns:p="http://schemas.microsoft.com/office/2006/metadata/properties" targetNamespace="http://schemas.microsoft.com/office/2006/metadata/properties" ma:root="true" ma:fieldsID="d413257cd9829394d17656a545d5fa4e">
     <xsd:element name="properties">
@@ -37577,6 +40075,15 @@
 </ct:contentTypeSchema>
 </file>
 
+<file path=customXml/item3.xml><?xml version="1.0" encoding="utf-8"?>
+<?mso-contentType ?>
+<FormTemplates xmlns="http://schemas.microsoft.com/sharepoint/v3/contenttype/forms">
+  <Display>DocumentLibraryForm</Display>
+  <Edit>DocumentLibraryForm</Edit>
+  <New>DocumentLibraryForm</New>
+</FormTemplates>
+</file>
+
 <file path=customXml/itemProps1.xml><?xml version="1.0" encoding="utf-8"?>
 <ds:datastoreItem xmlns:ds="http://schemas.openxmlformats.org/officeDocument/2006/customXml" ds:itemID="{4B31267F-D399-4A8A-87F8-B75F56828412}">
   <ds:schemaRefs>
@@ -37595,14 +40102,6 @@
 </file>
 
 <file path=customXml/itemProps2.xml><?xml version="1.0" encoding="utf-8"?>
-<ds:datastoreItem xmlns:ds="http://schemas.openxmlformats.org/officeDocument/2006/customXml" ds:itemID="{E2481852-F24E-4532-AF30-C154D705D105}">
-  <ds:schemaRefs>
-    <ds:schemaRef ds:uri="http://schemas.microsoft.com/sharepoint/v3/contenttype/forms"/>
-  </ds:schemaRefs>
-</ds:datastoreItem>
-</file>
-
-<file path=customXml/itemProps3.xml><?xml version="1.0" encoding="utf-8"?>
 <ds:datastoreItem xmlns:ds="http://schemas.openxmlformats.org/officeDocument/2006/customXml" ds:itemID="{EFDE92A4-5D2A-451A-A373-EB014CDC0D59}">
   <ds:schemaRefs>
     <ds:schemaRef ds:uri="http://schemas.microsoft.com/office/2006/metadata/contentType"/>
@@ -37616,4 +40115,12 @@
     <ds:schemaRef ds:uri="http://schemas.microsoft.com/office/infopath/2007/PartnerControls"/>
   </ds:schemaRefs>
 </ds:datastoreItem>
+</file>
+
+<file path=customXml/itemProps3.xml><?xml version="1.0" encoding="utf-8"?>
+<ds:datastoreItem xmlns:ds="http://schemas.openxmlformats.org/officeDocument/2006/customXml" ds:itemID="{E2481852-F24E-4532-AF30-C154D705D105}">
+  <ds:schemaRefs>
+    <ds:schemaRef ds:uri="http://schemas.microsoft.com/sharepoint/v3/contenttype/forms"/>
+  </ds:schemaRefs>
+</ds:datastoreItem>
 </file>
</xml_diff>

<commit_message>
Adiciona atualização do Status report semana 11
</commit_message>
<xml_diff>
--- a/Documentos/Status Report/StatusReport.pptx
+++ b/Documentos/Status Report/StatusReport.pptx
@@ -7,10 +7,10 @@
     <p:sldMasterId id="2147483665" r:id="rId6"/>
   </p:sldMasterIdLst>
   <p:notesMasterIdLst>
-    <p:notesMasterId r:id="rId18"/>
+    <p:notesMasterId r:id="rId19"/>
   </p:notesMasterIdLst>
   <p:handoutMasterIdLst>
-    <p:handoutMasterId r:id="rId19"/>
+    <p:handoutMasterId r:id="rId20"/>
   </p:handoutMasterIdLst>
   <p:sldIdLst>
     <p:sldId id="472" r:id="rId7"/>
@@ -24,6 +24,7 @@
     <p:sldId id="479" r:id="rId15"/>
     <p:sldId id="256" r:id="rId16"/>
     <p:sldId id="480" r:id="rId17"/>
+    <p:sldId id="481" r:id="rId18"/>
   </p:sldIdLst>
   <p:sldSz cx="13442950" cy="7561263"/>
   <p:notesSz cx="7104063" cy="10234613"/>
@@ -141,6 +142,7 @@
             <p14:sldId id="479"/>
             <p14:sldId id="256"/>
             <p14:sldId id="480"/>
+            <p14:sldId id="481"/>
           </p14:sldIdLst>
         </p14:section>
       </p14:sectionLst>
@@ -254,7 +256,7 @@
             <a:fld id="{C3CD65D1-5C11-455D-9F9A-0E035F00A0DA}" type="datetimeFigureOut">
               <a:rPr lang="pt-BR" smtClean="0"/>
               <a:pPr/>
-              <a:t>03/11/2021</a:t>
+              <a:t>10/11/2021</a:t>
             </a:fld>
             <a:endParaRPr lang="pt-BR"/>
           </a:p>
@@ -422,7 +424,7 @@
             <a:fld id="{A05DA3EF-18EA-43DE-B1BB-402A3C558822}" type="datetimeFigureOut">
               <a:rPr lang="pt-BR" smtClean="0"/>
               <a:pPr/>
-              <a:t>03/11/2021</a:t>
+              <a:t>10/11/2021</a:t>
             </a:fld>
             <a:endParaRPr lang="pt-BR"/>
           </a:p>
@@ -20282,7 +20284,7 @@
           <a:p>
             <a:fld id="{B63D1FDA-9627-42C2-B20E-477EB9193F18}" type="datetimeFigureOut">
               <a:rPr lang="pt-BR" smtClean="0"/>
-              <a:t>03/11/2021</a:t>
+              <a:t>10/11/2021</a:t>
             </a:fld>
             <a:endParaRPr lang="pt-BR"/>
           </a:p>
@@ -23624,6 +23626,2262 @@
     <p:extLst>
       <p:ext uri="{BB962C8B-B14F-4D97-AF65-F5344CB8AC3E}">
         <p14:creationId xmlns:p14="http://schemas.microsoft.com/office/powerpoint/2010/main" val="581679171"/>
+      </p:ext>
+    </p:extLst>
+  </p:cSld>
+  <p:clrMapOvr>
+    <a:masterClrMapping/>
+  </p:clrMapOvr>
+</p:sld>
+</file>
+
+<file path=ppt/slides/slide12.xml><?xml version="1.0" encoding="utf-8"?>
+<p:sld xmlns:a="http://schemas.openxmlformats.org/drawingml/2006/main" xmlns:r="http://schemas.openxmlformats.org/officeDocument/2006/relationships" xmlns:p="http://schemas.openxmlformats.org/presentationml/2006/main">
+  <p:cSld>
+    <p:spTree>
+      <p:nvGrpSpPr>
+        <p:cNvPr id="1" name=""/>
+        <p:cNvGrpSpPr/>
+        <p:nvPr/>
+      </p:nvGrpSpPr>
+      <p:grpSpPr>
+        <a:xfrm>
+          <a:off x="0" y="0"/>
+          <a:ext cx="0" cy="0"/>
+          <a:chOff x="0" y="0"/>
+          <a:chExt cx="0" cy="0"/>
+        </a:xfrm>
+      </p:grpSpPr>
+      <p:sp>
+        <p:nvSpPr>
+          <p:cNvPr id="3" name="Espaço Reservado para Número de Slide 2">
+            <a:extLst>
+              <a:ext uri="{FF2B5EF4-FFF2-40B4-BE49-F238E27FC236}">
+                <a16:creationId xmlns:a16="http://schemas.microsoft.com/office/drawing/2014/main" id="{25E66A94-914F-497A-A098-71B8A170A7DE}"/>
+              </a:ext>
+            </a:extLst>
+          </p:cNvPr>
+          <p:cNvSpPr>
+            <a:spLocks noGrp="1"/>
+          </p:cNvSpPr>
+          <p:nvPr>
+            <p:ph type="sldNum" sz="quarter" idx="4"/>
+          </p:nvPr>
+        </p:nvSpPr>
+        <p:spPr/>
+        <p:txBody>
+          <a:bodyPr/>
+          <a:lstStyle/>
+          <a:p>
+            <a:fld id="{74850952-3374-434C-8FC6-DE28F8CD25B0}" type="slidenum">
+              <a:rPr lang="pt-BR" smtClean="0">
+                <a:solidFill>
+                  <a:prstClr val="black">
+                    <a:tint val="75000"/>
+                  </a:prstClr>
+                </a:solidFill>
+              </a:rPr>
+              <a:pPr/>
+              <a:t>12</a:t>
+            </a:fld>
+            <a:endParaRPr lang="pt-BR" dirty="0">
+              <a:solidFill>
+                <a:prstClr val="black">
+                  <a:tint val="75000"/>
+                </a:prstClr>
+              </a:solidFill>
+            </a:endParaRPr>
+          </a:p>
+        </p:txBody>
+      </p:sp>
+      <p:sp>
+        <p:nvSpPr>
+          <p:cNvPr id="20" name="Rectangle 42">
+            <a:extLst>
+              <a:ext uri="{FF2B5EF4-FFF2-40B4-BE49-F238E27FC236}">
+                <a16:creationId xmlns:a16="http://schemas.microsoft.com/office/drawing/2014/main" id="{D56D5B31-1798-4A73-939D-5495975295D4}"/>
+              </a:ext>
+            </a:extLst>
+          </p:cNvPr>
+          <p:cNvSpPr/>
+          <p:nvPr/>
+        </p:nvSpPr>
+        <p:spPr>
+          <a:xfrm>
+            <a:off x="6804884" y="1106495"/>
+            <a:ext cx="6204408" cy="2962168"/>
+          </a:xfrm>
+          <a:prstGeom prst="rect">
+            <a:avLst/>
+          </a:prstGeom>
+          <a:noFill/>
+          <a:ln w="12700">
+            <a:solidFill>
+              <a:schemeClr val="bg1">
+                <a:lumMod val="50000"/>
+              </a:schemeClr>
+            </a:solidFill>
+          </a:ln>
+        </p:spPr>
+        <p:style>
+          <a:lnRef idx="2">
+            <a:schemeClr val="accent4"/>
+          </a:lnRef>
+          <a:fillRef idx="1">
+            <a:schemeClr val="lt1"/>
+          </a:fillRef>
+          <a:effectRef idx="0">
+            <a:schemeClr val="accent4"/>
+          </a:effectRef>
+          <a:fontRef idx="minor">
+            <a:schemeClr val="dk1"/>
+          </a:fontRef>
+        </p:style>
+        <p:txBody>
+          <a:bodyPr tIns="105844" rtlCol="0" anchor="t"/>
+          <a:lstStyle/>
+          <a:p>
+            <a:pPr defTabSz="672130">
+              <a:spcAft>
+                <a:spcPts val="882"/>
+              </a:spcAft>
+            </a:pPr>
+            <a:endParaRPr lang="pt-BR" sz="1470" dirty="0">
+              <a:solidFill>
+                <a:schemeClr val="tx1"/>
+              </a:solidFill>
+              <a:latin typeface="Exo 2 Medium" panose="00000600000000000000" pitchFamily="50" charset="0"/>
+              <a:cs typeface="Simplon BP Regular"/>
+            </a:endParaRPr>
+          </a:p>
+        </p:txBody>
+      </p:sp>
+      <p:sp>
+        <p:nvSpPr>
+          <p:cNvPr id="21" name="Title 2">
+            <a:extLst>
+              <a:ext uri="{FF2B5EF4-FFF2-40B4-BE49-F238E27FC236}">
+                <a16:creationId xmlns:a16="http://schemas.microsoft.com/office/drawing/2014/main" id="{C488E075-24DD-4CAC-A846-48FBDF28D797}"/>
+              </a:ext>
+            </a:extLst>
+          </p:cNvPr>
+          <p:cNvSpPr>
+            <a:spLocks noGrp="1"/>
+          </p:cNvSpPr>
+          <p:nvPr>
+            <p:ph type="title"/>
+          </p:nvPr>
+        </p:nvSpPr>
+        <p:spPr>
+          <a:xfrm>
+            <a:off x="469692" y="185232"/>
+            <a:ext cx="12098020" cy="800352"/>
+          </a:xfrm>
+        </p:spPr>
+        <p:txBody>
+          <a:bodyPr vert="horz" wrap="square" lIns="105844" tIns="0" rIns="105844" bIns="0" numCol="1" anchor="t" anchorCtr="0" compatLnSpc="1">
+            <a:prstTxWarp prst="textNoShape">
+              <a:avLst/>
+            </a:prstTxWarp>
+            <a:noAutofit/>
+          </a:bodyPr>
+          <a:lstStyle/>
+          <a:p>
+            <a:pPr algn="l">
+              <a:spcAft>
+                <a:spcPts val="882"/>
+              </a:spcAft>
+            </a:pPr>
+            <a:r>
+              <a:rPr lang="en-US" sz="2646" dirty="0">
+                <a:solidFill>
+                  <a:srgbClr val="08276B"/>
+                </a:solidFill>
+                <a:latin typeface="Exo 2 Medium" panose="00000600000000000000" pitchFamily="50" charset="0"/>
+                <a:cs typeface="Simplon Oi Headline"/>
+              </a:rPr>
+              <a:t>SEMANA 11 – 10/11/2021</a:t>
+            </a:r>
+          </a:p>
+        </p:txBody>
+      </p:sp>
+      <p:sp>
+        <p:nvSpPr>
+          <p:cNvPr id="22" name="TextBox 118">
+            <a:extLst>
+              <a:ext uri="{FF2B5EF4-FFF2-40B4-BE49-F238E27FC236}">
+                <a16:creationId xmlns:a16="http://schemas.microsoft.com/office/drawing/2014/main" id="{BD7B98C2-C566-441C-A8E5-BA505B2CA31F}"/>
+              </a:ext>
+            </a:extLst>
+          </p:cNvPr>
+          <p:cNvSpPr txBox="1"/>
+          <p:nvPr/>
+        </p:nvSpPr>
+        <p:spPr>
+          <a:xfrm>
+            <a:off x="11822773" y="576471"/>
+            <a:ext cx="899678" cy="179824"/>
+          </a:xfrm>
+          <a:prstGeom prst="rect">
+            <a:avLst/>
+          </a:prstGeom>
+          <a:noFill/>
+          <a:ln w="12700">
+            <a:noFill/>
+          </a:ln>
+        </p:spPr>
+        <p:style>
+          <a:lnRef idx="2">
+            <a:schemeClr val="accent4"/>
+          </a:lnRef>
+          <a:fillRef idx="1">
+            <a:schemeClr val="lt1"/>
+          </a:fillRef>
+          <a:effectRef idx="0">
+            <a:schemeClr val="accent4"/>
+          </a:effectRef>
+          <a:fontRef idx="minor">
+            <a:schemeClr val="dk1"/>
+          </a:fontRef>
+        </p:style>
+        <p:txBody>
+          <a:bodyPr wrap="none" lIns="52922" tIns="52922" rIns="52922" bIns="0" rtlCol="0" anchor="b"/>
+          <a:lstStyle>
+            <a:defPPr>
+              <a:defRPr lang="en-US"/>
+            </a:defPPr>
+            <a:lvl1pPr algn="ctr">
+              <a:defRPr sz="1000" b="1">
+                <a:latin typeface="Simplon BP Regular"/>
+                <a:cs typeface="Simplon BP Regular"/>
+              </a:defRPr>
+            </a:lvl1pPr>
+            <a:lvl2pPr>
+              <a:defRPr>
+                <a:solidFill>
+                  <a:schemeClr val="dk1"/>
+                </a:solidFill>
+              </a:defRPr>
+            </a:lvl2pPr>
+            <a:lvl3pPr>
+              <a:defRPr>
+                <a:solidFill>
+                  <a:schemeClr val="dk1"/>
+                </a:solidFill>
+              </a:defRPr>
+            </a:lvl3pPr>
+            <a:lvl4pPr>
+              <a:defRPr>
+                <a:solidFill>
+                  <a:schemeClr val="dk1"/>
+                </a:solidFill>
+              </a:defRPr>
+            </a:lvl4pPr>
+            <a:lvl5pPr>
+              <a:defRPr>
+                <a:solidFill>
+                  <a:schemeClr val="dk1"/>
+                </a:solidFill>
+              </a:defRPr>
+            </a:lvl5pPr>
+            <a:lvl6pPr>
+              <a:defRPr>
+                <a:solidFill>
+                  <a:schemeClr val="dk1"/>
+                </a:solidFill>
+              </a:defRPr>
+            </a:lvl6pPr>
+            <a:lvl7pPr>
+              <a:defRPr>
+                <a:solidFill>
+                  <a:schemeClr val="dk1"/>
+                </a:solidFill>
+              </a:defRPr>
+            </a:lvl7pPr>
+            <a:lvl8pPr>
+              <a:defRPr>
+                <a:solidFill>
+                  <a:schemeClr val="dk1"/>
+                </a:solidFill>
+              </a:defRPr>
+            </a:lvl8pPr>
+            <a:lvl9pPr>
+              <a:defRPr>
+                <a:solidFill>
+                  <a:schemeClr val="dk1"/>
+                </a:solidFill>
+              </a:defRPr>
+            </a:lvl9pPr>
+          </a:lstStyle>
+          <a:p>
+            <a:pPr defTabSz="672130"/>
+            <a:r>
+              <a:rPr lang="pt-BR" sz="1176" b="0" dirty="0">
+                <a:solidFill>
+                  <a:prstClr val="black"/>
+                </a:solidFill>
+                <a:latin typeface="Exo 2 Medium" panose="00000600000000000000" pitchFamily="50" charset="0"/>
+              </a:rPr>
+              <a:t>Negócios</a:t>
+            </a:r>
+          </a:p>
+        </p:txBody>
+      </p:sp>
+      <p:sp>
+        <p:nvSpPr>
+          <p:cNvPr id="23" name="Oval 120">
+            <a:extLst>
+              <a:ext uri="{FF2B5EF4-FFF2-40B4-BE49-F238E27FC236}">
+                <a16:creationId xmlns:a16="http://schemas.microsoft.com/office/drawing/2014/main" id="{D512B11E-A0D6-43B9-9FAB-A12852EB997C}"/>
+              </a:ext>
+            </a:extLst>
+          </p:cNvPr>
+          <p:cNvSpPr>
+            <a:spLocks noChangeAspect="1"/>
+          </p:cNvSpPr>
+          <p:nvPr/>
+        </p:nvSpPr>
+        <p:spPr>
+          <a:xfrm>
+            <a:off x="11193898" y="324247"/>
+            <a:ext cx="211404" cy="211689"/>
+          </a:xfrm>
+          <a:prstGeom prst="ellipse">
+            <a:avLst/>
+          </a:prstGeom>
+          <a:solidFill>
+            <a:srgbClr val="1BCF13"/>
+          </a:solidFill>
+          <a:ln w="12700">
+            <a:solidFill>
+              <a:schemeClr val="accent3"/>
+            </a:solidFill>
+          </a:ln>
+        </p:spPr>
+        <p:style>
+          <a:lnRef idx="2">
+            <a:schemeClr val="accent1">
+              <a:shade val="50000"/>
+            </a:schemeClr>
+          </a:lnRef>
+          <a:fillRef idx="1">
+            <a:schemeClr val="accent1"/>
+          </a:fillRef>
+          <a:effectRef idx="0">
+            <a:schemeClr val="accent1"/>
+          </a:effectRef>
+          <a:fontRef idx="minor">
+            <a:schemeClr val="lt1"/>
+          </a:fontRef>
+        </p:style>
+        <p:txBody>
+          <a:bodyPr wrap="none" lIns="52922" tIns="52922" rIns="52922" rtlCol="0" anchor="ctr"/>
+          <a:lstStyle/>
+          <a:p>
+            <a:pPr algn="ctr" defTabSz="672130"/>
+            <a:endParaRPr lang="en-US" sz="1176" dirty="0">
+              <a:solidFill>
+                <a:srgbClr val="1BCF13"/>
+              </a:solidFill>
+              <a:latin typeface="Exo 2 Medium" panose="00000600000000000000" pitchFamily="50" charset="0"/>
+              <a:cs typeface="Simplon BP Regular"/>
+            </a:endParaRPr>
+          </a:p>
+        </p:txBody>
+      </p:sp>
+      <p:sp>
+        <p:nvSpPr>
+          <p:cNvPr id="24" name="TextBox 123">
+            <a:extLst>
+              <a:ext uri="{FF2B5EF4-FFF2-40B4-BE49-F238E27FC236}">
+                <a16:creationId xmlns:a16="http://schemas.microsoft.com/office/drawing/2014/main" id="{DF2A6510-AF00-4432-92E4-F9CD9E5F17D8}"/>
+              </a:ext>
+            </a:extLst>
+          </p:cNvPr>
+          <p:cNvSpPr txBox="1"/>
+          <p:nvPr/>
+        </p:nvSpPr>
+        <p:spPr>
+          <a:xfrm>
+            <a:off x="10852497" y="576471"/>
+            <a:ext cx="899678" cy="179824"/>
+          </a:xfrm>
+          <a:prstGeom prst="rect">
+            <a:avLst/>
+          </a:prstGeom>
+          <a:noFill/>
+          <a:ln w="12700">
+            <a:noFill/>
+          </a:ln>
+        </p:spPr>
+        <p:style>
+          <a:lnRef idx="2">
+            <a:schemeClr val="accent4"/>
+          </a:lnRef>
+          <a:fillRef idx="1">
+            <a:schemeClr val="lt1"/>
+          </a:fillRef>
+          <a:effectRef idx="0">
+            <a:schemeClr val="accent4"/>
+          </a:effectRef>
+          <a:fontRef idx="minor">
+            <a:schemeClr val="dk1"/>
+          </a:fontRef>
+        </p:style>
+        <p:txBody>
+          <a:bodyPr wrap="none" lIns="52922" tIns="52922" rIns="52922" bIns="0" rtlCol="0" anchor="b"/>
+          <a:lstStyle>
+            <a:defPPr>
+              <a:defRPr lang="en-US"/>
+            </a:defPPr>
+            <a:lvl1pPr algn="ctr">
+              <a:defRPr sz="1000" b="1">
+                <a:latin typeface="Simplon BP Regular"/>
+                <a:cs typeface="Simplon BP Regular"/>
+              </a:defRPr>
+            </a:lvl1pPr>
+            <a:lvl2pPr>
+              <a:defRPr>
+                <a:solidFill>
+                  <a:schemeClr val="dk1"/>
+                </a:solidFill>
+              </a:defRPr>
+            </a:lvl2pPr>
+            <a:lvl3pPr>
+              <a:defRPr>
+                <a:solidFill>
+                  <a:schemeClr val="dk1"/>
+                </a:solidFill>
+              </a:defRPr>
+            </a:lvl3pPr>
+            <a:lvl4pPr>
+              <a:defRPr>
+                <a:solidFill>
+                  <a:schemeClr val="dk1"/>
+                </a:solidFill>
+              </a:defRPr>
+            </a:lvl4pPr>
+            <a:lvl5pPr>
+              <a:defRPr>
+                <a:solidFill>
+                  <a:schemeClr val="dk1"/>
+                </a:solidFill>
+              </a:defRPr>
+            </a:lvl5pPr>
+            <a:lvl6pPr>
+              <a:defRPr>
+                <a:solidFill>
+                  <a:schemeClr val="dk1"/>
+                </a:solidFill>
+              </a:defRPr>
+            </a:lvl6pPr>
+            <a:lvl7pPr>
+              <a:defRPr>
+                <a:solidFill>
+                  <a:schemeClr val="dk1"/>
+                </a:solidFill>
+              </a:defRPr>
+            </a:lvl7pPr>
+            <a:lvl8pPr>
+              <a:defRPr>
+                <a:solidFill>
+                  <a:schemeClr val="dk1"/>
+                </a:solidFill>
+              </a:defRPr>
+            </a:lvl8pPr>
+            <a:lvl9pPr>
+              <a:defRPr>
+                <a:solidFill>
+                  <a:schemeClr val="dk1"/>
+                </a:solidFill>
+              </a:defRPr>
+            </a:lvl9pPr>
+          </a:lstStyle>
+          <a:p>
+            <a:pPr defTabSz="672130"/>
+            <a:r>
+              <a:rPr lang="pt-BR" sz="1176" b="0" dirty="0">
+                <a:solidFill>
+                  <a:prstClr val="black"/>
+                </a:solidFill>
+                <a:latin typeface="Exo 2 Medium" panose="00000600000000000000" pitchFamily="50" charset="0"/>
+              </a:rPr>
+              <a:t>Plataforma</a:t>
+            </a:r>
+          </a:p>
+        </p:txBody>
+      </p:sp>
+      <p:sp>
+        <p:nvSpPr>
+          <p:cNvPr id="25" name="TextBox 128">
+            <a:extLst>
+              <a:ext uri="{FF2B5EF4-FFF2-40B4-BE49-F238E27FC236}">
+                <a16:creationId xmlns:a16="http://schemas.microsoft.com/office/drawing/2014/main" id="{983CE74D-5B8F-4DD1-8C18-E4BE116FF1DC}"/>
+              </a:ext>
+            </a:extLst>
+          </p:cNvPr>
+          <p:cNvSpPr txBox="1"/>
+          <p:nvPr/>
+        </p:nvSpPr>
+        <p:spPr>
+          <a:xfrm>
+            <a:off x="9854245" y="576471"/>
+            <a:ext cx="899678" cy="179824"/>
+          </a:xfrm>
+          <a:prstGeom prst="rect">
+            <a:avLst/>
+          </a:prstGeom>
+          <a:noFill/>
+          <a:ln w="12700">
+            <a:noFill/>
+          </a:ln>
+        </p:spPr>
+        <p:style>
+          <a:lnRef idx="2">
+            <a:schemeClr val="accent4"/>
+          </a:lnRef>
+          <a:fillRef idx="1">
+            <a:schemeClr val="lt1"/>
+          </a:fillRef>
+          <a:effectRef idx="0">
+            <a:schemeClr val="accent4"/>
+          </a:effectRef>
+          <a:fontRef idx="minor">
+            <a:schemeClr val="dk1"/>
+          </a:fontRef>
+        </p:style>
+        <p:txBody>
+          <a:bodyPr wrap="none" lIns="52922" tIns="52922" rIns="52922" bIns="0" rtlCol="0" anchor="b"/>
+          <a:lstStyle>
+            <a:defPPr>
+              <a:defRPr lang="en-US"/>
+            </a:defPPr>
+            <a:lvl1pPr algn="ctr">
+              <a:defRPr sz="1000" b="1">
+                <a:latin typeface="Simplon BP Regular"/>
+                <a:cs typeface="Simplon BP Regular"/>
+              </a:defRPr>
+            </a:lvl1pPr>
+            <a:lvl2pPr>
+              <a:defRPr>
+                <a:solidFill>
+                  <a:schemeClr val="dk1"/>
+                </a:solidFill>
+              </a:defRPr>
+            </a:lvl2pPr>
+            <a:lvl3pPr>
+              <a:defRPr>
+                <a:solidFill>
+                  <a:schemeClr val="dk1"/>
+                </a:solidFill>
+              </a:defRPr>
+            </a:lvl3pPr>
+            <a:lvl4pPr>
+              <a:defRPr>
+                <a:solidFill>
+                  <a:schemeClr val="dk1"/>
+                </a:solidFill>
+              </a:defRPr>
+            </a:lvl4pPr>
+            <a:lvl5pPr>
+              <a:defRPr>
+                <a:solidFill>
+                  <a:schemeClr val="dk1"/>
+                </a:solidFill>
+              </a:defRPr>
+            </a:lvl5pPr>
+            <a:lvl6pPr>
+              <a:defRPr>
+                <a:solidFill>
+                  <a:schemeClr val="dk1"/>
+                </a:solidFill>
+              </a:defRPr>
+            </a:lvl6pPr>
+            <a:lvl7pPr>
+              <a:defRPr>
+                <a:solidFill>
+                  <a:schemeClr val="dk1"/>
+                </a:solidFill>
+              </a:defRPr>
+            </a:lvl7pPr>
+            <a:lvl8pPr>
+              <a:defRPr>
+                <a:solidFill>
+                  <a:schemeClr val="dk1"/>
+                </a:solidFill>
+              </a:defRPr>
+            </a:lvl8pPr>
+            <a:lvl9pPr>
+              <a:defRPr>
+                <a:solidFill>
+                  <a:schemeClr val="dk1"/>
+                </a:solidFill>
+              </a:defRPr>
+            </a:lvl9pPr>
+          </a:lstStyle>
+          <a:p>
+            <a:pPr defTabSz="672130"/>
+            <a:r>
+              <a:rPr lang="pt-BR" sz="1176" b="0" dirty="0">
+                <a:solidFill>
+                  <a:prstClr val="black"/>
+                </a:solidFill>
+                <a:latin typeface="Exo 2 Medium" panose="00000600000000000000" pitchFamily="50" charset="0"/>
+              </a:rPr>
+              <a:t>Back</a:t>
+            </a:r>
+          </a:p>
+        </p:txBody>
+      </p:sp>
+      <p:sp>
+        <p:nvSpPr>
+          <p:cNvPr id="26" name="TextBox 133">
+            <a:extLst>
+              <a:ext uri="{FF2B5EF4-FFF2-40B4-BE49-F238E27FC236}">
+                <a16:creationId xmlns:a16="http://schemas.microsoft.com/office/drawing/2014/main" id="{FE1215A2-D778-4D77-9417-6C32B4E10829}"/>
+              </a:ext>
+            </a:extLst>
+          </p:cNvPr>
+          <p:cNvSpPr txBox="1"/>
+          <p:nvPr/>
+        </p:nvSpPr>
+        <p:spPr>
+          <a:xfrm>
+            <a:off x="8888645" y="576471"/>
+            <a:ext cx="899678" cy="179824"/>
+          </a:xfrm>
+          <a:prstGeom prst="rect">
+            <a:avLst/>
+          </a:prstGeom>
+          <a:noFill/>
+          <a:ln w="12700">
+            <a:noFill/>
+          </a:ln>
+        </p:spPr>
+        <p:style>
+          <a:lnRef idx="2">
+            <a:schemeClr val="accent4"/>
+          </a:lnRef>
+          <a:fillRef idx="1">
+            <a:schemeClr val="lt1"/>
+          </a:fillRef>
+          <a:effectRef idx="0">
+            <a:schemeClr val="accent4"/>
+          </a:effectRef>
+          <a:fontRef idx="minor">
+            <a:schemeClr val="dk1"/>
+          </a:fontRef>
+        </p:style>
+        <p:txBody>
+          <a:bodyPr wrap="none" lIns="52922" tIns="52922" rIns="52922" bIns="0" rtlCol="0" anchor="b"/>
+          <a:lstStyle>
+            <a:defPPr>
+              <a:defRPr lang="en-US"/>
+            </a:defPPr>
+            <a:lvl1pPr algn="ctr">
+              <a:defRPr sz="1000" b="1">
+                <a:latin typeface="Simplon BP Regular"/>
+                <a:cs typeface="Simplon BP Regular"/>
+              </a:defRPr>
+            </a:lvl1pPr>
+            <a:lvl2pPr>
+              <a:defRPr>
+                <a:solidFill>
+                  <a:schemeClr val="dk1"/>
+                </a:solidFill>
+              </a:defRPr>
+            </a:lvl2pPr>
+            <a:lvl3pPr>
+              <a:defRPr>
+                <a:solidFill>
+                  <a:schemeClr val="dk1"/>
+                </a:solidFill>
+              </a:defRPr>
+            </a:lvl3pPr>
+            <a:lvl4pPr>
+              <a:defRPr>
+                <a:solidFill>
+                  <a:schemeClr val="dk1"/>
+                </a:solidFill>
+              </a:defRPr>
+            </a:lvl4pPr>
+            <a:lvl5pPr>
+              <a:defRPr>
+                <a:solidFill>
+                  <a:schemeClr val="dk1"/>
+                </a:solidFill>
+              </a:defRPr>
+            </a:lvl5pPr>
+            <a:lvl6pPr>
+              <a:defRPr>
+                <a:solidFill>
+                  <a:schemeClr val="dk1"/>
+                </a:solidFill>
+              </a:defRPr>
+            </a:lvl6pPr>
+            <a:lvl7pPr>
+              <a:defRPr>
+                <a:solidFill>
+                  <a:schemeClr val="dk1"/>
+                </a:solidFill>
+              </a:defRPr>
+            </a:lvl7pPr>
+            <a:lvl8pPr>
+              <a:defRPr>
+                <a:solidFill>
+                  <a:schemeClr val="dk1"/>
+                </a:solidFill>
+              </a:defRPr>
+            </a:lvl8pPr>
+            <a:lvl9pPr>
+              <a:defRPr>
+                <a:solidFill>
+                  <a:schemeClr val="dk1"/>
+                </a:solidFill>
+              </a:defRPr>
+            </a:lvl9pPr>
+          </a:lstStyle>
+          <a:p>
+            <a:pPr defTabSz="672130"/>
+            <a:r>
+              <a:rPr lang="pt-BR" sz="1176" b="0" dirty="0">
+                <a:solidFill>
+                  <a:prstClr val="black"/>
+                </a:solidFill>
+                <a:latin typeface="Exo 2 Medium" panose="00000600000000000000" pitchFamily="50" charset="0"/>
+              </a:rPr>
+              <a:t>Front</a:t>
+            </a:r>
+          </a:p>
+        </p:txBody>
+      </p:sp>
+      <p:sp>
+        <p:nvSpPr>
+          <p:cNvPr id="27" name="Oval 134">
+            <a:extLst>
+              <a:ext uri="{FF2B5EF4-FFF2-40B4-BE49-F238E27FC236}">
+                <a16:creationId xmlns:a16="http://schemas.microsoft.com/office/drawing/2014/main" id="{E0659533-7794-44EF-87B8-DFFD796E8DCB}"/>
+              </a:ext>
+            </a:extLst>
+          </p:cNvPr>
+          <p:cNvSpPr>
+            <a:spLocks noChangeAspect="1"/>
+          </p:cNvSpPr>
+          <p:nvPr/>
+        </p:nvSpPr>
+        <p:spPr>
+          <a:xfrm>
+            <a:off x="8443555" y="297930"/>
+            <a:ext cx="211404" cy="211689"/>
+          </a:xfrm>
+          <a:prstGeom prst="ellipse">
+            <a:avLst/>
+          </a:prstGeom>
+          <a:solidFill>
+            <a:srgbClr val="1BCF13"/>
+          </a:solidFill>
+          <a:ln w="12700">
+            <a:solidFill>
+              <a:schemeClr val="accent3"/>
+            </a:solidFill>
+          </a:ln>
+        </p:spPr>
+        <p:style>
+          <a:lnRef idx="2">
+            <a:schemeClr val="accent1">
+              <a:shade val="50000"/>
+            </a:schemeClr>
+          </a:lnRef>
+          <a:fillRef idx="1">
+            <a:schemeClr val="accent1"/>
+          </a:fillRef>
+          <a:effectRef idx="0">
+            <a:schemeClr val="accent1"/>
+          </a:effectRef>
+          <a:fontRef idx="minor">
+            <a:schemeClr val="lt1"/>
+          </a:fontRef>
+        </p:style>
+        <p:txBody>
+          <a:bodyPr wrap="none" lIns="52922" tIns="52922" rIns="52922" rtlCol="0" anchor="ctr"/>
+          <a:lstStyle/>
+          <a:p>
+            <a:pPr algn="ctr" defTabSz="672130"/>
+            <a:endParaRPr lang="en-US" sz="1176" dirty="0">
+              <a:solidFill>
+                <a:srgbClr val="FFC000"/>
+              </a:solidFill>
+              <a:latin typeface="Exo 2 Medium" panose="00000600000000000000" pitchFamily="50" charset="0"/>
+              <a:cs typeface="Simplon BP Regular"/>
+            </a:endParaRPr>
+          </a:p>
+        </p:txBody>
+      </p:sp>
+      <p:sp>
+        <p:nvSpPr>
+          <p:cNvPr id="28" name="TextBox 138">
+            <a:extLst>
+              <a:ext uri="{FF2B5EF4-FFF2-40B4-BE49-F238E27FC236}">
+                <a16:creationId xmlns:a16="http://schemas.microsoft.com/office/drawing/2014/main" id="{CFC76C64-835E-4901-A393-78B96741EBC6}"/>
+              </a:ext>
+            </a:extLst>
+          </p:cNvPr>
+          <p:cNvSpPr txBox="1"/>
+          <p:nvPr/>
+        </p:nvSpPr>
+        <p:spPr>
+          <a:xfrm>
+            <a:off x="8126053" y="576471"/>
+            <a:ext cx="899678" cy="179824"/>
+          </a:xfrm>
+          <a:prstGeom prst="rect">
+            <a:avLst/>
+          </a:prstGeom>
+          <a:noFill/>
+          <a:ln w="12700">
+            <a:noFill/>
+          </a:ln>
+        </p:spPr>
+        <p:style>
+          <a:lnRef idx="2">
+            <a:schemeClr val="accent4"/>
+          </a:lnRef>
+          <a:fillRef idx="1">
+            <a:schemeClr val="lt1"/>
+          </a:fillRef>
+          <a:effectRef idx="0">
+            <a:schemeClr val="accent4"/>
+          </a:effectRef>
+          <a:fontRef idx="minor">
+            <a:schemeClr val="dk1"/>
+          </a:fontRef>
+        </p:style>
+        <p:txBody>
+          <a:bodyPr wrap="none" lIns="52922" tIns="52922" rIns="52922" bIns="0" rtlCol="0" anchor="b"/>
+          <a:lstStyle>
+            <a:defPPr>
+              <a:defRPr lang="en-US"/>
+            </a:defPPr>
+            <a:lvl1pPr algn="ctr">
+              <a:defRPr sz="1000" b="1">
+                <a:latin typeface="Simplon BP Regular"/>
+                <a:cs typeface="Simplon BP Regular"/>
+              </a:defRPr>
+            </a:lvl1pPr>
+            <a:lvl2pPr>
+              <a:defRPr>
+                <a:solidFill>
+                  <a:schemeClr val="dk1"/>
+                </a:solidFill>
+              </a:defRPr>
+            </a:lvl2pPr>
+            <a:lvl3pPr>
+              <a:defRPr>
+                <a:solidFill>
+                  <a:schemeClr val="dk1"/>
+                </a:solidFill>
+              </a:defRPr>
+            </a:lvl3pPr>
+            <a:lvl4pPr>
+              <a:defRPr>
+                <a:solidFill>
+                  <a:schemeClr val="dk1"/>
+                </a:solidFill>
+              </a:defRPr>
+            </a:lvl4pPr>
+            <a:lvl5pPr>
+              <a:defRPr>
+                <a:solidFill>
+                  <a:schemeClr val="dk1"/>
+                </a:solidFill>
+              </a:defRPr>
+            </a:lvl5pPr>
+            <a:lvl6pPr>
+              <a:defRPr>
+                <a:solidFill>
+                  <a:schemeClr val="dk1"/>
+                </a:solidFill>
+              </a:defRPr>
+            </a:lvl6pPr>
+            <a:lvl7pPr>
+              <a:defRPr>
+                <a:solidFill>
+                  <a:schemeClr val="dk1"/>
+                </a:solidFill>
+              </a:defRPr>
+            </a:lvl7pPr>
+            <a:lvl8pPr>
+              <a:defRPr>
+                <a:solidFill>
+                  <a:schemeClr val="dk1"/>
+                </a:solidFill>
+              </a:defRPr>
+            </a:lvl8pPr>
+            <a:lvl9pPr>
+              <a:defRPr>
+                <a:solidFill>
+                  <a:schemeClr val="dk1"/>
+                </a:solidFill>
+              </a:defRPr>
+            </a:lvl9pPr>
+          </a:lstStyle>
+          <a:p>
+            <a:pPr defTabSz="672130"/>
+            <a:r>
+              <a:rPr lang="en-US" sz="1176" b="0" dirty="0" err="1">
+                <a:solidFill>
+                  <a:prstClr val="black"/>
+                </a:solidFill>
+                <a:latin typeface="Exo 2 Medium" panose="00000600000000000000" pitchFamily="50" charset="0"/>
+              </a:rPr>
+              <a:t>Equipe</a:t>
+            </a:r>
+            <a:endParaRPr lang="en-US" sz="1176" b="0" dirty="0">
+              <a:solidFill>
+                <a:prstClr val="black"/>
+              </a:solidFill>
+              <a:latin typeface="Exo 2 Medium" panose="00000600000000000000" pitchFamily="50" charset="0"/>
+            </a:endParaRPr>
+          </a:p>
+        </p:txBody>
+      </p:sp>
+      <p:sp>
+        <p:nvSpPr>
+          <p:cNvPr id="29" name="Retângulo 28">
+            <a:extLst>
+              <a:ext uri="{FF2B5EF4-FFF2-40B4-BE49-F238E27FC236}">
+                <a16:creationId xmlns:a16="http://schemas.microsoft.com/office/drawing/2014/main" id="{1E43F633-0A68-4D0F-AC0D-375E22F80328}"/>
+              </a:ext>
+            </a:extLst>
+          </p:cNvPr>
+          <p:cNvSpPr/>
+          <p:nvPr/>
+        </p:nvSpPr>
+        <p:spPr>
+          <a:xfrm>
+            <a:off x="512766" y="868345"/>
+            <a:ext cx="6186608" cy="238150"/>
+          </a:xfrm>
+          <a:prstGeom prst="rect">
+            <a:avLst/>
+          </a:prstGeom>
+          <a:solidFill>
+            <a:srgbClr val="08276B"/>
+          </a:solidFill>
+        </p:spPr>
+        <p:txBody>
+          <a:bodyPr vert="horz" lIns="134422" tIns="67211" rIns="134422" bIns="67211" rtlCol="0" anchor="ctr"/>
+          <a:lstStyle/>
+          <a:p>
+            <a:pPr defTabSz="672130"/>
+            <a:r>
+              <a:rPr lang="en-US" sz="1544" dirty="0">
+                <a:solidFill>
+                  <a:schemeClr val="bg1"/>
+                </a:solidFill>
+                <a:latin typeface="Exo 2 Medium" panose="00000600000000000000" pitchFamily="50" charset="0"/>
+                <a:ea typeface="Simplon Oi Headline" charset="0"/>
+                <a:cs typeface="Simplon Oi Headline" charset="0"/>
+              </a:rPr>
+              <a:t>Progressos c/ responsáveis </a:t>
+            </a:r>
+          </a:p>
+        </p:txBody>
+      </p:sp>
+      <p:sp>
+        <p:nvSpPr>
+          <p:cNvPr id="30" name="Retângulo 29">
+            <a:extLst>
+              <a:ext uri="{FF2B5EF4-FFF2-40B4-BE49-F238E27FC236}">
+                <a16:creationId xmlns:a16="http://schemas.microsoft.com/office/drawing/2014/main" id="{D543C29D-67E1-4031-9D29-169B0DBC6EA2}"/>
+              </a:ext>
+            </a:extLst>
+          </p:cNvPr>
+          <p:cNvSpPr/>
+          <p:nvPr/>
+        </p:nvSpPr>
+        <p:spPr>
+          <a:xfrm>
+            <a:off x="6814576" y="868345"/>
+            <a:ext cx="6194715" cy="238150"/>
+          </a:xfrm>
+          <a:prstGeom prst="rect">
+            <a:avLst/>
+          </a:prstGeom>
+          <a:solidFill>
+            <a:srgbClr val="08276B"/>
+          </a:solidFill>
+        </p:spPr>
+        <p:txBody>
+          <a:bodyPr vert="horz" lIns="134422" tIns="67211" rIns="134422" bIns="67211" rtlCol="0" anchor="ctr"/>
+          <a:lstStyle/>
+          <a:p>
+            <a:pPr defTabSz="672130"/>
+            <a:r>
+              <a:rPr lang="pt-BR" sz="1544" dirty="0">
+                <a:solidFill>
+                  <a:schemeClr val="bg1"/>
+                </a:solidFill>
+                <a:latin typeface="Exo 2 Medium" panose="00000600000000000000" pitchFamily="50" charset="0"/>
+                <a:ea typeface="Simplon Oi Headline" charset="0"/>
+                <a:cs typeface="Simplon Oi Headline" charset="0"/>
+              </a:rPr>
+              <a:t>Pontos atenção/ Principais Riscos</a:t>
+            </a:r>
+          </a:p>
+        </p:txBody>
+      </p:sp>
+      <p:sp>
+        <p:nvSpPr>
+          <p:cNvPr id="31" name="Retângulo 30">
+            <a:extLst>
+              <a:ext uri="{FF2B5EF4-FFF2-40B4-BE49-F238E27FC236}">
+                <a16:creationId xmlns:a16="http://schemas.microsoft.com/office/drawing/2014/main" id="{DA8C0DE2-12B6-4997-B780-BE9D9F8E16D6}"/>
+              </a:ext>
+            </a:extLst>
+          </p:cNvPr>
+          <p:cNvSpPr/>
+          <p:nvPr/>
+        </p:nvSpPr>
+        <p:spPr>
+          <a:xfrm>
+            <a:off x="508267" y="4152347"/>
+            <a:ext cx="12505521" cy="238150"/>
+          </a:xfrm>
+          <a:prstGeom prst="rect">
+            <a:avLst/>
+          </a:prstGeom>
+          <a:solidFill>
+            <a:srgbClr val="08276B"/>
+          </a:solidFill>
+        </p:spPr>
+        <p:txBody>
+          <a:bodyPr vert="horz" lIns="134422" tIns="67211" rIns="134422" bIns="67211" rtlCol="0" anchor="ctr"/>
+          <a:lstStyle/>
+          <a:p>
+            <a:pPr defTabSz="672130"/>
+            <a:r>
+              <a:rPr lang="pt-BR" sz="1544" dirty="0">
+                <a:solidFill>
+                  <a:schemeClr val="bg1"/>
+                </a:solidFill>
+                <a:latin typeface="Exo 2 Medium" panose="00000600000000000000" pitchFamily="50" charset="0"/>
+                <a:ea typeface="Simplon Oi Headline" charset="0"/>
+                <a:cs typeface="Simplon Oi Headline" charset="0"/>
+              </a:rPr>
+              <a:t>Próximos Passos c/ responsáveis </a:t>
+            </a:r>
+          </a:p>
+        </p:txBody>
+      </p:sp>
+      <p:sp>
+        <p:nvSpPr>
+          <p:cNvPr id="32" name="Rectangle 37">
+            <a:extLst>
+              <a:ext uri="{FF2B5EF4-FFF2-40B4-BE49-F238E27FC236}">
+                <a16:creationId xmlns:a16="http://schemas.microsoft.com/office/drawing/2014/main" id="{224F3AF8-BD84-4D63-8F6E-083FA677F2DB}"/>
+              </a:ext>
+            </a:extLst>
+          </p:cNvPr>
+          <p:cNvSpPr/>
+          <p:nvPr/>
+        </p:nvSpPr>
+        <p:spPr>
+          <a:xfrm>
+            <a:off x="496766" y="1106495"/>
+            <a:ext cx="6186608" cy="2962168"/>
+          </a:xfrm>
+          <a:prstGeom prst="rect">
+            <a:avLst/>
+          </a:prstGeom>
+          <a:noFill/>
+          <a:ln w="12700">
+            <a:solidFill>
+              <a:schemeClr val="bg1">
+                <a:lumMod val="50000"/>
+              </a:schemeClr>
+            </a:solidFill>
+          </a:ln>
+        </p:spPr>
+        <p:style>
+          <a:lnRef idx="2">
+            <a:schemeClr val="accent4"/>
+          </a:lnRef>
+          <a:fillRef idx="1">
+            <a:schemeClr val="lt1"/>
+          </a:fillRef>
+          <a:effectRef idx="0">
+            <a:schemeClr val="accent4"/>
+          </a:effectRef>
+          <a:fontRef idx="minor">
+            <a:schemeClr val="dk1"/>
+          </a:fontRef>
+        </p:style>
+        <p:txBody>
+          <a:bodyPr tIns="105844" rtlCol="0" anchor="t"/>
+          <a:lstStyle/>
+          <a:p>
+            <a:pPr marL="0" lvl="1" fontAlgn="base">
+              <a:spcBef>
+                <a:spcPct val="0"/>
+              </a:spcBef>
+              <a:defRPr/>
+            </a:pPr>
+            <a:r>
+              <a:rPr lang="pt-BR" sz="1323" b="1" dirty="0">
+                <a:solidFill>
+                  <a:schemeClr val="tx1"/>
+                </a:solidFill>
+                <a:latin typeface="Exo 2 Medium" panose="00000600000000000000" pitchFamily="50" charset="0"/>
+                <a:cs typeface="Simplon BP Regular"/>
+              </a:rPr>
+              <a:t>Criação modal, ajustes e melhorias pontuais no sistema web</a:t>
+            </a:r>
+          </a:p>
+          <a:p>
+            <a:pPr marL="0" lvl="1" fontAlgn="base">
+              <a:spcBef>
+                <a:spcPct val="0"/>
+              </a:spcBef>
+              <a:defRPr/>
+            </a:pPr>
+            <a:r>
+              <a:rPr lang="pt-BR" sz="1323" dirty="0">
+                <a:solidFill>
+                  <a:schemeClr val="tx1"/>
+                </a:solidFill>
+                <a:latin typeface="Exo 2 Medium" panose="00000600000000000000" pitchFamily="50" charset="0"/>
+                <a:cs typeface="Simplon BP Regular"/>
+              </a:rPr>
+              <a:t>#Lucas Felix</a:t>
+            </a:r>
+          </a:p>
+          <a:p>
+            <a:pPr marL="0" lvl="1" fontAlgn="base">
+              <a:spcBef>
+                <a:spcPct val="0"/>
+              </a:spcBef>
+              <a:defRPr/>
+            </a:pPr>
+            <a:endParaRPr lang="pt-BR" sz="1323" b="1" dirty="0">
+              <a:solidFill>
+                <a:schemeClr val="tx1"/>
+              </a:solidFill>
+              <a:latin typeface="Exo 2 Medium" panose="00000600000000000000" pitchFamily="50" charset="0"/>
+              <a:cs typeface="Simplon BP Regular"/>
+            </a:endParaRPr>
+          </a:p>
+          <a:p>
+            <a:pPr marL="0" lvl="1" fontAlgn="base">
+              <a:spcBef>
+                <a:spcPct val="0"/>
+              </a:spcBef>
+              <a:defRPr/>
+            </a:pPr>
+            <a:r>
+              <a:rPr lang="pt-BR" sz="1323" b="1" dirty="0">
+                <a:solidFill>
+                  <a:schemeClr val="tx1"/>
+                </a:solidFill>
+                <a:latin typeface="Exo 2 Medium" panose="00000600000000000000" pitchFamily="50" charset="0"/>
+                <a:cs typeface="Simplon BP Regular"/>
+              </a:rPr>
+              <a:t>Atualização da </a:t>
+            </a:r>
+            <a:r>
+              <a:rPr lang="pt-BR" sz="1323" b="1" dirty="0" err="1">
+                <a:solidFill>
+                  <a:schemeClr val="tx1"/>
+                </a:solidFill>
+                <a:latin typeface="Exo 2 Medium" panose="00000600000000000000" pitchFamily="50" charset="0"/>
+                <a:cs typeface="Simplon BP Regular"/>
+              </a:rPr>
+              <a:t>timeline</a:t>
+            </a:r>
+            <a:r>
+              <a:rPr lang="pt-BR" sz="1323" dirty="0">
+                <a:solidFill>
+                  <a:schemeClr val="tx1"/>
+                </a:solidFill>
+                <a:latin typeface="Exo 2 Medium" panose="00000600000000000000" pitchFamily="50" charset="0"/>
+                <a:cs typeface="Simplon BP Regular"/>
+              </a:rPr>
+              <a:t> </a:t>
+            </a:r>
+            <a:r>
+              <a:rPr lang="pt-BR" sz="1323" b="1" dirty="0">
+                <a:solidFill>
+                  <a:schemeClr val="tx1"/>
+                </a:solidFill>
+                <a:latin typeface="Exo 2 Medium" panose="00000600000000000000" pitchFamily="50" charset="0"/>
+                <a:cs typeface="Simplon BP Regular"/>
+              </a:rPr>
+              <a:t>e desenvolvimento da OAT</a:t>
+            </a:r>
+          </a:p>
+          <a:p>
+            <a:pPr marL="0" lvl="1" fontAlgn="base">
+              <a:spcBef>
+                <a:spcPct val="0"/>
+              </a:spcBef>
+              <a:defRPr/>
+            </a:pPr>
+            <a:r>
+              <a:rPr lang="pt-BR" sz="1323" dirty="0">
+                <a:solidFill>
+                  <a:schemeClr val="tx1"/>
+                </a:solidFill>
+                <a:latin typeface="Exo 2 Medium" panose="00000600000000000000" pitchFamily="50" charset="0"/>
+                <a:cs typeface="Simplon BP Regular"/>
+              </a:rPr>
+              <a:t>#Lucas Ferreira</a:t>
+            </a:r>
+          </a:p>
+          <a:p>
+            <a:pPr marL="0" lvl="1" fontAlgn="base">
+              <a:spcBef>
+                <a:spcPct val="0"/>
+              </a:spcBef>
+              <a:defRPr/>
+            </a:pPr>
+            <a:endParaRPr lang="pt-BR" sz="1323" b="1" dirty="0">
+              <a:solidFill>
+                <a:schemeClr val="tx1"/>
+              </a:solidFill>
+              <a:latin typeface="Exo 2 Medium" panose="00000600000000000000" pitchFamily="50" charset="0"/>
+              <a:cs typeface="Simplon BP Regular"/>
+            </a:endParaRPr>
+          </a:p>
+          <a:p>
+            <a:pPr marL="0" lvl="1" fontAlgn="base">
+              <a:spcBef>
+                <a:spcPct val="0"/>
+              </a:spcBef>
+              <a:defRPr/>
+            </a:pPr>
+            <a:r>
+              <a:rPr lang="pt-BR" sz="1323" b="1" dirty="0">
+                <a:solidFill>
+                  <a:schemeClr val="tx1"/>
+                </a:solidFill>
+                <a:latin typeface="Exo 2 Medium" panose="00000600000000000000" pitchFamily="50" charset="0"/>
+                <a:cs typeface="Simplon BP Regular"/>
+              </a:rPr>
+              <a:t>Inserção do </a:t>
+            </a:r>
+            <a:r>
+              <a:rPr lang="pt-BR" sz="1323" b="1" dirty="0" err="1">
+                <a:solidFill>
+                  <a:schemeClr val="tx1"/>
+                </a:solidFill>
+                <a:latin typeface="Exo 2 Medium" panose="00000600000000000000" pitchFamily="50" charset="0"/>
+                <a:cs typeface="Simplon BP Regular"/>
+              </a:rPr>
+              <a:t>chatbot</a:t>
+            </a:r>
+            <a:r>
+              <a:rPr lang="pt-BR" sz="1323" b="1" dirty="0">
+                <a:solidFill>
+                  <a:schemeClr val="tx1"/>
+                </a:solidFill>
+                <a:latin typeface="Exo 2 Medium" panose="00000600000000000000" pitchFamily="50" charset="0"/>
+                <a:cs typeface="Simplon BP Regular"/>
+              </a:rPr>
+              <a:t> no sistema web(não finalizada)</a:t>
+            </a:r>
+          </a:p>
+          <a:p>
+            <a:pPr fontAlgn="base">
+              <a:spcBef>
+                <a:spcPct val="0"/>
+              </a:spcBef>
+              <a:defRPr/>
+            </a:pPr>
+            <a:r>
+              <a:rPr lang="pt-BR" sz="1323" dirty="0">
+                <a:solidFill>
+                  <a:schemeClr val="tx1"/>
+                </a:solidFill>
+                <a:latin typeface="Exo 2 Medium" panose="00000600000000000000" pitchFamily="50" charset="0"/>
+                <a:cs typeface="Simplon BP Regular"/>
+              </a:rPr>
+              <a:t>#João Oliveira</a:t>
+            </a:r>
+          </a:p>
+          <a:p>
+            <a:pPr fontAlgn="base">
+              <a:spcBef>
+                <a:spcPct val="0"/>
+              </a:spcBef>
+              <a:defRPr/>
+            </a:pPr>
+            <a:endParaRPr lang="pt-BR" sz="1323" dirty="0">
+              <a:solidFill>
+                <a:schemeClr val="tx1"/>
+              </a:solidFill>
+              <a:latin typeface="Exo 2 Medium" panose="00000600000000000000" pitchFamily="50" charset="0"/>
+              <a:cs typeface="Simplon BP Regular"/>
+            </a:endParaRPr>
+          </a:p>
+          <a:p>
+            <a:pPr fontAlgn="base">
+              <a:spcBef>
+                <a:spcPct val="0"/>
+              </a:spcBef>
+              <a:defRPr/>
+            </a:pPr>
+            <a:r>
+              <a:rPr lang="pt-BR" sz="1323" b="1" dirty="0">
+                <a:solidFill>
+                  <a:schemeClr val="tx1"/>
+                </a:solidFill>
+                <a:latin typeface="Exo 2 Medium" panose="00000600000000000000" pitchFamily="50" charset="0"/>
+                <a:cs typeface="Simplon BP Regular"/>
+              </a:rPr>
+              <a:t>Atualização contextualização                                          Atualização CRUD</a:t>
+            </a:r>
+          </a:p>
+          <a:p>
+            <a:pPr fontAlgn="base">
+              <a:spcBef>
+                <a:spcPct val="0"/>
+              </a:spcBef>
+              <a:defRPr/>
+            </a:pPr>
+            <a:r>
+              <a:rPr lang="pt-BR" sz="1323" b="1" dirty="0">
+                <a:solidFill>
+                  <a:schemeClr val="tx1"/>
+                </a:solidFill>
+                <a:latin typeface="Exo 2 Medium" panose="00000600000000000000" pitchFamily="50" charset="0"/>
+                <a:cs typeface="Simplon BP Regular"/>
+              </a:rPr>
+              <a:t>#</a:t>
+            </a:r>
+            <a:r>
+              <a:rPr lang="pt-BR" sz="1323" dirty="0">
+                <a:solidFill>
+                  <a:schemeClr val="tx1"/>
+                </a:solidFill>
+                <a:latin typeface="Exo 2 Medium" panose="00000600000000000000" pitchFamily="50" charset="0"/>
+                <a:cs typeface="Simplon BP Regular"/>
+              </a:rPr>
+              <a:t>Vinicius Novais </a:t>
+            </a:r>
+            <a:r>
+              <a:rPr lang="pt-BR" sz="1323" b="1" dirty="0">
+                <a:solidFill>
+                  <a:schemeClr val="tx1"/>
+                </a:solidFill>
+                <a:latin typeface="Exo 2 Medium" panose="00000600000000000000" pitchFamily="50" charset="0"/>
+                <a:cs typeface="Simplon BP Regular"/>
+              </a:rPr>
+              <a:t>                                                                 #</a:t>
+            </a:r>
+            <a:r>
+              <a:rPr lang="pt-BR" sz="1323" dirty="0">
+                <a:solidFill>
+                  <a:schemeClr val="tx1"/>
+                </a:solidFill>
+                <a:latin typeface="Exo 2 Medium" panose="00000600000000000000" pitchFamily="50" charset="0"/>
+                <a:cs typeface="Simplon BP Regular"/>
+              </a:rPr>
+              <a:t>Luiz Gustavo</a:t>
+            </a:r>
+            <a:r>
+              <a:rPr lang="pt-BR" sz="1323" b="1" dirty="0">
+                <a:solidFill>
+                  <a:schemeClr val="tx1"/>
+                </a:solidFill>
+                <a:latin typeface="Exo 2 Medium" panose="00000600000000000000" pitchFamily="50" charset="0"/>
+                <a:cs typeface="Simplon BP Regular"/>
+              </a:rPr>
+              <a:t>    </a:t>
+            </a:r>
+          </a:p>
+          <a:p>
+            <a:pPr fontAlgn="base">
+              <a:spcBef>
+                <a:spcPct val="0"/>
+              </a:spcBef>
+              <a:defRPr/>
+            </a:pPr>
+            <a:endParaRPr lang="pt-BR" sz="1323" b="1" dirty="0">
+              <a:solidFill>
+                <a:schemeClr val="tx1"/>
+              </a:solidFill>
+              <a:latin typeface="Exo 2 Medium" panose="00000600000000000000" pitchFamily="50" charset="0"/>
+              <a:cs typeface="Simplon BP Regular"/>
+            </a:endParaRPr>
+          </a:p>
+          <a:p>
+            <a:pPr fontAlgn="base">
+              <a:spcBef>
+                <a:spcPct val="0"/>
+              </a:spcBef>
+              <a:defRPr/>
+            </a:pPr>
+            <a:r>
+              <a:rPr lang="pt-BR" sz="1323" b="1" dirty="0">
+                <a:solidFill>
+                  <a:schemeClr val="tx1"/>
+                </a:solidFill>
+                <a:latin typeface="Exo 2 Medium" panose="00000600000000000000" pitchFamily="50" charset="0"/>
+                <a:cs typeface="Simplon BP Regular"/>
+              </a:rPr>
+              <a:t>Sistema após login em </a:t>
+            </a:r>
+            <a:r>
+              <a:rPr lang="pt-BR" sz="1323" b="1" dirty="0" err="1">
+                <a:solidFill>
+                  <a:schemeClr val="tx1"/>
+                </a:solidFill>
+                <a:latin typeface="Exo 2 Medium" panose="00000600000000000000" pitchFamily="50" charset="0"/>
+                <a:cs typeface="Simplon BP Regular"/>
+              </a:rPr>
+              <a:t>react</a:t>
+            </a:r>
+            <a:r>
+              <a:rPr lang="pt-BR" sz="1323" b="1" dirty="0">
+                <a:solidFill>
+                  <a:schemeClr val="tx1"/>
+                </a:solidFill>
+                <a:latin typeface="Exo 2 Medium" panose="00000600000000000000" pitchFamily="50" charset="0"/>
+                <a:cs typeface="Simplon BP Regular"/>
+              </a:rPr>
+              <a:t>                                           Manutenção das classes</a:t>
+            </a:r>
+          </a:p>
+          <a:p>
+            <a:pPr fontAlgn="base">
+              <a:spcBef>
+                <a:spcPct val="0"/>
+              </a:spcBef>
+              <a:defRPr/>
+            </a:pPr>
+            <a:r>
+              <a:rPr lang="pt-BR" sz="1323" b="1" dirty="0">
+                <a:solidFill>
+                  <a:schemeClr val="tx1"/>
+                </a:solidFill>
+                <a:latin typeface="Exo 2 Medium" panose="00000600000000000000" pitchFamily="50" charset="0"/>
+                <a:cs typeface="Simplon BP Regular"/>
+              </a:rPr>
+              <a:t>#</a:t>
+            </a:r>
+            <a:r>
+              <a:rPr lang="pt-BR" sz="1323" dirty="0">
+                <a:solidFill>
+                  <a:schemeClr val="tx1"/>
+                </a:solidFill>
+                <a:latin typeface="Exo 2 Medium" panose="00000600000000000000" pitchFamily="50" charset="0"/>
+                <a:cs typeface="Simplon BP Regular"/>
+              </a:rPr>
+              <a:t>Caio </a:t>
+            </a:r>
+            <a:r>
+              <a:rPr lang="pt-BR" sz="1323" dirty="0" err="1">
+                <a:solidFill>
+                  <a:schemeClr val="tx1"/>
+                </a:solidFill>
+                <a:latin typeface="Exo 2 Medium" panose="00000600000000000000" pitchFamily="50" charset="0"/>
+                <a:cs typeface="Simplon BP Regular"/>
+              </a:rPr>
+              <a:t>Elcio</a:t>
+            </a:r>
+            <a:r>
+              <a:rPr lang="pt-BR" sz="1323" dirty="0">
+                <a:solidFill>
+                  <a:schemeClr val="tx1"/>
+                </a:solidFill>
+                <a:latin typeface="Exo 2 Medium" panose="00000600000000000000" pitchFamily="50" charset="0"/>
+                <a:cs typeface="Simplon BP Regular"/>
+              </a:rPr>
+              <a:t> </a:t>
+            </a:r>
+            <a:r>
+              <a:rPr lang="pt-BR" sz="1323" b="1" dirty="0">
+                <a:solidFill>
+                  <a:schemeClr val="tx1"/>
+                </a:solidFill>
+                <a:latin typeface="Exo 2 Medium" panose="00000600000000000000" pitchFamily="50" charset="0"/>
+                <a:cs typeface="Simplon BP Regular"/>
+              </a:rPr>
+              <a:t>                                                                          #</a:t>
+            </a:r>
+            <a:r>
+              <a:rPr lang="pt-BR" sz="1323" dirty="0">
+                <a:solidFill>
+                  <a:schemeClr val="tx1"/>
+                </a:solidFill>
+                <a:latin typeface="Exo 2 Medium" panose="00000600000000000000" pitchFamily="50" charset="0"/>
+                <a:cs typeface="Simplon BP Regular"/>
+              </a:rPr>
+              <a:t>Luiz Gustavo</a:t>
+            </a:r>
+            <a:r>
+              <a:rPr lang="pt-BR" sz="1323" b="1" dirty="0">
+                <a:solidFill>
+                  <a:schemeClr val="tx1"/>
+                </a:solidFill>
+                <a:latin typeface="Exo 2 Medium" panose="00000600000000000000" pitchFamily="50" charset="0"/>
+                <a:cs typeface="Simplon BP Regular"/>
+              </a:rPr>
+              <a:t>    </a:t>
+            </a:r>
+          </a:p>
+        </p:txBody>
+      </p:sp>
+      <p:sp>
+        <p:nvSpPr>
+          <p:cNvPr id="33" name="Rectangle 43">
+            <a:extLst>
+              <a:ext uri="{FF2B5EF4-FFF2-40B4-BE49-F238E27FC236}">
+                <a16:creationId xmlns:a16="http://schemas.microsoft.com/office/drawing/2014/main" id="{F0F9D098-FF4D-4A23-BBE2-370207E68022}"/>
+              </a:ext>
+            </a:extLst>
+          </p:cNvPr>
+          <p:cNvSpPr>
+            <a:spLocks/>
+          </p:cNvSpPr>
+          <p:nvPr/>
+        </p:nvSpPr>
+        <p:spPr>
+          <a:xfrm>
+            <a:off x="512766" y="4500711"/>
+            <a:ext cx="12496525" cy="2808978"/>
+          </a:xfrm>
+          <a:prstGeom prst="rect">
+            <a:avLst/>
+          </a:prstGeom>
+          <a:noFill/>
+          <a:ln w="12700">
+            <a:solidFill>
+              <a:schemeClr val="bg1">
+                <a:lumMod val="50000"/>
+              </a:schemeClr>
+            </a:solidFill>
+          </a:ln>
+        </p:spPr>
+        <p:style>
+          <a:lnRef idx="2">
+            <a:schemeClr val="accent4"/>
+          </a:lnRef>
+          <a:fillRef idx="1">
+            <a:schemeClr val="lt1"/>
+          </a:fillRef>
+          <a:effectRef idx="0">
+            <a:schemeClr val="accent4"/>
+          </a:effectRef>
+          <a:fontRef idx="minor">
+            <a:schemeClr val="dk1"/>
+          </a:fontRef>
+        </p:style>
+        <p:txBody>
+          <a:bodyPr wrap="square" tIns="105844" numCol="3" rtlCol="0" anchor="t"/>
+          <a:lstStyle/>
+          <a:p>
+            <a:pPr marL="0" lvl="1" defTabSz="672130"/>
+            <a:r>
+              <a:rPr lang="pt-BR" sz="1323" b="1" dirty="0">
+                <a:solidFill>
+                  <a:schemeClr val="tx1"/>
+                </a:solidFill>
+                <a:latin typeface="Exo 2 Medium" panose="00000600000000000000" pitchFamily="50" charset="0"/>
+                <a:cs typeface="Simplon BP Regular"/>
+              </a:rPr>
+              <a:t>Finalizar inserção do </a:t>
+            </a:r>
+            <a:r>
+              <a:rPr lang="pt-BR" sz="1323" b="1" dirty="0" err="1">
+                <a:solidFill>
+                  <a:schemeClr val="tx1"/>
+                </a:solidFill>
+                <a:latin typeface="Exo 2 Medium" panose="00000600000000000000" pitchFamily="50" charset="0"/>
+                <a:cs typeface="Simplon BP Regular"/>
+              </a:rPr>
+              <a:t>chatbot</a:t>
+            </a:r>
+            <a:r>
+              <a:rPr lang="pt-BR" sz="1323" b="1" dirty="0">
+                <a:solidFill>
+                  <a:schemeClr val="tx1"/>
+                </a:solidFill>
+                <a:latin typeface="Exo 2 Medium" panose="00000600000000000000" pitchFamily="50" charset="0"/>
+                <a:cs typeface="Simplon BP Regular"/>
+              </a:rPr>
+              <a:t> no site</a:t>
+            </a:r>
+          </a:p>
+          <a:p>
+            <a:pPr marL="0" lvl="1" defTabSz="672130"/>
+            <a:r>
+              <a:rPr lang="pt-BR" sz="1323" b="1" dirty="0">
+                <a:solidFill>
+                  <a:schemeClr val="tx1"/>
+                </a:solidFill>
+                <a:latin typeface="Exo 2 Medium" panose="00000600000000000000" pitchFamily="50" charset="0"/>
+                <a:cs typeface="Simplon BP Regular"/>
+              </a:rPr>
+              <a:t>#</a:t>
+            </a:r>
+            <a:r>
+              <a:rPr lang="pt-BR" sz="1323" dirty="0">
+                <a:solidFill>
+                  <a:schemeClr val="tx1"/>
+                </a:solidFill>
+                <a:latin typeface="Exo 2 Medium" panose="00000600000000000000" pitchFamily="50" charset="0"/>
+                <a:cs typeface="Simplon BP Regular"/>
+              </a:rPr>
+              <a:t>João Oliveira</a:t>
+            </a:r>
+          </a:p>
+          <a:p>
+            <a:pPr marL="0" lvl="1" defTabSz="672130"/>
+            <a:endParaRPr lang="pt-BR" sz="1323" b="1" dirty="0">
+              <a:solidFill>
+                <a:schemeClr val="tx1"/>
+              </a:solidFill>
+              <a:latin typeface="Exo 2 Medium" panose="00000600000000000000" pitchFamily="50" charset="0"/>
+              <a:cs typeface="Simplon BP Regular"/>
+            </a:endParaRPr>
+          </a:p>
+          <a:p>
+            <a:pPr marL="0" lvl="1" defTabSz="672130"/>
+            <a:r>
+              <a:rPr lang="pt-BR" sz="1323" b="1" dirty="0">
+                <a:solidFill>
+                  <a:schemeClr val="tx1"/>
+                </a:solidFill>
+                <a:latin typeface="Exo 2 Medium" panose="00000600000000000000" pitchFamily="50" charset="0"/>
+                <a:cs typeface="Simplon BP Regular"/>
+              </a:rPr>
+              <a:t>Finalizar sistema após login em </a:t>
+            </a:r>
+            <a:r>
+              <a:rPr lang="pt-BR" sz="1323" b="1" dirty="0" err="1">
+                <a:solidFill>
+                  <a:schemeClr val="tx1"/>
+                </a:solidFill>
+                <a:latin typeface="Exo 2 Medium" panose="00000600000000000000" pitchFamily="50" charset="0"/>
+                <a:cs typeface="Simplon BP Regular"/>
+              </a:rPr>
+              <a:t>react</a:t>
+            </a:r>
+            <a:endParaRPr lang="pt-BR" sz="1323" b="1" dirty="0">
+              <a:solidFill>
+                <a:schemeClr val="tx1"/>
+              </a:solidFill>
+              <a:latin typeface="Exo 2 Medium" panose="00000600000000000000" pitchFamily="50" charset="0"/>
+              <a:cs typeface="Simplon BP Regular"/>
+            </a:endParaRPr>
+          </a:p>
+          <a:p>
+            <a:pPr marL="0" lvl="1" defTabSz="672130"/>
+            <a:r>
+              <a:rPr lang="pt-BR" sz="1323" b="1" dirty="0">
+                <a:solidFill>
+                  <a:schemeClr val="tx1"/>
+                </a:solidFill>
+                <a:latin typeface="Exo 2 Medium" panose="00000600000000000000" pitchFamily="50" charset="0"/>
+                <a:cs typeface="Simplon BP Regular"/>
+              </a:rPr>
+              <a:t>#Caio </a:t>
+            </a:r>
+            <a:r>
+              <a:rPr lang="pt-BR" sz="1323" b="1" dirty="0" err="1">
+                <a:solidFill>
+                  <a:schemeClr val="tx1"/>
+                </a:solidFill>
+                <a:latin typeface="Exo 2 Medium" panose="00000600000000000000" pitchFamily="50" charset="0"/>
+                <a:cs typeface="Simplon BP Regular"/>
+              </a:rPr>
+              <a:t>Elcio</a:t>
+            </a:r>
+            <a:endParaRPr lang="pt-BR" sz="1323" b="1" dirty="0">
+              <a:solidFill>
+                <a:schemeClr val="tx1"/>
+              </a:solidFill>
+              <a:latin typeface="Exo 2 Medium" panose="00000600000000000000" pitchFamily="50" charset="0"/>
+              <a:cs typeface="Simplon BP Regular"/>
+            </a:endParaRPr>
+          </a:p>
+          <a:p>
+            <a:pPr marL="0" lvl="1" defTabSz="672130"/>
+            <a:endParaRPr lang="pt-BR" sz="1323" b="1" dirty="0">
+              <a:solidFill>
+                <a:schemeClr val="tx1"/>
+              </a:solidFill>
+              <a:latin typeface="Exo 2 Medium" panose="00000600000000000000" pitchFamily="50" charset="0"/>
+              <a:cs typeface="Simplon BP Regular"/>
+            </a:endParaRPr>
+          </a:p>
+          <a:p>
+            <a:pPr marL="0" lvl="1" defTabSz="672130"/>
+            <a:r>
+              <a:rPr lang="pt-BR" sz="1323" b="1" dirty="0">
+                <a:solidFill>
+                  <a:schemeClr val="tx1"/>
+                </a:solidFill>
+                <a:latin typeface="Exo 2 Medium" panose="00000600000000000000" pitchFamily="50" charset="0"/>
+                <a:cs typeface="Simplon BP Regular"/>
+              </a:rPr>
+              <a:t>Finalizar OAT</a:t>
+            </a:r>
+          </a:p>
+          <a:p>
+            <a:pPr marL="0" lvl="1" defTabSz="672130"/>
+            <a:r>
+              <a:rPr lang="pt-BR" sz="1323" b="1" dirty="0">
+                <a:solidFill>
+                  <a:schemeClr val="tx1"/>
+                </a:solidFill>
+                <a:latin typeface="Exo 2 Medium" panose="00000600000000000000" pitchFamily="50" charset="0"/>
+                <a:cs typeface="Simplon BP Regular"/>
+              </a:rPr>
+              <a:t>#Lucas Ferreira</a:t>
+            </a:r>
+          </a:p>
+          <a:p>
+            <a:pPr marL="0" lvl="1" defTabSz="672130"/>
+            <a:endParaRPr lang="pt-BR" sz="1323" b="1" dirty="0">
+              <a:solidFill>
+                <a:schemeClr val="tx1"/>
+              </a:solidFill>
+              <a:latin typeface="Exo 2 Medium" panose="00000600000000000000" pitchFamily="50" charset="0"/>
+              <a:cs typeface="Simplon BP Regular"/>
+            </a:endParaRPr>
+          </a:p>
+          <a:p>
+            <a:pPr marL="0" lvl="1" defTabSz="672130"/>
+            <a:endParaRPr lang="pt-BR" sz="1323" b="1" dirty="0">
+              <a:solidFill>
+                <a:schemeClr val="tx1"/>
+              </a:solidFill>
+              <a:latin typeface="Exo 2 Medium" panose="00000600000000000000" pitchFamily="50" charset="0"/>
+              <a:cs typeface="Simplon BP Regular"/>
+            </a:endParaRPr>
+          </a:p>
+          <a:p>
+            <a:pPr marL="0" lvl="1" defTabSz="672130"/>
+            <a:r>
+              <a:rPr lang="pt-BR" sz="1323" b="1" dirty="0">
+                <a:solidFill>
+                  <a:schemeClr val="tx1"/>
+                </a:solidFill>
+                <a:latin typeface="Exo 2 Medium" panose="00000600000000000000" pitchFamily="50" charset="0"/>
+                <a:cs typeface="Simplon BP Regular"/>
+              </a:rPr>
+              <a:t>Finalizar telas de perfil(</a:t>
+            </a:r>
+            <a:r>
+              <a:rPr lang="pt-BR" sz="1323" b="1" dirty="0" err="1">
+                <a:solidFill>
+                  <a:schemeClr val="tx1"/>
+                </a:solidFill>
+                <a:latin typeface="Exo 2 Medium" panose="00000600000000000000" pitchFamily="50" charset="0"/>
+                <a:cs typeface="Simplon BP Regular"/>
+              </a:rPr>
+              <a:t>Dev</a:t>
+            </a:r>
+            <a:r>
+              <a:rPr lang="pt-BR" sz="1323" b="1" dirty="0">
+                <a:solidFill>
+                  <a:schemeClr val="tx1"/>
+                </a:solidFill>
+                <a:latin typeface="Exo 2 Medium" panose="00000600000000000000" pitchFamily="50" charset="0"/>
+                <a:cs typeface="Simplon BP Regular"/>
+              </a:rPr>
+              <a:t> e Investidor)</a:t>
+            </a:r>
+          </a:p>
+          <a:p>
+            <a:pPr marL="0" lvl="1" defTabSz="672130"/>
+            <a:r>
+              <a:rPr lang="pt-BR" sz="1323" b="1" dirty="0">
+                <a:solidFill>
+                  <a:schemeClr val="tx1"/>
+                </a:solidFill>
+                <a:latin typeface="Exo 2 Medium" panose="00000600000000000000" pitchFamily="50" charset="0"/>
+                <a:cs typeface="Simplon BP Regular"/>
+              </a:rPr>
+              <a:t>#Lucas Felix</a:t>
+            </a:r>
+          </a:p>
+          <a:p>
+            <a:pPr marL="0" lvl="1" defTabSz="672130"/>
+            <a:endParaRPr lang="pt-BR" sz="1323" b="1" dirty="0">
+              <a:solidFill>
+                <a:schemeClr val="tx1"/>
+              </a:solidFill>
+              <a:latin typeface="Exo 2 Medium" panose="00000600000000000000" pitchFamily="50" charset="0"/>
+              <a:cs typeface="Simplon BP Regular"/>
+            </a:endParaRPr>
+          </a:p>
+          <a:p>
+            <a:pPr marL="0" lvl="1" defTabSz="672130"/>
+            <a:r>
+              <a:rPr lang="pt-BR" sz="1323" b="1" dirty="0">
+                <a:solidFill>
+                  <a:schemeClr val="tx1"/>
+                </a:solidFill>
+                <a:latin typeface="Exo 2 Medium" panose="00000600000000000000" pitchFamily="50" charset="0"/>
+                <a:cs typeface="Simplon BP Regular"/>
+              </a:rPr>
+              <a:t>Melhoria do CRUD e do login/</a:t>
+            </a:r>
+            <a:r>
+              <a:rPr lang="pt-BR" sz="1323" b="1" dirty="0" err="1">
+                <a:solidFill>
+                  <a:schemeClr val="tx1"/>
+                </a:solidFill>
+                <a:latin typeface="Exo 2 Medium" panose="00000600000000000000" pitchFamily="50" charset="0"/>
+                <a:cs typeface="Simplon BP Regular"/>
+              </a:rPr>
+              <a:t>logoff</a:t>
+            </a:r>
+            <a:r>
+              <a:rPr lang="pt-BR" sz="1323" b="1" dirty="0">
+                <a:solidFill>
+                  <a:schemeClr val="tx1"/>
+                </a:solidFill>
+                <a:latin typeface="Exo 2 Medium" panose="00000600000000000000" pitchFamily="50" charset="0"/>
+                <a:cs typeface="Simplon BP Regular"/>
+              </a:rPr>
+              <a:t>.</a:t>
+            </a:r>
+          </a:p>
+          <a:p>
+            <a:pPr marL="0" lvl="1" defTabSz="672130"/>
+            <a:r>
+              <a:rPr lang="pt-BR" sz="1323" b="1" dirty="0">
+                <a:solidFill>
+                  <a:schemeClr val="tx1"/>
+                </a:solidFill>
+                <a:latin typeface="Exo 2 Medium" panose="00000600000000000000" pitchFamily="50" charset="0"/>
+                <a:cs typeface="Simplon BP Regular"/>
+              </a:rPr>
+              <a:t>#Luiz Gustavo</a:t>
+            </a:r>
+          </a:p>
+          <a:p>
+            <a:pPr marL="0" lvl="1" defTabSz="672130"/>
+            <a:endParaRPr lang="pt-BR" sz="1323" b="1" dirty="0">
+              <a:solidFill>
+                <a:schemeClr val="tx1"/>
+              </a:solidFill>
+              <a:latin typeface="Exo 2 Medium" panose="00000600000000000000" pitchFamily="50" charset="0"/>
+              <a:cs typeface="Simplon BP Regular"/>
+            </a:endParaRPr>
+          </a:p>
+        </p:txBody>
+      </p:sp>
+      <p:sp>
+        <p:nvSpPr>
+          <p:cNvPr id="34" name="Oval 134">
+            <a:extLst>
+              <a:ext uri="{FF2B5EF4-FFF2-40B4-BE49-F238E27FC236}">
+                <a16:creationId xmlns:a16="http://schemas.microsoft.com/office/drawing/2014/main" id="{B57AA8A8-84FD-48DE-BA43-08D253C6F275}"/>
+              </a:ext>
+            </a:extLst>
+          </p:cNvPr>
+          <p:cNvSpPr>
+            <a:spLocks noChangeAspect="1"/>
+          </p:cNvSpPr>
+          <p:nvPr/>
+        </p:nvSpPr>
+        <p:spPr>
+          <a:xfrm>
+            <a:off x="9225955" y="297930"/>
+            <a:ext cx="211404" cy="211689"/>
+          </a:xfrm>
+          <a:prstGeom prst="ellipse">
+            <a:avLst/>
+          </a:prstGeom>
+          <a:solidFill>
+            <a:srgbClr val="1BCF13"/>
+          </a:solidFill>
+          <a:ln w="12700">
+            <a:solidFill>
+              <a:schemeClr val="accent3"/>
+            </a:solidFill>
+          </a:ln>
+        </p:spPr>
+        <p:style>
+          <a:lnRef idx="2">
+            <a:schemeClr val="accent1">
+              <a:shade val="50000"/>
+            </a:schemeClr>
+          </a:lnRef>
+          <a:fillRef idx="1">
+            <a:schemeClr val="accent1"/>
+          </a:fillRef>
+          <a:effectRef idx="0">
+            <a:schemeClr val="accent1"/>
+          </a:effectRef>
+          <a:fontRef idx="minor">
+            <a:schemeClr val="lt1"/>
+          </a:fontRef>
+        </p:style>
+        <p:txBody>
+          <a:bodyPr wrap="none" lIns="52922" tIns="52922" rIns="52922" rtlCol="0" anchor="ctr"/>
+          <a:lstStyle/>
+          <a:p>
+            <a:pPr algn="ctr" defTabSz="672130"/>
+            <a:endParaRPr lang="en-US" sz="1176" dirty="0">
+              <a:solidFill>
+                <a:srgbClr val="00B050"/>
+              </a:solidFill>
+              <a:latin typeface="Exo 2 Medium" panose="00000600000000000000" pitchFamily="50" charset="0"/>
+              <a:cs typeface="Simplon BP Regular"/>
+            </a:endParaRPr>
+          </a:p>
+        </p:txBody>
+      </p:sp>
+      <p:sp>
+        <p:nvSpPr>
+          <p:cNvPr id="35" name="Oval 120">
+            <a:extLst>
+              <a:ext uri="{FF2B5EF4-FFF2-40B4-BE49-F238E27FC236}">
+                <a16:creationId xmlns:a16="http://schemas.microsoft.com/office/drawing/2014/main" id="{DAAADCBD-ECD9-4B5D-A8E0-075FB6F9BED7}"/>
+              </a:ext>
+            </a:extLst>
+          </p:cNvPr>
+          <p:cNvSpPr>
+            <a:spLocks noChangeAspect="1"/>
+          </p:cNvSpPr>
+          <p:nvPr/>
+        </p:nvSpPr>
+        <p:spPr>
+          <a:xfrm>
+            <a:off x="10188056" y="297930"/>
+            <a:ext cx="211404" cy="211689"/>
+          </a:xfrm>
+          <a:prstGeom prst="ellipse">
+            <a:avLst/>
+          </a:prstGeom>
+          <a:solidFill>
+            <a:srgbClr val="1BCF13"/>
+          </a:solidFill>
+          <a:ln w="12700">
+            <a:solidFill>
+              <a:schemeClr val="accent3"/>
+            </a:solidFill>
+          </a:ln>
+        </p:spPr>
+        <p:style>
+          <a:lnRef idx="2">
+            <a:schemeClr val="accent1">
+              <a:shade val="50000"/>
+            </a:schemeClr>
+          </a:lnRef>
+          <a:fillRef idx="1">
+            <a:schemeClr val="accent1"/>
+          </a:fillRef>
+          <a:effectRef idx="0">
+            <a:schemeClr val="accent1"/>
+          </a:effectRef>
+          <a:fontRef idx="minor">
+            <a:schemeClr val="lt1"/>
+          </a:fontRef>
+        </p:style>
+        <p:txBody>
+          <a:bodyPr wrap="none" lIns="52922" tIns="52922" rIns="52922" rtlCol="0" anchor="ctr"/>
+          <a:lstStyle/>
+          <a:p>
+            <a:pPr algn="ctr" defTabSz="672130"/>
+            <a:endParaRPr lang="en-US" sz="1176" dirty="0">
+              <a:solidFill>
+                <a:srgbClr val="1BCF13"/>
+              </a:solidFill>
+              <a:latin typeface="Exo 2 Medium" panose="00000600000000000000" pitchFamily="50" charset="0"/>
+              <a:cs typeface="Simplon BP Regular"/>
+            </a:endParaRPr>
+          </a:p>
+        </p:txBody>
+      </p:sp>
+      <p:sp>
+        <p:nvSpPr>
+          <p:cNvPr id="36" name="Retângulo 35">
+            <a:extLst>
+              <a:ext uri="{FF2B5EF4-FFF2-40B4-BE49-F238E27FC236}">
+                <a16:creationId xmlns:a16="http://schemas.microsoft.com/office/drawing/2014/main" id="{A87B1CA7-18E0-459A-8B40-B30CC45C209A}"/>
+              </a:ext>
+            </a:extLst>
+          </p:cNvPr>
+          <p:cNvSpPr/>
+          <p:nvPr/>
+        </p:nvSpPr>
+        <p:spPr>
+          <a:xfrm>
+            <a:off x="8017619" y="209534"/>
+            <a:ext cx="4937689" cy="618769"/>
+          </a:xfrm>
+          <a:prstGeom prst="rect">
+            <a:avLst/>
+          </a:prstGeom>
+          <a:noFill/>
+          <a:ln w="6350">
+            <a:solidFill>
+              <a:schemeClr val="bg1">
+                <a:lumMod val="75000"/>
+              </a:schemeClr>
+            </a:solidFill>
+          </a:ln>
+        </p:spPr>
+        <p:style>
+          <a:lnRef idx="2">
+            <a:schemeClr val="accent1">
+              <a:shade val="50000"/>
+            </a:schemeClr>
+          </a:lnRef>
+          <a:fillRef idx="1">
+            <a:schemeClr val="accent1"/>
+          </a:fillRef>
+          <a:effectRef idx="0">
+            <a:schemeClr val="accent1"/>
+          </a:effectRef>
+          <a:fontRef idx="minor">
+            <a:schemeClr val="lt1"/>
+          </a:fontRef>
+        </p:style>
+        <p:txBody>
+          <a:bodyPr rtlCol="0" anchor="ctr"/>
+          <a:lstStyle/>
+          <a:p>
+            <a:pPr algn="ctr"/>
+            <a:endParaRPr lang="pt-BR">
+              <a:latin typeface="Exo 2 Medium" panose="00000600000000000000" pitchFamily="50" charset="0"/>
+            </a:endParaRPr>
+          </a:p>
+        </p:txBody>
+      </p:sp>
+      <p:sp>
+        <p:nvSpPr>
+          <p:cNvPr id="37" name="TextBox 138">
+            <a:extLst>
+              <a:ext uri="{FF2B5EF4-FFF2-40B4-BE49-F238E27FC236}">
+                <a16:creationId xmlns:a16="http://schemas.microsoft.com/office/drawing/2014/main" id="{41B46BEE-7CCD-459E-800A-B6E0E71F7FC7}"/>
+              </a:ext>
+            </a:extLst>
+          </p:cNvPr>
+          <p:cNvSpPr txBox="1"/>
+          <p:nvPr/>
+        </p:nvSpPr>
+        <p:spPr>
+          <a:xfrm>
+            <a:off x="9715810" y="51570"/>
+            <a:ext cx="1478088" cy="211688"/>
+          </a:xfrm>
+          <a:prstGeom prst="rect">
+            <a:avLst/>
+          </a:prstGeom>
+          <a:solidFill>
+            <a:schemeClr val="bg1"/>
+          </a:solidFill>
+          <a:ln w="12700">
+            <a:noFill/>
+          </a:ln>
+        </p:spPr>
+        <p:style>
+          <a:lnRef idx="2">
+            <a:schemeClr val="accent4"/>
+          </a:lnRef>
+          <a:fillRef idx="1">
+            <a:schemeClr val="lt1"/>
+          </a:fillRef>
+          <a:effectRef idx="0">
+            <a:schemeClr val="accent4"/>
+          </a:effectRef>
+          <a:fontRef idx="minor">
+            <a:schemeClr val="dk1"/>
+          </a:fontRef>
+        </p:style>
+        <p:txBody>
+          <a:bodyPr wrap="none" lIns="52922" tIns="52922" rIns="52922" bIns="0" rtlCol="0" anchor="b"/>
+          <a:lstStyle>
+            <a:defPPr>
+              <a:defRPr lang="en-US"/>
+            </a:defPPr>
+            <a:lvl1pPr algn="ctr">
+              <a:defRPr sz="1000" b="1">
+                <a:latin typeface="Simplon BP Regular"/>
+                <a:cs typeface="Simplon BP Regular"/>
+              </a:defRPr>
+            </a:lvl1pPr>
+            <a:lvl2pPr>
+              <a:defRPr>
+                <a:solidFill>
+                  <a:schemeClr val="dk1"/>
+                </a:solidFill>
+              </a:defRPr>
+            </a:lvl2pPr>
+            <a:lvl3pPr>
+              <a:defRPr>
+                <a:solidFill>
+                  <a:schemeClr val="dk1"/>
+                </a:solidFill>
+              </a:defRPr>
+            </a:lvl3pPr>
+            <a:lvl4pPr>
+              <a:defRPr>
+                <a:solidFill>
+                  <a:schemeClr val="dk1"/>
+                </a:solidFill>
+              </a:defRPr>
+            </a:lvl4pPr>
+            <a:lvl5pPr>
+              <a:defRPr>
+                <a:solidFill>
+                  <a:schemeClr val="dk1"/>
+                </a:solidFill>
+              </a:defRPr>
+            </a:lvl5pPr>
+            <a:lvl6pPr>
+              <a:defRPr>
+                <a:solidFill>
+                  <a:schemeClr val="dk1"/>
+                </a:solidFill>
+              </a:defRPr>
+            </a:lvl6pPr>
+            <a:lvl7pPr>
+              <a:defRPr>
+                <a:solidFill>
+                  <a:schemeClr val="dk1"/>
+                </a:solidFill>
+              </a:defRPr>
+            </a:lvl7pPr>
+            <a:lvl8pPr>
+              <a:defRPr>
+                <a:solidFill>
+                  <a:schemeClr val="dk1"/>
+                </a:solidFill>
+              </a:defRPr>
+            </a:lvl8pPr>
+            <a:lvl9pPr>
+              <a:defRPr>
+                <a:solidFill>
+                  <a:schemeClr val="dk1"/>
+                </a:solidFill>
+              </a:defRPr>
+            </a:lvl9pPr>
+          </a:lstStyle>
+          <a:p>
+            <a:pPr defTabSz="672130"/>
+            <a:r>
+              <a:rPr lang="en-US" sz="1176" dirty="0">
+                <a:solidFill>
+                  <a:srgbClr val="08276B"/>
+                </a:solidFill>
+                <a:latin typeface="Exo 2 Medium" panose="00000600000000000000" pitchFamily="50" charset="0"/>
+              </a:rPr>
+              <a:t>    </a:t>
+            </a:r>
+            <a:r>
+              <a:rPr lang="en-US" sz="1176" dirty="0" err="1">
+                <a:solidFill>
+                  <a:srgbClr val="08276B"/>
+                </a:solidFill>
+                <a:latin typeface="Exo 2 Medium" panose="00000600000000000000" pitchFamily="50" charset="0"/>
+              </a:rPr>
+              <a:t>Farol</a:t>
+            </a:r>
+            <a:r>
+              <a:rPr lang="en-US" sz="1176" dirty="0">
+                <a:solidFill>
+                  <a:srgbClr val="08276B"/>
+                </a:solidFill>
+                <a:latin typeface="Exo 2 Medium" panose="00000600000000000000" pitchFamily="50" charset="0"/>
+              </a:rPr>
+              <a:t> do </a:t>
+            </a:r>
+            <a:r>
+              <a:rPr lang="en-US" sz="1176" dirty="0" err="1">
+                <a:solidFill>
+                  <a:srgbClr val="08276B"/>
+                </a:solidFill>
+                <a:latin typeface="Exo 2 Medium" panose="00000600000000000000" pitchFamily="50" charset="0"/>
+              </a:rPr>
+              <a:t>Projeto</a:t>
+            </a:r>
+            <a:r>
+              <a:rPr lang="en-US" sz="1176" dirty="0">
+                <a:solidFill>
+                  <a:srgbClr val="08276B"/>
+                </a:solidFill>
+                <a:latin typeface="Exo 2 Medium" panose="00000600000000000000" pitchFamily="50" charset="0"/>
+              </a:rPr>
+              <a:t>   </a:t>
+            </a:r>
+          </a:p>
+        </p:txBody>
+      </p:sp>
+      <p:sp>
+        <p:nvSpPr>
+          <p:cNvPr id="38" name="Oval 134">
+            <a:extLst>
+              <a:ext uri="{FF2B5EF4-FFF2-40B4-BE49-F238E27FC236}">
+                <a16:creationId xmlns:a16="http://schemas.microsoft.com/office/drawing/2014/main" id="{AC71B70F-2DA1-4D18-9AC0-DCFDF0FE0D5C}"/>
+              </a:ext>
+            </a:extLst>
+          </p:cNvPr>
+          <p:cNvSpPr>
+            <a:spLocks noChangeAspect="1"/>
+          </p:cNvSpPr>
+          <p:nvPr/>
+        </p:nvSpPr>
+        <p:spPr>
+          <a:xfrm>
+            <a:off x="12166910" y="328582"/>
+            <a:ext cx="211404" cy="211689"/>
+          </a:xfrm>
+          <a:prstGeom prst="ellipse">
+            <a:avLst/>
+          </a:prstGeom>
+          <a:solidFill>
+            <a:srgbClr val="1BCF13"/>
+          </a:solidFill>
+          <a:ln w="12700">
+            <a:solidFill>
+              <a:schemeClr val="accent3"/>
+            </a:solidFill>
+          </a:ln>
+        </p:spPr>
+        <p:style>
+          <a:lnRef idx="2">
+            <a:schemeClr val="accent1">
+              <a:shade val="50000"/>
+            </a:schemeClr>
+          </a:lnRef>
+          <a:fillRef idx="1">
+            <a:schemeClr val="accent1"/>
+          </a:fillRef>
+          <a:effectRef idx="0">
+            <a:schemeClr val="accent1"/>
+          </a:effectRef>
+          <a:fontRef idx="minor">
+            <a:schemeClr val="lt1"/>
+          </a:fontRef>
+        </p:style>
+        <p:txBody>
+          <a:bodyPr wrap="none" lIns="52922" tIns="52922" rIns="52922" rtlCol="0" anchor="ctr"/>
+          <a:lstStyle/>
+          <a:p>
+            <a:pPr algn="ctr" defTabSz="672130"/>
+            <a:endParaRPr lang="en-US" sz="1176" dirty="0">
+              <a:solidFill>
+                <a:srgbClr val="FFC000"/>
+              </a:solidFill>
+              <a:latin typeface="Exo 2 Medium" panose="00000600000000000000" pitchFamily="50" charset="0"/>
+              <a:cs typeface="Simplon BP Regular"/>
+            </a:endParaRPr>
+          </a:p>
+        </p:txBody>
+      </p:sp>
+    </p:spTree>
+    <p:extLst>
+      <p:ext uri="{BB962C8B-B14F-4D97-AF65-F5344CB8AC3E}">
+        <p14:creationId xmlns:p14="http://schemas.microsoft.com/office/powerpoint/2010/main" val="431365772"/>
       </p:ext>
     </p:extLst>
   </p:cSld>
@@ -39962,6 +42220,15 @@
 </file>
 
 <file path=customXml/item2.xml><?xml version="1.0" encoding="utf-8"?>
+<?mso-contentType ?>
+<FormTemplates xmlns="http://schemas.microsoft.com/sharepoint/v3/contenttype/forms">
+  <Display>DocumentLibraryForm</Display>
+  <Edit>DocumentLibraryForm</Edit>
+  <New>DocumentLibraryForm</New>
+</FormTemplates>
+</file>
+
+<file path=customXml/item3.xml><?xml version="1.0" encoding="utf-8"?>
 <ct:contentTypeSchema xmlns:ct="http://schemas.microsoft.com/office/2006/metadata/contentType" xmlns:ma="http://schemas.microsoft.com/office/2006/metadata/properties/metaAttributes" ct:_="" ma:_="" ma:contentTypeName="Document" ma:contentTypeID="0x0101007F8ECE7139958D46ABEDA89D12B90CBF" ma:contentTypeVersion="0" ma:contentTypeDescription="Create a new document." ma:contentTypeScope="" ma:versionID="e6d660081116f63565d30cc13099d5ec">
   <xsd:schema xmlns:xsd="http://www.w3.org/2001/XMLSchema" xmlns:xs="http://www.w3.org/2001/XMLSchema" xmlns:p="http://schemas.microsoft.com/office/2006/metadata/properties" targetNamespace="http://schemas.microsoft.com/office/2006/metadata/properties" ma:root="true" ma:fieldsID="d413257cd9829394d17656a545d5fa4e">
     <xsd:element name="properties">
@@ -40075,15 +42342,6 @@
 </ct:contentTypeSchema>
 </file>
 
-<file path=customXml/item3.xml><?xml version="1.0" encoding="utf-8"?>
-<?mso-contentType ?>
-<FormTemplates xmlns="http://schemas.microsoft.com/sharepoint/v3/contenttype/forms">
-  <Display>DocumentLibraryForm</Display>
-  <Edit>DocumentLibraryForm</Edit>
-  <New>DocumentLibraryForm</New>
-</FormTemplates>
-</file>
-
 <file path=customXml/itemProps1.xml><?xml version="1.0" encoding="utf-8"?>
 <ds:datastoreItem xmlns:ds="http://schemas.openxmlformats.org/officeDocument/2006/customXml" ds:itemID="{4B31267F-D399-4A8A-87F8-B75F56828412}">
   <ds:schemaRefs>
@@ -40102,6 +42360,14 @@
 </file>
 
 <file path=customXml/itemProps2.xml><?xml version="1.0" encoding="utf-8"?>
+<ds:datastoreItem xmlns:ds="http://schemas.openxmlformats.org/officeDocument/2006/customXml" ds:itemID="{E2481852-F24E-4532-AF30-C154D705D105}">
+  <ds:schemaRefs>
+    <ds:schemaRef ds:uri="http://schemas.microsoft.com/sharepoint/v3/contenttype/forms"/>
+  </ds:schemaRefs>
+</ds:datastoreItem>
+</file>
+
+<file path=customXml/itemProps3.xml><?xml version="1.0" encoding="utf-8"?>
 <ds:datastoreItem xmlns:ds="http://schemas.openxmlformats.org/officeDocument/2006/customXml" ds:itemID="{EFDE92A4-5D2A-451A-A373-EB014CDC0D59}">
   <ds:schemaRefs>
     <ds:schemaRef ds:uri="http://schemas.microsoft.com/office/2006/metadata/contentType"/>
@@ -40115,12 +42381,4 @@
     <ds:schemaRef ds:uri="http://schemas.microsoft.com/office/infopath/2007/PartnerControls"/>
   </ds:schemaRefs>
 </ds:datastoreItem>
-</file>
-
-<file path=customXml/itemProps3.xml><?xml version="1.0" encoding="utf-8"?>
-<ds:datastoreItem xmlns:ds="http://schemas.openxmlformats.org/officeDocument/2006/customXml" ds:itemID="{E2481852-F24E-4532-AF30-C154D705D105}">
-  <ds:schemaRefs>
-    <ds:schemaRef ds:uri="http://schemas.microsoft.com/sharepoint/v3/contenttype/forms"/>
-  </ds:schemaRefs>
-</ds:datastoreItem>
 </file>
</xml_diff>

<commit_message>
Atualiza status do back
</commit_message>
<xml_diff>
--- a/Documentos/Status Report/StatusReport.pptx
+++ b/Documentos/Status Report/StatusReport.pptx
@@ -25554,14 +25554,14 @@
         </p:nvSpPr>
         <p:spPr>
           <a:xfrm>
-            <a:off x="10188056" y="297930"/>
+            <a:off x="10188056" y="324247"/>
             <a:ext cx="211404" cy="211689"/>
           </a:xfrm>
           <a:prstGeom prst="ellipse">
             <a:avLst/>
           </a:prstGeom>
           <a:solidFill>
-            <a:srgbClr val="1BCF13"/>
+            <a:srgbClr val="FFFF00"/>
           </a:solidFill>
           <a:ln w="12700">
             <a:solidFill>
@@ -42220,15 +42220,6 @@
 </file>
 
 <file path=customXml/item2.xml><?xml version="1.0" encoding="utf-8"?>
-<?mso-contentType ?>
-<FormTemplates xmlns="http://schemas.microsoft.com/sharepoint/v3/contenttype/forms">
-  <Display>DocumentLibraryForm</Display>
-  <Edit>DocumentLibraryForm</Edit>
-  <New>DocumentLibraryForm</New>
-</FormTemplates>
-</file>
-
-<file path=customXml/item3.xml><?xml version="1.0" encoding="utf-8"?>
 <ct:contentTypeSchema xmlns:ct="http://schemas.microsoft.com/office/2006/metadata/contentType" xmlns:ma="http://schemas.microsoft.com/office/2006/metadata/properties/metaAttributes" ct:_="" ma:_="" ma:contentTypeName="Document" ma:contentTypeID="0x0101007F8ECE7139958D46ABEDA89D12B90CBF" ma:contentTypeVersion="0" ma:contentTypeDescription="Create a new document." ma:contentTypeScope="" ma:versionID="e6d660081116f63565d30cc13099d5ec">
   <xsd:schema xmlns:xsd="http://www.w3.org/2001/XMLSchema" xmlns:xs="http://www.w3.org/2001/XMLSchema" xmlns:p="http://schemas.microsoft.com/office/2006/metadata/properties" targetNamespace="http://schemas.microsoft.com/office/2006/metadata/properties" ma:root="true" ma:fieldsID="d413257cd9829394d17656a545d5fa4e">
     <xsd:element name="properties">
@@ -42342,6 +42333,15 @@
 </ct:contentTypeSchema>
 </file>
 
+<file path=customXml/item3.xml><?xml version="1.0" encoding="utf-8"?>
+<?mso-contentType ?>
+<FormTemplates xmlns="http://schemas.microsoft.com/sharepoint/v3/contenttype/forms">
+  <Display>DocumentLibraryForm</Display>
+  <Edit>DocumentLibraryForm</Edit>
+  <New>DocumentLibraryForm</New>
+</FormTemplates>
+</file>
+
 <file path=customXml/itemProps1.xml><?xml version="1.0" encoding="utf-8"?>
 <ds:datastoreItem xmlns:ds="http://schemas.openxmlformats.org/officeDocument/2006/customXml" ds:itemID="{4B31267F-D399-4A8A-87F8-B75F56828412}">
   <ds:schemaRefs>
@@ -42360,14 +42360,6 @@
 </file>
 
 <file path=customXml/itemProps2.xml><?xml version="1.0" encoding="utf-8"?>
-<ds:datastoreItem xmlns:ds="http://schemas.openxmlformats.org/officeDocument/2006/customXml" ds:itemID="{E2481852-F24E-4532-AF30-C154D705D105}">
-  <ds:schemaRefs>
-    <ds:schemaRef ds:uri="http://schemas.microsoft.com/sharepoint/v3/contenttype/forms"/>
-  </ds:schemaRefs>
-</ds:datastoreItem>
-</file>
-
-<file path=customXml/itemProps3.xml><?xml version="1.0" encoding="utf-8"?>
 <ds:datastoreItem xmlns:ds="http://schemas.openxmlformats.org/officeDocument/2006/customXml" ds:itemID="{EFDE92A4-5D2A-451A-A373-EB014CDC0D59}">
   <ds:schemaRefs>
     <ds:schemaRef ds:uri="http://schemas.microsoft.com/office/2006/metadata/contentType"/>
@@ -42381,4 +42373,12 @@
     <ds:schemaRef ds:uri="http://schemas.microsoft.com/office/infopath/2007/PartnerControls"/>
   </ds:schemaRefs>
 </ds:datastoreItem>
+</file>
+
+<file path=customXml/itemProps3.xml><?xml version="1.0" encoding="utf-8"?>
+<ds:datastoreItem xmlns:ds="http://schemas.openxmlformats.org/officeDocument/2006/customXml" ds:itemID="{E2481852-F24E-4532-AF30-C154D705D105}">
+  <ds:schemaRefs>
+    <ds:schemaRef ds:uri="http://schemas.microsoft.com/sharepoint/v3/contenttype/forms"/>
+  </ds:schemaRefs>
+</ds:datastoreItem>
 </file>
</xml_diff>

<commit_message>
Adiciona semana 11 do status report
</commit_message>
<xml_diff>
--- a/Documentos/Status Report/StatusReport.pptx
+++ b/Documentos/Status Report/StatusReport.pptx
@@ -7,10 +7,10 @@
     <p:sldMasterId id="2147483665" r:id="rId6"/>
   </p:sldMasterIdLst>
   <p:notesMasterIdLst>
-    <p:notesMasterId r:id="rId19"/>
+    <p:notesMasterId r:id="rId20"/>
   </p:notesMasterIdLst>
   <p:handoutMasterIdLst>
-    <p:handoutMasterId r:id="rId20"/>
+    <p:handoutMasterId r:id="rId21"/>
   </p:handoutMasterIdLst>
   <p:sldIdLst>
     <p:sldId id="472" r:id="rId7"/>
@@ -25,6 +25,7 @@
     <p:sldId id="256" r:id="rId16"/>
     <p:sldId id="480" r:id="rId17"/>
     <p:sldId id="481" r:id="rId18"/>
+    <p:sldId id="482" r:id="rId19"/>
   </p:sldIdLst>
   <p:sldSz cx="13442950" cy="7561263"/>
   <p:notesSz cx="7104063" cy="10234613"/>
@@ -143,6 +144,7 @@
             <p14:sldId id="256"/>
             <p14:sldId id="480"/>
             <p14:sldId id="481"/>
+            <p14:sldId id="482"/>
           </p14:sldIdLst>
         </p14:section>
       </p14:sectionLst>
@@ -256,7 +258,7 @@
             <a:fld id="{C3CD65D1-5C11-455D-9F9A-0E035F00A0DA}" type="datetimeFigureOut">
               <a:rPr lang="pt-BR" smtClean="0"/>
               <a:pPr/>
-              <a:t>10/11/2021</a:t>
+              <a:t>17/11/2021</a:t>
             </a:fld>
             <a:endParaRPr lang="pt-BR"/>
           </a:p>
@@ -424,7 +426,7 @@
             <a:fld id="{A05DA3EF-18EA-43DE-B1BB-402A3C558822}" type="datetimeFigureOut">
               <a:rPr lang="pt-BR" smtClean="0"/>
               <a:pPr/>
-              <a:t>10/11/2021</a:t>
+              <a:t>17/11/2021</a:t>
             </a:fld>
             <a:endParaRPr lang="pt-BR"/>
           </a:p>
@@ -20284,7 +20286,7 @@
           <a:p>
             <a:fld id="{B63D1FDA-9627-42C2-B20E-477EB9193F18}" type="datetimeFigureOut">
               <a:rPr lang="pt-BR" smtClean="0"/>
-              <a:t>10/11/2021</a:t>
+              <a:t>17/11/2021</a:t>
             </a:fld>
             <a:endParaRPr lang="pt-BR"/>
           </a:p>
@@ -25882,6 +25884,2268 @@
     <p:extLst>
       <p:ext uri="{BB962C8B-B14F-4D97-AF65-F5344CB8AC3E}">
         <p14:creationId xmlns:p14="http://schemas.microsoft.com/office/powerpoint/2010/main" val="431365772"/>
+      </p:ext>
+    </p:extLst>
+  </p:cSld>
+  <p:clrMapOvr>
+    <a:masterClrMapping/>
+  </p:clrMapOvr>
+</p:sld>
+</file>
+
+<file path=ppt/slides/slide13.xml><?xml version="1.0" encoding="utf-8"?>
+<p:sld xmlns:a="http://schemas.openxmlformats.org/drawingml/2006/main" xmlns:r="http://schemas.openxmlformats.org/officeDocument/2006/relationships" xmlns:p="http://schemas.openxmlformats.org/presentationml/2006/main">
+  <p:cSld>
+    <p:spTree>
+      <p:nvGrpSpPr>
+        <p:cNvPr id="1" name=""/>
+        <p:cNvGrpSpPr/>
+        <p:nvPr/>
+      </p:nvGrpSpPr>
+      <p:grpSpPr>
+        <a:xfrm>
+          <a:off x="0" y="0"/>
+          <a:ext cx="0" cy="0"/>
+          <a:chOff x="0" y="0"/>
+          <a:chExt cx="0" cy="0"/>
+        </a:xfrm>
+      </p:grpSpPr>
+      <p:sp>
+        <p:nvSpPr>
+          <p:cNvPr id="3" name="Espaço Reservado para Número de Slide 2">
+            <a:extLst>
+              <a:ext uri="{FF2B5EF4-FFF2-40B4-BE49-F238E27FC236}">
+                <a16:creationId xmlns:a16="http://schemas.microsoft.com/office/drawing/2014/main" id="{25E66A94-914F-497A-A098-71B8A170A7DE}"/>
+              </a:ext>
+            </a:extLst>
+          </p:cNvPr>
+          <p:cNvSpPr>
+            <a:spLocks noGrp="1"/>
+          </p:cNvSpPr>
+          <p:nvPr>
+            <p:ph type="sldNum" sz="quarter" idx="4"/>
+          </p:nvPr>
+        </p:nvSpPr>
+        <p:spPr/>
+        <p:txBody>
+          <a:bodyPr/>
+          <a:lstStyle/>
+          <a:p>
+            <a:fld id="{74850952-3374-434C-8FC6-DE28F8CD25B0}" type="slidenum">
+              <a:rPr lang="pt-BR" smtClean="0">
+                <a:solidFill>
+                  <a:prstClr val="black">
+                    <a:tint val="75000"/>
+                  </a:prstClr>
+                </a:solidFill>
+              </a:rPr>
+              <a:pPr/>
+              <a:t>13</a:t>
+            </a:fld>
+            <a:endParaRPr lang="pt-BR" dirty="0">
+              <a:solidFill>
+                <a:prstClr val="black">
+                  <a:tint val="75000"/>
+                </a:prstClr>
+              </a:solidFill>
+            </a:endParaRPr>
+          </a:p>
+        </p:txBody>
+      </p:sp>
+      <p:sp>
+        <p:nvSpPr>
+          <p:cNvPr id="20" name="Rectangle 42">
+            <a:extLst>
+              <a:ext uri="{FF2B5EF4-FFF2-40B4-BE49-F238E27FC236}">
+                <a16:creationId xmlns:a16="http://schemas.microsoft.com/office/drawing/2014/main" id="{D56D5B31-1798-4A73-939D-5495975295D4}"/>
+              </a:ext>
+            </a:extLst>
+          </p:cNvPr>
+          <p:cNvSpPr/>
+          <p:nvPr/>
+        </p:nvSpPr>
+        <p:spPr>
+          <a:xfrm>
+            <a:off x="6804884" y="1106495"/>
+            <a:ext cx="6204408" cy="2962168"/>
+          </a:xfrm>
+          <a:prstGeom prst="rect">
+            <a:avLst/>
+          </a:prstGeom>
+          <a:noFill/>
+          <a:ln w="12700">
+            <a:solidFill>
+              <a:schemeClr val="bg1">
+                <a:lumMod val="50000"/>
+              </a:schemeClr>
+            </a:solidFill>
+          </a:ln>
+        </p:spPr>
+        <p:style>
+          <a:lnRef idx="2">
+            <a:schemeClr val="accent4"/>
+          </a:lnRef>
+          <a:fillRef idx="1">
+            <a:schemeClr val="lt1"/>
+          </a:fillRef>
+          <a:effectRef idx="0">
+            <a:schemeClr val="accent4"/>
+          </a:effectRef>
+          <a:fontRef idx="minor">
+            <a:schemeClr val="dk1"/>
+          </a:fontRef>
+        </p:style>
+        <p:txBody>
+          <a:bodyPr tIns="105844" rtlCol="0" anchor="t"/>
+          <a:lstStyle/>
+          <a:p>
+            <a:pPr defTabSz="672130">
+              <a:spcAft>
+                <a:spcPts val="882"/>
+              </a:spcAft>
+            </a:pPr>
+            <a:endParaRPr lang="pt-BR" sz="1470" dirty="0">
+              <a:solidFill>
+                <a:schemeClr val="tx1"/>
+              </a:solidFill>
+              <a:latin typeface="Exo 2 Medium" panose="00000600000000000000" pitchFamily="50" charset="0"/>
+              <a:cs typeface="Simplon BP Regular"/>
+            </a:endParaRPr>
+          </a:p>
+        </p:txBody>
+      </p:sp>
+      <p:sp>
+        <p:nvSpPr>
+          <p:cNvPr id="21" name="Title 2">
+            <a:extLst>
+              <a:ext uri="{FF2B5EF4-FFF2-40B4-BE49-F238E27FC236}">
+                <a16:creationId xmlns:a16="http://schemas.microsoft.com/office/drawing/2014/main" id="{C488E075-24DD-4CAC-A846-48FBDF28D797}"/>
+              </a:ext>
+            </a:extLst>
+          </p:cNvPr>
+          <p:cNvSpPr>
+            <a:spLocks noGrp="1"/>
+          </p:cNvSpPr>
+          <p:nvPr>
+            <p:ph type="title"/>
+          </p:nvPr>
+        </p:nvSpPr>
+        <p:spPr>
+          <a:xfrm>
+            <a:off x="469692" y="185232"/>
+            <a:ext cx="12098020" cy="800352"/>
+          </a:xfrm>
+        </p:spPr>
+        <p:txBody>
+          <a:bodyPr vert="horz" wrap="square" lIns="105844" tIns="0" rIns="105844" bIns="0" numCol="1" anchor="t" anchorCtr="0" compatLnSpc="1">
+            <a:prstTxWarp prst="textNoShape">
+              <a:avLst/>
+            </a:prstTxWarp>
+            <a:noAutofit/>
+          </a:bodyPr>
+          <a:lstStyle/>
+          <a:p>
+            <a:pPr algn="l">
+              <a:spcAft>
+                <a:spcPts val="882"/>
+              </a:spcAft>
+            </a:pPr>
+            <a:r>
+              <a:rPr lang="en-US" sz="2646" dirty="0">
+                <a:solidFill>
+                  <a:srgbClr val="08276B"/>
+                </a:solidFill>
+                <a:latin typeface="Exo 2 Medium" panose="00000600000000000000" pitchFamily="50" charset="0"/>
+                <a:cs typeface="Simplon Oi Headline"/>
+              </a:rPr>
+              <a:t>SEMANA 12 – 17/11/2021</a:t>
+            </a:r>
+          </a:p>
+        </p:txBody>
+      </p:sp>
+      <p:sp>
+        <p:nvSpPr>
+          <p:cNvPr id="22" name="TextBox 118">
+            <a:extLst>
+              <a:ext uri="{FF2B5EF4-FFF2-40B4-BE49-F238E27FC236}">
+                <a16:creationId xmlns:a16="http://schemas.microsoft.com/office/drawing/2014/main" id="{BD7B98C2-C566-441C-A8E5-BA505B2CA31F}"/>
+              </a:ext>
+            </a:extLst>
+          </p:cNvPr>
+          <p:cNvSpPr txBox="1"/>
+          <p:nvPr/>
+        </p:nvSpPr>
+        <p:spPr>
+          <a:xfrm>
+            <a:off x="11822773" y="576471"/>
+            <a:ext cx="899678" cy="179824"/>
+          </a:xfrm>
+          <a:prstGeom prst="rect">
+            <a:avLst/>
+          </a:prstGeom>
+          <a:noFill/>
+          <a:ln w="12700">
+            <a:noFill/>
+          </a:ln>
+        </p:spPr>
+        <p:style>
+          <a:lnRef idx="2">
+            <a:schemeClr val="accent4"/>
+          </a:lnRef>
+          <a:fillRef idx="1">
+            <a:schemeClr val="lt1"/>
+          </a:fillRef>
+          <a:effectRef idx="0">
+            <a:schemeClr val="accent4"/>
+          </a:effectRef>
+          <a:fontRef idx="minor">
+            <a:schemeClr val="dk1"/>
+          </a:fontRef>
+        </p:style>
+        <p:txBody>
+          <a:bodyPr wrap="none" lIns="52922" tIns="52922" rIns="52922" bIns="0" rtlCol="0" anchor="b"/>
+          <a:lstStyle>
+            <a:defPPr>
+              <a:defRPr lang="en-US"/>
+            </a:defPPr>
+            <a:lvl1pPr algn="ctr">
+              <a:defRPr sz="1000" b="1">
+                <a:latin typeface="Simplon BP Regular"/>
+                <a:cs typeface="Simplon BP Regular"/>
+              </a:defRPr>
+            </a:lvl1pPr>
+            <a:lvl2pPr>
+              <a:defRPr>
+                <a:solidFill>
+                  <a:schemeClr val="dk1"/>
+                </a:solidFill>
+              </a:defRPr>
+            </a:lvl2pPr>
+            <a:lvl3pPr>
+              <a:defRPr>
+                <a:solidFill>
+                  <a:schemeClr val="dk1"/>
+                </a:solidFill>
+              </a:defRPr>
+            </a:lvl3pPr>
+            <a:lvl4pPr>
+              <a:defRPr>
+                <a:solidFill>
+                  <a:schemeClr val="dk1"/>
+                </a:solidFill>
+              </a:defRPr>
+            </a:lvl4pPr>
+            <a:lvl5pPr>
+              <a:defRPr>
+                <a:solidFill>
+                  <a:schemeClr val="dk1"/>
+                </a:solidFill>
+              </a:defRPr>
+            </a:lvl5pPr>
+            <a:lvl6pPr>
+              <a:defRPr>
+                <a:solidFill>
+                  <a:schemeClr val="dk1"/>
+                </a:solidFill>
+              </a:defRPr>
+            </a:lvl6pPr>
+            <a:lvl7pPr>
+              <a:defRPr>
+                <a:solidFill>
+                  <a:schemeClr val="dk1"/>
+                </a:solidFill>
+              </a:defRPr>
+            </a:lvl7pPr>
+            <a:lvl8pPr>
+              <a:defRPr>
+                <a:solidFill>
+                  <a:schemeClr val="dk1"/>
+                </a:solidFill>
+              </a:defRPr>
+            </a:lvl8pPr>
+            <a:lvl9pPr>
+              <a:defRPr>
+                <a:solidFill>
+                  <a:schemeClr val="dk1"/>
+                </a:solidFill>
+              </a:defRPr>
+            </a:lvl9pPr>
+          </a:lstStyle>
+          <a:p>
+            <a:pPr defTabSz="672130"/>
+            <a:r>
+              <a:rPr lang="pt-BR" sz="1176" b="0" dirty="0">
+                <a:solidFill>
+                  <a:prstClr val="black"/>
+                </a:solidFill>
+                <a:latin typeface="Exo 2 Medium" panose="00000600000000000000" pitchFamily="50" charset="0"/>
+              </a:rPr>
+              <a:t>Negócios</a:t>
+            </a:r>
+          </a:p>
+        </p:txBody>
+      </p:sp>
+      <p:sp>
+        <p:nvSpPr>
+          <p:cNvPr id="23" name="Oval 120">
+            <a:extLst>
+              <a:ext uri="{FF2B5EF4-FFF2-40B4-BE49-F238E27FC236}">
+                <a16:creationId xmlns:a16="http://schemas.microsoft.com/office/drawing/2014/main" id="{D512B11E-A0D6-43B9-9FAB-A12852EB997C}"/>
+              </a:ext>
+            </a:extLst>
+          </p:cNvPr>
+          <p:cNvSpPr>
+            <a:spLocks noChangeAspect="1"/>
+          </p:cNvSpPr>
+          <p:nvPr/>
+        </p:nvSpPr>
+        <p:spPr>
+          <a:xfrm>
+            <a:off x="11193898" y="324247"/>
+            <a:ext cx="211404" cy="211689"/>
+          </a:xfrm>
+          <a:prstGeom prst="ellipse">
+            <a:avLst/>
+          </a:prstGeom>
+          <a:solidFill>
+            <a:srgbClr val="1BCF13"/>
+          </a:solidFill>
+          <a:ln w="12700">
+            <a:solidFill>
+              <a:schemeClr val="accent3"/>
+            </a:solidFill>
+          </a:ln>
+        </p:spPr>
+        <p:style>
+          <a:lnRef idx="2">
+            <a:schemeClr val="accent1">
+              <a:shade val="50000"/>
+            </a:schemeClr>
+          </a:lnRef>
+          <a:fillRef idx="1">
+            <a:schemeClr val="accent1"/>
+          </a:fillRef>
+          <a:effectRef idx="0">
+            <a:schemeClr val="accent1"/>
+          </a:effectRef>
+          <a:fontRef idx="minor">
+            <a:schemeClr val="lt1"/>
+          </a:fontRef>
+        </p:style>
+        <p:txBody>
+          <a:bodyPr wrap="none" lIns="52922" tIns="52922" rIns="52922" rtlCol="0" anchor="ctr"/>
+          <a:lstStyle/>
+          <a:p>
+            <a:pPr algn="ctr" defTabSz="672130"/>
+            <a:endParaRPr lang="en-US" sz="1176" dirty="0">
+              <a:solidFill>
+                <a:srgbClr val="1BCF13"/>
+              </a:solidFill>
+              <a:latin typeface="Exo 2 Medium" panose="00000600000000000000" pitchFamily="50" charset="0"/>
+              <a:cs typeface="Simplon BP Regular"/>
+            </a:endParaRPr>
+          </a:p>
+        </p:txBody>
+      </p:sp>
+      <p:sp>
+        <p:nvSpPr>
+          <p:cNvPr id="24" name="TextBox 123">
+            <a:extLst>
+              <a:ext uri="{FF2B5EF4-FFF2-40B4-BE49-F238E27FC236}">
+                <a16:creationId xmlns:a16="http://schemas.microsoft.com/office/drawing/2014/main" id="{DF2A6510-AF00-4432-92E4-F9CD9E5F17D8}"/>
+              </a:ext>
+            </a:extLst>
+          </p:cNvPr>
+          <p:cNvSpPr txBox="1"/>
+          <p:nvPr/>
+        </p:nvSpPr>
+        <p:spPr>
+          <a:xfrm>
+            <a:off x="10852497" y="576471"/>
+            <a:ext cx="899678" cy="179824"/>
+          </a:xfrm>
+          <a:prstGeom prst="rect">
+            <a:avLst/>
+          </a:prstGeom>
+          <a:noFill/>
+          <a:ln w="12700">
+            <a:noFill/>
+          </a:ln>
+        </p:spPr>
+        <p:style>
+          <a:lnRef idx="2">
+            <a:schemeClr val="accent4"/>
+          </a:lnRef>
+          <a:fillRef idx="1">
+            <a:schemeClr val="lt1"/>
+          </a:fillRef>
+          <a:effectRef idx="0">
+            <a:schemeClr val="accent4"/>
+          </a:effectRef>
+          <a:fontRef idx="minor">
+            <a:schemeClr val="dk1"/>
+          </a:fontRef>
+        </p:style>
+        <p:txBody>
+          <a:bodyPr wrap="none" lIns="52922" tIns="52922" rIns="52922" bIns="0" rtlCol="0" anchor="b"/>
+          <a:lstStyle>
+            <a:defPPr>
+              <a:defRPr lang="en-US"/>
+            </a:defPPr>
+            <a:lvl1pPr algn="ctr">
+              <a:defRPr sz="1000" b="1">
+                <a:latin typeface="Simplon BP Regular"/>
+                <a:cs typeface="Simplon BP Regular"/>
+              </a:defRPr>
+            </a:lvl1pPr>
+            <a:lvl2pPr>
+              <a:defRPr>
+                <a:solidFill>
+                  <a:schemeClr val="dk1"/>
+                </a:solidFill>
+              </a:defRPr>
+            </a:lvl2pPr>
+            <a:lvl3pPr>
+              <a:defRPr>
+                <a:solidFill>
+                  <a:schemeClr val="dk1"/>
+                </a:solidFill>
+              </a:defRPr>
+            </a:lvl3pPr>
+            <a:lvl4pPr>
+              <a:defRPr>
+                <a:solidFill>
+                  <a:schemeClr val="dk1"/>
+                </a:solidFill>
+              </a:defRPr>
+            </a:lvl4pPr>
+            <a:lvl5pPr>
+              <a:defRPr>
+                <a:solidFill>
+                  <a:schemeClr val="dk1"/>
+                </a:solidFill>
+              </a:defRPr>
+            </a:lvl5pPr>
+            <a:lvl6pPr>
+              <a:defRPr>
+                <a:solidFill>
+                  <a:schemeClr val="dk1"/>
+                </a:solidFill>
+              </a:defRPr>
+            </a:lvl6pPr>
+            <a:lvl7pPr>
+              <a:defRPr>
+                <a:solidFill>
+                  <a:schemeClr val="dk1"/>
+                </a:solidFill>
+              </a:defRPr>
+            </a:lvl7pPr>
+            <a:lvl8pPr>
+              <a:defRPr>
+                <a:solidFill>
+                  <a:schemeClr val="dk1"/>
+                </a:solidFill>
+              </a:defRPr>
+            </a:lvl8pPr>
+            <a:lvl9pPr>
+              <a:defRPr>
+                <a:solidFill>
+                  <a:schemeClr val="dk1"/>
+                </a:solidFill>
+              </a:defRPr>
+            </a:lvl9pPr>
+          </a:lstStyle>
+          <a:p>
+            <a:pPr defTabSz="672130"/>
+            <a:r>
+              <a:rPr lang="pt-BR" sz="1176" b="0" dirty="0">
+                <a:solidFill>
+                  <a:prstClr val="black"/>
+                </a:solidFill>
+                <a:latin typeface="Exo 2 Medium" panose="00000600000000000000" pitchFamily="50" charset="0"/>
+              </a:rPr>
+              <a:t>Plataforma</a:t>
+            </a:r>
+          </a:p>
+        </p:txBody>
+      </p:sp>
+      <p:sp>
+        <p:nvSpPr>
+          <p:cNvPr id="25" name="TextBox 128">
+            <a:extLst>
+              <a:ext uri="{FF2B5EF4-FFF2-40B4-BE49-F238E27FC236}">
+                <a16:creationId xmlns:a16="http://schemas.microsoft.com/office/drawing/2014/main" id="{983CE74D-5B8F-4DD1-8C18-E4BE116FF1DC}"/>
+              </a:ext>
+            </a:extLst>
+          </p:cNvPr>
+          <p:cNvSpPr txBox="1"/>
+          <p:nvPr/>
+        </p:nvSpPr>
+        <p:spPr>
+          <a:xfrm>
+            <a:off x="9854245" y="576471"/>
+            <a:ext cx="899678" cy="179824"/>
+          </a:xfrm>
+          <a:prstGeom prst="rect">
+            <a:avLst/>
+          </a:prstGeom>
+          <a:noFill/>
+          <a:ln w="12700">
+            <a:noFill/>
+          </a:ln>
+        </p:spPr>
+        <p:style>
+          <a:lnRef idx="2">
+            <a:schemeClr val="accent4"/>
+          </a:lnRef>
+          <a:fillRef idx="1">
+            <a:schemeClr val="lt1"/>
+          </a:fillRef>
+          <a:effectRef idx="0">
+            <a:schemeClr val="accent4"/>
+          </a:effectRef>
+          <a:fontRef idx="minor">
+            <a:schemeClr val="dk1"/>
+          </a:fontRef>
+        </p:style>
+        <p:txBody>
+          <a:bodyPr wrap="none" lIns="52922" tIns="52922" rIns="52922" bIns="0" rtlCol="0" anchor="b"/>
+          <a:lstStyle>
+            <a:defPPr>
+              <a:defRPr lang="en-US"/>
+            </a:defPPr>
+            <a:lvl1pPr algn="ctr">
+              <a:defRPr sz="1000" b="1">
+                <a:latin typeface="Simplon BP Regular"/>
+                <a:cs typeface="Simplon BP Regular"/>
+              </a:defRPr>
+            </a:lvl1pPr>
+            <a:lvl2pPr>
+              <a:defRPr>
+                <a:solidFill>
+                  <a:schemeClr val="dk1"/>
+                </a:solidFill>
+              </a:defRPr>
+            </a:lvl2pPr>
+            <a:lvl3pPr>
+              <a:defRPr>
+                <a:solidFill>
+                  <a:schemeClr val="dk1"/>
+                </a:solidFill>
+              </a:defRPr>
+            </a:lvl3pPr>
+            <a:lvl4pPr>
+              <a:defRPr>
+                <a:solidFill>
+                  <a:schemeClr val="dk1"/>
+                </a:solidFill>
+              </a:defRPr>
+            </a:lvl4pPr>
+            <a:lvl5pPr>
+              <a:defRPr>
+                <a:solidFill>
+                  <a:schemeClr val="dk1"/>
+                </a:solidFill>
+              </a:defRPr>
+            </a:lvl5pPr>
+            <a:lvl6pPr>
+              <a:defRPr>
+                <a:solidFill>
+                  <a:schemeClr val="dk1"/>
+                </a:solidFill>
+              </a:defRPr>
+            </a:lvl6pPr>
+            <a:lvl7pPr>
+              <a:defRPr>
+                <a:solidFill>
+                  <a:schemeClr val="dk1"/>
+                </a:solidFill>
+              </a:defRPr>
+            </a:lvl7pPr>
+            <a:lvl8pPr>
+              <a:defRPr>
+                <a:solidFill>
+                  <a:schemeClr val="dk1"/>
+                </a:solidFill>
+              </a:defRPr>
+            </a:lvl8pPr>
+            <a:lvl9pPr>
+              <a:defRPr>
+                <a:solidFill>
+                  <a:schemeClr val="dk1"/>
+                </a:solidFill>
+              </a:defRPr>
+            </a:lvl9pPr>
+          </a:lstStyle>
+          <a:p>
+            <a:pPr defTabSz="672130"/>
+            <a:r>
+              <a:rPr lang="pt-BR" sz="1176" b="0" dirty="0">
+                <a:solidFill>
+                  <a:prstClr val="black"/>
+                </a:solidFill>
+                <a:latin typeface="Exo 2 Medium" panose="00000600000000000000" pitchFamily="50" charset="0"/>
+              </a:rPr>
+              <a:t>Back</a:t>
+            </a:r>
+          </a:p>
+        </p:txBody>
+      </p:sp>
+      <p:sp>
+        <p:nvSpPr>
+          <p:cNvPr id="26" name="TextBox 133">
+            <a:extLst>
+              <a:ext uri="{FF2B5EF4-FFF2-40B4-BE49-F238E27FC236}">
+                <a16:creationId xmlns:a16="http://schemas.microsoft.com/office/drawing/2014/main" id="{FE1215A2-D778-4D77-9417-6C32B4E10829}"/>
+              </a:ext>
+            </a:extLst>
+          </p:cNvPr>
+          <p:cNvSpPr txBox="1"/>
+          <p:nvPr/>
+        </p:nvSpPr>
+        <p:spPr>
+          <a:xfrm>
+            <a:off x="8888645" y="576471"/>
+            <a:ext cx="899678" cy="179824"/>
+          </a:xfrm>
+          <a:prstGeom prst="rect">
+            <a:avLst/>
+          </a:prstGeom>
+          <a:noFill/>
+          <a:ln w="12700">
+            <a:noFill/>
+          </a:ln>
+        </p:spPr>
+        <p:style>
+          <a:lnRef idx="2">
+            <a:schemeClr val="accent4"/>
+          </a:lnRef>
+          <a:fillRef idx="1">
+            <a:schemeClr val="lt1"/>
+          </a:fillRef>
+          <a:effectRef idx="0">
+            <a:schemeClr val="accent4"/>
+          </a:effectRef>
+          <a:fontRef idx="minor">
+            <a:schemeClr val="dk1"/>
+          </a:fontRef>
+        </p:style>
+        <p:txBody>
+          <a:bodyPr wrap="none" lIns="52922" tIns="52922" rIns="52922" bIns="0" rtlCol="0" anchor="b"/>
+          <a:lstStyle>
+            <a:defPPr>
+              <a:defRPr lang="en-US"/>
+            </a:defPPr>
+            <a:lvl1pPr algn="ctr">
+              <a:defRPr sz="1000" b="1">
+                <a:latin typeface="Simplon BP Regular"/>
+                <a:cs typeface="Simplon BP Regular"/>
+              </a:defRPr>
+            </a:lvl1pPr>
+            <a:lvl2pPr>
+              <a:defRPr>
+                <a:solidFill>
+                  <a:schemeClr val="dk1"/>
+                </a:solidFill>
+              </a:defRPr>
+            </a:lvl2pPr>
+            <a:lvl3pPr>
+              <a:defRPr>
+                <a:solidFill>
+                  <a:schemeClr val="dk1"/>
+                </a:solidFill>
+              </a:defRPr>
+            </a:lvl3pPr>
+            <a:lvl4pPr>
+              <a:defRPr>
+                <a:solidFill>
+                  <a:schemeClr val="dk1"/>
+                </a:solidFill>
+              </a:defRPr>
+            </a:lvl4pPr>
+            <a:lvl5pPr>
+              <a:defRPr>
+                <a:solidFill>
+                  <a:schemeClr val="dk1"/>
+                </a:solidFill>
+              </a:defRPr>
+            </a:lvl5pPr>
+            <a:lvl6pPr>
+              <a:defRPr>
+                <a:solidFill>
+                  <a:schemeClr val="dk1"/>
+                </a:solidFill>
+              </a:defRPr>
+            </a:lvl6pPr>
+            <a:lvl7pPr>
+              <a:defRPr>
+                <a:solidFill>
+                  <a:schemeClr val="dk1"/>
+                </a:solidFill>
+              </a:defRPr>
+            </a:lvl7pPr>
+            <a:lvl8pPr>
+              <a:defRPr>
+                <a:solidFill>
+                  <a:schemeClr val="dk1"/>
+                </a:solidFill>
+              </a:defRPr>
+            </a:lvl8pPr>
+            <a:lvl9pPr>
+              <a:defRPr>
+                <a:solidFill>
+                  <a:schemeClr val="dk1"/>
+                </a:solidFill>
+              </a:defRPr>
+            </a:lvl9pPr>
+          </a:lstStyle>
+          <a:p>
+            <a:pPr defTabSz="672130"/>
+            <a:r>
+              <a:rPr lang="pt-BR" sz="1176" b="0" dirty="0">
+                <a:solidFill>
+                  <a:prstClr val="black"/>
+                </a:solidFill>
+                <a:latin typeface="Exo 2 Medium" panose="00000600000000000000" pitchFamily="50" charset="0"/>
+              </a:rPr>
+              <a:t>Front</a:t>
+            </a:r>
+          </a:p>
+        </p:txBody>
+      </p:sp>
+      <p:sp>
+        <p:nvSpPr>
+          <p:cNvPr id="27" name="Oval 134">
+            <a:extLst>
+              <a:ext uri="{FF2B5EF4-FFF2-40B4-BE49-F238E27FC236}">
+                <a16:creationId xmlns:a16="http://schemas.microsoft.com/office/drawing/2014/main" id="{E0659533-7794-44EF-87B8-DFFD796E8DCB}"/>
+              </a:ext>
+            </a:extLst>
+          </p:cNvPr>
+          <p:cNvSpPr>
+            <a:spLocks noChangeAspect="1"/>
+          </p:cNvSpPr>
+          <p:nvPr/>
+        </p:nvSpPr>
+        <p:spPr>
+          <a:xfrm>
+            <a:off x="8443555" y="297930"/>
+            <a:ext cx="211404" cy="211689"/>
+          </a:xfrm>
+          <a:prstGeom prst="ellipse">
+            <a:avLst/>
+          </a:prstGeom>
+          <a:solidFill>
+            <a:srgbClr val="1BCF13"/>
+          </a:solidFill>
+          <a:ln w="12700">
+            <a:solidFill>
+              <a:schemeClr val="accent3"/>
+            </a:solidFill>
+          </a:ln>
+        </p:spPr>
+        <p:style>
+          <a:lnRef idx="2">
+            <a:schemeClr val="accent1">
+              <a:shade val="50000"/>
+            </a:schemeClr>
+          </a:lnRef>
+          <a:fillRef idx="1">
+            <a:schemeClr val="accent1"/>
+          </a:fillRef>
+          <a:effectRef idx="0">
+            <a:schemeClr val="accent1"/>
+          </a:effectRef>
+          <a:fontRef idx="minor">
+            <a:schemeClr val="lt1"/>
+          </a:fontRef>
+        </p:style>
+        <p:txBody>
+          <a:bodyPr wrap="none" lIns="52922" tIns="52922" rIns="52922" rtlCol="0" anchor="ctr"/>
+          <a:lstStyle/>
+          <a:p>
+            <a:pPr algn="ctr" defTabSz="672130"/>
+            <a:endParaRPr lang="en-US" sz="1176" dirty="0">
+              <a:solidFill>
+                <a:srgbClr val="FFC000"/>
+              </a:solidFill>
+              <a:latin typeface="Exo 2 Medium" panose="00000600000000000000" pitchFamily="50" charset="0"/>
+              <a:cs typeface="Simplon BP Regular"/>
+            </a:endParaRPr>
+          </a:p>
+        </p:txBody>
+      </p:sp>
+      <p:sp>
+        <p:nvSpPr>
+          <p:cNvPr id="28" name="TextBox 138">
+            <a:extLst>
+              <a:ext uri="{FF2B5EF4-FFF2-40B4-BE49-F238E27FC236}">
+                <a16:creationId xmlns:a16="http://schemas.microsoft.com/office/drawing/2014/main" id="{CFC76C64-835E-4901-A393-78B96741EBC6}"/>
+              </a:ext>
+            </a:extLst>
+          </p:cNvPr>
+          <p:cNvSpPr txBox="1"/>
+          <p:nvPr/>
+        </p:nvSpPr>
+        <p:spPr>
+          <a:xfrm>
+            <a:off x="8126053" y="576471"/>
+            <a:ext cx="899678" cy="179824"/>
+          </a:xfrm>
+          <a:prstGeom prst="rect">
+            <a:avLst/>
+          </a:prstGeom>
+          <a:noFill/>
+          <a:ln w="12700">
+            <a:noFill/>
+          </a:ln>
+        </p:spPr>
+        <p:style>
+          <a:lnRef idx="2">
+            <a:schemeClr val="accent4"/>
+          </a:lnRef>
+          <a:fillRef idx="1">
+            <a:schemeClr val="lt1"/>
+          </a:fillRef>
+          <a:effectRef idx="0">
+            <a:schemeClr val="accent4"/>
+          </a:effectRef>
+          <a:fontRef idx="minor">
+            <a:schemeClr val="dk1"/>
+          </a:fontRef>
+        </p:style>
+        <p:txBody>
+          <a:bodyPr wrap="none" lIns="52922" tIns="52922" rIns="52922" bIns="0" rtlCol="0" anchor="b"/>
+          <a:lstStyle>
+            <a:defPPr>
+              <a:defRPr lang="en-US"/>
+            </a:defPPr>
+            <a:lvl1pPr algn="ctr">
+              <a:defRPr sz="1000" b="1">
+                <a:latin typeface="Simplon BP Regular"/>
+                <a:cs typeface="Simplon BP Regular"/>
+              </a:defRPr>
+            </a:lvl1pPr>
+            <a:lvl2pPr>
+              <a:defRPr>
+                <a:solidFill>
+                  <a:schemeClr val="dk1"/>
+                </a:solidFill>
+              </a:defRPr>
+            </a:lvl2pPr>
+            <a:lvl3pPr>
+              <a:defRPr>
+                <a:solidFill>
+                  <a:schemeClr val="dk1"/>
+                </a:solidFill>
+              </a:defRPr>
+            </a:lvl3pPr>
+            <a:lvl4pPr>
+              <a:defRPr>
+                <a:solidFill>
+                  <a:schemeClr val="dk1"/>
+                </a:solidFill>
+              </a:defRPr>
+            </a:lvl4pPr>
+            <a:lvl5pPr>
+              <a:defRPr>
+                <a:solidFill>
+                  <a:schemeClr val="dk1"/>
+                </a:solidFill>
+              </a:defRPr>
+            </a:lvl5pPr>
+            <a:lvl6pPr>
+              <a:defRPr>
+                <a:solidFill>
+                  <a:schemeClr val="dk1"/>
+                </a:solidFill>
+              </a:defRPr>
+            </a:lvl6pPr>
+            <a:lvl7pPr>
+              <a:defRPr>
+                <a:solidFill>
+                  <a:schemeClr val="dk1"/>
+                </a:solidFill>
+              </a:defRPr>
+            </a:lvl7pPr>
+            <a:lvl8pPr>
+              <a:defRPr>
+                <a:solidFill>
+                  <a:schemeClr val="dk1"/>
+                </a:solidFill>
+              </a:defRPr>
+            </a:lvl8pPr>
+            <a:lvl9pPr>
+              <a:defRPr>
+                <a:solidFill>
+                  <a:schemeClr val="dk1"/>
+                </a:solidFill>
+              </a:defRPr>
+            </a:lvl9pPr>
+          </a:lstStyle>
+          <a:p>
+            <a:pPr defTabSz="672130"/>
+            <a:r>
+              <a:rPr lang="en-US" sz="1176" b="0" dirty="0" err="1">
+                <a:solidFill>
+                  <a:prstClr val="black"/>
+                </a:solidFill>
+                <a:latin typeface="Exo 2 Medium" panose="00000600000000000000" pitchFamily="50" charset="0"/>
+              </a:rPr>
+              <a:t>Equipe</a:t>
+            </a:r>
+            <a:endParaRPr lang="en-US" sz="1176" b="0" dirty="0">
+              <a:solidFill>
+                <a:prstClr val="black"/>
+              </a:solidFill>
+              <a:latin typeface="Exo 2 Medium" panose="00000600000000000000" pitchFamily="50" charset="0"/>
+            </a:endParaRPr>
+          </a:p>
+        </p:txBody>
+      </p:sp>
+      <p:sp>
+        <p:nvSpPr>
+          <p:cNvPr id="29" name="Retângulo 28">
+            <a:extLst>
+              <a:ext uri="{FF2B5EF4-FFF2-40B4-BE49-F238E27FC236}">
+                <a16:creationId xmlns:a16="http://schemas.microsoft.com/office/drawing/2014/main" id="{1E43F633-0A68-4D0F-AC0D-375E22F80328}"/>
+              </a:ext>
+            </a:extLst>
+          </p:cNvPr>
+          <p:cNvSpPr/>
+          <p:nvPr/>
+        </p:nvSpPr>
+        <p:spPr>
+          <a:xfrm>
+            <a:off x="512766" y="868345"/>
+            <a:ext cx="6186608" cy="238150"/>
+          </a:xfrm>
+          <a:prstGeom prst="rect">
+            <a:avLst/>
+          </a:prstGeom>
+          <a:solidFill>
+            <a:srgbClr val="08276B"/>
+          </a:solidFill>
+        </p:spPr>
+        <p:txBody>
+          <a:bodyPr vert="horz" lIns="134422" tIns="67211" rIns="134422" bIns="67211" rtlCol="0" anchor="ctr"/>
+          <a:lstStyle/>
+          <a:p>
+            <a:pPr defTabSz="672130"/>
+            <a:r>
+              <a:rPr lang="en-US" sz="1544" dirty="0">
+                <a:solidFill>
+                  <a:schemeClr val="bg1"/>
+                </a:solidFill>
+                <a:latin typeface="Exo 2 Medium" panose="00000600000000000000" pitchFamily="50" charset="0"/>
+                <a:ea typeface="Simplon Oi Headline" charset="0"/>
+                <a:cs typeface="Simplon Oi Headline" charset="0"/>
+              </a:rPr>
+              <a:t>Progressos c/ responsáveis </a:t>
+            </a:r>
+          </a:p>
+        </p:txBody>
+      </p:sp>
+      <p:sp>
+        <p:nvSpPr>
+          <p:cNvPr id="30" name="Retângulo 29">
+            <a:extLst>
+              <a:ext uri="{FF2B5EF4-FFF2-40B4-BE49-F238E27FC236}">
+                <a16:creationId xmlns:a16="http://schemas.microsoft.com/office/drawing/2014/main" id="{D543C29D-67E1-4031-9D29-169B0DBC6EA2}"/>
+              </a:ext>
+            </a:extLst>
+          </p:cNvPr>
+          <p:cNvSpPr/>
+          <p:nvPr/>
+        </p:nvSpPr>
+        <p:spPr>
+          <a:xfrm>
+            <a:off x="6814576" y="868345"/>
+            <a:ext cx="6194715" cy="238150"/>
+          </a:xfrm>
+          <a:prstGeom prst="rect">
+            <a:avLst/>
+          </a:prstGeom>
+          <a:solidFill>
+            <a:srgbClr val="08276B"/>
+          </a:solidFill>
+        </p:spPr>
+        <p:txBody>
+          <a:bodyPr vert="horz" lIns="134422" tIns="67211" rIns="134422" bIns="67211" rtlCol="0" anchor="ctr"/>
+          <a:lstStyle/>
+          <a:p>
+            <a:pPr defTabSz="672130"/>
+            <a:r>
+              <a:rPr lang="pt-BR" sz="1544" dirty="0">
+                <a:solidFill>
+                  <a:schemeClr val="bg1"/>
+                </a:solidFill>
+                <a:latin typeface="Exo 2 Medium" panose="00000600000000000000" pitchFamily="50" charset="0"/>
+                <a:ea typeface="Simplon Oi Headline" charset="0"/>
+                <a:cs typeface="Simplon Oi Headline" charset="0"/>
+              </a:rPr>
+              <a:t>Pontos atenção/ Principais Riscos</a:t>
+            </a:r>
+          </a:p>
+        </p:txBody>
+      </p:sp>
+      <p:sp>
+        <p:nvSpPr>
+          <p:cNvPr id="31" name="Retângulo 30">
+            <a:extLst>
+              <a:ext uri="{FF2B5EF4-FFF2-40B4-BE49-F238E27FC236}">
+                <a16:creationId xmlns:a16="http://schemas.microsoft.com/office/drawing/2014/main" id="{DA8C0DE2-12B6-4997-B780-BE9D9F8E16D6}"/>
+              </a:ext>
+            </a:extLst>
+          </p:cNvPr>
+          <p:cNvSpPr/>
+          <p:nvPr/>
+        </p:nvSpPr>
+        <p:spPr>
+          <a:xfrm>
+            <a:off x="508267" y="4152347"/>
+            <a:ext cx="12505521" cy="238150"/>
+          </a:xfrm>
+          <a:prstGeom prst="rect">
+            <a:avLst/>
+          </a:prstGeom>
+          <a:solidFill>
+            <a:srgbClr val="08276B"/>
+          </a:solidFill>
+        </p:spPr>
+        <p:txBody>
+          <a:bodyPr vert="horz" lIns="134422" tIns="67211" rIns="134422" bIns="67211" rtlCol="0" anchor="ctr"/>
+          <a:lstStyle/>
+          <a:p>
+            <a:pPr defTabSz="672130"/>
+            <a:r>
+              <a:rPr lang="pt-BR" sz="1544" dirty="0">
+                <a:solidFill>
+                  <a:schemeClr val="bg1"/>
+                </a:solidFill>
+                <a:latin typeface="Exo 2 Medium" panose="00000600000000000000" pitchFamily="50" charset="0"/>
+                <a:ea typeface="Simplon Oi Headline" charset="0"/>
+                <a:cs typeface="Simplon Oi Headline" charset="0"/>
+              </a:rPr>
+              <a:t>Próximos Passos c/ responsáveis </a:t>
+            </a:r>
+          </a:p>
+        </p:txBody>
+      </p:sp>
+      <p:sp>
+        <p:nvSpPr>
+          <p:cNvPr id="32" name="Rectangle 37">
+            <a:extLst>
+              <a:ext uri="{FF2B5EF4-FFF2-40B4-BE49-F238E27FC236}">
+                <a16:creationId xmlns:a16="http://schemas.microsoft.com/office/drawing/2014/main" id="{224F3AF8-BD84-4D63-8F6E-083FA677F2DB}"/>
+              </a:ext>
+            </a:extLst>
+          </p:cNvPr>
+          <p:cNvSpPr/>
+          <p:nvPr/>
+        </p:nvSpPr>
+        <p:spPr>
+          <a:xfrm>
+            <a:off x="496766" y="1106495"/>
+            <a:ext cx="6186608" cy="2962168"/>
+          </a:xfrm>
+          <a:prstGeom prst="rect">
+            <a:avLst/>
+          </a:prstGeom>
+          <a:noFill/>
+          <a:ln w="12700">
+            <a:solidFill>
+              <a:schemeClr val="bg1">
+                <a:lumMod val="50000"/>
+              </a:schemeClr>
+            </a:solidFill>
+          </a:ln>
+        </p:spPr>
+        <p:style>
+          <a:lnRef idx="2">
+            <a:schemeClr val="accent4"/>
+          </a:lnRef>
+          <a:fillRef idx="1">
+            <a:schemeClr val="lt1"/>
+          </a:fillRef>
+          <a:effectRef idx="0">
+            <a:schemeClr val="accent4"/>
+          </a:effectRef>
+          <a:fontRef idx="minor">
+            <a:schemeClr val="dk1"/>
+          </a:fontRef>
+        </p:style>
+        <p:txBody>
+          <a:bodyPr tIns="105844" rtlCol="0" anchor="t"/>
+          <a:lstStyle/>
+          <a:p>
+            <a:pPr marL="0" lvl="1" fontAlgn="base">
+              <a:spcBef>
+                <a:spcPct val="0"/>
+              </a:spcBef>
+              <a:defRPr/>
+            </a:pPr>
+            <a:r>
+              <a:rPr lang="pt-BR" sz="1323" b="1" dirty="0">
+                <a:solidFill>
+                  <a:schemeClr val="tx1"/>
+                </a:solidFill>
+                <a:latin typeface="Exo 2 Medium" panose="00000600000000000000" pitchFamily="50" charset="0"/>
+                <a:cs typeface="Simplon BP Regular"/>
+              </a:rPr>
+              <a:t>Finalização das telas</a:t>
+            </a:r>
+          </a:p>
+          <a:p>
+            <a:pPr marL="0" lvl="1" fontAlgn="base">
+              <a:spcBef>
+                <a:spcPct val="0"/>
+              </a:spcBef>
+              <a:defRPr/>
+            </a:pPr>
+            <a:r>
+              <a:rPr lang="pt-BR" sz="1323" dirty="0">
+                <a:solidFill>
+                  <a:schemeClr val="tx1"/>
+                </a:solidFill>
+                <a:latin typeface="Exo 2 Medium" panose="00000600000000000000" pitchFamily="50" charset="0"/>
+                <a:cs typeface="Simplon BP Regular"/>
+              </a:rPr>
+              <a:t>#Lucas Felix</a:t>
+            </a:r>
+          </a:p>
+          <a:p>
+            <a:pPr marL="0" lvl="1" fontAlgn="base">
+              <a:spcBef>
+                <a:spcPct val="0"/>
+              </a:spcBef>
+              <a:defRPr/>
+            </a:pPr>
+            <a:endParaRPr lang="pt-BR" sz="1323" b="1" dirty="0">
+              <a:solidFill>
+                <a:schemeClr val="tx1"/>
+              </a:solidFill>
+              <a:latin typeface="Exo 2 Medium" panose="00000600000000000000" pitchFamily="50" charset="0"/>
+              <a:cs typeface="Simplon BP Regular"/>
+            </a:endParaRPr>
+          </a:p>
+          <a:p>
+            <a:pPr marL="0" lvl="1" fontAlgn="base">
+              <a:spcBef>
+                <a:spcPct val="0"/>
+              </a:spcBef>
+              <a:defRPr/>
+            </a:pPr>
+            <a:r>
+              <a:rPr lang="pt-BR" sz="1323" b="1" dirty="0">
+                <a:solidFill>
+                  <a:schemeClr val="tx1"/>
+                </a:solidFill>
+                <a:latin typeface="Exo 2 Medium" panose="00000600000000000000" pitchFamily="50" charset="0"/>
+                <a:cs typeface="Simplon BP Regular"/>
+              </a:rPr>
+              <a:t>Desenvolvimento da OAT</a:t>
+            </a:r>
+          </a:p>
+          <a:p>
+            <a:pPr marL="0" lvl="1" fontAlgn="base">
+              <a:spcBef>
+                <a:spcPct val="0"/>
+              </a:spcBef>
+              <a:defRPr/>
+            </a:pPr>
+            <a:r>
+              <a:rPr lang="pt-BR" sz="1323" dirty="0">
+                <a:solidFill>
+                  <a:schemeClr val="tx1"/>
+                </a:solidFill>
+                <a:latin typeface="Exo 2 Medium" panose="00000600000000000000" pitchFamily="50" charset="0"/>
+                <a:cs typeface="Simplon BP Regular"/>
+              </a:rPr>
+              <a:t>#Lucas Ferreira</a:t>
+            </a:r>
+          </a:p>
+          <a:p>
+            <a:pPr marL="0" lvl="1" fontAlgn="base">
+              <a:spcBef>
+                <a:spcPct val="0"/>
+              </a:spcBef>
+              <a:defRPr/>
+            </a:pPr>
+            <a:endParaRPr lang="pt-BR" sz="1323" b="1" dirty="0">
+              <a:solidFill>
+                <a:schemeClr val="tx1"/>
+              </a:solidFill>
+              <a:latin typeface="Exo 2 Medium" panose="00000600000000000000" pitchFamily="50" charset="0"/>
+              <a:cs typeface="Simplon BP Regular"/>
+            </a:endParaRPr>
+          </a:p>
+          <a:p>
+            <a:pPr marL="0" lvl="1" fontAlgn="base">
+              <a:spcBef>
+                <a:spcPct val="0"/>
+              </a:spcBef>
+              <a:defRPr/>
+            </a:pPr>
+            <a:r>
+              <a:rPr lang="pt-BR" sz="1323" b="1" dirty="0">
+                <a:solidFill>
+                  <a:schemeClr val="tx1"/>
+                </a:solidFill>
+                <a:latin typeface="Exo 2 Medium" panose="00000600000000000000" pitchFamily="50" charset="0"/>
+                <a:cs typeface="Simplon BP Regular"/>
+              </a:rPr>
+              <a:t>Inserção do </a:t>
+            </a:r>
+            <a:r>
+              <a:rPr lang="pt-BR" sz="1323" b="1" dirty="0" err="1">
+                <a:solidFill>
+                  <a:schemeClr val="tx1"/>
+                </a:solidFill>
+                <a:latin typeface="Exo 2 Medium" panose="00000600000000000000" pitchFamily="50" charset="0"/>
+                <a:cs typeface="Simplon BP Regular"/>
+              </a:rPr>
+              <a:t>chatbot</a:t>
+            </a:r>
+            <a:r>
+              <a:rPr lang="pt-BR" sz="1323" b="1" dirty="0">
+                <a:solidFill>
+                  <a:schemeClr val="tx1"/>
+                </a:solidFill>
+                <a:latin typeface="Exo 2 Medium" panose="00000600000000000000" pitchFamily="50" charset="0"/>
+                <a:cs typeface="Simplon BP Regular"/>
+              </a:rPr>
+              <a:t> no sistema web</a:t>
+            </a:r>
+          </a:p>
+          <a:p>
+            <a:pPr marL="0" lvl="1" fontAlgn="base">
+              <a:spcBef>
+                <a:spcPct val="0"/>
+              </a:spcBef>
+              <a:defRPr/>
+            </a:pPr>
+            <a:r>
+              <a:rPr lang="pt-BR" sz="1323" dirty="0">
+                <a:solidFill>
+                  <a:schemeClr val="tx1"/>
+                </a:solidFill>
+                <a:latin typeface="Exo 2 Medium" panose="00000600000000000000" pitchFamily="50" charset="0"/>
+                <a:cs typeface="Simplon BP Regular"/>
+              </a:rPr>
+              <a:t>#João Oliveira</a:t>
+            </a:r>
+          </a:p>
+          <a:p>
+            <a:pPr fontAlgn="base">
+              <a:spcBef>
+                <a:spcPct val="0"/>
+              </a:spcBef>
+              <a:defRPr/>
+            </a:pPr>
+            <a:endParaRPr lang="pt-BR" sz="1323" dirty="0">
+              <a:solidFill>
+                <a:schemeClr val="tx1"/>
+              </a:solidFill>
+              <a:latin typeface="Exo 2 Medium" panose="00000600000000000000" pitchFamily="50" charset="0"/>
+              <a:cs typeface="Simplon BP Regular"/>
+            </a:endParaRPr>
+          </a:p>
+          <a:p>
+            <a:pPr fontAlgn="base">
+              <a:spcBef>
+                <a:spcPct val="0"/>
+              </a:spcBef>
+              <a:defRPr/>
+            </a:pPr>
+            <a:r>
+              <a:rPr lang="pt-BR" sz="1323" b="1" dirty="0">
+                <a:solidFill>
+                  <a:schemeClr val="tx1"/>
+                </a:solidFill>
+                <a:latin typeface="Exo 2 Medium" panose="00000600000000000000" pitchFamily="50" charset="0"/>
+                <a:cs typeface="Simplon BP Regular"/>
+              </a:rPr>
+              <a:t>Diagrama de Containers                                                   Atualização CRUD</a:t>
+            </a:r>
+          </a:p>
+          <a:p>
+            <a:pPr fontAlgn="base">
+              <a:spcBef>
+                <a:spcPct val="0"/>
+              </a:spcBef>
+              <a:defRPr/>
+            </a:pPr>
+            <a:r>
+              <a:rPr lang="pt-BR" sz="1323" b="1" dirty="0">
+                <a:solidFill>
+                  <a:schemeClr val="tx1"/>
+                </a:solidFill>
+                <a:latin typeface="Exo 2 Medium" panose="00000600000000000000" pitchFamily="50" charset="0"/>
+                <a:cs typeface="Simplon BP Regular"/>
+              </a:rPr>
+              <a:t>#</a:t>
+            </a:r>
+            <a:r>
+              <a:rPr lang="pt-BR" sz="1323" dirty="0">
+                <a:solidFill>
+                  <a:schemeClr val="tx1"/>
+                </a:solidFill>
+                <a:latin typeface="Exo 2 Medium" panose="00000600000000000000" pitchFamily="50" charset="0"/>
+                <a:cs typeface="Simplon BP Regular"/>
+              </a:rPr>
+              <a:t>Vinicius Novais </a:t>
+            </a:r>
+            <a:r>
+              <a:rPr lang="pt-BR" sz="1323" b="1" dirty="0">
+                <a:solidFill>
+                  <a:schemeClr val="tx1"/>
+                </a:solidFill>
+                <a:latin typeface="Exo 2 Medium" panose="00000600000000000000" pitchFamily="50" charset="0"/>
+                <a:cs typeface="Simplon BP Regular"/>
+              </a:rPr>
+              <a:t>                                                                 #</a:t>
+            </a:r>
+            <a:r>
+              <a:rPr lang="pt-BR" sz="1323" dirty="0">
+                <a:solidFill>
+                  <a:schemeClr val="tx1"/>
+                </a:solidFill>
+                <a:latin typeface="Exo 2 Medium" panose="00000600000000000000" pitchFamily="50" charset="0"/>
+                <a:cs typeface="Simplon BP Regular"/>
+              </a:rPr>
+              <a:t>Luiz Gustavo</a:t>
+            </a:r>
+            <a:r>
+              <a:rPr lang="pt-BR" sz="1323" b="1" dirty="0">
+                <a:solidFill>
+                  <a:schemeClr val="tx1"/>
+                </a:solidFill>
+                <a:latin typeface="Exo 2 Medium" panose="00000600000000000000" pitchFamily="50" charset="0"/>
+                <a:cs typeface="Simplon BP Regular"/>
+              </a:rPr>
+              <a:t>    </a:t>
+            </a:r>
+          </a:p>
+          <a:p>
+            <a:pPr fontAlgn="base">
+              <a:spcBef>
+                <a:spcPct val="0"/>
+              </a:spcBef>
+              <a:defRPr/>
+            </a:pPr>
+            <a:endParaRPr lang="pt-BR" sz="1323" b="1" dirty="0">
+              <a:solidFill>
+                <a:schemeClr val="tx1"/>
+              </a:solidFill>
+              <a:latin typeface="Exo 2 Medium" panose="00000600000000000000" pitchFamily="50" charset="0"/>
+              <a:cs typeface="Simplon BP Regular"/>
+            </a:endParaRPr>
+          </a:p>
+          <a:p>
+            <a:pPr fontAlgn="base">
+              <a:spcBef>
+                <a:spcPct val="0"/>
+              </a:spcBef>
+              <a:defRPr/>
+            </a:pPr>
+            <a:r>
+              <a:rPr lang="pt-BR" sz="1323" b="1" dirty="0">
+                <a:solidFill>
+                  <a:schemeClr val="tx1"/>
+                </a:solidFill>
+                <a:latin typeface="Exo 2 Medium" panose="00000600000000000000" pitchFamily="50" charset="0"/>
+                <a:cs typeface="Simplon BP Regular"/>
+              </a:rPr>
+              <a:t>Website em </a:t>
+            </a:r>
+            <a:r>
+              <a:rPr lang="pt-BR" sz="1323" b="1" dirty="0" err="1">
+                <a:solidFill>
+                  <a:schemeClr val="tx1"/>
+                </a:solidFill>
+                <a:latin typeface="Exo 2 Medium" panose="00000600000000000000" pitchFamily="50" charset="0"/>
+                <a:cs typeface="Simplon BP Regular"/>
+              </a:rPr>
+              <a:t>react</a:t>
+            </a:r>
+            <a:r>
+              <a:rPr lang="pt-BR" sz="1323" b="1" dirty="0">
+                <a:solidFill>
+                  <a:schemeClr val="tx1"/>
+                </a:solidFill>
+                <a:latin typeface="Exo 2 Medium" panose="00000600000000000000" pitchFamily="50" charset="0"/>
+                <a:cs typeface="Simplon BP Regular"/>
+              </a:rPr>
+              <a:t>                                                               Finalização das classes</a:t>
+            </a:r>
+          </a:p>
+          <a:p>
+            <a:pPr fontAlgn="base">
+              <a:spcBef>
+                <a:spcPct val="0"/>
+              </a:spcBef>
+              <a:defRPr/>
+            </a:pPr>
+            <a:r>
+              <a:rPr lang="pt-BR" sz="1323" b="1" dirty="0">
+                <a:solidFill>
+                  <a:schemeClr val="tx1"/>
+                </a:solidFill>
+                <a:latin typeface="Exo 2 Medium" panose="00000600000000000000" pitchFamily="50" charset="0"/>
+                <a:cs typeface="Simplon BP Regular"/>
+              </a:rPr>
+              <a:t>#</a:t>
+            </a:r>
+            <a:r>
+              <a:rPr lang="pt-BR" sz="1323" dirty="0">
+                <a:solidFill>
+                  <a:schemeClr val="tx1"/>
+                </a:solidFill>
+                <a:latin typeface="Exo 2 Medium" panose="00000600000000000000" pitchFamily="50" charset="0"/>
+                <a:cs typeface="Simplon BP Regular"/>
+              </a:rPr>
+              <a:t>Caio </a:t>
+            </a:r>
+            <a:r>
+              <a:rPr lang="pt-BR" sz="1323" dirty="0" err="1">
+                <a:solidFill>
+                  <a:schemeClr val="tx1"/>
+                </a:solidFill>
+                <a:latin typeface="Exo 2 Medium" panose="00000600000000000000" pitchFamily="50" charset="0"/>
+                <a:cs typeface="Simplon BP Regular"/>
+              </a:rPr>
+              <a:t>Elcio</a:t>
+            </a:r>
+            <a:r>
+              <a:rPr lang="pt-BR" sz="1323" dirty="0">
+                <a:solidFill>
+                  <a:schemeClr val="tx1"/>
+                </a:solidFill>
+                <a:latin typeface="Exo 2 Medium" panose="00000600000000000000" pitchFamily="50" charset="0"/>
+                <a:cs typeface="Simplon BP Regular"/>
+              </a:rPr>
+              <a:t> </a:t>
+            </a:r>
+            <a:r>
+              <a:rPr lang="pt-BR" sz="1323" b="1" dirty="0">
+                <a:solidFill>
+                  <a:schemeClr val="tx1"/>
+                </a:solidFill>
+                <a:latin typeface="Exo 2 Medium" panose="00000600000000000000" pitchFamily="50" charset="0"/>
+                <a:cs typeface="Simplon BP Regular"/>
+              </a:rPr>
+              <a:t>                                                                          #</a:t>
+            </a:r>
+            <a:r>
+              <a:rPr lang="pt-BR" sz="1323" dirty="0">
+                <a:solidFill>
+                  <a:schemeClr val="tx1"/>
+                </a:solidFill>
+                <a:latin typeface="Exo 2 Medium" panose="00000600000000000000" pitchFamily="50" charset="0"/>
+                <a:cs typeface="Simplon BP Regular"/>
+              </a:rPr>
+              <a:t>Luiz Gustavo</a:t>
+            </a:r>
+            <a:r>
+              <a:rPr lang="pt-BR" sz="1323" b="1" dirty="0">
+                <a:solidFill>
+                  <a:schemeClr val="tx1"/>
+                </a:solidFill>
+                <a:latin typeface="Exo 2 Medium" panose="00000600000000000000" pitchFamily="50" charset="0"/>
+                <a:cs typeface="Simplon BP Regular"/>
+              </a:rPr>
+              <a:t>    </a:t>
+            </a:r>
+          </a:p>
+        </p:txBody>
+      </p:sp>
+      <p:sp>
+        <p:nvSpPr>
+          <p:cNvPr id="33" name="Rectangle 43">
+            <a:extLst>
+              <a:ext uri="{FF2B5EF4-FFF2-40B4-BE49-F238E27FC236}">
+                <a16:creationId xmlns:a16="http://schemas.microsoft.com/office/drawing/2014/main" id="{F0F9D098-FF4D-4A23-BBE2-370207E68022}"/>
+              </a:ext>
+            </a:extLst>
+          </p:cNvPr>
+          <p:cNvSpPr>
+            <a:spLocks/>
+          </p:cNvSpPr>
+          <p:nvPr/>
+        </p:nvSpPr>
+        <p:spPr>
+          <a:xfrm>
+            <a:off x="512766" y="4500711"/>
+            <a:ext cx="12496525" cy="2808978"/>
+          </a:xfrm>
+          <a:prstGeom prst="rect">
+            <a:avLst/>
+          </a:prstGeom>
+          <a:noFill/>
+          <a:ln w="12700">
+            <a:solidFill>
+              <a:schemeClr val="bg1">
+                <a:lumMod val="50000"/>
+              </a:schemeClr>
+            </a:solidFill>
+          </a:ln>
+        </p:spPr>
+        <p:style>
+          <a:lnRef idx="2">
+            <a:schemeClr val="accent4"/>
+          </a:lnRef>
+          <a:fillRef idx="1">
+            <a:schemeClr val="lt1"/>
+          </a:fillRef>
+          <a:effectRef idx="0">
+            <a:schemeClr val="accent4"/>
+          </a:effectRef>
+          <a:fontRef idx="minor">
+            <a:schemeClr val="dk1"/>
+          </a:fontRef>
+        </p:style>
+        <p:txBody>
+          <a:bodyPr wrap="square" tIns="105844" numCol="3" rtlCol="0" anchor="t"/>
+          <a:lstStyle/>
+          <a:p>
+            <a:pPr marL="0" lvl="1" defTabSz="672130"/>
+            <a:r>
+              <a:rPr lang="pt-BR" sz="1323" b="1" dirty="0">
+                <a:solidFill>
+                  <a:schemeClr val="tx1"/>
+                </a:solidFill>
+                <a:latin typeface="Exo 2 Medium" panose="00000600000000000000" pitchFamily="50" charset="0"/>
+                <a:cs typeface="Simplon BP Regular"/>
+              </a:rPr>
+              <a:t>Iniciar função de chat entre </a:t>
+            </a:r>
+            <a:r>
+              <a:rPr lang="pt-BR" sz="1323" b="1" dirty="0" err="1">
+                <a:solidFill>
+                  <a:schemeClr val="tx1"/>
+                </a:solidFill>
+                <a:latin typeface="Exo 2 Medium" panose="00000600000000000000" pitchFamily="50" charset="0"/>
+                <a:cs typeface="Simplon BP Regular"/>
+              </a:rPr>
+              <a:t>dev</a:t>
+            </a:r>
+            <a:r>
+              <a:rPr lang="pt-BR" sz="1323" b="1" dirty="0">
+                <a:solidFill>
+                  <a:schemeClr val="tx1"/>
+                </a:solidFill>
+                <a:latin typeface="Exo 2 Medium" panose="00000600000000000000" pitchFamily="50" charset="0"/>
+                <a:cs typeface="Simplon BP Regular"/>
+              </a:rPr>
+              <a:t> e investidor</a:t>
+            </a:r>
+          </a:p>
+          <a:p>
+            <a:pPr marL="0" lvl="1" defTabSz="672130"/>
+            <a:r>
+              <a:rPr lang="pt-BR" sz="1323" b="1" dirty="0">
+                <a:solidFill>
+                  <a:schemeClr val="tx1"/>
+                </a:solidFill>
+                <a:latin typeface="Exo 2 Medium" panose="00000600000000000000" pitchFamily="50" charset="0"/>
+                <a:cs typeface="Simplon BP Regular"/>
+              </a:rPr>
+              <a:t>#</a:t>
+            </a:r>
+            <a:r>
+              <a:rPr lang="pt-BR" sz="1323" dirty="0">
+                <a:solidFill>
+                  <a:schemeClr val="tx1"/>
+                </a:solidFill>
+                <a:latin typeface="Exo 2 Medium" panose="00000600000000000000" pitchFamily="50" charset="0"/>
+                <a:cs typeface="Simplon BP Regular"/>
+              </a:rPr>
+              <a:t>João Oliveira</a:t>
+            </a:r>
+          </a:p>
+          <a:p>
+            <a:pPr marL="0" lvl="1" defTabSz="672130"/>
+            <a:endParaRPr lang="pt-BR" sz="1323" b="1" dirty="0">
+              <a:solidFill>
+                <a:schemeClr val="tx1"/>
+              </a:solidFill>
+              <a:latin typeface="Exo 2 Medium" panose="00000600000000000000" pitchFamily="50" charset="0"/>
+              <a:cs typeface="Simplon BP Regular"/>
+            </a:endParaRPr>
+          </a:p>
+          <a:p>
+            <a:pPr marL="0" lvl="1" defTabSz="672130"/>
+            <a:r>
+              <a:rPr lang="pt-BR" sz="1323" b="1" dirty="0">
+                <a:solidFill>
+                  <a:schemeClr val="tx1"/>
+                </a:solidFill>
+                <a:latin typeface="Exo 2 Medium" panose="00000600000000000000" pitchFamily="50" charset="0"/>
+                <a:cs typeface="Simplon BP Regular"/>
+              </a:rPr>
+              <a:t>Finalizar sistema após login em </a:t>
+            </a:r>
+            <a:r>
+              <a:rPr lang="pt-BR" sz="1323" b="1" dirty="0" err="1">
+                <a:solidFill>
+                  <a:schemeClr val="tx1"/>
+                </a:solidFill>
+                <a:latin typeface="Exo 2 Medium" panose="00000600000000000000" pitchFamily="50" charset="0"/>
+                <a:cs typeface="Simplon BP Regular"/>
+              </a:rPr>
+              <a:t>react</a:t>
+            </a:r>
+            <a:endParaRPr lang="pt-BR" sz="1323" b="1" dirty="0">
+              <a:solidFill>
+                <a:schemeClr val="tx1"/>
+              </a:solidFill>
+              <a:latin typeface="Exo 2 Medium" panose="00000600000000000000" pitchFamily="50" charset="0"/>
+              <a:cs typeface="Simplon BP Regular"/>
+            </a:endParaRPr>
+          </a:p>
+          <a:p>
+            <a:pPr marL="0" lvl="1" defTabSz="672130"/>
+            <a:r>
+              <a:rPr lang="pt-BR" sz="1323" b="1" dirty="0">
+                <a:solidFill>
+                  <a:schemeClr val="tx1"/>
+                </a:solidFill>
+                <a:latin typeface="Exo 2 Medium" panose="00000600000000000000" pitchFamily="50" charset="0"/>
+                <a:cs typeface="Simplon BP Regular"/>
+              </a:rPr>
+              <a:t>#</a:t>
+            </a:r>
+            <a:r>
+              <a:rPr lang="pt-BR" sz="1323" dirty="0">
+                <a:solidFill>
+                  <a:schemeClr val="tx1"/>
+                </a:solidFill>
+                <a:latin typeface="Exo 2 Medium" panose="00000600000000000000" pitchFamily="50" charset="0"/>
+                <a:cs typeface="Simplon BP Regular"/>
+              </a:rPr>
+              <a:t>Caio </a:t>
+            </a:r>
+            <a:r>
+              <a:rPr lang="pt-BR" sz="1323" dirty="0" err="1">
+                <a:solidFill>
+                  <a:schemeClr val="tx1"/>
+                </a:solidFill>
+                <a:latin typeface="Exo 2 Medium" panose="00000600000000000000" pitchFamily="50" charset="0"/>
+                <a:cs typeface="Simplon BP Regular"/>
+              </a:rPr>
+              <a:t>Elcio</a:t>
+            </a:r>
+            <a:endParaRPr lang="pt-BR" sz="1323" dirty="0">
+              <a:solidFill>
+                <a:schemeClr val="tx1"/>
+              </a:solidFill>
+              <a:latin typeface="Exo 2 Medium" panose="00000600000000000000" pitchFamily="50" charset="0"/>
+              <a:cs typeface="Simplon BP Regular"/>
+            </a:endParaRPr>
+          </a:p>
+          <a:p>
+            <a:pPr marL="0" lvl="1" defTabSz="672130"/>
+            <a:endParaRPr lang="pt-BR" sz="1323" b="1" dirty="0">
+              <a:solidFill>
+                <a:schemeClr val="tx1"/>
+              </a:solidFill>
+              <a:latin typeface="Exo 2 Medium" panose="00000600000000000000" pitchFamily="50" charset="0"/>
+              <a:cs typeface="Simplon BP Regular"/>
+            </a:endParaRPr>
+          </a:p>
+          <a:p>
+            <a:pPr marL="0" lvl="1" defTabSz="672130"/>
+            <a:r>
+              <a:rPr lang="pt-BR" sz="1323" b="1" dirty="0">
+                <a:solidFill>
+                  <a:schemeClr val="tx1"/>
+                </a:solidFill>
+                <a:latin typeface="Exo 2 Medium" panose="00000600000000000000" pitchFamily="50" charset="0"/>
+                <a:cs typeface="Simplon BP Regular"/>
+              </a:rPr>
+              <a:t>Finalizar OAT</a:t>
+            </a:r>
+          </a:p>
+          <a:p>
+            <a:pPr marL="0" lvl="1" defTabSz="672130"/>
+            <a:r>
+              <a:rPr lang="pt-BR" sz="1323" b="1" dirty="0">
+                <a:solidFill>
+                  <a:schemeClr val="tx1"/>
+                </a:solidFill>
+                <a:latin typeface="Exo 2 Medium" panose="00000600000000000000" pitchFamily="50" charset="0"/>
+                <a:cs typeface="Simplon BP Regular"/>
+              </a:rPr>
+              <a:t>#</a:t>
+            </a:r>
+            <a:r>
+              <a:rPr lang="pt-BR" sz="1323" dirty="0">
+                <a:solidFill>
+                  <a:schemeClr val="tx1"/>
+                </a:solidFill>
+                <a:latin typeface="Exo 2 Medium" panose="00000600000000000000" pitchFamily="50" charset="0"/>
+                <a:cs typeface="Simplon BP Regular"/>
+              </a:rPr>
+              <a:t>Lucas Ferreira</a:t>
+            </a:r>
+          </a:p>
+          <a:p>
+            <a:pPr marL="0" lvl="1" defTabSz="672130"/>
+            <a:endParaRPr lang="pt-BR" sz="1323" b="1" dirty="0">
+              <a:solidFill>
+                <a:schemeClr val="tx1"/>
+              </a:solidFill>
+              <a:latin typeface="Exo 2 Medium" panose="00000600000000000000" pitchFamily="50" charset="0"/>
+              <a:cs typeface="Simplon BP Regular"/>
+            </a:endParaRPr>
+          </a:p>
+          <a:p>
+            <a:pPr marL="0" lvl="1" defTabSz="672130"/>
+            <a:endParaRPr lang="pt-BR" sz="1323" b="1" dirty="0">
+              <a:solidFill>
+                <a:schemeClr val="tx1"/>
+              </a:solidFill>
+              <a:latin typeface="Exo 2 Medium" panose="00000600000000000000" pitchFamily="50" charset="0"/>
+              <a:cs typeface="Simplon BP Regular"/>
+            </a:endParaRPr>
+          </a:p>
+          <a:p>
+            <a:pPr marL="0" lvl="1" defTabSz="672130"/>
+            <a:r>
+              <a:rPr lang="pt-BR" sz="1323" b="1" dirty="0">
+                <a:solidFill>
+                  <a:schemeClr val="tx1"/>
+                </a:solidFill>
+                <a:latin typeface="Exo 2 Medium" panose="00000600000000000000" pitchFamily="50" charset="0"/>
+                <a:cs typeface="Simplon BP Regular"/>
+              </a:rPr>
+              <a:t>Iniciar integração</a:t>
+            </a:r>
+          </a:p>
+          <a:p>
+            <a:pPr marL="0" lvl="1" defTabSz="672130"/>
+            <a:r>
+              <a:rPr lang="pt-BR" sz="1323" b="1" dirty="0">
+                <a:solidFill>
+                  <a:schemeClr val="tx1"/>
+                </a:solidFill>
+                <a:latin typeface="Exo 2 Medium" panose="00000600000000000000" pitchFamily="50" charset="0"/>
+                <a:cs typeface="Simplon BP Regular"/>
+              </a:rPr>
+              <a:t>#</a:t>
+            </a:r>
+            <a:r>
+              <a:rPr lang="pt-BR" sz="1323" dirty="0">
+                <a:solidFill>
+                  <a:schemeClr val="tx1"/>
+                </a:solidFill>
+                <a:latin typeface="Exo 2 Medium" panose="00000600000000000000" pitchFamily="50" charset="0"/>
+                <a:cs typeface="Simplon BP Regular"/>
+              </a:rPr>
+              <a:t>Time todo</a:t>
+            </a:r>
+          </a:p>
+          <a:p>
+            <a:pPr marL="0" lvl="1" defTabSz="672130"/>
+            <a:endParaRPr lang="pt-BR" sz="1323" b="1" dirty="0">
+              <a:solidFill>
+                <a:schemeClr val="tx1"/>
+              </a:solidFill>
+              <a:latin typeface="Exo 2 Medium" panose="00000600000000000000" pitchFamily="50" charset="0"/>
+              <a:cs typeface="Simplon BP Regular"/>
+            </a:endParaRPr>
+          </a:p>
+          <a:p>
+            <a:pPr marL="0" lvl="1" defTabSz="672130"/>
+            <a:r>
+              <a:rPr lang="pt-BR" sz="1323" b="1" dirty="0">
+                <a:solidFill>
+                  <a:schemeClr val="tx1"/>
+                </a:solidFill>
+                <a:latin typeface="Exo 2 Medium" panose="00000600000000000000" pitchFamily="50" charset="0"/>
+                <a:cs typeface="Simplon BP Regular"/>
+              </a:rPr>
+              <a:t>Documento de Layout de Importação de Dados a partir de um Arquivo Texto com Header / Corpo / Trailer.</a:t>
+            </a:r>
+          </a:p>
+          <a:p>
+            <a:pPr marL="0" lvl="1" defTabSz="672130"/>
+            <a:r>
+              <a:rPr lang="pt-BR" sz="1323" b="1" dirty="0">
+                <a:solidFill>
+                  <a:schemeClr val="tx1"/>
+                </a:solidFill>
+                <a:latin typeface="Exo 2 Medium" panose="00000600000000000000" pitchFamily="50" charset="0"/>
+                <a:cs typeface="Simplon BP Regular"/>
+              </a:rPr>
+              <a:t>#</a:t>
+            </a:r>
+            <a:r>
+              <a:rPr lang="pt-BR" sz="1323" dirty="0">
+                <a:solidFill>
+                  <a:schemeClr val="tx1"/>
+                </a:solidFill>
+                <a:latin typeface="Exo 2 Medium" panose="00000600000000000000" pitchFamily="50" charset="0"/>
+                <a:cs typeface="Simplon BP Regular"/>
+              </a:rPr>
+              <a:t>Luiz Gustavo</a:t>
+            </a:r>
+          </a:p>
+          <a:p>
+            <a:pPr marL="0" lvl="1" defTabSz="672130"/>
+            <a:endParaRPr lang="pt-BR" sz="1323" b="1" dirty="0">
+              <a:solidFill>
+                <a:schemeClr val="tx1"/>
+              </a:solidFill>
+              <a:latin typeface="Exo 2 Medium" panose="00000600000000000000" pitchFamily="50" charset="0"/>
+              <a:cs typeface="Simplon BP Regular"/>
+            </a:endParaRPr>
+          </a:p>
+          <a:p>
+            <a:pPr marL="0" lvl="1" defTabSz="672130"/>
+            <a:endParaRPr lang="pt-BR" sz="1323" b="1" dirty="0">
+              <a:solidFill>
+                <a:schemeClr val="tx1"/>
+              </a:solidFill>
+              <a:latin typeface="Exo 2 Medium" panose="00000600000000000000" pitchFamily="50" charset="0"/>
+              <a:cs typeface="Simplon BP Regular"/>
+            </a:endParaRPr>
+          </a:p>
+          <a:p>
+            <a:pPr marL="0" lvl="1" defTabSz="672130"/>
+            <a:r>
+              <a:rPr lang="pt-BR" sz="1323" b="1" dirty="0">
+                <a:solidFill>
+                  <a:schemeClr val="tx1"/>
+                </a:solidFill>
+                <a:latin typeface="Exo 2 Medium" panose="00000600000000000000" pitchFamily="50" charset="0"/>
+                <a:cs typeface="Simplon BP Regular"/>
+              </a:rPr>
+              <a:t>Upload do projeto integrado ao banco</a:t>
+            </a:r>
+          </a:p>
+          <a:p>
+            <a:pPr marL="0" lvl="1" defTabSz="672130"/>
+            <a:r>
+              <a:rPr lang="pt-BR" sz="1323" dirty="0">
+                <a:solidFill>
+                  <a:schemeClr val="tx1"/>
+                </a:solidFill>
+                <a:latin typeface="Exo 2 Medium" panose="00000600000000000000" pitchFamily="50" charset="0"/>
+                <a:cs typeface="Simplon BP Regular"/>
+              </a:rPr>
+              <a:t>#Lucas Félix</a:t>
+            </a:r>
+          </a:p>
+        </p:txBody>
+      </p:sp>
+      <p:sp>
+        <p:nvSpPr>
+          <p:cNvPr id="34" name="Oval 134">
+            <a:extLst>
+              <a:ext uri="{FF2B5EF4-FFF2-40B4-BE49-F238E27FC236}">
+                <a16:creationId xmlns:a16="http://schemas.microsoft.com/office/drawing/2014/main" id="{B57AA8A8-84FD-48DE-BA43-08D253C6F275}"/>
+              </a:ext>
+            </a:extLst>
+          </p:cNvPr>
+          <p:cNvSpPr>
+            <a:spLocks noChangeAspect="1"/>
+          </p:cNvSpPr>
+          <p:nvPr/>
+        </p:nvSpPr>
+        <p:spPr>
+          <a:xfrm>
+            <a:off x="9225955" y="297930"/>
+            <a:ext cx="211404" cy="211689"/>
+          </a:xfrm>
+          <a:prstGeom prst="ellipse">
+            <a:avLst/>
+          </a:prstGeom>
+          <a:solidFill>
+            <a:srgbClr val="1BCF13"/>
+          </a:solidFill>
+          <a:ln w="12700">
+            <a:solidFill>
+              <a:schemeClr val="accent3"/>
+            </a:solidFill>
+          </a:ln>
+        </p:spPr>
+        <p:style>
+          <a:lnRef idx="2">
+            <a:schemeClr val="accent1">
+              <a:shade val="50000"/>
+            </a:schemeClr>
+          </a:lnRef>
+          <a:fillRef idx="1">
+            <a:schemeClr val="accent1"/>
+          </a:fillRef>
+          <a:effectRef idx="0">
+            <a:schemeClr val="accent1"/>
+          </a:effectRef>
+          <a:fontRef idx="minor">
+            <a:schemeClr val="lt1"/>
+          </a:fontRef>
+        </p:style>
+        <p:txBody>
+          <a:bodyPr wrap="none" lIns="52922" tIns="52922" rIns="52922" rtlCol="0" anchor="ctr"/>
+          <a:lstStyle/>
+          <a:p>
+            <a:pPr algn="ctr" defTabSz="672130"/>
+            <a:endParaRPr lang="en-US" sz="1176" dirty="0">
+              <a:solidFill>
+                <a:srgbClr val="00B050"/>
+              </a:solidFill>
+              <a:latin typeface="Exo 2 Medium" panose="00000600000000000000" pitchFamily="50" charset="0"/>
+              <a:cs typeface="Simplon BP Regular"/>
+            </a:endParaRPr>
+          </a:p>
+        </p:txBody>
+      </p:sp>
+      <p:sp>
+        <p:nvSpPr>
+          <p:cNvPr id="35" name="Oval 120">
+            <a:extLst>
+              <a:ext uri="{FF2B5EF4-FFF2-40B4-BE49-F238E27FC236}">
+                <a16:creationId xmlns:a16="http://schemas.microsoft.com/office/drawing/2014/main" id="{DAAADCBD-ECD9-4B5D-A8E0-075FB6F9BED7}"/>
+              </a:ext>
+            </a:extLst>
+          </p:cNvPr>
+          <p:cNvSpPr>
+            <a:spLocks noChangeAspect="1"/>
+          </p:cNvSpPr>
+          <p:nvPr/>
+        </p:nvSpPr>
+        <p:spPr>
+          <a:xfrm>
+            <a:off x="10188056" y="324247"/>
+            <a:ext cx="211404" cy="211689"/>
+          </a:xfrm>
+          <a:prstGeom prst="ellipse">
+            <a:avLst/>
+          </a:prstGeom>
+          <a:solidFill>
+            <a:srgbClr val="FFFF00"/>
+          </a:solidFill>
+          <a:ln w="12700">
+            <a:solidFill>
+              <a:schemeClr val="accent3"/>
+            </a:solidFill>
+          </a:ln>
+        </p:spPr>
+        <p:style>
+          <a:lnRef idx="2">
+            <a:schemeClr val="accent1">
+              <a:shade val="50000"/>
+            </a:schemeClr>
+          </a:lnRef>
+          <a:fillRef idx="1">
+            <a:schemeClr val="accent1"/>
+          </a:fillRef>
+          <a:effectRef idx="0">
+            <a:schemeClr val="accent1"/>
+          </a:effectRef>
+          <a:fontRef idx="minor">
+            <a:schemeClr val="lt1"/>
+          </a:fontRef>
+        </p:style>
+        <p:txBody>
+          <a:bodyPr wrap="none" lIns="52922" tIns="52922" rIns="52922" rtlCol="0" anchor="ctr"/>
+          <a:lstStyle/>
+          <a:p>
+            <a:pPr algn="ctr" defTabSz="672130"/>
+            <a:endParaRPr lang="en-US" sz="1176" dirty="0">
+              <a:solidFill>
+                <a:srgbClr val="1BCF13"/>
+              </a:solidFill>
+              <a:latin typeface="Exo 2 Medium" panose="00000600000000000000" pitchFamily="50" charset="0"/>
+              <a:cs typeface="Simplon BP Regular"/>
+            </a:endParaRPr>
+          </a:p>
+        </p:txBody>
+      </p:sp>
+      <p:sp>
+        <p:nvSpPr>
+          <p:cNvPr id="36" name="Retângulo 35">
+            <a:extLst>
+              <a:ext uri="{FF2B5EF4-FFF2-40B4-BE49-F238E27FC236}">
+                <a16:creationId xmlns:a16="http://schemas.microsoft.com/office/drawing/2014/main" id="{A87B1CA7-18E0-459A-8B40-B30CC45C209A}"/>
+              </a:ext>
+            </a:extLst>
+          </p:cNvPr>
+          <p:cNvSpPr/>
+          <p:nvPr/>
+        </p:nvSpPr>
+        <p:spPr>
+          <a:xfrm>
+            <a:off x="8017619" y="209534"/>
+            <a:ext cx="4937689" cy="618769"/>
+          </a:xfrm>
+          <a:prstGeom prst="rect">
+            <a:avLst/>
+          </a:prstGeom>
+          <a:noFill/>
+          <a:ln w="6350">
+            <a:solidFill>
+              <a:schemeClr val="bg1">
+                <a:lumMod val="75000"/>
+              </a:schemeClr>
+            </a:solidFill>
+          </a:ln>
+        </p:spPr>
+        <p:style>
+          <a:lnRef idx="2">
+            <a:schemeClr val="accent1">
+              <a:shade val="50000"/>
+            </a:schemeClr>
+          </a:lnRef>
+          <a:fillRef idx="1">
+            <a:schemeClr val="accent1"/>
+          </a:fillRef>
+          <a:effectRef idx="0">
+            <a:schemeClr val="accent1"/>
+          </a:effectRef>
+          <a:fontRef idx="minor">
+            <a:schemeClr val="lt1"/>
+          </a:fontRef>
+        </p:style>
+        <p:txBody>
+          <a:bodyPr rtlCol="0" anchor="ctr"/>
+          <a:lstStyle/>
+          <a:p>
+            <a:pPr algn="ctr"/>
+            <a:endParaRPr lang="pt-BR">
+              <a:latin typeface="Exo 2 Medium" panose="00000600000000000000" pitchFamily="50" charset="0"/>
+            </a:endParaRPr>
+          </a:p>
+        </p:txBody>
+      </p:sp>
+      <p:sp>
+        <p:nvSpPr>
+          <p:cNvPr id="37" name="TextBox 138">
+            <a:extLst>
+              <a:ext uri="{FF2B5EF4-FFF2-40B4-BE49-F238E27FC236}">
+                <a16:creationId xmlns:a16="http://schemas.microsoft.com/office/drawing/2014/main" id="{41B46BEE-7CCD-459E-800A-B6E0E71F7FC7}"/>
+              </a:ext>
+            </a:extLst>
+          </p:cNvPr>
+          <p:cNvSpPr txBox="1"/>
+          <p:nvPr/>
+        </p:nvSpPr>
+        <p:spPr>
+          <a:xfrm>
+            <a:off x="9715810" y="51570"/>
+            <a:ext cx="1478088" cy="211688"/>
+          </a:xfrm>
+          <a:prstGeom prst="rect">
+            <a:avLst/>
+          </a:prstGeom>
+          <a:solidFill>
+            <a:schemeClr val="bg1"/>
+          </a:solidFill>
+          <a:ln w="12700">
+            <a:noFill/>
+          </a:ln>
+        </p:spPr>
+        <p:style>
+          <a:lnRef idx="2">
+            <a:schemeClr val="accent4"/>
+          </a:lnRef>
+          <a:fillRef idx="1">
+            <a:schemeClr val="lt1"/>
+          </a:fillRef>
+          <a:effectRef idx="0">
+            <a:schemeClr val="accent4"/>
+          </a:effectRef>
+          <a:fontRef idx="minor">
+            <a:schemeClr val="dk1"/>
+          </a:fontRef>
+        </p:style>
+        <p:txBody>
+          <a:bodyPr wrap="none" lIns="52922" tIns="52922" rIns="52922" bIns="0" rtlCol="0" anchor="b"/>
+          <a:lstStyle>
+            <a:defPPr>
+              <a:defRPr lang="en-US"/>
+            </a:defPPr>
+            <a:lvl1pPr algn="ctr">
+              <a:defRPr sz="1000" b="1">
+                <a:latin typeface="Simplon BP Regular"/>
+                <a:cs typeface="Simplon BP Regular"/>
+              </a:defRPr>
+            </a:lvl1pPr>
+            <a:lvl2pPr>
+              <a:defRPr>
+                <a:solidFill>
+                  <a:schemeClr val="dk1"/>
+                </a:solidFill>
+              </a:defRPr>
+            </a:lvl2pPr>
+            <a:lvl3pPr>
+              <a:defRPr>
+                <a:solidFill>
+                  <a:schemeClr val="dk1"/>
+                </a:solidFill>
+              </a:defRPr>
+            </a:lvl3pPr>
+            <a:lvl4pPr>
+              <a:defRPr>
+                <a:solidFill>
+                  <a:schemeClr val="dk1"/>
+                </a:solidFill>
+              </a:defRPr>
+            </a:lvl4pPr>
+            <a:lvl5pPr>
+              <a:defRPr>
+                <a:solidFill>
+                  <a:schemeClr val="dk1"/>
+                </a:solidFill>
+              </a:defRPr>
+            </a:lvl5pPr>
+            <a:lvl6pPr>
+              <a:defRPr>
+                <a:solidFill>
+                  <a:schemeClr val="dk1"/>
+                </a:solidFill>
+              </a:defRPr>
+            </a:lvl6pPr>
+            <a:lvl7pPr>
+              <a:defRPr>
+                <a:solidFill>
+                  <a:schemeClr val="dk1"/>
+                </a:solidFill>
+              </a:defRPr>
+            </a:lvl7pPr>
+            <a:lvl8pPr>
+              <a:defRPr>
+                <a:solidFill>
+                  <a:schemeClr val="dk1"/>
+                </a:solidFill>
+              </a:defRPr>
+            </a:lvl8pPr>
+            <a:lvl9pPr>
+              <a:defRPr>
+                <a:solidFill>
+                  <a:schemeClr val="dk1"/>
+                </a:solidFill>
+              </a:defRPr>
+            </a:lvl9pPr>
+          </a:lstStyle>
+          <a:p>
+            <a:pPr defTabSz="672130"/>
+            <a:r>
+              <a:rPr lang="en-US" sz="1176" dirty="0">
+                <a:solidFill>
+                  <a:srgbClr val="08276B"/>
+                </a:solidFill>
+                <a:latin typeface="Exo 2 Medium" panose="00000600000000000000" pitchFamily="50" charset="0"/>
+              </a:rPr>
+              <a:t>    </a:t>
+            </a:r>
+            <a:r>
+              <a:rPr lang="en-US" sz="1176" dirty="0" err="1">
+                <a:solidFill>
+                  <a:srgbClr val="08276B"/>
+                </a:solidFill>
+                <a:latin typeface="Exo 2 Medium" panose="00000600000000000000" pitchFamily="50" charset="0"/>
+              </a:rPr>
+              <a:t>Farol</a:t>
+            </a:r>
+            <a:r>
+              <a:rPr lang="en-US" sz="1176" dirty="0">
+                <a:solidFill>
+                  <a:srgbClr val="08276B"/>
+                </a:solidFill>
+                <a:latin typeface="Exo 2 Medium" panose="00000600000000000000" pitchFamily="50" charset="0"/>
+              </a:rPr>
+              <a:t> do </a:t>
+            </a:r>
+            <a:r>
+              <a:rPr lang="en-US" sz="1176" dirty="0" err="1">
+                <a:solidFill>
+                  <a:srgbClr val="08276B"/>
+                </a:solidFill>
+                <a:latin typeface="Exo 2 Medium" panose="00000600000000000000" pitchFamily="50" charset="0"/>
+              </a:rPr>
+              <a:t>Projeto</a:t>
+            </a:r>
+            <a:r>
+              <a:rPr lang="en-US" sz="1176" dirty="0">
+                <a:solidFill>
+                  <a:srgbClr val="08276B"/>
+                </a:solidFill>
+                <a:latin typeface="Exo 2 Medium" panose="00000600000000000000" pitchFamily="50" charset="0"/>
+              </a:rPr>
+              <a:t>   </a:t>
+            </a:r>
+          </a:p>
+        </p:txBody>
+      </p:sp>
+      <p:sp>
+        <p:nvSpPr>
+          <p:cNvPr id="38" name="Oval 134">
+            <a:extLst>
+              <a:ext uri="{FF2B5EF4-FFF2-40B4-BE49-F238E27FC236}">
+                <a16:creationId xmlns:a16="http://schemas.microsoft.com/office/drawing/2014/main" id="{AC71B70F-2DA1-4D18-9AC0-DCFDF0FE0D5C}"/>
+              </a:ext>
+            </a:extLst>
+          </p:cNvPr>
+          <p:cNvSpPr>
+            <a:spLocks noChangeAspect="1"/>
+          </p:cNvSpPr>
+          <p:nvPr/>
+        </p:nvSpPr>
+        <p:spPr>
+          <a:xfrm>
+            <a:off x="12166910" y="328582"/>
+            <a:ext cx="211404" cy="211689"/>
+          </a:xfrm>
+          <a:prstGeom prst="ellipse">
+            <a:avLst/>
+          </a:prstGeom>
+          <a:solidFill>
+            <a:srgbClr val="1BCF13"/>
+          </a:solidFill>
+          <a:ln w="12700">
+            <a:solidFill>
+              <a:schemeClr val="accent3"/>
+            </a:solidFill>
+          </a:ln>
+        </p:spPr>
+        <p:style>
+          <a:lnRef idx="2">
+            <a:schemeClr val="accent1">
+              <a:shade val="50000"/>
+            </a:schemeClr>
+          </a:lnRef>
+          <a:fillRef idx="1">
+            <a:schemeClr val="accent1"/>
+          </a:fillRef>
+          <a:effectRef idx="0">
+            <a:schemeClr val="accent1"/>
+          </a:effectRef>
+          <a:fontRef idx="minor">
+            <a:schemeClr val="lt1"/>
+          </a:fontRef>
+        </p:style>
+        <p:txBody>
+          <a:bodyPr wrap="none" lIns="52922" tIns="52922" rIns="52922" rtlCol="0" anchor="ctr"/>
+          <a:lstStyle/>
+          <a:p>
+            <a:pPr algn="ctr" defTabSz="672130"/>
+            <a:endParaRPr lang="en-US" sz="1176" dirty="0">
+              <a:solidFill>
+                <a:srgbClr val="FFC000"/>
+              </a:solidFill>
+              <a:latin typeface="Exo 2 Medium" panose="00000600000000000000" pitchFamily="50" charset="0"/>
+              <a:cs typeface="Simplon BP Regular"/>
+            </a:endParaRPr>
+          </a:p>
+        </p:txBody>
+      </p:sp>
+    </p:spTree>
+    <p:extLst>
+      <p:ext uri="{BB962C8B-B14F-4D97-AF65-F5344CB8AC3E}">
+        <p14:creationId xmlns:p14="http://schemas.microsoft.com/office/powerpoint/2010/main" val="1871888551"/>
       </p:ext>
     </p:extLst>
   </p:cSld>
@@ -42220,6 +44484,15 @@
 </file>
 
 <file path=customXml/item2.xml><?xml version="1.0" encoding="utf-8"?>
+<?mso-contentType ?>
+<FormTemplates xmlns="http://schemas.microsoft.com/sharepoint/v3/contenttype/forms">
+  <Display>DocumentLibraryForm</Display>
+  <Edit>DocumentLibraryForm</Edit>
+  <New>DocumentLibraryForm</New>
+</FormTemplates>
+</file>
+
+<file path=customXml/item3.xml><?xml version="1.0" encoding="utf-8"?>
 <ct:contentTypeSchema xmlns:ct="http://schemas.microsoft.com/office/2006/metadata/contentType" xmlns:ma="http://schemas.microsoft.com/office/2006/metadata/properties/metaAttributes" ct:_="" ma:_="" ma:contentTypeName="Document" ma:contentTypeID="0x0101007F8ECE7139958D46ABEDA89D12B90CBF" ma:contentTypeVersion="0" ma:contentTypeDescription="Create a new document." ma:contentTypeScope="" ma:versionID="e6d660081116f63565d30cc13099d5ec">
   <xsd:schema xmlns:xsd="http://www.w3.org/2001/XMLSchema" xmlns:xs="http://www.w3.org/2001/XMLSchema" xmlns:p="http://schemas.microsoft.com/office/2006/metadata/properties" targetNamespace="http://schemas.microsoft.com/office/2006/metadata/properties" ma:root="true" ma:fieldsID="d413257cd9829394d17656a545d5fa4e">
     <xsd:element name="properties">
@@ -42333,15 +44606,6 @@
 </ct:contentTypeSchema>
 </file>
 
-<file path=customXml/item3.xml><?xml version="1.0" encoding="utf-8"?>
-<?mso-contentType ?>
-<FormTemplates xmlns="http://schemas.microsoft.com/sharepoint/v3/contenttype/forms">
-  <Display>DocumentLibraryForm</Display>
-  <Edit>DocumentLibraryForm</Edit>
-  <New>DocumentLibraryForm</New>
-</FormTemplates>
-</file>
-
 <file path=customXml/itemProps1.xml><?xml version="1.0" encoding="utf-8"?>
 <ds:datastoreItem xmlns:ds="http://schemas.openxmlformats.org/officeDocument/2006/customXml" ds:itemID="{4B31267F-D399-4A8A-87F8-B75F56828412}">
   <ds:schemaRefs>
@@ -42360,6 +44624,14 @@
 </file>
 
 <file path=customXml/itemProps2.xml><?xml version="1.0" encoding="utf-8"?>
+<ds:datastoreItem xmlns:ds="http://schemas.openxmlformats.org/officeDocument/2006/customXml" ds:itemID="{E2481852-F24E-4532-AF30-C154D705D105}">
+  <ds:schemaRefs>
+    <ds:schemaRef ds:uri="http://schemas.microsoft.com/sharepoint/v3/contenttype/forms"/>
+  </ds:schemaRefs>
+</ds:datastoreItem>
+</file>
+
+<file path=customXml/itemProps3.xml><?xml version="1.0" encoding="utf-8"?>
 <ds:datastoreItem xmlns:ds="http://schemas.openxmlformats.org/officeDocument/2006/customXml" ds:itemID="{EFDE92A4-5D2A-451A-A373-EB014CDC0D59}">
   <ds:schemaRefs>
     <ds:schemaRef ds:uri="http://schemas.microsoft.com/office/2006/metadata/contentType"/>
@@ -42373,12 +44645,4 @@
     <ds:schemaRef ds:uri="http://schemas.microsoft.com/office/infopath/2007/PartnerControls"/>
   </ds:schemaRefs>
 </ds:datastoreItem>
-</file>
-
-<file path=customXml/itemProps3.xml><?xml version="1.0" encoding="utf-8"?>
-<ds:datastoreItem xmlns:ds="http://schemas.openxmlformats.org/officeDocument/2006/customXml" ds:itemID="{E2481852-F24E-4532-AF30-C154D705D105}">
-  <ds:schemaRefs>
-    <ds:schemaRef ds:uri="http://schemas.microsoft.com/sharepoint/v3/contenttype/forms"/>
-  </ds:schemaRefs>
-</ds:datastoreItem>
 </file>
</xml_diff>